<commit_message>
inspectSginal, Report, I/O data
Added a new class to inspect signal: inspectSignal. Moved isWhite to
inspectSginal.
Some changes to the report
Modified input.mat and output.mat so that now each experiment is
separated in 3 parts, both the input and the output
</commit_message>
<xml_diff>
--- a/report/Report.pptx
+++ b/report/Report.pptx
@@ -260,7 +260,7 @@
           <a:p>
             <a:fld id="{843C4FC0-81D1-4453-9443-D3E156B7E80B}" type="datetimeFigureOut">
               <a:rPr lang="en-GB" smtClean="0"/>
-              <a:t>04/04/2015</a:t>
+              <a:t>05/04/2015</a:t>
             </a:fld>
             <a:endParaRPr lang="en-GB"/>
           </a:p>
@@ -430,7 +430,7 @@
           <a:p>
             <a:fld id="{843C4FC0-81D1-4453-9443-D3E156B7E80B}" type="datetimeFigureOut">
               <a:rPr lang="en-GB" smtClean="0"/>
-              <a:t>04/04/2015</a:t>
+              <a:t>05/04/2015</a:t>
             </a:fld>
             <a:endParaRPr lang="en-GB"/>
           </a:p>
@@ -610,7 +610,7 @@
           <a:p>
             <a:fld id="{843C4FC0-81D1-4453-9443-D3E156B7E80B}" type="datetimeFigureOut">
               <a:rPr lang="en-GB" smtClean="0"/>
-              <a:t>04/04/2015</a:t>
+              <a:t>05/04/2015</a:t>
             </a:fld>
             <a:endParaRPr lang="en-GB"/>
           </a:p>
@@ -1391,7 +1391,7 @@
           <a:p>
             <a:fld id="{843C4FC0-81D1-4453-9443-D3E156B7E80B}" type="datetimeFigureOut">
               <a:rPr lang="en-GB" smtClean="0"/>
-              <a:t>04/04/2015</a:t>
+              <a:t>05/04/2015</a:t>
             </a:fld>
             <a:endParaRPr lang="en-GB"/>
           </a:p>
@@ -1637,7 +1637,7 @@
           <a:p>
             <a:fld id="{843C4FC0-81D1-4453-9443-D3E156B7E80B}" type="datetimeFigureOut">
               <a:rPr lang="en-GB" smtClean="0"/>
-              <a:t>04/04/2015</a:t>
+              <a:t>05/04/2015</a:t>
             </a:fld>
             <a:endParaRPr lang="en-GB"/>
           </a:p>
@@ -1869,7 +1869,7 @@
           <a:p>
             <a:fld id="{843C4FC0-81D1-4453-9443-D3E156B7E80B}" type="datetimeFigureOut">
               <a:rPr lang="en-GB" smtClean="0"/>
-              <a:t>04/04/2015</a:t>
+              <a:t>05/04/2015</a:t>
             </a:fld>
             <a:endParaRPr lang="en-GB"/>
           </a:p>
@@ -2236,7 +2236,7 @@
           <a:p>
             <a:fld id="{843C4FC0-81D1-4453-9443-D3E156B7E80B}" type="datetimeFigureOut">
               <a:rPr lang="en-GB" smtClean="0"/>
-              <a:t>04/04/2015</a:t>
+              <a:t>05/04/2015</a:t>
             </a:fld>
             <a:endParaRPr lang="en-GB"/>
           </a:p>
@@ -2354,7 +2354,7 @@
           <a:p>
             <a:fld id="{843C4FC0-81D1-4453-9443-D3E156B7E80B}" type="datetimeFigureOut">
               <a:rPr lang="en-GB" smtClean="0"/>
-              <a:t>04/04/2015</a:t>
+              <a:t>05/04/2015</a:t>
             </a:fld>
             <a:endParaRPr lang="en-GB"/>
           </a:p>
@@ -2449,7 +2449,7 @@
           <a:p>
             <a:fld id="{843C4FC0-81D1-4453-9443-D3E156B7E80B}" type="datetimeFigureOut">
               <a:rPr lang="en-GB" smtClean="0"/>
-              <a:t>04/04/2015</a:t>
+              <a:t>05/04/2015</a:t>
             </a:fld>
             <a:endParaRPr lang="en-GB"/>
           </a:p>
@@ -2726,7 +2726,7 @@
           <a:p>
             <a:fld id="{843C4FC0-81D1-4453-9443-D3E156B7E80B}" type="datetimeFigureOut">
               <a:rPr lang="en-GB" smtClean="0"/>
-              <a:t>04/04/2015</a:t>
+              <a:t>05/04/2015</a:t>
             </a:fld>
             <a:endParaRPr lang="en-GB"/>
           </a:p>
@@ -2979,7 +2979,7 @@
           <a:p>
             <a:fld id="{843C4FC0-81D1-4453-9443-D3E156B7E80B}" type="datetimeFigureOut">
               <a:rPr lang="en-GB" smtClean="0"/>
-              <a:t>04/04/2015</a:t>
+              <a:t>05/04/2015</a:t>
             </a:fld>
             <a:endParaRPr lang="en-GB"/>
           </a:p>
@@ -3192,7 +3192,7 @@
           <a:p>
             <a:fld id="{843C4FC0-81D1-4453-9443-D3E156B7E80B}" type="datetimeFigureOut">
               <a:rPr lang="en-GB" smtClean="0"/>
-              <a:t>04/04/2015</a:t>
+              <a:t>05/04/2015</a:t>
             </a:fld>
             <a:endParaRPr lang="en-GB"/>
           </a:p>
@@ -4966,15 +4966,7 @@
                   <a:srgbClr val="004F84"/>
                 </a:solidFill>
               </a:rPr>
-              <a:t>Model Identification</a:t>
-            </a:r>
-            <a:r>
-              <a:rPr lang="en-GB" altLang="en-US" b="1" dirty="0" smtClean="0">
-                <a:solidFill>
-                  <a:srgbClr val="004F84"/>
-                </a:solidFill>
-              </a:rPr>
-              <a:t>: </a:t>
+              <a:t>Model Identification: </a:t>
             </a:r>
             <a:r>
               <a:rPr lang="en-GB" altLang="en-US" sz="2200" b="1" i="1" dirty="0" smtClean="0">
@@ -4982,15 +4974,7 @@
                   <a:srgbClr val="004F84"/>
                 </a:solidFill>
               </a:rPr>
-              <a:t>Comparison of Black-Box </a:t>
-            </a:r>
-            <a:r>
-              <a:rPr lang="en-GB" altLang="en-US" sz="2200" b="1" i="1" dirty="0" smtClean="0">
-                <a:solidFill>
-                  <a:srgbClr val="004F84"/>
-                </a:solidFill>
-              </a:rPr>
-              <a:t>methods to identify the attitude dynamics of a </a:t>
+              <a:t>Comparison of Black-Box methods to identify the attitude dynamics of a </a:t>
             </a:r>
             <a:r>
               <a:rPr lang="en-GB" altLang="en-US" sz="2200" b="1" i="1" dirty="0" err="1" smtClean="0">
@@ -5588,16 +5572,6 @@
               </a:rPr>
               <a:t>GOAL</a:t>
             </a:r>
-            <a:endParaRPr kumimoji="0" lang="en-GB" sz="2400" b="1" i="0" u="none" strike="noStrike" cap="none" normalizeH="0" baseline="0" dirty="0" smtClean="0">
-              <a:ln>
-                <a:noFill/>
-              </a:ln>
-              <a:solidFill>
-                <a:schemeClr val="tx1"/>
-              </a:solidFill>
-              <a:effectLst/>
-              <a:latin typeface="Arial" charset="0"/>
-            </a:endParaRPr>
           </a:p>
         </p:txBody>
       </p:sp>
@@ -5671,21 +5645,11 @@
               </a:rPr>
               <a:t>DATA</a:t>
             </a:r>
-            <a:endParaRPr kumimoji="0" lang="en-GB" sz="2400" b="1" i="0" u="none" strike="noStrike" cap="none" normalizeH="0" baseline="0" dirty="0" smtClean="0">
-              <a:ln>
-                <a:noFill/>
-              </a:ln>
-              <a:solidFill>
-                <a:schemeClr val="tx1"/>
-              </a:solidFill>
-              <a:effectLst/>
-              <a:latin typeface="Arial" charset="0"/>
-            </a:endParaRPr>
-          </a:p>
-        </p:txBody>
-      </p:sp>
-      <mc:AlternateContent xmlns:mc="http://schemas.openxmlformats.org/markup-compatibility/2006">
-        <mc:Choice xmlns:a14="http://schemas.microsoft.com/office/drawing/2010/main" Requires="a14">
+          </a:p>
+        </p:txBody>
+      </p:sp>
+      <mc:AlternateContent xmlns:mc="http://schemas.openxmlformats.org/markup-compatibility/2006" xmlns:a14="http://schemas.microsoft.com/office/drawing/2010/main">
+        <mc:Choice Requires="a14">
           <p:sp>
             <p:nvSpPr>
               <p:cNvPr id="9" name="TextBox 8"/>
@@ -5836,7 +5800,7 @@
             </p:txBody>
           </p:sp>
         </mc:Choice>
-        <mc:Fallback>
+        <mc:Fallback xmlns="">
           <p:sp>
             <p:nvSpPr>
               <p:cNvPr id="9" name="TextBox 8"/>
@@ -5945,16 +5909,6 @@
               </a:rPr>
               <a:t>TOOLS</a:t>
             </a:r>
-            <a:endParaRPr kumimoji="0" lang="en-GB" sz="2400" b="1" i="0" u="none" strike="noStrike" cap="none" normalizeH="0" baseline="0" dirty="0" smtClean="0">
-              <a:ln>
-                <a:noFill/>
-              </a:ln>
-              <a:solidFill>
-                <a:schemeClr val="tx1"/>
-              </a:solidFill>
-              <a:effectLst/>
-              <a:latin typeface="Arial" charset="0"/>
-            </a:endParaRPr>
           </a:p>
         </p:txBody>
       </p:sp>
@@ -6203,16 +6157,6 @@
               </a:rPr>
               <a:t>Experiment</a:t>
             </a:r>
-            <a:endParaRPr kumimoji="0" lang="en-GB" sz="2400" b="1" i="0" u="none" strike="noStrike" cap="none" normalizeH="0" baseline="0" dirty="0" smtClean="0">
-              <a:ln>
-                <a:noFill/>
-              </a:ln>
-              <a:solidFill>
-                <a:schemeClr val="tx1"/>
-              </a:solidFill>
-              <a:effectLst/>
-              <a:latin typeface="Arial" charset="0"/>
-            </a:endParaRPr>
           </a:p>
         </p:txBody>
       </p:sp>
@@ -6286,16 +6230,6 @@
               </a:rPr>
               <a:t>Data Processing</a:t>
             </a:r>
-            <a:endParaRPr kumimoji="0" lang="en-GB" sz="2400" b="1" i="0" u="none" strike="noStrike" cap="none" normalizeH="0" baseline="0" dirty="0" smtClean="0">
-              <a:ln>
-                <a:noFill/>
-              </a:ln>
-              <a:solidFill>
-                <a:schemeClr val="tx1"/>
-              </a:solidFill>
-              <a:effectLst/>
-              <a:latin typeface="Arial" charset="0"/>
-            </a:endParaRPr>
           </a:p>
         </p:txBody>
       </p:sp>
@@ -6369,16 +6303,6 @@
               </a:rPr>
               <a:t>Model Identification</a:t>
             </a:r>
-            <a:endParaRPr kumimoji="0" lang="en-GB" sz="2400" b="1" i="0" u="none" strike="noStrike" cap="none" normalizeH="0" baseline="0" dirty="0" smtClean="0">
-              <a:ln>
-                <a:noFill/>
-              </a:ln>
-              <a:solidFill>
-                <a:schemeClr val="tx1"/>
-              </a:solidFill>
-              <a:effectLst/>
-              <a:latin typeface="Arial" charset="0"/>
-            </a:endParaRPr>
           </a:p>
         </p:txBody>
       </p:sp>
@@ -6452,16 +6376,6 @@
               </a:rPr>
               <a:t>Validation</a:t>
             </a:r>
-            <a:endParaRPr kumimoji="0" lang="en-GB" sz="2400" b="1" i="0" u="none" strike="noStrike" cap="none" normalizeH="0" baseline="0" dirty="0" smtClean="0">
-              <a:ln>
-                <a:noFill/>
-              </a:ln>
-              <a:solidFill>
-                <a:schemeClr val="tx1"/>
-              </a:solidFill>
-              <a:effectLst/>
-              <a:latin typeface="Arial" charset="0"/>
-            </a:endParaRPr>
           </a:p>
         </p:txBody>
       </p:sp>
@@ -6835,6 +6749,1101 @@
           </a:p>
         </p:txBody>
       </p:sp>
+      <mc:AlternateContent xmlns:mc="http://schemas.openxmlformats.org/markup-compatibility/2006">
+        <mc:Choice xmlns:a14="http://schemas.microsoft.com/office/drawing/2010/main" Requires="a14">
+          <p:sp>
+            <p:nvSpPr>
+              <p:cNvPr id="4" name="TextBox 3"/>
+              <p:cNvSpPr txBox="1"/>
+              <p:nvPr/>
+            </p:nvSpPr>
+            <p:spPr>
+              <a:xfrm>
+                <a:off x="546100" y="2209800"/>
+                <a:ext cx="11375422" cy="3788088"/>
+              </a:xfrm>
+              <a:prstGeom prst="rect">
+                <a:avLst/>
+              </a:prstGeom>
+              <a:noFill/>
+            </p:spPr>
+            <p:txBody>
+              <a:bodyPr wrap="none" rtlCol="0">
+                <a:spAutoFit/>
+              </a:bodyPr>
+              <a:lstStyle/>
+              <a:p>
+                <a:pPr marL="285750" indent="-285750">
+                  <a:buFont typeface="Arial" panose="020B0604020202020204" pitchFamily="34" charset="0"/>
+                  <a:buChar char="•"/>
+                </a:pPr>
+                <a:r>
+                  <a:rPr lang="en-GB" dirty="0" smtClean="0"/>
+                  <a:t>Three experiments, done in the following manner for </a:t>
+                </a:r>
+                <a14:m>
+                  <m:oMath xmlns:m="http://schemas.openxmlformats.org/officeDocument/2006/math">
+                    <m:r>
+                      <a:rPr lang="en-GB" b="0" i="1" smtClean="0">
+                        <a:latin typeface="Cambria Math" panose="02040503050406030204" pitchFamily="18" charset="0"/>
+                      </a:rPr>
+                      <m:t>𝑡</m:t>
+                    </m:r>
+                    <m:r>
+                      <a:rPr lang="en-GB" b="0" i="1" smtClean="0">
+                        <a:latin typeface="Cambria Math" panose="02040503050406030204" pitchFamily="18" charset="0"/>
+                      </a:rPr>
+                      <m:t>∈</m:t>
+                    </m:r>
+                    <m:d>
+                      <m:dPr>
+                        <m:begChr m:val="["/>
+                        <m:endChr m:val="]"/>
+                        <m:ctrlPr>
+                          <a:rPr lang="en-GB" b="0" i="1" smtClean="0">
+                            <a:latin typeface="Cambria Math" panose="02040503050406030204" pitchFamily="18" charset="0"/>
+                          </a:rPr>
+                        </m:ctrlPr>
+                      </m:dPr>
+                      <m:e>
+                        <m:r>
+                          <a:rPr lang="en-GB" b="0" i="1" smtClean="0">
+                            <a:latin typeface="Cambria Math" panose="02040503050406030204" pitchFamily="18" charset="0"/>
+                          </a:rPr>
+                          <m:t>0, </m:t>
+                        </m:r>
+                        <m:r>
+                          <a:rPr lang="en-GB" b="0" i="1" smtClean="0">
+                            <a:latin typeface="Cambria Math" panose="02040503050406030204" pitchFamily="18" charset="0"/>
+                          </a:rPr>
+                          <m:t>𝑇</m:t>
+                        </m:r>
+                      </m:e>
+                    </m:d>
+                    <m:r>
+                      <a:rPr lang="en-GB" b="0" i="1" smtClean="0">
+                        <a:latin typeface="Cambria Math" panose="02040503050406030204" pitchFamily="18" charset="0"/>
+                      </a:rPr>
+                      <m:t>:</m:t>
+                    </m:r>
+                  </m:oMath>
+                </a14:m>
+                <a:endParaRPr lang="en-GB" dirty="0" smtClean="0"/>
+              </a:p>
+              <a:p>
+                <a:pPr marL="742950" lvl="1" indent="-285750">
+                  <a:buFont typeface="Arial" panose="020B0604020202020204" pitchFamily="34" charset="0"/>
+                  <a:buChar char="•"/>
+                </a:pPr>
+                <a:r>
+                  <a:rPr lang="en-GB" dirty="0" smtClean="0"/>
+                  <a:t>For </a:t>
+                </a:r>
+                <a14:m>
+                  <m:oMath xmlns:m="http://schemas.openxmlformats.org/officeDocument/2006/math">
+                    <m:r>
+                      <a:rPr lang="en-GB" b="0" i="1" smtClean="0">
+                        <a:latin typeface="Cambria Math" panose="02040503050406030204" pitchFamily="18" charset="0"/>
+                      </a:rPr>
+                      <m:t>𝑡</m:t>
+                    </m:r>
+                    <m:r>
+                      <a:rPr lang="en-GB" b="0" i="1" smtClean="0">
+                        <a:latin typeface="Cambria Math" panose="02040503050406030204" pitchFamily="18" charset="0"/>
+                      </a:rPr>
+                      <m:t>∈[0, </m:t>
+                    </m:r>
+                    <m:sSub>
+                      <m:sSubPr>
+                        <m:ctrlPr>
+                          <a:rPr lang="en-GB" b="0" i="1" smtClean="0">
+                            <a:latin typeface="Cambria Math" panose="02040503050406030204" pitchFamily="18" charset="0"/>
+                          </a:rPr>
+                        </m:ctrlPr>
+                      </m:sSubPr>
+                      <m:e>
+                        <m:r>
+                          <a:rPr lang="en-GB" b="0" i="1" smtClean="0">
+                            <a:latin typeface="Cambria Math" panose="02040503050406030204" pitchFamily="18" charset="0"/>
+                          </a:rPr>
+                          <m:t>𝑇</m:t>
+                        </m:r>
+                      </m:e>
+                      <m:sub>
+                        <m:r>
+                          <a:rPr lang="en-GB" b="0" i="1" smtClean="0">
+                            <a:latin typeface="Cambria Math" panose="02040503050406030204" pitchFamily="18" charset="0"/>
+                          </a:rPr>
+                          <m:t>1</m:t>
+                        </m:r>
+                      </m:sub>
+                    </m:sSub>
+                    <m:r>
+                      <a:rPr lang="en-GB" b="0" i="1" smtClean="0">
+                        <a:latin typeface="Cambria Math" panose="02040503050406030204" pitchFamily="18" charset="0"/>
+                      </a:rPr>
+                      <m:t>]</m:t>
+                    </m:r>
+                  </m:oMath>
+                </a14:m>
+                <a:r>
+                  <a:rPr lang="en-GB" dirty="0" smtClean="0"/>
+                  <a:t> the system is closed loop, with a PD regulator and a certain reference </a:t>
+                </a:r>
+                <a14:m>
+                  <m:oMath xmlns:m="http://schemas.openxmlformats.org/officeDocument/2006/math">
+                    <m:r>
+                      <a:rPr lang="en-GB" b="0" i="1" smtClean="0">
+                        <a:latin typeface="Cambria Math" panose="02040503050406030204" pitchFamily="18" charset="0"/>
+                      </a:rPr>
+                      <m:t>𝑟</m:t>
+                    </m:r>
+                    <m:d>
+                      <m:dPr>
+                        <m:ctrlPr>
+                          <a:rPr lang="en-GB" b="0" i="1" smtClean="0">
+                            <a:latin typeface="Cambria Math" panose="02040503050406030204" pitchFamily="18" charset="0"/>
+                          </a:rPr>
+                        </m:ctrlPr>
+                      </m:dPr>
+                      <m:e>
+                        <m:r>
+                          <a:rPr lang="en-GB" b="0" i="1" smtClean="0">
+                            <a:latin typeface="Cambria Math" panose="02040503050406030204" pitchFamily="18" charset="0"/>
+                          </a:rPr>
+                          <m:t>𝑡</m:t>
+                        </m:r>
+                      </m:e>
+                    </m:d>
+                    <m:r>
+                      <a:rPr lang="en-GB" b="0" i="0" smtClean="0">
+                        <a:latin typeface="Cambria Math" panose="02040503050406030204" pitchFamily="18" charset="0"/>
+                      </a:rPr>
+                      <m:t>.</m:t>
+                    </m:r>
+                  </m:oMath>
+                </a14:m>
+                <a:endParaRPr lang="en-GB" b="0" dirty="0" smtClean="0"/>
+              </a:p>
+              <a:p>
+                <a:pPr marL="742950" lvl="1" indent="-285750">
+                  <a:buFont typeface="Arial" panose="020B0604020202020204" pitchFamily="34" charset="0"/>
+                  <a:buChar char="•"/>
+                </a:pPr>
+                <a:r>
+                  <a:rPr lang="en-GB" dirty="0" smtClean="0"/>
+                  <a:t>For </a:t>
+                </a:r>
+                <a14:m>
+                  <m:oMath xmlns:m="http://schemas.openxmlformats.org/officeDocument/2006/math">
+                    <m:r>
+                      <a:rPr lang="en-GB" b="0" i="1" smtClean="0">
+                        <a:latin typeface="Cambria Math" panose="02040503050406030204" pitchFamily="18" charset="0"/>
+                      </a:rPr>
+                      <m:t>𝑡</m:t>
+                    </m:r>
+                    <m:r>
+                      <a:rPr lang="en-GB" b="0" i="1" smtClean="0">
+                        <a:latin typeface="Cambria Math" panose="02040503050406030204" pitchFamily="18" charset="0"/>
+                      </a:rPr>
+                      <m:t>∈</m:t>
+                    </m:r>
+                    <m:d>
+                      <m:dPr>
+                        <m:begChr m:val="["/>
+                        <m:endChr m:val="]"/>
+                        <m:ctrlPr>
+                          <a:rPr lang="en-GB" b="0" i="1" smtClean="0">
+                            <a:latin typeface="Cambria Math" panose="02040503050406030204" pitchFamily="18" charset="0"/>
+                          </a:rPr>
+                        </m:ctrlPr>
+                      </m:dPr>
+                      <m:e>
+                        <m:sSub>
+                          <m:sSubPr>
+                            <m:ctrlPr>
+                              <a:rPr lang="en-GB" b="0" i="1" smtClean="0">
+                                <a:latin typeface="Cambria Math" panose="02040503050406030204" pitchFamily="18" charset="0"/>
+                              </a:rPr>
+                            </m:ctrlPr>
+                          </m:sSubPr>
+                          <m:e>
+                            <m:r>
+                              <a:rPr lang="en-GB" b="0" i="1" smtClean="0">
+                                <a:latin typeface="Cambria Math" panose="02040503050406030204" pitchFamily="18" charset="0"/>
+                              </a:rPr>
+                              <m:t>𝑇</m:t>
+                            </m:r>
+                          </m:e>
+                          <m:sub>
+                            <m:r>
+                              <a:rPr lang="en-GB" b="0" i="1" smtClean="0">
+                                <a:latin typeface="Cambria Math" panose="02040503050406030204" pitchFamily="18" charset="0"/>
+                              </a:rPr>
+                              <m:t>1</m:t>
+                            </m:r>
+                          </m:sub>
+                        </m:sSub>
+                        <m:r>
+                          <a:rPr lang="en-GB" b="0" i="1" smtClean="0">
+                            <a:latin typeface="Cambria Math" panose="02040503050406030204" pitchFamily="18" charset="0"/>
+                          </a:rPr>
+                          <m:t>+0.2, </m:t>
+                        </m:r>
+                        <m:sSub>
+                          <m:sSubPr>
+                            <m:ctrlPr>
+                              <a:rPr lang="en-GB" b="0" i="1" smtClean="0">
+                                <a:latin typeface="Cambria Math" panose="02040503050406030204" pitchFamily="18" charset="0"/>
+                              </a:rPr>
+                            </m:ctrlPr>
+                          </m:sSubPr>
+                          <m:e>
+                            <m:r>
+                              <a:rPr lang="en-GB" b="0" i="1" smtClean="0">
+                                <a:latin typeface="Cambria Math" panose="02040503050406030204" pitchFamily="18" charset="0"/>
+                              </a:rPr>
+                              <m:t>𝑇</m:t>
+                            </m:r>
+                          </m:e>
+                          <m:sub>
+                            <m:r>
+                              <a:rPr lang="en-GB" b="0" i="1" smtClean="0">
+                                <a:latin typeface="Cambria Math" panose="02040503050406030204" pitchFamily="18" charset="0"/>
+                              </a:rPr>
+                              <m:t>2</m:t>
+                            </m:r>
+                          </m:sub>
+                        </m:sSub>
+                      </m:e>
+                    </m:d>
+                  </m:oMath>
+                </a14:m>
+                <a:r>
+                  <a:rPr lang="en-GB" dirty="0" smtClean="0"/>
+                  <a:t> the system is in open loop, where </a:t>
+                </a:r>
+                <a14:m>
+                  <m:oMath xmlns:m="http://schemas.openxmlformats.org/officeDocument/2006/math">
+                    <m:r>
+                      <a:rPr lang="en-GB" b="0" i="1" smtClean="0">
+                        <a:latin typeface="Cambria Math" panose="02040503050406030204" pitchFamily="18" charset="0"/>
+                      </a:rPr>
+                      <m:t>𝑢</m:t>
+                    </m:r>
+                    <m:r>
+                      <a:rPr lang="en-GB" b="0" i="1" smtClean="0">
+                        <a:latin typeface="Cambria Math" panose="02040503050406030204" pitchFamily="18" charset="0"/>
+                      </a:rPr>
+                      <m:t>(</m:t>
+                    </m:r>
+                    <m:r>
+                      <a:rPr lang="en-GB" b="0" i="1" smtClean="0">
+                        <a:latin typeface="Cambria Math" panose="02040503050406030204" pitchFamily="18" charset="0"/>
+                      </a:rPr>
+                      <m:t>𝑡</m:t>
+                    </m:r>
+                    <m:r>
+                      <a:rPr lang="en-GB" b="0" i="1" smtClean="0">
+                        <a:latin typeface="Cambria Math" panose="02040503050406030204" pitchFamily="18" charset="0"/>
+                      </a:rPr>
+                      <m:t>)</m:t>
+                    </m:r>
+                  </m:oMath>
+                </a14:m>
+                <a:r>
+                  <a:rPr lang="en-GB" dirty="0" smtClean="0"/>
+                  <a:t> is a PRBS </a:t>
+                </a:r>
+                <a:r>
+                  <a:rPr lang="en-GB" sz="1400" dirty="0" smtClean="0"/>
+                  <a:t>(Pseudo random binary source)</a:t>
+                </a:r>
+                <a:r>
+                  <a:rPr lang="en-GB" dirty="0" smtClean="0"/>
+                  <a:t> signal.</a:t>
+                </a:r>
+              </a:p>
+              <a:p>
+                <a:pPr marL="742950" lvl="1" indent="-285750">
+                  <a:buFont typeface="Arial" panose="020B0604020202020204" pitchFamily="34" charset="0"/>
+                  <a:buChar char="•"/>
+                </a:pPr>
+                <a:r>
+                  <a:rPr lang="en-GB" dirty="0" smtClean="0"/>
+                  <a:t>For </a:t>
+                </a:r>
+                <a14:m>
+                  <m:oMath xmlns:m="http://schemas.openxmlformats.org/officeDocument/2006/math">
+                    <m:r>
+                      <a:rPr lang="en-GB" i="1">
+                        <a:latin typeface="Cambria Math" panose="02040503050406030204" pitchFamily="18" charset="0"/>
+                      </a:rPr>
+                      <m:t>𝑡</m:t>
+                    </m:r>
+                    <m:r>
+                      <a:rPr lang="en-GB" i="1">
+                        <a:latin typeface="Cambria Math" panose="02040503050406030204" pitchFamily="18" charset="0"/>
+                      </a:rPr>
+                      <m:t>∈</m:t>
+                    </m:r>
+                    <m:d>
+                      <m:dPr>
+                        <m:begChr m:val="["/>
+                        <m:endChr m:val="]"/>
+                        <m:ctrlPr>
+                          <a:rPr lang="en-GB" i="1">
+                            <a:latin typeface="Cambria Math" panose="02040503050406030204" pitchFamily="18" charset="0"/>
+                          </a:rPr>
+                        </m:ctrlPr>
+                      </m:dPr>
+                      <m:e>
+                        <m:sSub>
+                          <m:sSubPr>
+                            <m:ctrlPr>
+                              <a:rPr lang="en-GB" b="0" i="1" smtClean="0">
+                                <a:latin typeface="Cambria Math" panose="02040503050406030204" pitchFamily="18" charset="0"/>
+                              </a:rPr>
+                            </m:ctrlPr>
+                          </m:sSubPr>
+                          <m:e>
+                            <m:r>
+                              <a:rPr lang="en-GB" b="0" i="1" smtClean="0">
+                                <a:latin typeface="Cambria Math" panose="02040503050406030204" pitchFamily="18" charset="0"/>
+                              </a:rPr>
+                              <m:t>𝑇</m:t>
+                            </m:r>
+                          </m:e>
+                          <m:sub>
+                            <m:r>
+                              <a:rPr lang="en-GB" b="0" i="1" smtClean="0">
+                                <a:latin typeface="Cambria Math" panose="02040503050406030204" pitchFamily="18" charset="0"/>
+                              </a:rPr>
+                              <m:t>2</m:t>
+                            </m:r>
+                          </m:sub>
+                        </m:sSub>
+                        <m:r>
+                          <a:rPr lang="en-GB" b="0" i="1" smtClean="0">
+                            <a:latin typeface="Cambria Math" panose="02040503050406030204" pitchFamily="18" charset="0"/>
+                          </a:rPr>
+                          <m:t>+0.2, </m:t>
+                        </m:r>
+                        <m:r>
+                          <a:rPr lang="en-GB" b="0" i="1" smtClean="0">
+                            <a:latin typeface="Cambria Math" panose="02040503050406030204" pitchFamily="18" charset="0"/>
+                          </a:rPr>
+                          <m:t>𝑇</m:t>
+                        </m:r>
+                      </m:e>
+                    </m:d>
+                  </m:oMath>
+                </a14:m>
+                <a:r>
+                  <a:rPr lang="en-GB" dirty="0" smtClean="0"/>
+                  <a:t> the system is again in closed loop.</a:t>
+                </a:r>
+              </a:p>
+              <a:p>
+                <a:endParaRPr lang="en-GB" dirty="0"/>
+              </a:p>
+              <a:p>
+                <a:pPr marL="285750" indent="-285750">
+                  <a:buFont typeface="Arial" panose="020B0604020202020204" pitchFamily="34" charset="0"/>
+                  <a:buChar char="•"/>
+                </a:pPr>
+                <a:r>
+                  <a:rPr lang="en-GB" dirty="0"/>
+                  <a:t>Experiment data is collected in a set </a:t>
+                </a:r>
+                <a14:m>
+                  <m:oMath xmlns:m="http://schemas.openxmlformats.org/officeDocument/2006/math">
+                    <m:sSubSup>
+                      <m:sSubSupPr>
+                        <m:ctrlPr>
+                          <a:rPr lang="en-GB" i="1">
+                            <a:latin typeface="Cambria Math" panose="02040503050406030204" pitchFamily="18" charset="0"/>
+                          </a:rPr>
+                        </m:ctrlPr>
+                      </m:sSubSupPr>
+                      <m:e>
+                        <m:d>
+                          <m:dPr>
+                            <m:begChr m:val="{"/>
+                            <m:endChr m:val="}"/>
+                            <m:ctrlPr>
+                              <a:rPr lang="en-GB" i="1">
+                                <a:latin typeface="Cambria Math" panose="02040503050406030204" pitchFamily="18" charset="0"/>
+                              </a:rPr>
+                            </m:ctrlPr>
+                          </m:dPr>
+                          <m:e>
+                            <m:sSub>
+                              <m:sSubPr>
+                                <m:ctrlPr>
+                                  <a:rPr lang="en-GB" i="1">
+                                    <a:latin typeface="Cambria Math" panose="02040503050406030204" pitchFamily="18" charset="0"/>
+                                  </a:rPr>
+                                </m:ctrlPr>
+                              </m:sSubPr>
+                              <m:e>
+                                <m:d>
+                                  <m:dPr>
+                                    <m:ctrlPr>
+                                      <a:rPr lang="en-GB" i="1">
+                                        <a:latin typeface="Cambria Math" panose="02040503050406030204" pitchFamily="18" charset="0"/>
+                                      </a:rPr>
+                                    </m:ctrlPr>
+                                  </m:dPr>
+                                  <m:e>
+                                    <m:r>
+                                      <a:rPr lang="en-GB" b="1" i="1">
+                                        <a:latin typeface="Cambria Math" panose="02040503050406030204" pitchFamily="18" charset="0"/>
+                                      </a:rPr>
+                                      <m:t>𝒙</m:t>
+                                    </m:r>
+                                    <m:r>
+                                      <a:rPr lang="en-GB" i="1">
+                                        <a:latin typeface="Cambria Math" panose="02040503050406030204" pitchFamily="18" charset="0"/>
+                                      </a:rPr>
+                                      <m:t>,</m:t>
+                                    </m:r>
+                                    <m:r>
+                                      <a:rPr lang="en-GB" b="1" i="1">
+                                        <a:latin typeface="Cambria Math" panose="02040503050406030204" pitchFamily="18" charset="0"/>
+                                      </a:rPr>
+                                      <m:t>𝒚</m:t>
+                                    </m:r>
+                                  </m:e>
+                                </m:d>
+                              </m:e>
+                              <m:sub>
+                                <m:r>
+                                  <a:rPr lang="en-GB" i="1">
+                                    <a:latin typeface="Cambria Math" panose="02040503050406030204" pitchFamily="18" charset="0"/>
+                                  </a:rPr>
+                                  <m:t>𝑖</m:t>
+                                </m:r>
+                                <m:r>
+                                  <a:rPr lang="en-GB" b="0" i="1" smtClean="0">
+                                    <a:latin typeface="Cambria Math" panose="02040503050406030204" pitchFamily="18" charset="0"/>
+                                  </a:rPr>
+                                  <m:t> </m:t>
+                                </m:r>
+                              </m:sub>
+                            </m:sSub>
+                            <m:r>
+                              <a:rPr lang="en-GB" b="0" i="1" smtClean="0">
+                                <a:latin typeface="Cambria Math" panose="02040503050406030204" pitchFamily="18" charset="0"/>
+                              </a:rPr>
+                              <m:t>, </m:t>
+                            </m:r>
+                            <m:r>
+                              <a:rPr lang="en-GB" b="0" i="1" smtClean="0">
+                                <a:latin typeface="Cambria Math" panose="02040503050406030204" pitchFamily="18" charset="0"/>
+                              </a:rPr>
+                              <m:t>𝑖</m:t>
+                            </m:r>
+                            <m:r>
+                              <a:rPr lang="en-GB" b="0" i="1" smtClean="0">
+                                <a:latin typeface="Cambria Math" panose="02040503050406030204" pitchFamily="18" charset="0"/>
+                              </a:rPr>
+                              <m:t>=1,2,3</m:t>
+                            </m:r>
+                          </m:e>
+                        </m:d>
+                      </m:e>
+                      <m:sub/>
+                      <m:sup/>
+                    </m:sSubSup>
+                  </m:oMath>
+                </a14:m>
+                <a:r>
+                  <a:rPr lang="en-GB" dirty="0"/>
+                  <a:t>, where </a:t>
+                </a:r>
+                <a14:m>
+                  <m:oMath xmlns:m="http://schemas.openxmlformats.org/officeDocument/2006/math">
+                    <m:r>
+                      <a:rPr lang="en-GB" i="1">
+                        <a:latin typeface="Cambria Math" panose="02040503050406030204" pitchFamily="18" charset="0"/>
+                      </a:rPr>
+                      <m:t>𝑖</m:t>
+                    </m:r>
+                  </m:oMath>
+                </a14:m>
+                <a:r>
+                  <a:rPr lang="en-GB" dirty="0"/>
+                  <a:t> is the </a:t>
+                </a:r>
+                <a:r>
+                  <a:rPr lang="en-GB" dirty="0" err="1"/>
+                  <a:t>i</a:t>
+                </a:r>
+                <a:r>
+                  <a:rPr lang="en-GB" dirty="0"/>
+                  <a:t>-eth </a:t>
+                </a:r>
+                <a:r>
+                  <a:rPr lang="en-GB" dirty="0" smtClean="0"/>
+                  <a:t>experiment.</a:t>
+                </a:r>
+              </a:p>
+              <a:p>
+                <a:pPr marL="285750" indent="-285750">
+                  <a:buFont typeface="Arial" panose="020B0604020202020204" pitchFamily="34" charset="0"/>
+                  <a:buChar char="•"/>
+                </a:pPr>
+                <a:endParaRPr lang="en-GB" dirty="0"/>
+              </a:p>
+              <a:p>
+                <a:pPr marL="285750" indent="-285750">
+                  <a:buFont typeface="Arial" panose="020B0604020202020204" pitchFamily="34" charset="0"/>
+                  <a:buChar char="•"/>
+                </a:pPr>
+                <a14:m>
+                  <m:oMath xmlns:m="http://schemas.openxmlformats.org/officeDocument/2006/math">
+                    <m:sSub>
+                      <m:sSubPr>
+                        <m:ctrlPr>
+                          <a:rPr lang="en-GB" i="1">
+                            <a:latin typeface="Cambria Math" panose="02040503050406030204" pitchFamily="18" charset="0"/>
+                          </a:rPr>
+                        </m:ctrlPr>
+                      </m:sSubPr>
+                      <m:e>
+                        <m:d>
+                          <m:dPr>
+                            <m:ctrlPr>
+                              <a:rPr lang="en-GB" i="1">
+                                <a:latin typeface="Cambria Math" panose="02040503050406030204" pitchFamily="18" charset="0"/>
+                              </a:rPr>
+                            </m:ctrlPr>
+                          </m:dPr>
+                          <m:e>
+                            <m:r>
+                              <a:rPr lang="en-GB" b="1" i="1">
+                                <a:latin typeface="Cambria Math" panose="02040503050406030204" pitchFamily="18" charset="0"/>
+                              </a:rPr>
+                              <m:t>𝒙</m:t>
+                            </m:r>
+                            <m:r>
+                              <a:rPr lang="en-GB" i="1">
+                                <a:latin typeface="Cambria Math" panose="02040503050406030204" pitchFamily="18" charset="0"/>
+                              </a:rPr>
+                              <m:t>,</m:t>
+                            </m:r>
+                            <m:r>
+                              <a:rPr lang="en-GB" b="1" i="1">
+                                <a:latin typeface="Cambria Math" panose="02040503050406030204" pitchFamily="18" charset="0"/>
+                              </a:rPr>
+                              <m:t>𝒚</m:t>
+                            </m:r>
+                          </m:e>
+                        </m:d>
+                      </m:e>
+                      <m:sub>
+                        <m:r>
+                          <a:rPr lang="en-GB" i="1">
+                            <a:latin typeface="Cambria Math" panose="02040503050406030204" pitchFamily="18" charset="0"/>
+                          </a:rPr>
+                          <m:t>𝑖</m:t>
+                        </m:r>
+                      </m:sub>
+                    </m:sSub>
+                    <m:r>
+                      <a:rPr lang="en-GB" b="0" i="1" smtClean="0">
+                        <a:latin typeface="Cambria Math" panose="02040503050406030204" pitchFamily="18" charset="0"/>
+                      </a:rPr>
+                      <m:t>={</m:t>
+                    </m:r>
+                    <m:d>
+                      <m:dPr>
+                        <m:ctrlPr>
+                          <a:rPr lang="en-GB" b="0" i="1" smtClean="0">
+                            <a:latin typeface="Cambria Math" panose="02040503050406030204" pitchFamily="18" charset="0"/>
+                          </a:rPr>
+                        </m:ctrlPr>
+                      </m:dPr>
+                      <m:e>
+                        <m:sSub>
+                          <m:sSubPr>
+                            <m:ctrlPr>
+                              <a:rPr lang="en-GB" b="0" i="1" smtClean="0">
+                                <a:latin typeface="Cambria Math" panose="02040503050406030204" pitchFamily="18" charset="0"/>
+                              </a:rPr>
+                            </m:ctrlPr>
+                          </m:sSubPr>
+                          <m:e>
+                            <m:r>
+                              <a:rPr lang="en-GB" b="1" i="1" smtClean="0">
+                                <a:latin typeface="Cambria Math" panose="02040503050406030204" pitchFamily="18" charset="0"/>
+                              </a:rPr>
+                              <m:t>𝒙</m:t>
+                            </m:r>
+                          </m:e>
+                          <m:sub>
+                            <m:r>
+                              <a:rPr lang="en-GB" b="0" i="1" smtClean="0">
+                                <a:latin typeface="Cambria Math" panose="02040503050406030204" pitchFamily="18" charset="0"/>
+                              </a:rPr>
+                              <m:t>𝑖𝑗</m:t>
+                            </m:r>
+                          </m:sub>
+                        </m:sSub>
+                        <m:r>
+                          <a:rPr lang="en-GB" b="0" i="1" smtClean="0">
+                            <a:latin typeface="Cambria Math" panose="02040503050406030204" pitchFamily="18" charset="0"/>
+                          </a:rPr>
+                          <m:t>,</m:t>
+                        </m:r>
+                        <m:sSub>
+                          <m:sSubPr>
+                            <m:ctrlPr>
+                              <a:rPr lang="en-GB" b="0" i="1" smtClean="0">
+                                <a:latin typeface="Cambria Math" panose="02040503050406030204" pitchFamily="18" charset="0"/>
+                              </a:rPr>
+                            </m:ctrlPr>
+                          </m:sSubPr>
+                          <m:e>
+                            <m:r>
+                              <a:rPr lang="en-GB" b="1" i="1" smtClean="0">
+                                <a:latin typeface="Cambria Math" panose="02040503050406030204" pitchFamily="18" charset="0"/>
+                              </a:rPr>
+                              <m:t>𝒚</m:t>
+                            </m:r>
+                          </m:e>
+                          <m:sub>
+                            <m:r>
+                              <a:rPr lang="en-GB" b="0" i="1" smtClean="0">
+                                <a:latin typeface="Cambria Math" panose="02040503050406030204" pitchFamily="18" charset="0"/>
+                              </a:rPr>
+                              <m:t>𝑖𝑗</m:t>
+                            </m:r>
+                          </m:sub>
+                        </m:sSub>
+                      </m:e>
+                    </m:d>
+                    <m:r>
+                      <a:rPr lang="en-GB" b="0" i="1" smtClean="0">
+                        <a:latin typeface="Cambria Math" panose="02040503050406030204" pitchFamily="18" charset="0"/>
+                      </a:rPr>
+                      <m:t>, </m:t>
+                    </m:r>
+                    <m:r>
+                      <a:rPr lang="en-GB" b="0" i="1" smtClean="0">
+                        <a:latin typeface="Cambria Math" panose="02040503050406030204" pitchFamily="18" charset="0"/>
+                      </a:rPr>
+                      <m:t>𝑗</m:t>
+                    </m:r>
+                    <m:r>
+                      <a:rPr lang="en-GB" b="0" i="1" smtClean="0">
+                        <a:latin typeface="Cambria Math" panose="02040503050406030204" pitchFamily="18" charset="0"/>
+                      </a:rPr>
+                      <m:t>=1,2,3}</m:t>
+                    </m:r>
+                  </m:oMath>
+                </a14:m>
+                <a:r>
+                  <a:rPr lang="en-GB" dirty="0" smtClean="0"/>
+                  <a:t>, where </a:t>
+                </a:r>
+                <a14:m>
+                  <m:oMath xmlns:m="http://schemas.openxmlformats.org/officeDocument/2006/math">
+                    <m:r>
+                      <a:rPr lang="en-GB" b="0" i="1" smtClean="0">
+                        <a:latin typeface="Cambria Math" panose="02040503050406030204" pitchFamily="18" charset="0"/>
+                      </a:rPr>
+                      <m:t>𝑗</m:t>
+                    </m:r>
+                    <m:r>
+                      <a:rPr lang="en-GB" b="0" i="1" smtClean="0">
+                        <a:latin typeface="Cambria Math" panose="02040503050406030204" pitchFamily="18" charset="0"/>
+                      </a:rPr>
+                      <m:t>=1</m:t>
+                    </m:r>
+                  </m:oMath>
+                </a14:m>
+                <a:r>
+                  <a:rPr lang="en-GB" dirty="0" smtClean="0"/>
+                  <a:t> represents data for </a:t>
+                </a:r>
+                <a14:m>
+                  <m:oMath xmlns:m="http://schemas.openxmlformats.org/officeDocument/2006/math">
+                    <m:r>
+                      <a:rPr lang="en-GB" i="1">
+                        <a:latin typeface="Cambria Math" panose="02040503050406030204" pitchFamily="18" charset="0"/>
+                      </a:rPr>
+                      <m:t>𝑡</m:t>
+                    </m:r>
+                    <m:r>
+                      <a:rPr lang="en-GB" i="1">
+                        <a:latin typeface="Cambria Math" panose="02040503050406030204" pitchFamily="18" charset="0"/>
+                      </a:rPr>
+                      <m:t>∈[0, </m:t>
+                    </m:r>
+                    <m:sSub>
+                      <m:sSubPr>
+                        <m:ctrlPr>
+                          <a:rPr lang="en-GB" i="1">
+                            <a:latin typeface="Cambria Math" panose="02040503050406030204" pitchFamily="18" charset="0"/>
+                          </a:rPr>
+                        </m:ctrlPr>
+                      </m:sSubPr>
+                      <m:e>
+                        <m:r>
+                          <a:rPr lang="en-GB" i="1">
+                            <a:latin typeface="Cambria Math" panose="02040503050406030204" pitchFamily="18" charset="0"/>
+                          </a:rPr>
+                          <m:t>𝑇</m:t>
+                        </m:r>
+                      </m:e>
+                      <m:sub>
+                        <m:r>
+                          <a:rPr lang="en-GB" i="1">
+                            <a:latin typeface="Cambria Math" panose="02040503050406030204" pitchFamily="18" charset="0"/>
+                          </a:rPr>
+                          <m:t>1</m:t>
+                        </m:r>
+                      </m:sub>
+                    </m:sSub>
+                    <m:r>
+                      <a:rPr lang="en-GB" i="1">
+                        <a:latin typeface="Cambria Math" panose="02040503050406030204" pitchFamily="18" charset="0"/>
+                      </a:rPr>
+                      <m:t>]</m:t>
+                    </m:r>
+                  </m:oMath>
+                </a14:m>
+                <a:r>
+                  <a:rPr lang="en-GB" dirty="0"/>
+                  <a:t> </a:t>
+                </a:r>
+                <a:r>
+                  <a:rPr lang="en-GB" dirty="0" smtClean="0"/>
+                  <a:t>, etc… .</a:t>
+                </a:r>
+              </a:p>
+              <a:p>
+                <a:pPr marL="285750" indent="-285750">
+                  <a:buFont typeface="Arial" panose="020B0604020202020204" pitchFamily="34" charset="0"/>
+                  <a:buChar char="•"/>
+                </a:pPr>
+                <a:endParaRPr lang="en-GB" dirty="0" smtClean="0"/>
+              </a:p>
+              <a:p>
+                <a:pPr marL="285750" indent="-285750">
+                  <a:buFont typeface="Arial" panose="020B0604020202020204" pitchFamily="34" charset="0"/>
+                  <a:buChar char="•"/>
+                </a:pPr>
+                <a:endParaRPr lang="en-GB" dirty="0" smtClean="0"/>
+              </a:p>
+              <a:p>
+                <a:pPr marL="285750" indent="-285750">
+                  <a:buFont typeface="Arial" panose="020B0604020202020204" pitchFamily="34" charset="0"/>
+                  <a:buChar char="•"/>
+                </a:pPr>
+                <a:endParaRPr lang="en-GB" dirty="0" smtClean="0"/>
+              </a:p>
+              <a:p>
+                <a:pPr marL="285750" indent="-285750">
+                  <a:buFont typeface="Arial" panose="020B0604020202020204" pitchFamily="34" charset="0"/>
+                  <a:buChar char="•"/>
+                </a:pPr>
+                <a:endParaRPr lang="en-GB" dirty="0" smtClean="0"/>
+              </a:p>
+              <a:p>
+                <a:pPr marL="285750" indent="-285750">
+                  <a:buFont typeface="Arial" panose="020B0604020202020204" pitchFamily="34" charset="0"/>
+                  <a:buChar char="•"/>
+                </a:pPr>
+                <a:endParaRPr lang="en-GB" dirty="0" smtClean="0"/>
+              </a:p>
+            </p:txBody>
+          </p:sp>
+        </mc:Choice>
+        <mc:Fallback>
+          <p:sp>
+            <p:nvSpPr>
+              <p:cNvPr id="4" name="TextBox 3"/>
+              <p:cNvSpPr txBox="1">
+                <a:spLocks noRot="1" noChangeAspect="1" noMove="1" noResize="1" noEditPoints="1" noAdjustHandles="1" noChangeArrowheads="1" noChangeShapeType="1" noTextEdit="1"/>
+              </p:cNvSpPr>
+              <p:nvPr/>
+            </p:nvSpPr>
+            <p:spPr>
+              <a:xfrm>
+                <a:off x="546100" y="2209800"/>
+                <a:ext cx="11375422" cy="3788088"/>
+              </a:xfrm>
+              <a:prstGeom prst="rect">
+                <a:avLst/>
+              </a:prstGeom>
+              <a:blipFill rotWithShape="0">
+                <a:blip r:embed="rId2"/>
+                <a:stretch>
+                  <a:fillRect l="-375" t="-966"/>
+                </a:stretch>
+              </a:blipFill>
+            </p:spPr>
+            <p:txBody>
+              <a:bodyPr/>
+              <a:lstStyle/>
+              <a:p>
+                <a:r>
+                  <a:rPr lang="en-GB">
+                    <a:noFill/>
+                  </a:rPr>
+                  <a:t> </a:t>
+                </a:r>
+              </a:p>
+            </p:txBody>
+          </p:sp>
+        </mc:Fallback>
+      </mc:AlternateContent>
+      <p:sp>
+        <p:nvSpPr>
+          <p:cNvPr id="6" name="Right Arrow 5"/>
+          <p:cNvSpPr/>
+          <p:nvPr/>
+        </p:nvSpPr>
+        <p:spPr bwMode="auto">
+          <a:xfrm>
+            <a:off x="762000" y="5080000"/>
+            <a:ext cx="1041400" cy="444500"/>
+          </a:xfrm>
+          <a:prstGeom prst="rightArrow">
+            <a:avLst/>
+          </a:prstGeom>
+          <a:ln>
+            <a:headEnd type="none" w="med" len="med"/>
+            <a:tailEnd type="none" w="med" len="med"/>
+          </a:ln>
+        </p:spPr>
+        <p:style>
+          <a:lnRef idx="2">
+            <a:schemeClr val="accent6"/>
+          </a:lnRef>
+          <a:fillRef idx="1">
+            <a:schemeClr val="lt1"/>
+          </a:fillRef>
+          <a:effectRef idx="0">
+            <a:schemeClr val="accent6"/>
+          </a:effectRef>
+          <a:fontRef idx="minor">
+            <a:schemeClr val="dk1"/>
+          </a:fontRef>
+        </p:style>
+        <p:txBody>
+          <a:bodyPr vert="horz" wrap="square" lIns="0" tIns="0" rIns="0" bIns="0" numCol="1" rtlCol="0" anchor="t" anchorCtr="0" compatLnSpc="1">
+            <a:prstTxWarp prst="textNoShape">
+              <a:avLst/>
+            </a:prstTxWarp>
+          </a:bodyPr>
+          <a:lstStyle/>
+          <a:p>
+            <a:pPr marL="0" marR="0" indent="0" algn="l" defTabSz="914400" rtl="0" eaLnBrk="0" fontAlgn="base" latinLnBrk="0" hangingPunct="0">
+              <a:lnSpc>
+                <a:spcPct val="100000"/>
+              </a:lnSpc>
+              <a:spcBef>
+                <a:spcPct val="20000"/>
+              </a:spcBef>
+              <a:spcAft>
+                <a:spcPct val="0"/>
+              </a:spcAft>
+              <a:buClrTx/>
+              <a:buSzTx/>
+              <a:buFontTx/>
+              <a:buNone/>
+              <a:tabLst/>
+            </a:pPr>
+            <a:endParaRPr kumimoji="0" lang="en-GB" sz="2400" b="0" i="0" u="none" strike="noStrike" cap="none" normalizeH="0" baseline="0" smtClean="0">
+              <a:ln>
+                <a:noFill/>
+              </a:ln>
+              <a:solidFill>
+                <a:schemeClr val="tx1"/>
+              </a:solidFill>
+              <a:effectLst/>
+              <a:latin typeface="Arial" charset="0"/>
+            </a:endParaRPr>
+          </a:p>
+        </p:txBody>
+      </p:sp>
+      <mc:AlternateContent xmlns:mc="http://schemas.openxmlformats.org/markup-compatibility/2006">
+        <mc:Choice xmlns:a14="http://schemas.microsoft.com/office/drawing/2010/main" Requires="a14">
+          <p:sp>
+            <p:nvSpPr>
+              <p:cNvPr id="7" name="TextBox 6"/>
+              <p:cNvSpPr txBox="1"/>
+              <p:nvPr/>
+            </p:nvSpPr>
+            <p:spPr>
+              <a:xfrm>
+                <a:off x="2019300" y="5080000"/>
+                <a:ext cx="5232400" cy="411395"/>
+              </a:xfrm>
+              <a:prstGeom prst="rect">
+                <a:avLst/>
+              </a:prstGeom>
+              <a:noFill/>
+            </p:spPr>
+            <p:txBody>
+              <a:bodyPr wrap="square" rtlCol="0">
+                <a:spAutoFit/>
+              </a:bodyPr>
+              <a:lstStyle/>
+              <a:p>
+                <a14:m>
+                  <m:oMath xmlns:m="http://schemas.openxmlformats.org/officeDocument/2006/math">
+                    <m:d>
+                      <m:dPr>
+                        <m:ctrlPr>
+                          <a:rPr lang="en-GB" b="0" i="1" smtClean="0">
+                            <a:latin typeface="Cambria Math" panose="02040503050406030204" pitchFamily="18" charset="0"/>
+                          </a:rPr>
+                        </m:ctrlPr>
+                      </m:dPr>
+                      <m:e>
+                        <m:sSub>
+                          <m:sSubPr>
+                            <m:ctrlPr>
+                              <a:rPr lang="en-GB" b="0" i="1" smtClean="0">
+                                <a:latin typeface="Cambria Math" panose="02040503050406030204" pitchFamily="18" charset="0"/>
+                              </a:rPr>
+                            </m:ctrlPr>
+                          </m:sSubPr>
+                          <m:e>
+                            <m:r>
+                              <a:rPr lang="en-GB" b="0" i="1" smtClean="0">
+                                <a:latin typeface="Cambria Math" panose="02040503050406030204" pitchFamily="18" charset="0"/>
+                              </a:rPr>
+                              <m:t>𝑥</m:t>
+                            </m:r>
+                          </m:e>
+                          <m:sub>
+                            <m:r>
+                              <a:rPr lang="en-GB" b="0" i="1" smtClean="0">
+                                <a:latin typeface="Cambria Math" panose="02040503050406030204" pitchFamily="18" charset="0"/>
+                              </a:rPr>
+                              <m:t>2</m:t>
+                            </m:r>
+                            <m:r>
+                              <a:rPr lang="en-GB" b="0" i="1" smtClean="0">
+                                <a:latin typeface="Cambria Math" panose="02040503050406030204" pitchFamily="18" charset="0"/>
+                              </a:rPr>
+                              <m:t>𝑗</m:t>
+                            </m:r>
+                          </m:sub>
+                        </m:sSub>
+                        <m:r>
+                          <a:rPr lang="en-GB" b="0" i="1" smtClean="0">
+                            <a:latin typeface="Cambria Math" panose="02040503050406030204" pitchFamily="18" charset="0"/>
+                          </a:rPr>
+                          <m:t>, </m:t>
+                        </m:r>
+                        <m:sSub>
+                          <m:sSubPr>
+                            <m:ctrlPr>
+                              <a:rPr lang="en-GB" b="0" i="1" smtClean="0">
+                                <a:latin typeface="Cambria Math" panose="02040503050406030204" pitchFamily="18" charset="0"/>
+                              </a:rPr>
+                            </m:ctrlPr>
+                          </m:sSubPr>
+                          <m:e>
+                            <m:r>
+                              <a:rPr lang="en-GB" b="0" i="1" smtClean="0">
+                                <a:latin typeface="Cambria Math" panose="02040503050406030204" pitchFamily="18" charset="0"/>
+                              </a:rPr>
+                              <m:t>𝑦</m:t>
+                            </m:r>
+                          </m:e>
+                          <m:sub>
+                            <m:r>
+                              <a:rPr lang="en-GB" b="0" i="1" smtClean="0">
+                                <a:latin typeface="Cambria Math" panose="02040503050406030204" pitchFamily="18" charset="0"/>
+                              </a:rPr>
+                              <m:t>2</m:t>
+                            </m:r>
+                            <m:r>
+                              <a:rPr lang="en-GB" b="0" i="1" smtClean="0">
+                                <a:latin typeface="Cambria Math" panose="02040503050406030204" pitchFamily="18" charset="0"/>
+                              </a:rPr>
+                              <m:t>𝑗</m:t>
+                            </m:r>
+                          </m:sub>
+                        </m:sSub>
+                      </m:e>
+                    </m:d>
+                    <m:r>
+                      <a:rPr lang="en-GB" b="0" i="1" smtClean="0">
+                        <a:latin typeface="Cambria Math" panose="02040503050406030204" pitchFamily="18" charset="0"/>
+                      </a:rPr>
+                      <m:t>, </m:t>
+                    </m:r>
+                    <m:r>
+                      <a:rPr lang="en-GB" b="0" i="1" smtClean="0">
+                        <a:latin typeface="Cambria Math" panose="02040503050406030204" pitchFamily="18" charset="0"/>
+                      </a:rPr>
+                      <m:t>𝑗</m:t>
+                    </m:r>
+                    <m:r>
+                      <a:rPr lang="en-GB" b="0" i="1" smtClean="0">
+                        <a:latin typeface="Cambria Math" panose="02040503050406030204" pitchFamily="18" charset="0"/>
+                      </a:rPr>
+                      <m:t>=1,2,3 </m:t>
+                    </m:r>
+                  </m:oMath>
+                </a14:m>
+                <a:r>
+                  <a:rPr lang="en-GB" dirty="0" smtClean="0"/>
+                  <a:t>is open loop data</a:t>
+                </a:r>
+                <a:endParaRPr lang="en-GB" dirty="0"/>
+              </a:p>
+            </p:txBody>
+          </p:sp>
+        </mc:Choice>
+        <mc:Fallback>
+          <p:sp>
+            <p:nvSpPr>
+              <p:cNvPr id="7" name="TextBox 6"/>
+              <p:cNvSpPr txBox="1">
+                <a:spLocks noRot="1" noChangeAspect="1" noMove="1" noResize="1" noEditPoints="1" noAdjustHandles="1" noChangeArrowheads="1" noChangeShapeType="1" noTextEdit="1"/>
+              </p:cNvSpPr>
+              <p:nvPr/>
+            </p:nvSpPr>
+            <p:spPr>
+              <a:xfrm>
+                <a:off x="2019300" y="5080000"/>
+                <a:ext cx="5232400" cy="411395"/>
+              </a:xfrm>
+              <a:prstGeom prst="rect">
+                <a:avLst/>
+              </a:prstGeom>
+              <a:blipFill rotWithShape="0">
+                <a:blip r:embed="rId3"/>
+                <a:stretch>
+                  <a:fillRect t="-2941" b="-16176"/>
+                </a:stretch>
+              </a:blipFill>
+            </p:spPr>
+            <p:txBody>
+              <a:bodyPr/>
+              <a:lstStyle/>
+              <a:p>
+                <a:r>
+                  <a:rPr lang="en-GB">
+                    <a:noFill/>
+                  </a:rPr>
+                  <a:t> </a:t>
+                </a:r>
+              </a:p>
+            </p:txBody>
+          </p:sp>
+        </mc:Fallback>
+      </mc:AlternateContent>
     </p:spTree>
     <p:extLst>
       <p:ext uri="{BB962C8B-B14F-4D97-AF65-F5344CB8AC3E}">

</xml_diff>

<commit_message>
Fix inspectSignal, Ts loaddata, Report & data plot
Now inspectX and inspectXY show the correct power spectrum and FFT.
Fixed the covariance length.

Added sampling time to loaddata

Some additional work on the report

Added file to plot the experiment data (used later in the report)
</commit_message>
<xml_diff>
--- a/report/Report.pptx
+++ b/report/Report.pptx
@@ -12,6 +12,10 @@
     <p:sldId id="259" r:id="rId6"/>
     <p:sldId id="260" r:id="rId7"/>
     <p:sldId id="261" r:id="rId8"/>
+    <p:sldId id="262" r:id="rId9"/>
+    <p:sldId id="263" r:id="rId10"/>
+    <p:sldId id="264" r:id="rId11"/>
+    <p:sldId id="265" r:id="rId12"/>
   </p:sldIdLst>
   <p:sldSz cx="12192000" cy="6858000"/>
   <p:notesSz cx="6858000" cy="9144000"/>
@@ -260,7 +264,7 @@
           <a:p>
             <a:fld id="{843C4FC0-81D1-4453-9443-D3E156B7E80B}" type="datetimeFigureOut">
               <a:rPr lang="en-GB" smtClean="0"/>
-              <a:t>05/04/2015</a:t>
+              <a:t>06/04/2015</a:t>
             </a:fld>
             <a:endParaRPr lang="en-GB"/>
           </a:p>
@@ -430,7 +434,7 @@
           <a:p>
             <a:fld id="{843C4FC0-81D1-4453-9443-D3E156B7E80B}" type="datetimeFigureOut">
               <a:rPr lang="en-GB" smtClean="0"/>
-              <a:t>05/04/2015</a:t>
+              <a:t>06/04/2015</a:t>
             </a:fld>
             <a:endParaRPr lang="en-GB"/>
           </a:p>
@@ -610,7 +614,7 @@
           <a:p>
             <a:fld id="{843C4FC0-81D1-4453-9443-D3E156B7E80B}" type="datetimeFigureOut">
               <a:rPr lang="en-GB" smtClean="0"/>
-              <a:t>05/04/2015</a:t>
+              <a:t>06/04/2015</a:t>
             </a:fld>
             <a:endParaRPr lang="en-GB"/>
           </a:p>
@@ -1391,7 +1395,7 @@
           <a:p>
             <a:fld id="{843C4FC0-81D1-4453-9443-D3E156B7E80B}" type="datetimeFigureOut">
               <a:rPr lang="en-GB" smtClean="0"/>
-              <a:t>05/04/2015</a:t>
+              <a:t>06/04/2015</a:t>
             </a:fld>
             <a:endParaRPr lang="en-GB"/>
           </a:p>
@@ -1637,7 +1641,7 @@
           <a:p>
             <a:fld id="{843C4FC0-81D1-4453-9443-D3E156B7E80B}" type="datetimeFigureOut">
               <a:rPr lang="en-GB" smtClean="0"/>
-              <a:t>05/04/2015</a:t>
+              <a:t>06/04/2015</a:t>
             </a:fld>
             <a:endParaRPr lang="en-GB"/>
           </a:p>
@@ -1869,7 +1873,7 @@
           <a:p>
             <a:fld id="{843C4FC0-81D1-4453-9443-D3E156B7E80B}" type="datetimeFigureOut">
               <a:rPr lang="en-GB" smtClean="0"/>
-              <a:t>05/04/2015</a:t>
+              <a:t>06/04/2015</a:t>
             </a:fld>
             <a:endParaRPr lang="en-GB"/>
           </a:p>
@@ -2236,7 +2240,7 @@
           <a:p>
             <a:fld id="{843C4FC0-81D1-4453-9443-D3E156B7E80B}" type="datetimeFigureOut">
               <a:rPr lang="en-GB" smtClean="0"/>
-              <a:t>05/04/2015</a:t>
+              <a:t>06/04/2015</a:t>
             </a:fld>
             <a:endParaRPr lang="en-GB"/>
           </a:p>
@@ -2354,7 +2358,7 @@
           <a:p>
             <a:fld id="{843C4FC0-81D1-4453-9443-D3E156B7E80B}" type="datetimeFigureOut">
               <a:rPr lang="en-GB" smtClean="0"/>
-              <a:t>05/04/2015</a:t>
+              <a:t>06/04/2015</a:t>
             </a:fld>
             <a:endParaRPr lang="en-GB"/>
           </a:p>
@@ -2449,7 +2453,7 @@
           <a:p>
             <a:fld id="{843C4FC0-81D1-4453-9443-D3E156B7E80B}" type="datetimeFigureOut">
               <a:rPr lang="en-GB" smtClean="0"/>
-              <a:t>05/04/2015</a:t>
+              <a:t>06/04/2015</a:t>
             </a:fld>
             <a:endParaRPr lang="en-GB"/>
           </a:p>
@@ -2726,7 +2730,7 @@
           <a:p>
             <a:fld id="{843C4FC0-81D1-4453-9443-D3E156B7E80B}" type="datetimeFigureOut">
               <a:rPr lang="en-GB" smtClean="0"/>
-              <a:t>05/04/2015</a:t>
+              <a:t>06/04/2015</a:t>
             </a:fld>
             <a:endParaRPr lang="en-GB"/>
           </a:p>
@@ -2979,7 +2983,7 @@
           <a:p>
             <a:fld id="{843C4FC0-81D1-4453-9443-D3E156B7E80B}" type="datetimeFigureOut">
               <a:rPr lang="en-GB" smtClean="0"/>
-              <a:t>05/04/2015</a:t>
+              <a:t>06/04/2015</a:t>
             </a:fld>
             <a:endParaRPr lang="en-GB"/>
           </a:p>
@@ -3192,7 +3196,7 @@
           <a:p>
             <a:fld id="{843C4FC0-81D1-4453-9443-D3E156B7E80B}" type="datetimeFigureOut">
               <a:rPr lang="en-GB" smtClean="0"/>
-              <a:t>05/04/2015</a:t>
+              <a:t>06/04/2015</a:t>
             </a:fld>
             <a:endParaRPr lang="en-GB"/>
           </a:p>
@@ -4277,7 +4281,7 @@
         <p:spPr bwMode="auto">
           <a:xfrm>
             <a:off x="992718" y="109539"/>
-            <a:ext cx="9275233" cy="553998"/>
+            <a:ext cx="5765801" cy="430887"/>
           </a:xfrm>
           <a:prstGeom prst="rect">
             <a:avLst/>
@@ -4292,7 +4296,7 @@
           <a:effectLst/>
         </p:spPr>
         <p:txBody>
-          <a:bodyPr lIns="0" tIns="0" rIns="0" bIns="0">
+          <a:bodyPr wrap="square" lIns="0" tIns="0" rIns="0" bIns="0">
             <a:spAutoFit/>
           </a:bodyPr>
           <a:lstStyle/>
@@ -4304,7 +4308,7 @@
               <a:defRPr/>
             </a:pPr>
             <a:r>
-              <a:rPr lang="it-IT" sz="1800" b="1" dirty="0" smtClean="0">
+              <a:rPr lang="it-IT" sz="1400" b="1" dirty="0" smtClean="0">
                 <a:solidFill>
                   <a:srgbClr val="004F84"/>
                 </a:solidFill>
@@ -4313,7 +4317,7 @@
               <a:t>ICT</a:t>
             </a:r>
             <a:r>
-              <a:rPr lang="it-IT" sz="1800" b="1" baseline="0" dirty="0" smtClean="0">
+              <a:rPr lang="it-IT" sz="1400" b="1" baseline="0" dirty="0" smtClean="0">
                 <a:solidFill>
                   <a:srgbClr val="004F84"/>
                 </a:solidFill>
@@ -4321,7 +4325,7 @@
               </a:rPr>
               <a:t> FOR CONTROL SYSTEMS ENGINEERING: IDENTIFICATION OF THE ATTITUDE DYNAMICS FOR A QUADROTOR HELICOPTER</a:t>
             </a:r>
-            <a:endParaRPr lang="it-IT" sz="1800" b="1" dirty="0">
+            <a:endParaRPr lang="it-IT" sz="1400" b="1" dirty="0">
               <a:solidFill>
                 <a:srgbClr val="004F84"/>
               </a:solidFill>
@@ -5390,6 +5394,37 @@
           </a:p>
         </p:txBody>
       </p:sp>
+      <p:sp>
+        <p:nvSpPr>
+          <p:cNvPr id="6" name="Rectangle 5"/>
+          <p:cNvSpPr/>
+          <p:nvPr/>
+        </p:nvSpPr>
+        <p:spPr>
+          <a:xfrm>
+            <a:off x="2050142" y="6373606"/>
+            <a:ext cx="3928383" cy="369332"/>
+          </a:xfrm>
+          <a:prstGeom prst="rect">
+            <a:avLst/>
+          </a:prstGeom>
+        </p:spPr>
+        <p:txBody>
+          <a:bodyPr wrap="none">
+            <a:spAutoFit/>
+          </a:bodyPr>
+          <a:lstStyle/>
+          <a:p>
+            <a:r>
+              <a:rPr lang="en-GB" dirty="0">
+                <a:hlinkClick r:id="rId2"/>
+              </a:rPr>
+              <a:t>https://github.com/rssalessio/ictproject</a:t>
+            </a:r>
+            <a:endParaRPr lang="en-GB" dirty="0"/>
+          </a:p>
+        </p:txBody>
+      </p:sp>
     </p:spTree>
     <p:extLst>
       <p:ext uri="{BB962C8B-B14F-4D97-AF65-F5344CB8AC3E}">
@@ -5953,6 +5988,50 @@
           </a:p>
         </p:txBody>
       </p:sp>
+      <p:sp>
+        <p:nvSpPr>
+          <p:cNvPr id="3" name="TextBox 2"/>
+          <p:cNvSpPr txBox="1"/>
+          <p:nvPr/>
+        </p:nvSpPr>
+        <p:spPr>
+          <a:xfrm>
+            <a:off x="7556950" y="148382"/>
+            <a:ext cx="2082814" cy="369332"/>
+          </a:xfrm>
+          <a:prstGeom prst="rect">
+            <a:avLst/>
+          </a:prstGeom>
+          <a:noFill/>
+        </p:spPr>
+        <p:txBody>
+          <a:bodyPr wrap="none" rtlCol="0">
+            <a:spAutoFit/>
+          </a:bodyPr>
+          <a:lstStyle/>
+          <a:p>
+            <a:r>
+              <a:rPr lang="en-GB" b="1" dirty="0" smtClean="0">
+                <a:solidFill>
+                  <a:srgbClr val="FF0000"/>
+                </a:solidFill>
+                <a:latin typeface="DejaVu Sans" panose="020B0603030804020204" pitchFamily="34" charset="0"/>
+                <a:ea typeface="DejaVu Sans" panose="020B0603030804020204" pitchFamily="34" charset="0"/>
+                <a:cs typeface="DejaVu Sans" panose="020B0603030804020204" pitchFamily="34" charset="0"/>
+              </a:rPr>
+              <a:t>PROJECT GOAL</a:t>
+            </a:r>
+            <a:endParaRPr lang="en-GB" b="1" dirty="0">
+              <a:solidFill>
+                <a:srgbClr val="FF0000"/>
+              </a:solidFill>
+              <a:latin typeface="DejaVu Sans" panose="020B0603030804020204" pitchFamily="34" charset="0"/>
+              <a:ea typeface="DejaVu Sans" panose="020B0603030804020204" pitchFamily="34" charset="0"/>
+              <a:cs typeface="DejaVu Sans" panose="020B0603030804020204" pitchFamily="34" charset="0"/>
+            </a:endParaRPr>
+          </a:p>
+        </p:txBody>
+      </p:sp>
     </p:spTree>
     <p:extLst>
       <p:ext uri="{BB962C8B-B14F-4D97-AF65-F5344CB8AC3E}">
@@ -6654,6 +6733,50 @@
           </a:p>
         </p:txBody>
       </p:sp>
+      <p:sp>
+        <p:nvSpPr>
+          <p:cNvPr id="17" name="TextBox 16"/>
+          <p:cNvSpPr txBox="1"/>
+          <p:nvPr/>
+        </p:nvSpPr>
+        <p:spPr>
+          <a:xfrm>
+            <a:off x="7055828" y="165100"/>
+            <a:ext cx="3148170" cy="369332"/>
+          </a:xfrm>
+          <a:prstGeom prst="rect">
+            <a:avLst/>
+          </a:prstGeom>
+          <a:noFill/>
+        </p:spPr>
+        <p:txBody>
+          <a:bodyPr wrap="none" rtlCol="0">
+            <a:spAutoFit/>
+          </a:bodyPr>
+          <a:lstStyle/>
+          <a:p>
+            <a:r>
+              <a:rPr lang="en-GB" b="1" dirty="0" smtClean="0">
+                <a:solidFill>
+                  <a:srgbClr val="FF0000"/>
+                </a:solidFill>
+                <a:latin typeface="DejaVu Sans" panose="020B0603030804020204" pitchFamily="34" charset="0"/>
+                <a:ea typeface="DejaVu Sans" panose="020B0603030804020204" pitchFamily="34" charset="0"/>
+                <a:cs typeface="DejaVu Sans" panose="020B0603030804020204" pitchFamily="34" charset="0"/>
+              </a:rPr>
+              <a:t>IDENTIFICATION CYCLE</a:t>
+            </a:r>
+            <a:endParaRPr lang="en-GB" b="1" dirty="0">
+              <a:solidFill>
+                <a:srgbClr val="FF0000"/>
+              </a:solidFill>
+              <a:latin typeface="DejaVu Sans" panose="020B0603030804020204" pitchFamily="34" charset="0"/>
+              <a:ea typeface="DejaVu Sans" panose="020B0603030804020204" pitchFamily="34" charset="0"/>
+              <a:cs typeface="DejaVu Sans" panose="020B0603030804020204" pitchFamily="34" charset="0"/>
+            </a:endParaRPr>
+          </a:p>
+        </p:txBody>
+      </p:sp>
     </p:spTree>
     <p:extLst>
       <p:ext uri="{BB962C8B-B14F-4D97-AF65-F5344CB8AC3E}">
@@ -6760,7 +6883,7 @@
             <p:spPr>
               <a:xfrm>
                 <a:off x="546100" y="2209800"/>
-                <a:ext cx="11375422" cy="3788088"/>
+                <a:ext cx="11375422" cy="4464043"/>
               </a:xfrm>
               <a:prstGeom prst="rect">
                 <a:avLst/>
@@ -6779,7 +6902,11 @@
                 </a:pPr>
                 <a:r>
                   <a:rPr lang="en-GB" dirty="0" smtClean="0"/>
-                  <a:t>Three experiments, done in the following manner for </a:t>
+                  <a:t>Three </a:t>
+                </a:r>
+                <a:r>
+                  <a:rPr lang="en-GB" dirty="0" smtClean="0"/>
+                  <a:t>experiments, done in the following manner for </a:t>
                 </a:r>
                 <a14:m>
                   <m:oMath xmlns:m="http://schemas.openxmlformats.org/officeDocument/2006/math">
@@ -7141,8 +7268,220 @@
                 </a14:m>
                 <a:r>
                   <a:rPr lang="en-GB" dirty="0" smtClean="0"/>
-                  <a:t> the system is again in closed loop.</a:t>
+                  <a:t> the system is again in closed loop</a:t>
                 </a:r>
+                <a:r>
+                  <a:rPr lang="en-GB" dirty="0" smtClean="0"/>
+                  <a:t>.</a:t>
+                </a:r>
+              </a:p>
+              <a:p>
+                <a:pPr marL="285750" indent="-285750">
+                  <a:buFont typeface="Arial" panose="020B0604020202020204" pitchFamily="34" charset="0"/>
+                  <a:buChar char="•"/>
+                </a:pPr>
+                <a:endParaRPr lang="en-GB" dirty="0"/>
+              </a:p>
+              <a:p>
+                <a:pPr marL="285750" indent="-285750">
+                  <a:buFont typeface="Arial" panose="020B0604020202020204" pitchFamily="34" charset="0"/>
+                  <a:buChar char="•"/>
+                </a:pPr>
+                <a:r>
+                  <a:rPr lang="en-GB" dirty="0" smtClean="0"/>
+                  <a:t>Sampling time </a:t>
+                </a:r>
+                <a14:m>
+                  <m:oMath xmlns:m="http://schemas.openxmlformats.org/officeDocument/2006/math">
+                    <m:sSub>
+                      <m:sSubPr>
+                        <m:ctrlPr>
+                          <a:rPr lang="en-GB" b="0" i="1" smtClean="0">
+                            <a:latin typeface="Cambria Math" panose="02040503050406030204" pitchFamily="18" charset="0"/>
+                          </a:rPr>
+                        </m:ctrlPr>
+                      </m:sSubPr>
+                      <m:e>
+                        <m:r>
+                          <a:rPr lang="en-GB" b="0" i="1" smtClean="0">
+                            <a:latin typeface="Cambria Math" panose="02040503050406030204" pitchFamily="18" charset="0"/>
+                          </a:rPr>
+                          <m:t>𝑇</m:t>
+                        </m:r>
+                      </m:e>
+                      <m:sub>
+                        <m:r>
+                          <a:rPr lang="en-GB" b="0" i="1" smtClean="0">
+                            <a:latin typeface="Cambria Math" panose="02040503050406030204" pitchFamily="18" charset="0"/>
+                          </a:rPr>
+                          <m:t>𝑠</m:t>
+                        </m:r>
+                      </m:sub>
+                    </m:sSub>
+                    <m:r>
+                      <a:rPr lang="en-GB" b="0" i="1" smtClean="0">
+                        <a:latin typeface="Cambria Math" panose="02040503050406030204" pitchFamily="18" charset="0"/>
+                      </a:rPr>
+                      <m:t>=0.2 </m:t>
+                    </m:r>
+                    <m:d>
+                      <m:dPr>
+                        <m:begChr m:val="["/>
+                        <m:endChr m:val="]"/>
+                        <m:ctrlPr>
+                          <a:rPr lang="en-GB" b="0" i="1" smtClean="0">
+                            <a:latin typeface="Cambria Math" panose="02040503050406030204" pitchFamily="18" charset="0"/>
+                          </a:rPr>
+                        </m:ctrlPr>
+                      </m:dPr>
+                      <m:e>
+                        <m:r>
+                          <a:rPr lang="en-GB" b="0" i="1" smtClean="0">
+                            <a:latin typeface="Cambria Math" panose="02040503050406030204" pitchFamily="18" charset="0"/>
+                          </a:rPr>
+                          <m:t>𝑠</m:t>
+                        </m:r>
+                      </m:e>
+                    </m:d>
+                    <m:r>
+                      <a:rPr lang="en-GB" b="0" i="1" smtClean="0">
+                        <a:latin typeface="Cambria Math" panose="02040503050406030204" pitchFamily="18" charset="0"/>
+                      </a:rPr>
+                      <m:t>⇒</m:t>
+                    </m:r>
+                    <m:sSub>
+                      <m:sSubPr>
+                        <m:ctrlPr>
+                          <a:rPr lang="en-GB" b="0" i="1" smtClean="0">
+                            <a:latin typeface="Cambria Math" panose="02040503050406030204" pitchFamily="18" charset="0"/>
+                          </a:rPr>
+                        </m:ctrlPr>
+                      </m:sSubPr>
+                      <m:e>
+                        <m:r>
+                          <a:rPr lang="en-GB" b="0" i="1" smtClean="0">
+                            <a:latin typeface="Cambria Math" panose="02040503050406030204" pitchFamily="18" charset="0"/>
+                          </a:rPr>
+                          <m:t>𝑓</m:t>
+                        </m:r>
+                      </m:e>
+                      <m:sub>
+                        <m:r>
+                          <a:rPr lang="en-GB" b="0" i="1" smtClean="0">
+                            <a:latin typeface="Cambria Math" panose="02040503050406030204" pitchFamily="18" charset="0"/>
+                          </a:rPr>
+                          <m:t>𝑠</m:t>
+                        </m:r>
+                      </m:sub>
+                    </m:sSub>
+                    <m:r>
+                      <a:rPr lang="en-GB" b="0" i="1" smtClean="0">
+                        <a:latin typeface="Cambria Math" panose="02040503050406030204" pitchFamily="18" charset="0"/>
+                      </a:rPr>
+                      <m:t>=5 </m:t>
+                    </m:r>
+                    <m:d>
+                      <m:dPr>
+                        <m:begChr m:val="["/>
+                        <m:endChr m:val="]"/>
+                        <m:ctrlPr>
+                          <a:rPr lang="en-GB" b="0" i="1" smtClean="0">
+                            <a:latin typeface="Cambria Math" panose="02040503050406030204" pitchFamily="18" charset="0"/>
+                          </a:rPr>
+                        </m:ctrlPr>
+                      </m:dPr>
+                      <m:e>
+                        <m:r>
+                          <a:rPr lang="en-GB" b="0" i="1" smtClean="0">
+                            <a:latin typeface="Cambria Math" panose="02040503050406030204" pitchFamily="18" charset="0"/>
+                          </a:rPr>
+                          <m:t>𝐻𝑧</m:t>
+                        </m:r>
+                      </m:e>
+                    </m:d>
+                    <m:r>
+                      <a:rPr lang="en-GB" b="0" i="1" smtClean="0">
+                        <a:latin typeface="Cambria Math" panose="02040503050406030204" pitchFamily="18" charset="0"/>
+                      </a:rPr>
+                      <m:t>, </m:t>
+                    </m:r>
+                  </m:oMath>
+                </a14:m>
+                <a:r>
+                  <a:rPr lang="en-GB" dirty="0" smtClean="0"/>
+                  <a:t>can see dynamics up to </a:t>
+                </a:r>
+                <a14:m>
+                  <m:oMath xmlns:m="http://schemas.openxmlformats.org/officeDocument/2006/math">
+                    <m:r>
+                      <a:rPr lang="en-GB" b="0" i="1" smtClean="0">
+                        <a:latin typeface="Cambria Math" panose="02040503050406030204" pitchFamily="18" charset="0"/>
+                      </a:rPr>
+                      <m:t>2.5</m:t>
+                    </m:r>
+                    <m:d>
+                      <m:dPr>
+                        <m:begChr m:val="["/>
+                        <m:endChr m:val="]"/>
+                        <m:ctrlPr>
+                          <a:rPr lang="en-GB" b="0" i="1" smtClean="0">
+                            <a:latin typeface="Cambria Math" panose="02040503050406030204" pitchFamily="18" charset="0"/>
+                          </a:rPr>
+                        </m:ctrlPr>
+                      </m:dPr>
+                      <m:e>
+                        <m:r>
+                          <a:rPr lang="en-GB" b="0" i="1" smtClean="0">
+                            <a:latin typeface="Cambria Math" panose="02040503050406030204" pitchFamily="18" charset="0"/>
+                          </a:rPr>
+                          <m:t>𝐻𝑧</m:t>
+                        </m:r>
+                      </m:e>
+                    </m:d>
+                    <m:r>
+                      <a:rPr lang="en-GB" b="0" i="1" smtClean="0">
+                        <a:latin typeface="Cambria Math" panose="02040503050406030204" pitchFamily="18" charset="0"/>
+                      </a:rPr>
+                      <m:t> ≡15.7 [</m:t>
+                    </m:r>
+                    <m:f>
+                      <m:fPr>
+                        <m:ctrlPr>
+                          <a:rPr lang="en-GB" b="0" i="1" smtClean="0">
+                            <a:latin typeface="Cambria Math" panose="02040503050406030204" pitchFamily="18" charset="0"/>
+                          </a:rPr>
+                        </m:ctrlPr>
+                      </m:fPr>
+                      <m:num>
+                        <m:r>
+                          <a:rPr lang="en-GB" b="0" i="1" smtClean="0">
+                            <a:latin typeface="Cambria Math" panose="02040503050406030204" pitchFamily="18" charset="0"/>
+                          </a:rPr>
+                          <m:t>𝑟𝑎𝑑</m:t>
+                        </m:r>
+                      </m:num>
+                      <m:den>
+                        <m:r>
+                          <a:rPr lang="en-GB" b="0" i="1" smtClean="0">
+                            <a:latin typeface="Cambria Math" panose="02040503050406030204" pitchFamily="18" charset="0"/>
+                          </a:rPr>
+                          <m:t>𝑠𝑒𝑐</m:t>
+                        </m:r>
+                      </m:den>
+                    </m:f>
+                    <m:r>
+                      <a:rPr lang="en-GB" b="0" i="1" smtClean="0">
+                        <a:latin typeface="Cambria Math" panose="02040503050406030204" pitchFamily="18" charset="0"/>
+                      </a:rPr>
+                      <m:t>]</m:t>
+                    </m:r>
+                  </m:oMath>
+                </a14:m>
+                <a:r>
+                  <a:rPr lang="en-GB" dirty="0" smtClean="0"/>
+                  <a:t>.</a:t>
+                </a:r>
+                <a:endParaRPr lang="en-GB" dirty="0" smtClean="0"/>
               </a:p>
               <a:p>
                 <a:endParaRPr lang="en-GB" dirty="0"/>
@@ -7574,7 +7913,7 @@
             <p:spPr>
               <a:xfrm>
                 <a:off x="546100" y="2209800"/>
-                <a:ext cx="11375422" cy="3788088"/>
+                <a:ext cx="11375422" cy="4464043"/>
               </a:xfrm>
               <a:prstGeom prst="rect">
                 <a:avLst/>
@@ -7582,7 +7921,7 @@
               <a:blipFill rotWithShape="0">
                 <a:blip r:embed="rId2"/>
                 <a:stretch>
-                  <a:fillRect l="-375" t="-966"/>
+                  <a:fillRect l="-375" t="-820"/>
                 </a:stretch>
               </a:blipFill>
             </p:spPr>
@@ -7609,7 +7948,7 @@
         </p:nvSpPr>
         <p:spPr bwMode="auto">
           <a:xfrm>
-            <a:off x="762000" y="5080000"/>
+            <a:off x="762000" y="5285697"/>
             <a:ext cx="1041400" cy="444500"/>
           </a:xfrm>
           <a:prstGeom prst="rightArrow">
@@ -7681,7 +8020,7 @@
             </p:nvSpPr>
             <p:spPr>
               <a:xfrm>
-                <a:off x="2019300" y="5080000"/>
+                <a:off x="2019300" y="5302249"/>
                 <a:ext cx="5232400" cy="411395"/>
               </a:xfrm>
               <a:prstGeom prst="rect">
@@ -7816,7 +8155,7 @@
             </p:nvSpPr>
             <p:spPr>
               <a:xfrm>
-                <a:off x="2019300" y="5080000"/>
+                <a:off x="2019300" y="5302249"/>
                 <a:ext cx="5232400" cy="411395"/>
               </a:xfrm>
               <a:prstGeom prst="rect">
@@ -7825,7 +8164,7 @@
               <a:blipFill rotWithShape="0">
                 <a:blip r:embed="rId3"/>
                 <a:stretch>
-                  <a:fillRect t="-2941" b="-16176"/>
+                  <a:fillRect t="-4478" b="-17910"/>
                 </a:stretch>
               </a:blipFill>
             </p:spPr>
@@ -7844,6 +8183,50 @@
           </p:sp>
         </mc:Fallback>
       </mc:AlternateContent>
+      <p:sp>
+        <p:nvSpPr>
+          <p:cNvPr id="8" name="TextBox 7"/>
+          <p:cNvSpPr txBox="1"/>
+          <p:nvPr/>
+        </p:nvSpPr>
+        <p:spPr>
+          <a:xfrm>
+            <a:off x="7556950" y="148382"/>
+            <a:ext cx="1848583" cy="369332"/>
+          </a:xfrm>
+          <a:prstGeom prst="rect">
+            <a:avLst/>
+          </a:prstGeom>
+          <a:noFill/>
+        </p:spPr>
+        <p:txBody>
+          <a:bodyPr wrap="none" rtlCol="0">
+            <a:spAutoFit/>
+          </a:bodyPr>
+          <a:lstStyle/>
+          <a:p>
+            <a:r>
+              <a:rPr lang="en-GB" b="1" dirty="0" smtClean="0">
+                <a:solidFill>
+                  <a:srgbClr val="FF0000"/>
+                </a:solidFill>
+                <a:latin typeface="DejaVu Sans" panose="020B0603030804020204" pitchFamily="34" charset="0"/>
+                <a:ea typeface="DejaVu Sans" panose="020B0603030804020204" pitchFamily="34" charset="0"/>
+                <a:cs typeface="DejaVu Sans" panose="020B0603030804020204" pitchFamily="34" charset="0"/>
+              </a:rPr>
+              <a:t>EXPERIMENT</a:t>
+            </a:r>
+            <a:endParaRPr lang="en-GB" b="1" dirty="0">
+              <a:solidFill>
+                <a:srgbClr val="FF0000"/>
+              </a:solidFill>
+              <a:latin typeface="DejaVu Sans" panose="020B0603030804020204" pitchFamily="34" charset="0"/>
+              <a:ea typeface="DejaVu Sans" panose="020B0603030804020204" pitchFamily="34" charset="0"/>
+              <a:cs typeface="DejaVu Sans" panose="020B0603030804020204" pitchFamily="34" charset="0"/>
+            </a:endParaRPr>
+          </a:p>
+        </p:txBody>
+      </p:sp>
     </p:spTree>
     <p:extLst>
       <p:ext uri="{BB962C8B-B14F-4D97-AF65-F5344CB8AC3E}">
@@ -7854,6 +8237,13 @@
   <p:clrMapOvr>
     <a:masterClrMapping/>
   </p:clrMapOvr>
+  <p:timing>
+    <p:tnLst>
+      <p:par>
+        <p:cTn id="1" dur="indefinite" restart="never" nodeType="tmRoot"/>
+      </p:par>
+    </p:tnLst>
+  </p:timing>
 </p:sld>
 </file>
 
@@ -7907,7 +8297,7 @@
         <p:spPr>
           <a:xfrm>
             <a:off x="4292140" y="1046490"/>
-            <a:ext cx="3607719" cy="523220"/>
+            <a:ext cx="3561744" cy="523220"/>
           </a:xfrm>
           <a:prstGeom prst="rect">
             <a:avLst/>
@@ -7924,10 +8314,54 @@
               <a:rPr lang="en-GB" sz="2800" b="1" i="1" dirty="0" smtClean="0">
                 <a:latin typeface="+mj-lt"/>
               </a:rPr>
-              <a:t>DATA PROCESSING</a:t>
+              <a:t>EXPERIMENT DATA</a:t>
             </a:r>
             <a:endParaRPr lang="en-GB" sz="2800" b="1" i="1" dirty="0">
               <a:latin typeface="+mj-lt"/>
+            </a:endParaRPr>
+          </a:p>
+        </p:txBody>
+      </p:sp>
+      <p:sp>
+        <p:nvSpPr>
+          <p:cNvPr id="4" name="TextBox 3"/>
+          <p:cNvSpPr txBox="1"/>
+          <p:nvPr/>
+        </p:nvSpPr>
+        <p:spPr>
+          <a:xfrm>
+            <a:off x="7556950" y="148382"/>
+            <a:ext cx="1848583" cy="369332"/>
+          </a:xfrm>
+          <a:prstGeom prst="rect">
+            <a:avLst/>
+          </a:prstGeom>
+          <a:noFill/>
+        </p:spPr>
+        <p:txBody>
+          <a:bodyPr wrap="none" rtlCol="0">
+            <a:spAutoFit/>
+          </a:bodyPr>
+          <a:lstStyle/>
+          <a:p>
+            <a:r>
+              <a:rPr lang="en-GB" b="1" dirty="0" smtClean="0">
+                <a:solidFill>
+                  <a:srgbClr val="FF0000"/>
+                </a:solidFill>
+                <a:latin typeface="DejaVu Sans" panose="020B0603030804020204" pitchFamily="34" charset="0"/>
+                <a:ea typeface="DejaVu Sans" panose="020B0603030804020204" pitchFamily="34" charset="0"/>
+                <a:cs typeface="DejaVu Sans" panose="020B0603030804020204" pitchFamily="34" charset="0"/>
+              </a:rPr>
+              <a:t>EXPERIMENT</a:t>
+            </a:r>
+            <a:endParaRPr lang="en-GB" b="1" dirty="0">
+              <a:solidFill>
+                <a:srgbClr val="FF0000"/>
+              </a:solidFill>
+              <a:latin typeface="DejaVu Sans" panose="020B0603030804020204" pitchFamily="34" charset="0"/>
+              <a:ea typeface="DejaVu Sans" panose="020B0603030804020204" pitchFamily="34" charset="0"/>
+              <a:cs typeface="DejaVu Sans" panose="020B0603030804020204" pitchFamily="34" charset="0"/>
             </a:endParaRPr>
           </a:p>
         </p:txBody>
@@ -7942,6 +8376,557 @@
   <p:clrMapOvr>
     <a:masterClrMapping/>
   </p:clrMapOvr>
+  <p:timing>
+    <p:tnLst>
+      <p:par>
+        <p:cTn id="1" dur="indefinite" restart="never" nodeType="tmRoot"/>
+      </p:par>
+    </p:tnLst>
+  </p:timing>
+</p:sld>
+</file>
+
+<file path=ppt/slides/slide6.xml><?xml version="1.0" encoding="utf-8"?>
+<p:sld xmlns:a="http://schemas.openxmlformats.org/drawingml/2006/main" xmlns:r="http://schemas.openxmlformats.org/officeDocument/2006/relationships" xmlns:p="http://schemas.openxmlformats.org/presentationml/2006/main">
+  <p:cSld>
+    <p:spTree>
+      <p:nvGrpSpPr>
+        <p:cNvPr id="1" name=""/>
+        <p:cNvGrpSpPr/>
+        <p:nvPr/>
+      </p:nvGrpSpPr>
+      <p:grpSpPr>
+        <a:xfrm>
+          <a:off x="0" y="0"/>
+          <a:ext cx="0" cy="0"/>
+          <a:chOff x="0" y="0"/>
+          <a:chExt cx="0" cy="0"/>
+        </a:xfrm>
+      </p:grpSpPr>
+      <p:sp>
+        <p:nvSpPr>
+          <p:cNvPr id="2" name="Slide Number Placeholder 1"/>
+          <p:cNvSpPr>
+            <a:spLocks noGrp="1"/>
+          </p:cNvSpPr>
+          <p:nvPr>
+            <p:ph type="sldNum" sz="quarter" idx="10"/>
+          </p:nvPr>
+        </p:nvSpPr>
+        <p:spPr/>
+        <p:txBody>
+          <a:bodyPr/>
+          <a:lstStyle/>
+          <a:p>
+            <a:fld id="{61155BBA-336D-4AED-BB34-E42D9706BCE7}" type="slidenum">
+              <a:rPr lang="it-IT" altLang="en-US" smtClean="0"/>
+              <a:pPr/>
+              <a:t>6</a:t>
+            </a:fld>
+            <a:endParaRPr lang="it-IT" altLang="en-US"/>
+          </a:p>
+        </p:txBody>
+      </p:sp>
+      <p:sp>
+        <p:nvSpPr>
+          <p:cNvPr id="3" name="TextBox 2"/>
+          <p:cNvSpPr txBox="1"/>
+          <p:nvPr/>
+        </p:nvSpPr>
+        <p:spPr>
+          <a:xfrm>
+            <a:off x="4292140" y="1046490"/>
+            <a:ext cx="3607719" cy="523220"/>
+          </a:xfrm>
+          <a:prstGeom prst="rect">
+            <a:avLst/>
+          </a:prstGeom>
+          <a:noFill/>
+        </p:spPr>
+        <p:txBody>
+          <a:bodyPr wrap="none" rtlCol="0">
+            <a:spAutoFit/>
+          </a:bodyPr>
+          <a:lstStyle/>
+          <a:p>
+            <a:r>
+              <a:rPr lang="en-GB" sz="2800" b="1" i="1" dirty="0" smtClean="0">
+                <a:latin typeface="+mj-lt"/>
+              </a:rPr>
+              <a:t>DATA PROCESSING</a:t>
+            </a:r>
+          </a:p>
+        </p:txBody>
+      </p:sp>
+      <p:sp>
+        <p:nvSpPr>
+          <p:cNvPr id="4" name="TextBox 3"/>
+          <p:cNvSpPr txBox="1"/>
+          <p:nvPr/>
+        </p:nvSpPr>
+        <p:spPr>
+          <a:xfrm>
+            <a:off x="7556950" y="148382"/>
+            <a:ext cx="2597506" cy="369332"/>
+          </a:xfrm>
+          <a:prstGeom prst="rect">
+            <a:avLst/>
+          </a:prstGeom>
+          <a:noFill/>
+        </p:spPr>
+        <p:txBody>
+          <a:bodyPr wrap="none" rtlCol="0">
+            <a:spAutoFit/>
+          </a:bodyPr>
+          <a:lstStyle/>
+          <a:p>
+            <a:r>
+              <a:rPr lang="en-GB" b="1" dirty="0" smtClean="0">
+                <a:solidFill>
+                  <a:srgbClr val="FF0000"/>
+                </a:solidFill>
+                <a:latin typeface="DejaVu Sans" panose="020B0603030804020204" pitchFamily="34" charset="0"/>
+                <a:ea typeface="DejaVu Sans" panose="020B0603030804020204" pitchFamily="34" charset="0"/>
+                <a:cs typeface="DejaVu Sans" panose="020B0603030804020204" pitchFamily="34" charset="0"/>
+              </a:rPr>
+              <a:t>DATA PROCESSING</a:t>
+            </a:r>
+            <a:endParaRPr lang="en-GB" b="1" dirty="0">
+              <a:solidFill>
+                <a:srgbClr val="FF0000"/>
+              </a:solidFill>
+              <a:latin typeface="DejaVu Sans" panose="020B0603030804020204" pitchFamily="34" charset="0"/>
+              <a:ea typeface="DejaVu Sans" panose="020B0603030804020204" pitchFamily="34" charset="0"/>
+              <a:cs typeface="DejaVu Sans" panose="020B0603030804020204" pitchFamily="34" charset="0"/>
+            </a:endParaRPr>
+          </a:p>
+        </p:txBody>
+      </p:sp>
+    </p:spTree>
+    <p:extLst>
+      <p:ext uri="{BB962C8B-B14F-4D97-AF65-F5344CB8AC3E}">
+        <p14:creationId xmlns:p14="http://schemas.microsoft.com/office/powerpoint/2010/main" val="3878552150"/>
+      </p:ext>
+    </p:extLst>
+  </p:cSld>
+  <p:clrMapOvr>
+    <a:masterClrMapping/>
+  </p:clrMapOvr>
+  <p:timing>
+    <p:tnLst>
+      <p:par>
+        <p:cTn id="1" dur="indefinite" restart="never" nodeType="tmRoot"/>
+      </p:par>
+    </p:tnLst>
+  </p:timing>
+</p:sld>
+</file>
+
+<file path=ppt/slides/slide7.xml><?xml version="1.0" encoding="utf-8"?>
+<p:sld xmlns:a="http://schemas.openxmlformats.org/drawingml/2006/main" xmlns:r="http://schemas.openxmlformats.org/officeDocument/2006/relationships" xmlns:p="http://schemas.openxmlformats.org/presentationml/2006/main">
+  <p:cSld>
+    <p:spTree>
+      <p:nvGrpSpPr>
+        <p:cNvPr id="1" name=""/>
+        <p:cNvGrpSpPr/>
+        <p:nvPr/>
+      </p:nvGrpSpPr>
+      <p:grpSpPr>
+        <a:xfrm>
+          <a:off x="0" y="0"/>
+          <a:ext cx="0" cy="0"/>
+          <a:chOff x="0" y="0"/>
+          <a:chExt cx="0" cy="0"/>
+        </a:xfrm>
+      </p:grpSpPr>
+      <p:sp>
+        <p:nvSpPr>
+          <p:cNvPr id="2" name="Slide Number Placeholder 1"/>
+          <p:cNvSpPr>
+            <a:spLocks noGrp="1"/>
+          </p:cNvSpPr>
+          <p:nvPr>
+            <p:ph type="sldNum" sz="quarter" idx="10"/>
+          </p:nvPr>
+        </p:nvSpPr>
+        <p:spPr/>
+        <p:txBody>
+          <a:bodyPr/>
+          <a:lstStyle/>
+          <a:p>
+            <a:fld id="{61155BBA-336D-4AED-BB34-E42D9706BCE7}" type="slidenum">
+              <a:rPr lang="it-IT" altLang="en-US" smtClean="0"/>
+              <a:pPr/>
+              <a:t>7</a:t>
+            </a:fld>
+            <a:endParaRPr lang="it-IT" altLang="en-US"/>
+          </a:p>
+        </p:txBody>
+      </p:sp>
+      <p:sp>
+        <p:nvSpPr>
+          <p:cNvPr id="3" name="TextBox 2"/>
+          <p:cNvSpPr txBox="1"/>
+          <p:nvPr/>
+        </p:nvSpPr>
+        <p:spPr>
+          <a:xfrm>
+            <a:off x="4292140" y="1046490"/>
+            <a:ext cx="4420313" cy="523220"/>
+          </a:xfrm>
+          <a:prstGeom prst="rect">
+            <a:avLst/>
+          </a:prstGeom>
+          <a:noFill/>
+        </p:spPr>
+        <p:txBody>
+          <a:bodyPr wrap="none" rtlCol="0">
+            <a:spAutoFit/>
+          </a:bodyPr>
+          <a:lstStyle/>
+          <a:p>
+            <a:r>
+              <a:rPr lang="en-GB" sz="2800" b="1" i="1" dirty="0" smtClean="0">
+                <a:latin typeface="+mj-lt"/>
+              </a:rPr>
+              <a:t>MODEL IDENTIFICATION</a:t>
+            </a:r>
+          </a:p>
+        </p:txBody>
+      </p:sp>
+      <p:sp>
+        <p:nvSpPr>
+          <p:cNvPr id="4" name="TextBox 3"/>
+          <p:cNvSpPr txBox="1"/>
+          <p:nvPr/>
+        </p:nvSpPr>
+        <p:spPr>
+          <a:xfrm>
+            <a:off x="7078960" y="173782"/>
+            <a:ext cx="3266985" cy="369332"/>
+          </a:xfrm>
+          <a:prstGeom prst="rect">
+            <a:avLst/>
+          </a:prstGeom>
+          <a:noFill/>
+        </p:spPr>
+        <p:txBody>
+          <a:bodyPr wrap="none" rtlCol="0">
+            <a:spAutoFit/>
+          </a:bodyPr>
+          <a:lstStyle/>
+          <a:p>
+            <a:r>
+              <a:rPr lang="en-GB" b="1" dirty="0" smtClean="0">
+                <a:solidFill>
+                  <a:srgbClr val="FF0000"/>
+                </a:solidFill>
+                <a:latin typeface="DejaVu Sans" panose="020B0603030804020204" pitchFamily="34" charset="0"/>
+                <a:ea typeface="DejaVu Sans" panose="020B0603030804020204" pitchFamily="34" charset="0"/>
+                <a:cs typeface="DejaVu Sans" panose="020B0603030804020204" pitchFamily="34" charset="0"/>
+              </a:rPr>
+              <a:t>MODEL IDENTIFICATION</a:t>
+            </a:r>
+            <a:endParaRPr lang="en-GB" b="1" dirty="0">
+              <a:solidFill>
+                <a:srgbClr val="FF0000"/>
+              </a:solidFill>
+              <a:latin typeface="DejaVu Sans" panose="020B0603030804020204" pitchFamily="34" charset="0"/>
+              <a:ea typeface="DejaVu Sans" panose="020B0603030804020204" pitchFamily="34" charset="0"/>
+              <a:cs typeface="DejaVu Sans" panose="020B0603030804020204" pitchFamily="34" charset="0"/>
+            </a:endParaRPr>
+          </a:p>
+        </p:txBody>
+      </p:sp>
+    </p:spTree>
+    <p:extLst>
+      <p:ext uri="{BB962C8B-B14F-4D97-AF65-F5344CB8AC3E}">
+        <p14:creationId xmlns:p14="http://schemas.microsoft.com/office/powerpoint/2010/main" val="310502378"/>
+      </p:ext>
+    </p:extLst>
+  </p:cSld>
+  <p:clrMapOvr>
+    <a:masterClrMapping/>
+  </p:clrMapOvr>
+  <p:timing>
+    <p:tnLst>
+      <p:par>
+        <p:cTn id="1" dur="indefinite" restart="never" nodeType="tmRoot"/>
+      </p:par>
+    </p:tnLst>
+  </p:timing>
+</p:sld>
+</file>
+
+<file path=ppt/slides/slide8.xml><?xml version="1.0" encoding="utf-8"?>
+<p:sld xmlns:a="http://schemas.openxmlformats.org/drawingml/2006/main" xmlns:r="http://schemas.openxmlformats.org/officeDocument/2006/relationships" xmlns:p="http://schemas.openxmlformats.org/presentationml/2006/main">
+  <p:cSld>
+    <p:spTree>
+      <p:nvGrpSpPr>
+        <p:cNvPr id="1" name=""/>
+        <p:cNvGrpSpPr/>
+        <p:nvPr/>
+      </p:nvGrpSpPr>
+      <p:grpSpPr>
+        <a:xfrm>
+          <a:off x="0" y="0"/>
+          <a:ext cx="0" cy="0"/>
+          <a:chOff x="0" y="0"/>
+          <a:chExt cx="0" cy="0"/>
+        </a:xfrm>
+      </p:grpSpPr>
+      <p:sp>
+        <p:nvSpPr>
+          <p:cNvPr id="2" name="Slide Number Placeholder 1"/>
+          <p:cNvSpPr>
+            <a:spLocks noGrp="1"/>
+          </p:cNvSpPr>
+          <p:nvPr>
+            <p:ph type="sldNum" sz="quarter" idx="10"/>
+          </p:nvPr>
+        </p:nvSpPr>
+        <p:spPr/>
+        <p:txBody>
+          <a:bodyPr/>
+          <a:lstStyle/>
+          <a:p>
+            <a:fld id="{61155BBA-336D-4AED-BB34-E42D9706BCE7}" type="slidenum">
+              <a:rPr lang="it-IT" altLang="en-US" smtClean="0"/>
+              <a:pPr/>
+              <a:t>8</a:t>
+            </a:fld>
+            <a:endParaRPr lang="it-IT" altLang="en-US"/>
+          </a:p>
+        </p:txBody>
+      </p:sp>
+      <p:sp>
+        <p:nvSpPr>
+          <p:cNvPr id="3" name="TextBox 2"/>
+          <p:cNvSpPr txBox="1"/>
+          <p:nvPr/>
+        </p:nvSpPr>
+        <p:spPr>
+          <a:xfrm>
+            <a:off x="4292140" y="1046490"/>
+            <a:ext cx="3715569" cy="523220"/>
+          </a:xfrm>
+          <a:prstGeom prst="rect">
+            <a:avLst/>
+          </a:prstGeom>
+          <a:noFill/>
+        </p:spPr>
+        <p:txBody>
+          <a:bodyPr wrap="none" rtlCol="0">
+            <a:spAutoFit/>
+          </a:bodyPr>
+          <a:lstStyle/>
+          <a:p>
+            <a:r>
+              <a:rPr lang="en-GB" sz="2800" b="1" i="1" dirty="0" smtClean="0">
+                <a:latin typeface="+mj-lt"/>
+              </a:rPr>
+              <a:t>MODEL VALIDATION</a:t>
+            </a:r>
+          </a:p>
+        </p:txBody>
+      </p:sp>
+      <p:sp>
+        <p:nvSpPr>
+          <p:cNvPr id="4" name="TextBox 3"/>
+          <p:cNvSpPr txBox="1"/>
+          <p:nvPr/>
+        </p:nvSpPr>
+        <p:spPr>
+          <a:xfrm>
+            <a:off x="7078960" y="173782"/>
+            <a:ext cx="2746393" cy="369332"/>
+          </a:xfrm>
+          <a:prstGeom prst="rect">
+            <a:avLst/>
+          </a:prstGeom>
+          <a:noFill/>
+        </p:spPr>
+        <p:txBody>
+          <a:bodyPr wrap="none" rtlCol="0">
+            <a:spAutoFit/>
+          </a:bodyPr>
+          <a:lstStyle/>
+          <a:p>
+            <a:r>
+              <a:rPr lang="en-GB" b="1" dirty="0" smtClean="0">
+                <a:solidFill>
+                  <a:srgbClr val="FF0000"/>
+                </a:solidFill>
+                <a:latin typeface="DejaVu Sans" panose="020B0603030804020204" pitchFamily="34" charset="0"/>
+                <a:ea typeface="DejaVu Sans" panose="020B0603030804020204" pitchFamily="34" charset="0"/>
+                <a:cs typeface="DejaVu Sans" panose="020B0603030804020204" pitchFamily="34" charset="0"/>
+              </a:rPr>
+              <a:t>MODEL VALIDATION</a:t>
+            </a:r>
+            <a:endParaRPr lang="en-GB" b="1" dirty="0">
+              <a:solidFill>
+                <a:srgbClr val="FF0000"/>
+              </a:solidFill>
+              <a:latin typeface="DejaVu Sans" panose="020B0603030804020204" pitchFamily="34" charset="0"/>
+              <a:ea typeface="DejaVu Sans" panose="020B0603030804020204" pitchFamily="34" charset="0"/>
+              <a:cs typeface="DejaVu Sans" panose="020B0603030804020204" pitchFamily="34" charset="0"/>
+            </a:endParaRPr>
+          </a:p>
+        </p:txBody>
+      </p:sp>
+    </p:spTree>
+    <p:extLst>
+      <p:ext uri="{BB962C8B-B14F-4D97-AF65-F5344CB8AC3E}">
+        <p14:creationId xmlns:p14="http://schemas.microsoft.com/office/powerpoint/2010/main" val="55177232"/>
+      </p:ext>
+    </p:extLst>
+  </p:cSld>
+  <p:clrMapOvr>
+    <a:masterClrMapping/>
+  </p:clrMapOvr>
+  <p:timing>
+    <p:tnLst>
+      <p:par>
+        <p:cTn id="1" dur="indefinite" restart="never" nodeType="tmRoot"/>
+      </p:par>
+    </p:tnLst>
+  </p:timing>
+</p:sld>
+</file>
+
+<file path=ppt/slides/slide9.xml><?xml version="1.0" encoding="utf-8"?>
+<p:sld xmlns:a="http://schemas.openxmlformats.org/drawingml/2006/main" xmlns:r="http://schemas.openxmlformats.org/officeDocument/2006/relationships" xmlns:p="http://schemas.openxmlformats.org/presentationml/2006/main">
+  <p:cSld>
+    <p:spTree>
+      <p:nvGrpSpPr>
+        <p:cNvPr id="1" name=""/>
+        <p:cNvGrpSpPr/>
+        <p:nvPr/>
+      </p:nvGrpSpPr>
+      <p:grpSpPr>
+        <a:xfrm>
+          <a:off x="0" y="0"/>
+          <a:ext cx="0" cy="0"/>
+          <a:chOff x="0" y="0"/>
+          <a:chExt cx="0" cy="0"/>
+        </a:xfrm>
+      </p:grpSpPr>
+      <p:sp>
+        <p:nvSpPr>
+          <p:cNvPr id="2" name="Slide Number Placeholder 1"/>
+          <p:cNvSpPr>
+            <a:spLocks noGrp="1"/>
+          </p:cNvSpPr>
+          <p:nvPr>
+            <p:ph type="sldNum" sz="quarter" idx="10"/>
+          </p:nvPr>
+        </p:nvSpPr>
+        <p:spPr/>
+        <p:txBody>
+          <a:bodyPr/>
+          <a:lstStyle/>
+          <a:p>
+            <a:fld id="{61155BBA-336D-4AED-BB34-E42D9706BCE7}" type="slidenum">
+              <a:rPr lang="it-IT" altLang="en-US" smtClean="0"/>
+              <a:pPr/>
+              <a:t>9</a:t>
+            </a:fld>
+            <a:endParaRPr lang="it-IT" altLang="en-US"/>
+          </a:p>
+        </p:txBody>
+      </p:sp>
+      <p:sp>
+        <p:nvSpPr>
+          <p:cNvPr id="3" name="TextBox 2"/>
+          <p:cNvSpPr txBox="1"/>
+          <p:nvPr/>
+        </p:nvSpPr>
+        <p:spPr>
+          <a:xfrm>
+            <a:off x="4746912" y="1033790"/>
+            <a:ext cx="2698175" cy="523220"/>
+          </a:xfrm>
+          <a:prstGeom prst="rect">
+            <a:avLst/>
+          </a:prstGeom>
+          <a:noFill/>
+        </p:spPr>
+        <p:txBody>
+          <a:bodyPr wrap="none" rtlCol="0">
+            <a:spAutoFit/>
+          </a:bodyPr>
+          <a:lstStyle/>
+          <a:p>
+            <a:r>
+              <a:rPr lang="en-GB" sz="2800" b="1" i="1" dirty="0" smtClean="0">
+                <a:latin typeface="+mj-lt"/>
+              </a:rPr>
+              <a:t>CONCLUSION</a:t>
+            </a:r>
+          </a:p>
+        </p:txBody>
+      </p:sp>
+      <p:sp>
+        <p:nvSpPr>
+          <p:cNvPr id="4" name="TextBox 3"/>
+          <p:cNvSpPr txBox="1"/>
+          <p:nvPr/>
+        </p:nvSpPr>
+        <p:spPr>
+          <a:xfrm>
+            <a:off x="6956299" y="173782"/>
+            <a:ext cx="3512308" cy="369332"/>
+          </a:xfrm>
+          <a:prstGeom prst="rect">
+            <a:avLst/>
+          </a:prstGeom>
+          <a:noFill/>
+        </p:spPr>
+        <p:txBody>
+          <a:bodyPr wrap="none" rtlCol="0">
+            <a:spAutoFit/>
+          </a:bodyPr>
+          <a:lstStyle/>
+          <a:p>
+            <a:r>
+              <a:rPr lang="en-GB" b="1" dirty="0" smtClean="0">
+                <a:solidFill>
+                  <a:srgbClr val="FF0000"/>
+                </a:solidFill>
+                <a:latin typeface="DejaVu Sans" panose="020B0603030804020204" pitchFamily="34" charset="0"/>
+                <a:ea typeface="DejaVu Sans" panose="020B0603030804020204" pitchFamily="34" charset="0"/>
+                <a:cs typeface="DejaVu Sans" panose="020B0603030804020204" pitchFamily="34" charset="0"/>
+              </a:rPr>
+              <a:t>CONCLUSION &amp; REMARKS</a:t>
+            </a:r>
+            <a:endParaRPr lang="en-GB" b="1" dirty="0">
+              <a:solidFill>
+                <a:srgbClr val="FF0000"/>
+              </a:solidFill>
+              <a:latin typeface="DejaVu Sans" panose="020B0603030804020204" pitchFamily="34" charset="0"/>
+              <a:ea typeface="DejaVu Sans" panose="020B0603030804020204" pitchFamily="34" charset="0"/>
+              <a:cs typeface="DejaVu Sans" panose="020B0603030804020204" pitchFamily="34" charset="0"/>
+            </a:endParaRPr>
+          </a:p>
+        </p:txBody>
+      </p:sp>
+    </p:spTree>
+    <p:extLst>
+      <p:ext uri="{BB962C8B-B14F-4D97-AF65-F5344CB8AC3E}">
+        <p14:creationId xmlns:p14="http://schemas.microsoft.com/office/powerpoint/2010/main" val="2463455316"/>
+      </p:ext>
+    </p:extLst>
+  </p:cSld>
+  <p:clrMapOvr>
+    <a:masterClrMapping/>
+  </p:clrMapOvr>
+  <p:timing>
+    <p:tnLst>
+      <p:par>
+        <p:cTn id="1" dur="indefinite" restart="never" nodeType="tmRoot"/>
+      </p:par>
+    </p:tnLst>
+  </p:timing>
 </p:sld>
 </file>
 

</xml_diff>

<commit_message>
Bug fix in power spectrum inspect signal, report
Fixed a bug when plotting the power spectrum in inspectsignal.
Some work on the report
</commit_message>
<xml_diff>
--- a/report/Report.pptx
+++ b/report/Report.pptx
@@ -5683,8 +5683,8 @@
           </a:p>
         </p:txBody>
       </p:sp>
-      <mc:AlternateContent xmlns:mc="http://schemas.openxmlformats.org/markup-compatibility/2006" xmlns:a14="http://schemas.microsoft.com/office/drawing/2010/main">
-        <mc:Choice Requires="a14">
+      <mc:AlternateContent xmlns:mc="http://schemas.openxmlformats.org/markup-compatibility/2006">
+        <mc:Choice xmlns:a14="http://schemas.microsoft.com/office/drawing/2010/main" Requires="a14">
           <p:sp>
             <p:nvSpPr>
               <p:cNvPr id="9" name="TextBox 8"/>
@@ -5694,7 +5694,7 @@
             <p:spPr>
               <a:xfrm>
                 <a:off x="2968658" y="3083831"/>
-                <a:ext cx="11259401" cy="951030"/>
+                <a:ext cx="11259401" cy="976036"/>
               </a:xfrm>
               <a:prstGeom prst="rect">
                 <a:avLst/>
@@ -5795,31 +5795,29 @@
                                 </m:r>
                               </m:sub>
                             </m:sSub>
+                            <m:r>
+                              <a:rPr lang="en-GB" b="0" i="1" smtClean="0">
+                                <a:latin typeface="Cambria Math" panose="02040503050406030204" pitchFamily="18" charset="0"/>
+                              </a:rPr>
+                              <m:t>, </m:t>
+                            </m:r>
+                            <m:r>
+                              <a:rPr lang="en-GB" b="0" i="1" smtClean="0">
+                                <a:latin typeface="Cambria Math" panose="02040503050406030204" pitchFamily="18" charset="0"/>
+                              </a:rPr>
+                              <m:t>𝑖</m:t>
+                            </m:r>
+                            <m:r>
+                              <a:rPr lang="en-GB" b="0" i="1" smtClean="0">
+                                <a:latin typeface="Cambria Math" panose="02040503050406030204" pitchFamily="18" charset="0"/>
+                              </a:rPr>
+                              <m:t>=1,2,3</m:t>
+                            </m:r>
                           </m:e>
                         </m:d>
                       </m:e>
-                      <m:sub>
-                        <m:r>
-                          <a:rPr lang="en-GB" b="0" i="1" smtClean="0">
-                            <a:latin typeface="Cambria Math" panose="02040503050406030204" pitchFamily="18" charset="0"/>
-                          </a:rPr>
-                          <m:t>𝑖</m:t>
-                        </m:r>
-                        <m:r>
-                          <a:rPr lang="en-GB" b="0" i="1" smtClean="0">
-                            <a:latin typeface="Cambria Math" panose="02040503050406030204" pitchFamily="18" charset="0"/>
-                          </a:rPr>
-                          <m:t>=1</m:t>
-                        </m:r>
-                      </m:sub>
-                      <m:sup>
-                        <m:r>
-                          <a:rPr lang="en-GB" b="0" i="1" smtClean="0">
-                            <a:latin typeface="Cambria Math" panose="02040503050406030204" pitchFamily="18" charset="0"/>
-                          </a:rPr>
-                          <m:t>3</m:t>
-                        </m:r>
-                      </m:sup>
+                      <m:sub/>
+                      <m:sup/>
                     </m:sSubSup>
                   </m:oMath>
                 </a14:m>
@@ -5835,7 +5833,7 @@
             </p:txBody>
           </p:sp>
         </mc:Choice>
-        <mc:Fallback xmlns="">
+        <mc:Fallback>
           <p:sp>
             <p:nvSpPr>
               <p:cNvPr id="9" name="TextBox 8"/>
@@ -5847,7 +5845,7 @@
             <p:spPr>
               <a:xfrm>
                 <a:off x="2968658" y="3083831"/>
-                <a:ext cx="11259401" cy="951030"/>
+                <a:ext cx="11259401" cy="976036"/>
               </a:xfrm>
               <a:prstGeom prst="rect">
                 <a:avLst/>
@@ -5855,7 +5853,7 @@
               <a:blipFill rotWithShape="0">
                 <a:blip r:embed="rId2"/>
                 <a:stretch>
-                  <a:fillRect l="-379" t="-3846"/>
+                  <a:fillRect l="-379" t="-3750"/>
                 </a:stretch>
               </a:blipFill>
             </p:spPr>
@@ -6902,11 +6900,7 @@
                 </a:pPr>
                 <a:r>
                   <a:rPr lang="en-GB" dirty="0" smtClean="0"/>
-                  <a:t>Three </a:t>
-                </a:r>
-                <a:r>
-                  <a:rPr lang="en-GB" dirty="0" smtClean="0"/>
-                  <a:t>experiments, done in the following manner for </a:t>
+                  <a:t>Three experiments, done in the following manner for </a:t>
                 </a:r>
                 <a14:m>
                   <m:oMath xmlns:m="http://schemas.openxmlformats.org/officeDocument/2006/math">
@@ -7268,11 +7262,7 @@
                 </a14:m>
                 <a:r>
                   <a:rPr lang="en-GB" dirty="0" smtClean="0"/>
-                  <a:t> the system is again in closed loop</a:t>
-                </a:r>
-                <a:r>
-                  <a:rPr lang="en-GB" dirty="0" smtClean="0"/>
-                  <a:t>.</a:t>
+                  <a:t> the system is again in closed loop.</a:t>
                 </a:r>
               </a:p>
               <a:p>
@@ -7481,7 +7471,6 @@
                   <a:rPr lang="en-GB" dirty="0" smtClean="0"/>
                   <a:t>.</a:t>
                 </a:r>
-                <a:endParaRPr lang="en-GB" dirty="0" smtClean="0"/>
               </a:p>
               <a:p>
                 <a:endParaRPr lang="en-GB" dirty="0"/>
@@ -7696,23 +7685,23 @@
                       </a:rPr>
                       <m:t>={</m:t>
                     </m:r>
-                    <m:d>
-                      <m:dPr>
+                    <m:sSub>
+                      <m:sSubPr>
                         <m:ctrlPr>
                           <a:rPr lang="en-GB" b="0" i="1" smtClean="0">
                             <a:latin typeface="Cambria Math" panose="02040503050406030204" pitchFamily="18" charset="0"/>
                           </a:rPr>
                         </m:ctrlPr>
-                      </m:dPr>
+                      </m:sSubPr>
                       <m:e>
-                        <m:sSub>
-                          <m:sSubPr>
+                        <m:d>
+                          <m:dPr>
                             <m:ctrlPr>
                               <a:rPr lang="en-GB" b="0" i="1" smtClean="0">
                                 <a:latin typeface="Cambria Math" panose="02040503050406030204" pitchFamily="18" charset="0"/>
                               </a:rPr>
                             </m:ctrlPr>
-                          </m:sSubPr>
+                          </m:dPr>
                           <m:e>
                             <m:r>
                               <a:rPr lang="en-GB" b="1" i="1" smtClean="0">
@@ -7720,49 +7709,36 @@
                               </a:rPr>
                               <m:t>𝒙</m:t>
                             </m:r>
-                          </m:e>
-                          <m:sub>
                             <m:r>
                               <a:rPr lang="en-GB" b="0" i="1" smtClean="0">
                                 <a:latin typeface="Cambria Math" panose="02040503050406030204" pitchFamily="18" charset="0"/>
                               </a:rPr>
-                              <m:t>𝑖𝑗</m:t>
+                              <m:t>,</m:t>
                             </m:r>
-                          </m:sub>
-                        </m:sSub>
-                        <m:r>
-                          <a:rPr lang="en-GB" b="0" i="1" smtClean="0">
-                            <a:latin typeface="Cambria Math" panose="02040503050406030204" pitchFamily="18" charset="0"/>
-                          </a:rPr>
-                          <m:t>,</m:t>
-                        </m:r>
-                        <m:sSub>
-                          <m:sSubPr>
-                            <m:ctrlPr>
-                              <a:rPr lang="en-GB" b="0" i="1" smtClean="0">
-                                <a:latin typeface="Cambria Math" panose="02040503050406030204" pitchFamily="18" charset="0"/>
-                              </a:rPr>
-                            </m:ctrlPr>
-                          </m:sSubPr>
-                          <m:e>
                             <m:r>
                               <a:rPr lang="en-GB" b="1" i="1" smtClean="0">
                                 <a:latin typeface="Cambria Math" panose="02040503050406030204" pitchFamily="18" charset="0"/>
                               </a:rPr>
                               <m:t>𝒚</m:t>
                             </m:r>
-                          </m:e>
-                          <m:sub>
                             <m:r>
                               <a:rPr lang="en-GB" b="0" i="1" smtClean="0">
                                 <a:latin typeface="Cambria Math" panose="02040503050406030204" pitchFamily="18" charset="0"/>
                               </a:rPr>
-                              <m:t>𝑖𝑗</m:t>
+                              <m:t> </m:t>
                             </m:r>
-                          </m:sub>
-                        </m:sSub>
+                          </m:e>
+                        </m:d>
                       </m:e>
-                    </m:d>
+                      <m:sub>
+                        <m:r>
+                          <a:rPr lang="en-GB" b="0" i="1" smtClean="0">
+                            <a:latin typeface="Cambria Math" panose="02040503050406030204" pitchFamily="18" charset="0"/>
+                          </a:rPr>
+                          <m:t>𝑖𝑗</m:t>
+                        </m:r>
+                      </m:sub>
+                    </m:sSub>
                     <m:r>
                       <a:rPr lang="en-GB" b="0" i="1" smtClean="0">
                         <a:latin typeface="Cambria Math" panose="02040503050406030204" pitchFamily="18" charset="0"/>
@@ -7948,7 +7924,7 @@
         </p:nvSpPr>
         <p:spPr bwMode="auto">
           <a:xfrm>
-            <a:off x="762000" y="5285697"/>
+            <a:off x="762000" y="5377093"/>
             <a:ext cx="1041400" cy="444500"/>
           </a:xfrm>
           <a:prstGeom prst="rightArrow">
@@ -8020,8 +7996,8 @@
             </p:nvSpPr>
             <p:spPr>
               <a:xfrm>
-                <a:off x="2019300" y="5302249"/>
-                <a:ext cx="5232400" cy="411395"/>
+                <a:off x="2019300" y="5393645"/>
+                <a:ext cx="5232400" cy="369332"/>
               </a:xfrm>
               <a:prstGeom prst="rect">
                 <a:avLst/>
@@ -8036,108 +8012,79 @@
               <a:p>
                 <a14:m>
                   <m:oMath xmlns:m="http://schemas.openxmlformats.org/officeDocument/2006/math">
-                    <m:d>
-                      <m:dPr>
+                    <m:sSub>
+                      <m:sSubPr>
                         <m:ctrlPr>
                           <a:rPr lang="en-GB" b="0" i="1" smtClean="0">
                             <a:latin typeface="Cambria Math" panose="02040503050406030204" pitchFamily="18" charset="0"/>
                           </a:rPr>
                         </m:ctrlPr>
-                      </m:dPr>
+                      </m:sSubPr>
                       <m:e>
-                        <m:sSub>
-                          <m:sSubPr>
+                        <m:d>
+                          <m:dPr>
                             <m:ctrlPr>
                               <a:rPr lang="en-GB" b="0" i="1" smtClean="0">
                                 <a:latin typeface="Cambria Math" panose="02040503050406030204" pitchFamily="18" charset="0"/>
                               </a:rPr>
                             </m:ctrlPr>
-                          </m:sSubPr>
+                          </m:dPr>
                           <m:e>
                             <m:r>
-                              <a:rPr lang="en-GB" b="0" i="1" smtClean="0">
+                              <a:rPr lang="en-GB" b="1" i="1" smtClean="0">
                                 <a:latin typeface="Cambria Math" panose="02040503050406030204" pitchFamily="18" charset="0"/>
                               </a:rPr>
-                              <m:t>𝑥</m:t>
-                            </m:r>
-                          </m:e>
-                          <m:sub>
-                            <m:r>
-                              <a:rPr lang="en-GB" b="0" i="1" smtClean="0">
-                                <a:latin typeface="Cambria Math" panose="02040503050406030204" pitchFamily="18" charset="0"/>
-                              </a:rPr>
-                              <m:t>2</m:t>
+                              <m:t>𝒙</m:t>
                             </m:r>
                             <m:r>
                               <a:rPr lang="en-GB" b="0" i="1" smtClean="0">
                                 <a:latin typeface="Cambria Math" panose="02040503050406030204" pitchFamily="18" charset="0"/>
                               </a:rPr>
-                              <m:t>𝑗</m:t>
+                              <m:t>,</m:t>
                             </m:r>
-                          </m:sub>
-                        </m:sSub>
+                            <m:r>
+                              <a:rPr lang="en-GB" b="1" i="1" smtClean="0">
+                                <a:latin typeface="Cambria Math" panose="02040503050406030204" pitchFamily="18" charset="0"/>
+                              </a:rPr>
+                              <m:t>𝒚</m:t>
+                            </m:r>
+                          </m:e>
+                        </m:d>
+                      </m:e>
+                      <m:sub>
                         <m:r>
                           <a:rPr lang="en-GB" b="0" i="1" smtClean="0">
                             <a:latin typeface="Cambria Math" panose="02040503050406030204" pitchFamily="18" charset="0"/>
                           </a:rPr>
-                          <m:t>, </m:t>
+                          <m:t>𝑖</m:t>
                         </m:r>
-                        <m:sSub>
-                          <m:sSubPr>
-                            <m:ctrlPr>
-                              <a:rPr lang="en-GB" b="0" i="1" smtClean="0">
-                                <a:latin typeface="Cambria Math" panose="02040503050406030204" pitchFamily="18" charset="0"/>
-                              </a:rPr>
-                            </m:ctrlPr>
-                          </m:sSubPr>
-                          <m:e>
-                            <m:r>
-                              <a:rPr lang="en-GB" b="0" i="1" smtClean="0">
-                                <a:latin typeface="Cambria Math" panose="02040503050406030204" pitchFamily="18" charset="0"/>
-                              </a:rPr>
-                              <m:t>𝑦</m:t>
-                            </m:r>
-                          </m:e>
-                          <m:sub>
-                            <m:r>
-                              <a:rPr lang="en-GB" b="0" i="1" smtClean="0">
-                                <a:latin typeface="Cambria Math" panose="02040503050406030204" pitchFamily="18" charset="0"/>
-                              </a:rPr>
-                              <m:t>2</m:t>
-                            </m:r>
-                            <m:r>
-                              <a:rPr lang="en-GB" b="0" i="1" smtClean="0">
-                                <a:latin typeface="Cambria Math" panose="02040503050406030204" pitchFamily="18" charset="0"/>
-                              </a:rPr>
-                              <m:t>𝑗</m:t>
-                            </m:r>
-                          </m:sub>
-                        </m:sSub>
-                      </m:e>
-                    </m:d>
+                        <m:r>
+                          <a:rPr lang="en-GB" b="0" i="1" smtClean="0">
+                            <a:latin typeface="Cambria Math" panose="02040503050406030204" pitchFamily="18" charset="0"/>
+                          </a:rPr>
+                          <m:t>2</m:t>
+                        </m:r>
+                      </m:sub>
+                    </m:sSub>
                     <m:r>
                       <a:rPr lang="en-GB" b="0" i="1" smtClean="0">
                         <a:latin typeface="Cambria Math" panose="02040503050406030204" pitchFamily="18" charset="0"/>
                       </a:rPr>
-                      <m:t>, </m:t>
-                    </m:r>
-                    <m:r>
-                      <a:rPr lang="en-GB" b="0" i="1" smtClean="0">
-                        <a:latin typeface="Cambria Math" panose="02040503050406030204" pitchFamily="18" charset="0"/>
-                      </a:rPr>
-                      <m:t>𝑗</m:t>
-                    </m:r>
-                    <m:r>
-                      <a:rPr lang="en-GB" b="0" i="1" smtClean="0">
-                        <a:latin typeface="Cambria Math" panose="02040503050406030204" pitchFamily="18" charset="0"/>
-                      </a:rPr>
-                      <m:t>=1,2,3 </m:t>
+                      <m:t> </m:t>
                     </m:r>
                   </m:oMath>
                 </a14:m>
                 <a:r>
                   <a:rPr lang="en-GB" dirty="0" smtClean="0"/>
-                  <a:t>is open loop data</a:t>
+                  <a:t>is </a:t>
+                </a:r>
+                <a:r>
+                  <a:rPr lang="en-GB" dirty="0" smtClean="0"/>
+                  <a:t>the open </a:t>
+                </a:r>
+                <a:r>
+                  <a:rPr lang="en-GB" dirty="0" smtClean="0"/>
+                  <a:t>loop data</a:t>
                 </a:r>
                 <a:endParaRPr lang="en-GB" dirty="0"/>
               </a:p>
@@ -8155,8 +8102,8 @@
             </p:nvSpPr>
             <p:spPr>
               <a:xfrm>
-                <a:off x="2019300" y="5302249"/>
-                <a:ext cx="5232400" cy="411395"/>
+                <a:off x="2019300" y="5393645"/>
+                <a:ext cx="5232400" cy="369332"/>
               </a:xfrm>
               <a:prstGeom prst="rect">
                 <a:avLst/>
@@ -8164,7 +8111,7 @@
               <a:blipFill rotWithShape="0">
                 <a:blip r:embed="rId3"/>
                 <a:stretch>
-                  <a:fillRect t="-4478" b="-17910"/>
+                  <a:fillRect t="-10000" b="-26667"/>
                 </a:stretch>
               </a:blipFill>
             </p:spPr>
@@ -8366,6 +8313,96 @@
           </a:p>
         </p:txBody>
       </p:sp>
+      <p:pic>
+        <p:nvPicPr>
+          <p:cNvPr id="5" name="Picture 4"/>
+          <p:cNvPicPr>
+            <a:picLocks noChangeAspect="1"/>
+          </p:cNvPicPr>
+          <p:nvPr/>
+        </p:nvPicPr>
+        <p:blipFill>
+          <a:blip r:embed="rId2">
+            <a:extLst>
+              <a:ext uri="{28A0092B-C50C-407E-A947-70E740481C1C}">
+                <a14:useLocalDpi xmlns:a14="http://schemas.microsoft.com/office/drawing/2010/main" val="0"/>
+              </a:ext>
+            </a:extLst>
+          </a:blip>
+          <a:stretch>
+            <a:fillRect/>
+          </a:stretch>
+        </p:blipFill>
+        <p:spPr>
+          <a:xfrm>
+            <a:off x="314865" y="1569709"/>
+            <a:ext cx="3363984" cy="2522988"/>
+          </a:xfrm>
+          <a:prstGeom prst="rect">
+            <a:avLst/>
+          </a:prstGeom>
+        </p:spPr>
+      </p:pic>
+      <p:pic>
+        <p:nvPicPr>
+          <p:cNvPr id="6" name="Picture 5"/>
+          <p:cNvPicPr>
+            <a:picLocks noChangeAspect="1"/>
+          </p:cNvPicPr>
+          <p:nvPr/>
+        </p:nvPicPr>
+        <p:blipFill>
+          <a:blip r:embed="rId3">
+            <a:extLst>
+              <a:ext uri="{28A0092B-C50C-407E-A947-70E740481C1C}">
+                <a14:useLocalDpi xmlns:a14="http://schemas.microsoft.com/office/drawing/2010/main" val="0"/>
+              </a:ext>
+            </a:extLst>
+          </a:blip>
+          <a:stretch>
+            <a:fillRect/>
+          </a:stretch>
+        </p:blipFill>
+        <p:spPr>
+          <a:xfrm>
+            <a:off x="8071066" y="1569710"/>
+            <a:ext cx="3363985" cy="2522989"/>
+          </a:xfrm>
+          <a:prstGeom prst="rect">
+            <a:avLst/>
+          </a:prstGeom>
+        </p:spPr>
+      </p:pic>
+      <p:pic>
+        <p:nvPicPr>
+          <p:cNvPr id="7" name="Picture 6"/>
+          <p:cNvPicPr>
+            <a:picLocks noChangeAspect="1"/>
+          </p:cNvPicPr>
+          <p:nvPr/>
+        </p:nvPicPr>
+        <p:blipFill>
+          <a:blip r:embed="rId4">
+            <a:extLst>
+              <a:ext uri="{28A0092B-C50C-407E-A947-70E740481C1C}">
+                <a14:useLocalDpi xmlns:a14="http://schemas.microsoft.com/office/drawing/2010/main" val="0"/>
+              </a:ext>
+            </a:extLst>
+          </a:blip>
+          <a:stretch>
+            <a:fillRect/>
+          </a:stretch>
+        </p:blipFill>
+        <p:spPr>
+          <a:xfrm>
+            <a:off x="4192965" y="1569709"/>
+            <a:ext cx="3363985" cy="2522989"/>
+          </a:xfrm>
+          <a:prstGeom prst="rect">
+            <a:avLst/>
+          </a:prstGeom>
+        </p:spPr>
+      </p:pic>
     </p:spTree>
     <p:extLst>
       <p:ext uri="{BB962C8B-B14F-4D97-AF65-F5344CB8AC3E}">

</xml_diff>

<commit_message>
Additional work on report
</commit_message>
<xml_diff>
--- a/report/Report.pptx
+++ b/report/Report.pptx
@@ -8940,7 +8940,7 @@
                 </a14:m>
                 <a:r>
                   <a:rPr lang="en-GB" dirty="0" smtClean="0"/>
-                  <a:t> (or a distance) of</a:t>
+                  <a:t> (or a distance) function of</a:t>
                 </a:r>
                 <a14:m>
                   <m:oMath xmlns:m="http://schemas.openxmlformats.org/officeDocument/2006/math">
@@ -11347,7 +11347,7 @@
               <a:blipFill rotWithShape="0">
                 <a:blip r:embed="rId2"/>
                 <a:stretch>
-                  <a:fillRect l="-480" t="-572"/>
+                  <a:fillRect l="-480" t="-572" r="-1761"/>
                 </a:stretch>
               </a:blipFill>
             </p:spPr>

</xml_diff>

<commit_message>
Additional work on the report (model identification)
</commit_message>
<xml_diff>
--- a/report/Report.pptx
+++ b/report/Report.pptx
@@ -26,11 +26,12 @@
     <p:sldId id="270" r:id="rId20"/>
     <p:sldId id="263" r:id="rId21"/>
     <p:sldId id="279" r:id="rId22"/>
-    <p:sldId id="280" r:id="rId23"/>
-    <p:sldId id="264" r:id="rId24"/>
-    <p:sldId id="265" r:id="rId25"/>
-    <p:sldId id="277" r:id="rId26"/>
-    <p:sldId id="278" r:id="rId27"/>
+    <p:sldId id="281" r:id="rId23"/>
+    <p:sldId id="280" r:id="rId24"/>
+    <p:sldId id="264" r:id="rId25"/>
+    <p:sldId id="265" r:id="rId26"/>
+    <p:sldId id="277" r:id="rId27"/>
+    <p:sldId id="278" r:id="rId28"/>
   </p:sldIdLst>
   <p:sldSz cx="12192000" cy="6858000"/>
   <p:notesSz cx="6858000" cy="9144000"/>
@@ -6950,8 +6951,8 @@
         </p:nvSpPr>
         <p:spPr>
           <a:xfrm>
-            <a:off x="2219233" y="975657"/>
-            <a:ext cx="8353056" cy="523220"/>
+            <a:off x="3810759" y="1030484"/>
+            <a:ext cx="4570482" cy="523220"/>
           </a:xfrm>
           <a:prstGeom prst="rect">
             <a:avLst/>
@@ -6968,7 +6969,7 @@
               <a:rPr lang="en-GB" sz="2800" b="1" i="1" dirty="0" smtClean="0">
                 <a:latin typeface="+mj-lt"/>
               </a:rPr>
-              <a:t>IMPULSE RESPONSE 1/3 – Correlation Analysis</a:t>
+              <a:t>IMPULSE RESPONSE 1/3 </a:t>
             </a:r>
           </a:p>
         </p:txBody>
@@ -7038,8 +7039,8 @@
         </p:nvSpPr>
         <p:spPr>
           <a:xfrm>
-            <a:off x="645951" y="1937857"/>
-            <a:ext cx="10100345" cy="646331"/>
+            <a:off x="679506" y="1798769"/>
+            <a:ext cx="10100345" cy="2031325"/>
           </a:xfrm>
           <a:prstGeom prst="rect">
             <a:avLst/>
@@ -7054,14 +7055,51 @@
           <a:p>
             <a:r>
               <a:rPr lang="en-GB" dirty="0" smtClean="0"/>
-              <a:t>We can make use of the Correlation analysis in order to make a rough estimation of the impulse response, and together with the measured data, try to estimate the input delay (dead time).</a:t>
+              <a:t>Main two approaches to estimate the impulse response are:</a:t>
+            </a:r>
+          </a:p>
+          <a:p>
+            <a:endParaRPr lang="en-GB" dirty="0"/>
+          </a:p>
+          <a:p>
+            <a:pPr marL="342900" indent="-342900">
+              <a:buFont typeface="+mj-lt"/>
+              <a:buAutoNum type="arabicPeriod"/>
+            </a:pPr>
+            <a:r>
+              <a:rPr lang="en-GB" dirty="0" smtClean="0"/>
+              <a:t>Identify a FIR model </a:t>
+            </a:r>
+          </a:p>
+          <a:p>
+            <a:pPr marL="342900" indent="-342900">
+              <a:buFont typeface="+mj-lt"/>
+              <a:buAutoNum type="arabicPeriod"/>
+            </a:pPr>
+            <a:r>
+              <a:rPr lang="en-GB" dirty="0" smtClean="0"/>
+              <a:t>Make use of correlation analysis</a:t>
+            </a:r>
+            <a:endParaRPr lang="en-GB" dirty="0"/>
+          </a:p>
+          <a:p>
+            <a:endParaRPr lang="en-GB" dirty="0"/>
+          </a:p>
+          <a:p>
+            <a:r>
+              <a:rPr lang="en-GB" dirty="0" smtClean="0"/>
+              <a:t>From this we can make </a:t>
+            </a:r>
+            <a:r>
+              <a:rPr lang="en-GB" dirty="0" smtClean="0"/>
+              <a:t>a rough estimation of the impulse response, and together with the measured data, try to estimate the input delay (dead time).</a:t>
             </a:r>
             <a:endParaRPr lang="en-GB" dirty="0"/>
           </a:p>
         </p:txBody>
       </p:sp>
-      <mc:AlternateContent xmlns:mc="http://schemas.openxmlformats.org/markup-compatibility/2006" xmlns:a14="http://schemas.microsoft.com/office/drawing/2010/main">
-        <mc:Choice Requires="a14">
+      <mc:AlternateContent xmlns:mc="http://schemas.openxmlformats.org/markup-compatibility/2006">
+        <mc:Choice xmlns:a14="http://schemas.microsoft.com/office/drawing/2010/main" Requires="a14">
           <p:sp>
             <p:nvSpPr>
               <p:cNvPr id="8" name="TextBox 7"/>
@@ -7070,8 +7108,8 @@
             </p:nvSpPr>
             <p:spPr>
               <a:xfrm>
-                <a:off x="637561" y="2938929"/>
-                <a:ext cx="10620465" cy="2371098"/>
+                <a:off x="679506" y="3915768"/>
+                <a:ext cx="10620465" cy="2602315"/>
               </a:xfrm>
               <a:prstGeom prst="rect">
                 <a:avLst/>
@@ -7083,6 +7121,15 @@
                 <a:spAutoFit/>
               </a:bodyPr>
               <a:lstStyle/>
+              <a:p>
+                <a:r>
+                  <a:rPr lang="en-GB" dirty="0" smtClean="0"/>
+                  <a:t>The correlation analysis works in the following way:</a:t>
+                </a:r>
+                <a:endParaRPr lang="en-GB" b="0" i="1" dirty="0" smtClean="0">
+                  <a:latin typeface="Cambria Math" panose="02040503050406030204" pitchFamily="18" charset="0"/>
+                </a:endParaRPr>
+              </a:p>
               <a:p>
                 <a14:m>
                   <m:oMath xmlns:m="http://schemas.openxmlformats.org/officeDocument/2006/math">
@@ -8100,7 +8147,7 @@
             </p:txBody>
           </p:sp>
         </mc:Choice>
-        <mc:Fallback xmlns="">
+        <mc:Fallback>
           <p:sp>
             <p:nvSpPr>
               <p:cNvPr id="8" name="TextBox 7"/>
@@ -8111,8 +8158,8 @@
             </p:nvSpPr>
             <p:spPr>
               <a:xfrm>
-                <a:off x="637561" y="2938929"/>
-                <a:ext cx="10620465" cy="2371098"/>
+                <a:off x="679506" y="3915768"/>
+                <a:ext cx="10620465" cy="2602315"/>
               </a:xfrm>
               <a:prstGeom prst="rect">
                 <a:avLst/>
@@ -8120,7 +8167,7 @@
               <a:blipFill rotWithShape="0">
                 <a:blip r:embed="rId2"/>
                 <a:stretch>
-                  <a:fillRect l="-1378" t="-20308" r="-1033"/>
+                  <a:fillRect l="-1320" t="-7963" r="-1033"/>
                 </a:stretch>
               </a:blipFill>
             </p:spPr>
@@ -8176,6 +8223,36 @@
           <a:chExt cx="0" cy="0"/>
         </a:xfrm>
       </p:grpSpPr>
+      <p:pic>
+        <p:nvPicPr>
+          <p:cNvPr id="4" name="Picture 3"/>
+          <p:cNvPicPr>
+            <a:picLocks noChangeAspect="1"/>
+          </p:cNvPicPr>
+          <p:nvPr/>
+        </p:nvPicPr>
+        <p:blipFill>
+          <a:blip r:embed="rId2">
+            <a:extLst>
+              <a:ext uri="{28A0092B-C50C-407E-A947-70E740481C1C}">
+                <a14:useLocalDpi xmlns:a14="http://schemas.microsoft.com/office/drawing/2010/main" val="0"/>
+              </a:ext>
+            </a:extLst>
+          </a:blip>
+          <a:stretch>
+            <a:fillRect/>
+          </a:stretch>
+        </p:blipFill>
+        <p:spPr>
+          <a:xfrm>
+            <a:off x="-820581" y="1498877"/>
+            <a:ext cx="9676284" cy="4964135"/>
+          </a:xfrm>
+          <a:prstGeom prst="rect">
+            <a:avLst/>
+          </a:prstGeom>
+        </p:spPr>
+      </p:pic>
       <p:sp>
         <p:nvSpPr>
           <p:cNvPr id="2" name="Slide Number Placeholder 1"/>
@@ -8231,36 +8308,6 @@
           </a:p>
         </p:txBody>
       </p:sp>
-      <p:pic>
-        <p:nvPicPr>
-          <p:cNvPr id="6" name="Picture 5"/>
-          <p:cNvPicPr>
-            <a:picLocks noChangeAspect="1"/>
-          </p:cNvPicPr>
-          <p:nvPr/>
-        </p:nvPicPr>
-        <p:blipFill>
-          <a:blip r:embed="rId2">
-            <a:extLst>
-              <a:ext uri="{28A0092B-C50C-407E-A947-70E740481C1C}">
-                <a14:useLocalDpi xmlns:a14="http://schemas.microsoft.com/office/drawing/2010/main" val="0"/>
-              </a:ext>
-            </a:extLst>
-          </a:blip>
-          <a:stretch>
-            <a:fillRect/>
-          </a:stretch>
-        </p:blipFill>
-        <p:spPr>
-          <a:xfrm>
-            <a:off x="973123" y="1410881"/>
-            <a:ext cx="9924176" cy="5091308"/>
-          </a:xfrm>
-          <a:prstGeom prst="rect">
-            <a:avLst/>
-          </a:prstGeom>
-        </p:spPr>
-      </p:pic>
       <p:sp>
         <p:nvSpPr>
           <p:cNvPr id="10" name="TextBox 9"/>
@@ -8326,8 +8373,8 @@
         </p:nvSpPr>
         <p:spPr>
           <a:xfrm>
-            <a:off x="10154456" y="2924632"/>
-            <a:ext cx="1845866" cy="2031325"/>
+            <a:off x="8308589" y="1828203"/>
+            <a:ext cx="3552973" cy="4247317"/>
           </a:xfrm>
           <a:prstGeom prst="rect">
             <a:avLst/>
@@ -8342,7 +8389,32 @@
           <a:p>
             <a:r>
               <a:rPr lang="en-GB" dirty="0" smtClean="0"/>
-              <a:t>Seems like that</a:t>
+              <a:t>First image is based on correlation analysis.</a:t>
+            </a:r>
+          </a:p>
+          <a:p>
+            <a:endParaRPr lang="en-GB" dirty="0"/>
+          </a:p>
+          <a:p>
+            <a:r>
+              <a:rPr lang="en-GB" dirty="0" smtClean="0"/>
+              <a:t>Second one is based on the identification of a fir model up to n=20.</a:t>
+            </a:r>
+          </a:p>
+          <a:p>
+            <a:endParaRPr lang="en-GB" dirty="0"/>
+          </a:p>
+          <a:p>
+            <a:endParaRPr lang="en-GB" dirty="0"/>
+          </a:p>
+          <a:p>
+            <a:r>
+              <a:rPr lang="en-GB" dirty="0" smtClean="0"/>
+              <a:t>Seems </a:t>
+            </a:r>
+            <a:r>
+              <a:rPr lang="en-GB" dirty="0" smtClean="0"/>
+              <a:t>like that</a:t>
             </a:r>
           </a:p>
           <a:p>
@@ -8354,15 +8426,16 @@
           <a:p>
             <a:r>
               <a:rPr lang="en-GB" dirty="0" smtClean="0"/>
-              <a:t>Is delayed of 2-3 lags(</a:t>
-            </a:r>
-            <a:r>
-              <a:rPr lang="en-GB" dirty="0" err="1" smtClean="0"/>
-              <a:t>Ts</a:t>
-            </a:r>
+              <a:t>Is delayed of 2-3 lags (See confidence region)</a:t>
+            </a:r>
+          </a:p>
+          <a:p>
+            <a:endParaRPr lang="en-GB" dirty="0"/>
+          </a:p>
+          <a:p>
             <a:r>
               <a:rPr lang="en-GB" dirty="0" smtClean="0"/>
-              <a:t>), most likely 3 (See confidence region)</a:t>
+              <a:t>Tested on all the datasets, quite similar behaviour.</a:t>
             </a:r>
             <a:endParaRPr lang="en-GB" dirty="0"/>
           </a:p>
@@ -11521,8 +11594,8 @@
             </p:nvSpPr>
             <p:spPr>
               <a:xfrm>
-                <a:off x="542488" y="1787824"/>
-                <a:ext cx="11425805" cy="4005968"/>
+                <a:off x="534099" y="1703934"/>
+                <a:ext cx="11425805" cy="4836965"/>
               </a:xfrm>
               <a:prstGeom prst="rect">
                 <a:avLst/>
@@ -11537,7 +11610,7 @@
               <a:p>
                 <a:r>
                   <a:rPr lang="en-GB" dirty="0" smtClean="0"/>
-                  <a:t>How is </a:t>
+                  <a:t>We don’t know G,H of the true system, neither its parametrisation, then how is </a:t>
                 </a:r>
                 <a14:m>
                   <m:oMath xmlns:m="http://schemas.openxmlformats.org/officeDocument/2006/math">
@@ -11562,9 +11635,84 @@
                   </m:oMath>
                 </a14:m>
                 <a:r>
+                  <a:rPr lang="en-GB" dirty="0"/>
+                  <a:t> built </a:t>
+                </a:r>
+                <a:r>
                   <a:rPr lang="en-GB" dirty="0" smtClean="0"/>
-                  <a:t> built up?</a:t>
+                  <a:t>up in reality? </a:t>
                 </a:r>
+                <a:r>
+                  <a:rPr lang="en-GB" dirty="0"/>
+                  <a:t>(denote with </a:t>
+                </a:r>
+                <a14:m>
+                  <m:oMath xmlns:m="http://schemas.openxmlformats.org/officeDocument/2006/math">
+                    <m:sSup>
+                      <m:sSupPr>
+                        <m:ctrlPr>
+                          <a:rPr lang="en-GB" i="1">
+                            <a:latin typeface="Cambria Math" panose="02040503050406030204" pitchFamily="18" charset="0"/>
+                          </a:rPr>
+                        </m:ctrlPr>
+                      </m:sSupPr>
+                      <m:e>
+                        <m:r>
+                          <a:rPr lang="en-GB" i="1">
+                            <a:latin typeface="Cambria Math" panose="02040503050406030204" pitchFamily="18" charset="0"/>
+                          </a:rPr>
+                          <m:t>𝐺</m:t>
+                        </m:r>
+                      </m:e>
+                      <m:sup>
+                        <m:r>
+                          <a:rPr lang="en-GB" i="1">
+                            <a:latin typeface="Cambria Math" panose="02040503050406030204" pitchFamily="18" charset="0"/>
+                          </a:rPr>
+                          <m:t>0</m:t>
+                        </m:r>
+                      </m:sup>
+                    </m:sSup>
+                    <m:r>
+                      <a:rPr lang="en-GB" i="1">
+                        <a:latin typeface="Cambria Math" panose="02040503050406030204" pitchFamily="18" charset="0"/>
+                      </a:rPr>
+                      <m:t>,</m:t>
+                    </m:r>
+                    <m:sSup>
+                      <m:sSupPr>
+                        <m:ctrlPr>
+                          <a:rPr lang="en-GB" i="1">
+                            <a:latin typeface="Cambria Math" panose="02040503050406030204" pitchFamily="18" charset="0"/>
+                          </a:rPr>
+                        </m:ctrlPr>
+                      </m:sSupPr>
+                      <m:e>
+                        <m:r>
+                          <a:rPr lang="en-GB" i="1">
+                            <a:latin typeface="Cambria Math" panose="02040503050406030204" pitchFamily="18" charset="0"/>
+                          </a:rPr>
+                          <m:t>𝐻</m:t>
+                        </m:r>
+                      </m:e>
+                      <m:sup>
+                        <m:r>
+                          <a:rPr lang="en-GB" i="1">
+                            <a:latin typeface="Cambria Math" panose="02040503050406030204" pitchFamily="18" charset="0"/>
+                          </a:rPr>
+                          <m:t>0</m:t>
+                        </m:r>
+                      </m:sup>
+                    </m:sSup>
+                  </m:oMath>
+                </a14:m>
+                <a:r>
+                  <a:rPr lang="en-GB" dirty="0" smtClean="0"/>
+                  <a:t> the transfer functions of the true system, then:</a:t>
+                </a:r>
+              </a:p>
+              <a:p>
+                <a:endParaRPr lang="en-GB" dirty="0" smtClean="0"/>
               </a:p>
               <a:p>
                 <a:pPr marL="742950" lvl="1" indent="-285750">
@@ -11629,33 +11777,23 @@
               <a:p>
                 <a:r>
                   <a:rPr lang="en-GB" dirty="0" smtClean="0"/>
-                  <a:t>We choose the best </a:t>
+                  <a:t>Then </a:t>
+                </a:r>
+                <a:r>
+                  <a:rPr lang="en-GB" dirty="0"/>
+                  <a:t>w</a:t>
+                </a:r>
+                <a:r>
+                  <a:rPr lang="en-GB" dirty="0" smtClean="0"/>
+                  <a:t>e choose </a:t>
                 </a:r>
                 <a14:m>
                   <m:oMath xmlns:m="http://schemas.openxmlformats.org/officeDocument/2006/math">
-                    <m:acc>
-                      <m:accPr>
-                        <m:chr m:val="̂"/>
-                        <m:ctrlPr>
-                          <a:rPr lang="en-GB" b="0" i="1" dirty="0" smtClean="0">
-                            <a:latin typeface="Cambria Math" panose="02040503050406030204" pitchFamily="18" charset="0"/>
-                          </a:rPr>
-                        </m:ctrlPr>
-                      </m:accPr>
-                      <m:e>
-                        <m:r>
-                          <a:rPr lang="en-GB" b="0" i="1" dirty="0" smtClean="0">
-                            <a:latin typeface="Cambria Math" panose="02040503050406030204" pitchFamily="18" charset="0"/>
-                          </a:rPr>
-                          <m:t>𝑦</m:t>
-                        </m:r>
-                      </m:e>
-                    </m:acc>
                     <m:r>
-                      <a:rPr lang="en-GB" i="1">
+                      <a:rPr lang="en-GB" b="0" i="1" smtClean="0">
                         <a:latin typeface="Cambria Math" panose="02040503050406030204" pitchFamily="18" charset="0"/>
                       </a:rPr>
-                      <m:t> </m:t>
+                      <m:t>𝜃</m:t>
                     </m:r>
                   </m:oMath>
                 </a14:m>
@@ -11715,16 +11853,39 @@
                       <a:rPr lang="en-GB" b="0" i="1" smtClean="0">
                         <a:latin typeface="Cambria Math" panose="02040503050406030204" pitchFamily="18" charset="0"/>
                       </a:rPr>
-                      <m:t>…</m:t>
+                      <m:t>⇒</m:t>
                     </m:r>
-                  </m:oMath>
-                </a14:m>
-                <a:r>
-                  <a:rPr lang="en-GB" dirty="0" smtClean="0"/>
-                  <a:t> but we are training a model based on </a:t>
-                </a:r>
-                <a14:m>
-                  <m:oMath xmlns:m="http://schemas.openxmlformats.org/officeDocument/2006/math">
+                    <m:sSub>
+                      <m:sSubPr>
+                        <m:ctrlPr>
+                          <a:rPr lang="en-GB" b="0" i="1" smtClean="0">
+                            <a:latin typeface="Cambria Math" panose="02040503050406030204" pitchFamily="18" charset="0"/>
+                          </a:rPr>
+                        </m:ctrlPr>
+                      </m:sSubPr>
+                      <m:e>
+                        <m:r>
+                          <a:rPr lang="en-GB" b="0" i="1" smtClean="0">
+                            <a:latin typeface="Cambria Math" panose="02040503050406030204" pitchFamily="18" charset="0"/>
+                          </a:rPr>
+                          <m:t>𝑚𝑖𝑛</m:t>
+                        </m:r>
+                      </m:e>
+                      <m:sub>
+                        <m:r>
+                          <a:rPr lang="en-GB" b="0" i="1" smtClean="0">
+                            <a:latin typeface="Cambria Math" panose="02040503050406030204" pitchFamily="18" charset="0"/>
+                          </a:rPr>
+                          <m:t>𝜃</m:t>
+                        </m:r>
+                      </m:sub>
+                    </m:sSub>
+                    <m:r>
+                      <a:rPr lang="en-GB" b="0" i="1" smtClean="0">
+                        <a:latin typeface="Cambria Math" panose="02040503050406030204" pitchFamily="18" charset="0"/>
+                      </a:rPr>
+                      <m:t>𝑙</m:t>
+                    </m:r>
                     <m:r>
                       <a:rPr lang="en-GB" b="0" i="1" smtClean="0">
                         <a:latin typeface="Cambria Math" panose="02040503050406030204" pitchFamily="18" charset="0"/>
@@ -11737,17 +11898,171 @@
                       </a:rPr>
                       <m:t>𝑦</m:t>
                     </m:r>
+                    <m:d>
+                      <m:dPr>
+                        <m:ctrlPr>
+                          <a:rPr lang="en-GB" b="0" i="1" smtClean="0">
+                            <a:latin typeface="Cambria Math" panose="02040503050406030204" pitchFamily="18" charset="0"/>
+                          </a:rPr>
+                        </m:ctrlPr>
+                      </m:dPr>
+                      <m:e>
+                        <m:r>
+                          <a:rPr lang="en-GB" b="0" i="1" smtClean="0">
+                            <a:latin typeface="Cambria Math" panose="02040503050406030204" pitchFamily="18" charset="0"/>
+                          </a:rPr>
+                          <m:t>𝑡</m:t>
+                        </m:r>
+                      </m:e>
+                    </m:d>
                     <m:r>
                       <a:rPr lang="en-GB" b="0" i="1" smtClean="0">
                         <a:latin typeface="Cambria Math" panose="02040503050406030204" pitchFamily="18" charset="0"/>
                       </a:rPr>
-                      <m:t>,</m:t>
+                      <m:t>−</m:t>
+                    </m:r>
+                    <m:acc>
+                      <m:accPr>
+                        <m:chr m:val="̂"/>
+                        <m:ctrlPr>
+                          <a:rPr lang="en-GB" b="0" i="1" smtClean="0">
+                            <a:latin typeface="Cambria Math" panose="02040503050406030204" pitchFamily="18" charset="0"/>
+                          </a:rPr>
+                        </m:ctrlPr>
+                      </m:accPr>
+                      <m:e>
+                        <m:r>
+                          <a:rPr lang="en-GB" b="0" i="1" smtClean="0">
+                            <a:latin typeface="Cambria Math" panose="02040503050406030204" pitchFamily="18" charset="0"/>
+                          </a:rPr>
+                          <m:t>𝑦</m:t>
+                        </m:r>
+                      </m:e>
+                    </m:acc>
+                    <m:d>
+                      <m:dPr>
+                        <m:ctrlPr>
+                          <a:rPr lang="en-GB" b="0" i="1" smtClean="0">
+                            <a:latin typeface="Cambria Math" panose="02040503050406030204" pitchFamily="18" charset="0"/>
+                          </a:rPr>
+                        </m:ctrlPr>
+                      </m:dPr>
+                      <m:e>
+                        <m:r>
+                          <a:rPr lang="en-GB" b="0" i="1" smtClean="0">
+                            <a:latin typeface="Cambria Math" panose="02040503050406030204" pitchFamily="18" charset="0"/>
+                          </a:rPr>
+                          <m:t>𝑡</m:t>
+                        </m:r>
+                        <m:r>
+                          <a:rPr lang="en-GB" b="0" i="1" smtClean="0">
+                            <a:latin typeface="Cambria Math" panose="02040503050406030204" pitchFamily="18" charset="0"/>
+                          </a:rPr>
+                          <m:t>,</m:t>
+                        </m:r>
+                        <m:r>
+                          <a:rPr lang="en-GB" b="0" i="1" smtClean="0">
+                            <a:latin typeface="Cambria Math" panose="02040503050406030204" pitchFamily="18" charset="0"/>
+                          </a:rPr>
+                          <m:t>𝜃</m:t>
+                        </m:r>
+                      </m:e>
+                    </m:d>
+                    <m:r>
+                      <a:rPr lang="en-GB" b="0" i="1" smtClean="0">
+                        <a:latin typeface="Cambria Math" panose="02040503050406030204" pitchFamily="18" charset="0"/>
+                      </a:rPr>
+                      <m:t>)</m:t>
+                    </m:r>
+                    <m:r>
+                      <a:rPr lang="en-GB" b="0" i="0" smtClean="0">
+                        <a:latin typeface="Cambria Math" panose="02040503050406030204" pitchFamily="18" charset="0"/>
+                      </a:rPr>
+                      <m:t> </m:t>
+                    </m:r>
+                  </m:oMath>
+                </a14:m>
+                <a:r>
+                  <a:rPr lang="en-GB" dirty="0" smtClean="0"/>
+                  <a:t>is the problem to solve.</a:t>
+                </a:r>
+              </a:p>
+              <a:p>
+                <a:endParaRPr lang="en-GB" dirty="0"/>
+              </a:p>
+              <a:p>
+                <a:r>
+                  <a:rPr lang="en-GB" dirty="0" smtClean="0"/>
+                  <a:t>In this project we are interested in simulation. In fact we want to find G </a:t>
+                </a:r>
+                <a:r>
+                  <a:rPr lang="en-GB" dirty="0" err="1" smtClean="0"/>
+                  <a:t>s.t.</a:t>
+                </a:r>
+                <a:r>
+                  <a:rPr lang="en-GB" dirty="0" smtClean="0"/>
+                  <a:t> </a:t>
+                </a:r>
+                <a14:m>
+                  <m:oMath xmlns:m="http://schemas.openxmlformats.org/officeDocument/2006/math">
+                    <m:r>
+                      <a:rPr lang="en-GB" b="0" i="1" smtClean="0">
+                        <a:latin typeface="Cambria Math" panose="02040503050406030204" pitchFamily="18" charset="0"/>
+                      </a:rPr>
+                      <m:t>𝐺𝑢</m:t>
+                    </m:r>
+                    <m:d>
+                      <m:dPr>
+                        <m:ctrlPr>
+                          <a:rPr lang="en-GB" b="0" i="1" smtClean="0">
+                            <a:latin typeface="Cambria Math" panose="02040503050406030204" pitchFamily="18" charset="0"/>
+                          </a:rPr>
+                        </m:ctrlPr>
+                      </m:dPr>
+                      <m:e>
+                        <m:r>
+                          <a:rPr lang="en-GB" b="0" i="1" smtClean="0">
+                            <a:latin typeface="Cambria Math" panose="02040503050406030204" pitchFamily="18" charset="0"/>
+                          </a:rPr>
+                          <m:t>𝑡</m:t>
+                        </m:r>
+                        <m:r>
+                          <a:rPr lang="en-GB" b="0" i="1" smtClean="0">
+                            <a:latin typeface="Cambria Math" panose="02040503050406030204" pitchFamily="18" charset="0"/>
+                          </a:rPr>
+                          <m:t>−</m:t>
+                        </m:r>
+                        <m:r>
+                          <a:rPr lang="en-GB" b="0" i="1" smtClean="0">
+                            <a:latin typeface="Cambria Math" panose="02040503050406030204" pitchFamily="18" charset="0"/>
+                          </a:rPr>
+                          <m:t>𝑘</m:t>
+                        </m:r>
+                      </m:e>
+                    </m:d>
+                    <m:r>
+                      <a:rPr lang="en-GB" b="0" i="1" smtClean="0">
+                        <a:latin typeface="Cambria Math" panose="02040503050406030204" pitchFamily="18" charset="0"/>
+                      </a:rPr>
+                      <m:t>∼</m:t>
                     </m:r>
                     <m:r>
                       <a:rPr lang="en-GB" b="0" i="1" smtClean="0">
                         <a:latin typeface="Cambria Math" panose="02040503050406030204" pitchFamily="18" charset="0"/>
                       </a:rPr>
-                      <m:t>𝑢</m:t>
+                      <m:t>𝑦</m:t>
+                    </m:r>
+                    <m:r>
+                      <a:rPr lang="en-GB" b="0" i="1" smtClean="0">
+                        <a:latin typeface="Cambria Math" panose="02040503050406030204" pitchFamily="18" charset="0"/>
+                      </a:rPr>
+                      <m:t>(</m:t>
+                    </m:r>
+                    <m:r>
+                      <a:rPr lang="en-GB" b="0" i="1" smtClean="0">
+                        <a:latin typeface="Cambria Math" panose="02040503050406030204" pitchFamily="18" charset="0"/>
+                      </a:rPr>
+                      <m:t>𝑡</m:t>
                     </m:r>
                     <m:r>
                       <a:rPr lang="en-GB" b="0" i="1" smtClean="0">
@@ -11759,37 +12074,17 @@
                 </a14:m>
                 <a:r>
                   <a:rPr lang="en-GB" dirty="0" smtClean="0"/>
-                  <a:t> data and then check the cost function on the same data -&gt; we get a biased result.</a:t>
+                  <a:t>How to address this problem with the minimization problem? </a:t>
                 </a:r>
-              </a:p>
-              <a:p>
-                <a:r>
-                  <a:rPr lang="en-GB" dirty="0" smtClean="0"/>
-                  <a:t>To get unbiased results we need to test the cost function on a different data set.</a:t>
-                </a:r>
+                <a:endParaRPr lang="en-GB" dirty="0" smtClean="0"/>
               </a:p>
               <a:p>
                 <a:endParaRPr lang="en-GB" dirty="0"/>
               </a:p>
               <a:p>
-                <a:r>
-                  <a:rPr lang="en-GB" dirty="0" smtClean="0"/>
-                  <a:t>Unfortunately in this project the data is quite similar, though the second data set covariance function is a little different </a:t>
-                </a:r>
-                <a14:m>
-                  <m:oMath xmlns:m="http://schemas.openxmlformats.org/officeDocument/2006/math">
-                    <m:r>
-                      <a:rPr lang="en-GB" b="0" i="1" smtClean="0">
-                        <a:latin typeface="Cambria Math" panose="02040503050406030204" pitchFamily="18" charset="0"/>
-                      </a:rPr>
-                      <m:t>⇒</m:t>
-                    </m:r>
-                  </m:oMath>
-                </a14:m>
-                <a:r>
-                  <a:rPr lang="en-GB" dirty="0" smtClean="0"/>
-                  <a:t> We may test the cost function on a subset of this experiment. 	</a:t>
-                </a:r>
+                <a:endParaRPr lang="en-GB" dirty="0" smtClean="0"/>
+              </a:p>
+              <a:p>
                 <a:endParaRPr lang="en-GB" dirty="0"/>
               </a:p>
               <a:p>
@@ -11809,8 +12104,8 @@
             </p:nvSpPr>
             <p:spPr>
               <a:xfrm>
-                <a:off x="542488" y="1787824"/>
-                <a:ext cx="11425805" cy="4005968"/>
+                <a:off x="534099" y="1703934"/>
+                <a:ext cx="11425805" cy="4836965"/>
               </a:xfrm>
               <a:prstGeom prst="rect">
                 <a:avLst/>
@@ -11818,7 +12113,7 @@
               <a:blipFill rotWithShape="0">
                 <a:blip r:embed="rId2"/>
                 <a:stretch>
-                  <a:fillRect l="-480" t="-761"/>
+                  <a:fillRect l="-480" t="-757" r="-907"/>
                 </a:stretch>
               </a:blipFill>
             </p:spPr>
@@ -12521,6 +12816,845 @@
               <a:rPr lang="it-IT" altLang="en-US" smtClean="0"/>
               <a:pPr/>
               <a:t>20</a:t>
+            </a:fld>
+            <a:endParaRPr lang="it-IT" altLang="en-US"/>
+          </a:p>
+        </p:txBody>
+      </p:sp>
+      <p:sp>
+        <p:nvSpPr>
+          <p:cNvPr id="3" name="TextBox 2"/>
+          <p:cNvSpPr txBox="1"/>
+          <p:nvPr/>
+        </p:nvSpPr>
+        <p:spPr>
+          <a:xfrm>
+            <a:off x="2379822" y="1046490"/>
+            <a:ext cx="7432356" cy="523220"/>
+          </a:xfrm>
+          <a:prstGeom prst="rect">
+            <a:avLst/>
+          </a:prstGeom>
+          <a:noFill/>
+        </p:spPr>
+        <p:txBody>
+          <a:bodyPr wrap="none" rtlCol="0">
+            <a:spAutoFit/>
+          </a:bodyPr>
+          <a:lstStyle/>
+          <a:p>
+            <a:r>
+              <a:rPr lang="en-GB" sz="2800" b="1" i="1" dirty="0" smtClean="0">
+                <a:latin typeface="+mj-lt"/>
+              </a:rPr>
+              <a:t>MODEL </a:t>
+            </a:r>
+            <a:r>
+              <a:rPr lang="en-GB" sz="2800" b="1" i="1" dirty="0" smtClean="0">
+                <a:latin typeface="+mj-lt"/>
+              </a:rPr>
+              <a:t>IDENTIFICATION – WHICH MODEL</a:t>
+            </a:r>
+            <a:endParaRPr lang="en-GB" sz="2800" b="1" i="1" dirty="0" smtClean="0">
+              <a:latin typeface="+mj-lt"/>
+            </a:endParaRPr>
+          </a:p>
+        </p:txBody>
+      </p:sp>
+      <p:sp>
+        <p:nvSpPr>
+          <p:cNvPr id="4" name="TextBox 3"/>
+          <p:cNvSpPr txBox="1"/>
+          <p:nvPr/>
+        </p:nvSpPr>
+        <p:spPr>
+          <a:xfrm>
+            <a:off x="7078960" y="173782"/>
+            <a:ext cx="3266985" cy="369332"/>
+          </a:xfrm>
+          <a:prstGeom prst="rect">
+            <a:avLst/>
+          </a:prstGeom>
+          <a:noFill/>
+        </p:spPr>
+        <p:txBody>
+          <a:bodyPr wrap="none" rtlCol="0">
+            <a:spAutoFit/>
+          </a:bodyPr>
+          <a:lstStyle/>
+          <a:p>
+            <a:r>
+              <a:rPr lang="en-GB" b="1" dirty="0" smtClean="0">
+                <a:solidFill>
+                  <a:srgbClr val="FF0000"/>
+                </a:solidFill>
+                <a:latin typeface="DejaVu Sans" panose="020B0603030804020204" pitchFamily="34" charset="0"/>
+                <a:ea typeface="DejaVu Sans" panose="020B0603030804020204" pitchFamily="34" charset="0"/>
+                <a:cs typeface="DejaVu Sans" panose="020B0603030804020204" pitchFamily="34" charset="0"/>
+              </a:rPr>
+              <a:t>MODEL IDENTIFICATION</a:t>
+            </a:r>
+            <a:endParaRPr lang="en-GB" b="1" dirty="0">
+              <a:solidFill>
+                <a:srgbClr val="FF0000"/>
+              </a:solidFill>
+              <a:latin typeface="DejaVu Sans" panose="020B0603030804020204" pitchFamily="34" charset="0"/>
+              <a:ea typeface="DejaVu Sans" panose="020B0603030804020204" pitchFamily="34" charset="0"/>
+              <a:cs typeface="DejaVu Sans" panose="020B0603030804020204" pitchFamily="34" charset="0"/>
+            </a:endParaRPr>
+          </a:p>
+        </p:txBody>
+      </p:sp>
+      <mc:AlternateContent xmlns:mc="http://schemas.openxmlformats.org/markup-compatibility/2006">
+        <mc:Choice xmlns:a14="http://schemas.microsoft.com/office/drawing/2010/main" Requires="a14">
+          <p:sp>
+            <p:nvSpPr>
+              <p:cNvPr id="5" name="TextBox 4"/>
+              <p:cNvSpPr txBox="1"/>
+              <p:nvPr/>
+            </p:nvSpPr>
+            <p:spPr>
+              <a:xfrm>
+                <a:off x="534099" y="1703934"/>
+                <a:ext cx="11425805" cy="4005968"/>
+              </a:xfrm>
+              <a:prstGeom prst="rect">
+                <a:avLst/>
+              </a:prstGeom>
+              <a:noFill/>
+            </p:spPr>
+            <p:txBody>
+              <a:bodyPr wrap="square" rtlCol="0">
+                <a:spAutoFit/>
+              </a:bodyPr>
+              <a:lstStyle/>
+              <a:p>
+                <a14:m>
+                  <m:oMath xmlns:m="http://schemas.openxmlformats.org/officeDocument/2006/math">
+                    <m:sSub>
+                      <m:sSubPr>
+                        <m:ctrlPr>
+                          <a:rPr lang="en-GB" i="1" smtClean="0">
+                            <a:latin typeface="Cambria Math" panose="02040503050406030204" pitchFamily="18" charset="0"/>
+                          </a:rPr>
+                        </m:ctrlPr>
+                      </m:sSubPr>
+                      <m:e>
+                        <m:r>
+                          <a:rPr lang="en-GB" i="1">
+                            <a:latin typeface="Cambria Math" panose="02040503050406030204" pitchFamily="18" charset="0"/>
+                          </a:rPr>
+                          <m:t>𝑚𝑖𝑛</m:t>
+                        </m:r>
+                      </m:e>
+                      <m:sub>
+                        <m:r>
+                          <a:rPr lang="en-GB" i="1">
+                            <a:latin typeface="Cambria Math" panose="02040503050406030204" pitchFamily="18" charset="0"/>
+                          </a:rPr>
+                          <m:t>𝜃</m:t>
+                        </m:r>
+                      </m:sub>
+                    </m:sSub>
+                    <m:r>
+                      <a:rPr lang="en-GB" i="1">
+                        <a:latin typeface="Cambria Math" panose="02040503050406030204" pitchFamily="18" charset="0"/>
+                      </a:rPr>
+                      <m:t>𝑙</m:t>
+                    </m:r>
+                    <m:r>
+                      <a:rPr lang="en-GB" i="1">
+                        <a:latin typeface="Cambria Math" panose="02040503050406030204" pitchFamily="18" charset="0"/>
+                      </a:rPr>
+                      <m:t>(</m:t>
+                    </m:r>
+                    <m:r>
+                      <a:rPr lang="en-GB" i="1">
+                        <a:latin typeface="Cambria Math" panose="02040503050406030204" pitchFamily="18" charset="0"/>
+                      </a:rPr>
+                      <m:t>𝑦</m:t>
+                    </m:r>
+                    <m:d>
+                      <m:dPr>
+                        <m:ctrlPr>
+                          <a:rPr lang="en-GB" i="1">
+                            <a:latin typeface="Cambria Math" panose="02040503050406030204" pitchFamily="18" charset="0"/>
+                          </a:rPr>
+                        </m:ctrlPr>
+                      </m:dPr>
+                      <m:e>
+                        <m:r>
+                          <a:rPr lang="en-GB" i="1">
+                            <a:latin typeface="Cambria Math" panose="02040503050406030204" pitchFamily="18" charset="0"/>
+                          </a:rPr>
+                          <m:t>𝑡</m:t>
+                        </m:r>
+                      </m:e>
+                    </m:d>
+                    <m:r>
+                      <a:rPr lang="en-GB" i="1">
+                        <a:latin typeface="Cambria Math" panose="02040503050406030204" pitchFamily="18" charset="0"/>
+                      </a:rPr>
+                      <m:t>−</m:t>
+                    </m:r>
+                    <m:acc>
+                      <m:accPr>
+                        <m:chr m:val="̂"/>
+                        <m:ctrlPr>
+                          <a:rPr lang="en-GB" i="1">
+                            <a:latin typeface="Cambria Math" panose="02040503050406030204" pitchFamily="18" charset="0"/>
+                          </a:rPr>
+                        </m:ctrlPr>
+                      </m:accPr>
+                      <m:e>
+                        <m:r>
+                          <a:rPr lang="en-GB" i="1">
+                            <a:latin typeface="Cambria Math" panose="02040503050406030204" pitchFamily="18" charset="0"/>
+                          </a:rPr>
+                          <m:t>𝑦</m:t>
+                        </m:r>
+                      </m:e>
+                    </m:acc>
+                    <m:d>
+                      <m:dPr>
+                        <m:ctrlPr>
+                          <a:rPr lang="en-GB" i="1">
+                            <a:latin typeface="Cambria Math" panose="02040503050406030204" pitchFamily="18" charset="0"/>
+                          </a:rPr>
+                        </m:ctrlPr>
+                      </m:dPr>
+                      <m:e>
+                        <m:r>
+                          <a:rPr lang="en-GB" i="1">
+                            <a:latin typeface="Cambria Math" panose="02040503050406030204" pitchFamily="18" charset="0"/>
+                          </a:rPr>
+                          <m:t>𝑡</m:t>
+                        </m:r>
+                        <m:r>
+                          <a:rPr lang="en-GB" i="1">
+                            <a:latin typeface="Cambria Math" panose="02040503050406030204" pitchFamily="18" charset="0"/>
+                          </a:rPr>
+                          <m:t>,</m:t>
+                        </m:r>
+                        <m:r>
+                          <a:rPr lang="en-GB" i="1">
+                            <a:latin typeface="Cambria Math" panose="02040503050406030204" pitchFamily="18" charset="0"/>
+                          </a:rPr>
+                          <m:t>𝜃</m:t>
+                        </m:r>
+                      </m:e>
+                    </m:d>
+                    <m:r>
+                      <a:rPr lang="en-GB" i="1">
+                        <a:latin typeface="Cambria Math" panose="02040503050406030204" pitchFamily="18" charset="0"/>
+                      </a:rPr>
+                      <m:t>)</m:t>
+                    </m:r>
+                    <m:r>
+                      <a:rPr lang="en-GB">
+                        <a:latin typeface="Cambria Math" panose="02040503050406030204" pitchFamily="18" charset="0"/>
+                      </a:rPr>
+                      <m:t> </m:t>
+                    </m:r>
+                  </m:oMath>
+                </a14:m>
+                <a:r>
+                  <a:rPr lang="en-GB" dirty="0" smtClean="0"/>
+                  <a:t>= </a:t>
+                </a:r>
+                <a14:m>
+                  <m:oMath xmlns:m="http://schemas.openxmlformats.org/officeDocument/2006/math">
+                    <m:sSub>
+                      <m:sSubPr>
+                        <m:ctrlPr>
+                          <a:rPr lang="en-GB" i="1">
+                            <a:latin typeface="Cambria Math" panose="02040503050406030204" pitchFamily="18" charset="0"/>
+                          </a:rPr>
+                        </m:ctrlPr>
+                      </m:sSubPr>
+                      <m:e>
+                        <m:r>
+                          <a:rPr lang="en-GB" i="1">
+                            <a:latin typeface="Cambria Math" panose="02040503050406030204" pitchFamily="18" charset="0"/>
+                          </a:rPr>
+                          <m:t>𝑚𝑖𝑛</m:t>
+                        </m:r>
+                      </m:e>
+                      <m:sub>
+                        <m:r>
+                          <a:rPr lang="en-GB" i="1">
+                            <a:latin typeface="Cambria Math" panose="02040503050406030204" pitchFamily="18" charset="0"/>
+                          </a:rPr>
+                          <m:t>𝜃</m:t>
+                        </m:r>
+                      </m:sub>
+                    </m:sSub>
+                    <m:r>
+                      <a:rPr lang="en-GB" i="1">
+                        <a:latin typeface="Cambria Math" panose="02040503050406030204" pitchFamily="18" charset="0"/>
+                      </a:rPr>
+                      <m:t>𝑙</m:t>
+                    </m:r>
+                    <m:d>
+                      <m:dPr>
+                        <m:ctrlPr>
+                          <a:rPr lang="en-GB" i="1">
+                            <a:latin typeface="Cambria Math" panose="02040503050406030204" pitchFamily="18" charset="0"/>
+                          </a:rPr>
+                        </m:ctrlPr>
+                      </m:dPr>
+                      <m:e>
+                        <m:sSup>
+                          <m:sSupPr>
+                            <m:ctrlPr>
+                              <a:rPr lang="en-GB" b="0" i="1" smtClean="0">
+                                <a:latin typeface="Cambria Math" panose="02040503050406030204" pitchFamily="18" charset="0"/>
+                              </a:rPr>
+                            </m:ctrlPr>
+                          </m:sSupPr>
+                          <m:e>
+                            <m:r>
+                              <a:rPr lang="en-GB" b="0" i="1" smtClean="0">
+                                <a:latin typeface="Cambria Math" panose="02040503050406030204" pitchFamily="18" charset="0"/>
+                              </a:rPr>
+                              <m:t>𝐻</m:t>
+                            </m:r>
+                          </m:e>
+                          <m:sup>
+                            <m:r>
+                              <a:rPr lang="en-GB" b="0" i="1" smtClean="0">
+                                <a:latin typeface="Cambria Math" panose="02040503050406030204" pitchFamily="18" charset="0"/>
+                              </a:rPr>
+                              <m:t>−1</m:t>
+                            </m:r>
+                          </m:sup>
+                        </m:sSup>
+                        <m:r>
+                          <a:rPr lang="en-GB" i="1">
+                            <a:latin typeface="Cambria Math" panose="02040503050406030204" pitchFamily="18" charset="0"/>
+                          </a:rPr>
+                          <m:t>𝑦</m:t>
+                        </m:r>
+                        <m:d>
+                          <m:dPr>
+                            <m:ctrlPr>
+                              <a:rPr lang="en-GB" i="1">
+                                <a:latin typeface="Cambria Math" panose="02040503050406030204" pitchFamily="18" charset="0"/>
+                              </a:rPr>
+                            </m:ctrlPr>
+                          </m:dPr>
+                          <m:e>
+                            <m:r>
+                              <a:rPr lang="en-GB" i="1">
+                                <a:latin typeface="Cambria Math" panose="02040503050406030204" pitchFamily="18" charset="0"/>
+                              </a:rPr>
+                              <m:t>𝑡</m:t>
+                            </m:r>
+                          </m:e>
+                        </m:d>
+                        <m:r>
+                          <a:rPr lang="en-GB" b="0" i="1" smtClean="0">
+                            <a:latin typeface="Cambria Math" panose="02040503050406030204" pitchFamily="18" charset="0"/>
+                          </a:rPr>
+                          <m:t>−</m:t>
+                        </m:r>
+                        <m:sSup>
+                          <m:sSupPr>
+                            <m:ctrlPr>
+                              <a:rPr lang="en-GB" b="0" i="1" smtClean="0">
+                                <a:latin typeface="Cambria Math" panose="02040503050406030204" pitchFamily="18" charset="0"/>
+                              </a:rPr>
+                            </m:ctrlPr>
+                          </m:sSupPr>
+                          <m:e>
+                            <m:r>
+                              <a:rPr lang="en-GB" b="0" i="1" smtClean="0">
+                                <a:latin typeface="Cambria Math" panose="02040503050406030204" pitchFamily="18" charset="0"/>
+                              </a:rPr>
+                              <m:t>𝐻</m:t>
+                            </m:r>
+                          </m:e>
+                          <m:sup>
+                            <m:r>
+                              <a:rPr lang="en-GB" b="0" i="1" smtClean="0">
+                                <a:latin typeface="Cambria Math" panose="02040503050406030204" pitchFamily="18" charset="0"/>
+                              </a:rPr>
+                              <m:t>−1</m:t>
+                            </m:r>
+                          </m:sup>
+                        </m:sSup>
+                        <m:r>
+                          <a:rPr lang="en-GB" b="0" i="1" smtClean="0">
+                            <a:latin typeface="Cambria Math" panose="02040503050406030204" pitchFamily="18" charset="0"/>
+                          </a:rPr>
+                          <m:t>𝐺</m:t>
+                        </m:r>
+                        <m:r>
+                          <a:rPr lang="en-GB" i="1">
+                            <a:latin typeface="Cambria Math" panose="02040503050406030204" pitchFamily="18" charset="0"/>
+                          </a:rPr>
+                          <m:t>𝑢</m:t>
+                        </m:r>
+                        <m:d>
+                          <m:dPr>
+                            <m:ctrlPr>
+                              <a:rPr lang="en-GB" i="1">
+                                <a:latin typeface="Cambria Math" panose="02040503050406030204" pitchFamily="18" charset="0"/>
+                              </a:rPr>
+                            </m:ctrlPr>
+                          </m:dPr>
+                          <m:e>
+                            <m:r>
+                              <a:rPr lang="en-GB" i="1">
+                                <a:latin typeface="Cambria Math" panose="02040503050406030204" pitchFamily="18" charset="0"/>
+                              </a:rPr>
+                              <m:t>𝑡</m:t>
+                            </m:r>
+                            <m:r>
+                              <a:rPr lang="en-GB" i="1">
+                                <a:latin typeface="Cambria Math" panose="02040503050406030204" pitchFamily="18" charset="0"/>
+                              </a:rPr>
+                              <m:t>−</m:t>
+                            </m:r>
+                            <m:r>
+                              <a:rPr lang="en-GB" i="1">
+                                <a:latin typeface="Cambria Math" panose="02040503050406030204" pitchFamily="18" charset="0"/>
+                              </a:rPr>
+                              <m:t>𝑘</m:t>
+                            </m:r>
+                          </m:e>
+                        </m:d>
+                      </m:e>
+                    </m:d>
+                    <m:r>
+                      <a:rPr lang="en-GB" b="0" i="1" smtClean="0">
+                        <a:latin typeface="Cambria Math" panose="02040503050406030204" pitchFamily="18" charset="0"/>
+                      </a:rPr>
+                      <m:t>=</m:t>
+                    </m:r>
+                    <m:sSub>
+                      <m:sSubPr>
+                        <m:ctrlPr>
+                          <a:rPr lang="en-GB" i="1">
+                            <a:latin typeface="Cambria Math" panose="02040503050406030204" pitchFamily="18" charset="0"/>
+                          </a:rPr>
+                        </m:ctrlPr>
+                      </m:sSubPr>
+                      <m:e>
+                        <m:r>
+                          <a:rPr lang="en-GB" i="1">
+                            <a:latin typeface="Cambria Math" panose="02040503050406030204" pitchFamily="18" charset="0"/>
+                          </a:rPr>
+                          <m:t>𝑚𝑖𝑛</m:t>
+                        </m:r>
+                      </m:e>
+                      <m:sub>
+                        <m:r>
+                          <a:rPr lang="en-GB" i="1">
+                            <a:latin typeface="Cambria Math" panose="02040503050406030204" pitchFamily="18" charset="0"/>
+                          </a:rPr>
+                          <m:t>𝜃</m:t>
+                        </m:r>
+                      </m:sub>
+                    </m:sSub>
+                    <m:r>
+                      <a:rPr lang="en-GB" i="1">
+                        <a:latin typeface="Cambria Math" panose="02040503050406030204" pitchFamily="18" charset="0"/>
+                      </a:rPr>
+                      <m:t>𝑙</m:t>
+                    </m:r>
+                    <m:d>
+                      <m:dPr>
+                        <m:ctrlPr>
+                          <a:rPr lang="en-GB" i="1">
+                            <a:latin typeface="Cambria Math" panose="02040503050406030204" pitchFamily="18" charset="0"/>
+                          </a:rPr>
+                        </m:ctrlPr>
+                      </m:dPr>
+                      <m:e>
+                        <m:sSup>
+                          <m:sSupPr>
+                            <m:ctrlPr>
+                              <a:rPr lang="en-GB" i="1">
+                                <a:latin typeface="Cambria Math" panose="02040503050406030204" pitchFamily="18" charset="0"/>
+                              </a:rPr>
+                            </m:ctrlPr>
+                          </m:sSupPr>
+                          <m:e>
+                            <m:r>
+                              <a:rPr lang="en-GB" i="1">
+                                <a:latin typeface="Cambria Math" panose="02040503050406030204" pitchFamily="18" charset="0"/>
+                              </a:rPr>
+                              <m:t>𝐻</m:t>
+                            </m:r>
+                          </m:e>
+                          <m:sup>
+                            <m:r>
+                              <a:rPr lang="en-GB" i="1">
+                                <a:latin typeface="Cambria Math" panose="02040503050406030204" pitchFamily="18" charset="0"/>
+                              </a:rPr>
+                              <m:t>−1</m:t>
+                            </m:r>
+                          </m:sup>
+                        </m:sSup>
+                        <m:r>
+                          <a:rPr lang="en-GB" b="0" i="1" smtClean="0">
+                            <a:latin typeface="Cambria Math" panose="02040503050406030204" pitchFamily="18" charset="0"/>
+                          </a:rPr>
+                          <m:t>(</m:t>
+                        </m:r>
+                        <m:r>
+                          <a:rPr lang="en-GB" b="0" i="1" smtClean="0">
+                            <a:latin typeface="Cambria Math" panose="02040503050406030204" pitchFamily="18" charset="0"/>
+                          </a:rPr>
+                          <m:t>𝑦</m:t>
+                        </m:r>
+                        <m:d>
+                          <m:dPr>
+                            <m:ctrlPr>
+                              <a:rPr lang="en-GB" b="0" i="1" smtClean="0">
+                                <a:latin typeface="Cambria Math" panose="02040503050406030204" pitchFamily="18" charset="0"/>
+                              </a:rPr>
+                            </m:ctrlPr>
+                          </m:dPr>
+                          <m:e>
+                            <m:r>
+                              <a:rPr lang="en-GB" b="0" i="1" smtClean="0">
+                                <a:latin typeface="Cambria Math" panose="02040503050406030204" pitchFamily="18" charset="0"/>
+                              </a:rPr>
+                              <m:t>𝑡</m:t>
+                            </m:r>
+                          </m:e>
+                        </m:d>
+                        <m:r>
+                          <a:rPr lang="en-GB" b="0" i="1" smtClean="0">
+                            <a:latin typeface="Cambria Math" panose="02040503050406030204" pitchFamily="18" charset="0"/>
+                          </a:rPr>
+                          <m:t>−</m:t>
+                        </m:r>
+                        <m:r>
+                          <a:rPr lang="en-GB" i="1">
+                            <a:latin typeface="Cambria Math" panose="02040503050406030204" pitchFamily="18" charset="0"/>
+                          </a:rPr>
+                          <m:t>𝐺</m:t>
+                        </m:r>
+                        <m:r>
+                          <a:rPr lang="en-GB" i="1">
+                            <a:latin typeface="Cambria Math" panose="02040503050406030204" pitchFamily="18" charset="0"/>
+                          </a:rPr>
+                          <m:t>𝑢</m:t>
+                        </m:r>
+                        <m:d>
+                          <m:dPr>
+                            <m:ctrlPr>
+                              <a:rPr lang="en-GB" i="1">
+                                <a:latin typeface="Cambria Math" panose="02040503050406030204" pitchFamily="18" charset="0"/>
+                              </a:rPr>
+                            </m:ctrlPr>
+                          </m:dPr>
+                          <m:e>
+                            <m:r>
+                              <a:rPr lang="en-GB" i="1">
+                                <a:latin typeface="Cambria Math" panose="02040503050406030204" pitchFamily="18" charset="0"/>
+                              </a:rPr>
+                              <m:t>𝑡</m:t>
+                            </m:r>
+                            <m:r>
+                              <a:rPr lang="en-GB" i="1">
+                                <a:latin typeface="Cambria Math" panose="02040503050406030204" pitchFamily="18" charset="0"/>
+                              </a:rPr>
+                              <m:t>−</m:t>
+                            </m:r>
+                            <m:r>
+                              <a:rPr lang="en-GB" i="1">
+                                <a:latin typeface="Cambria Math" panose="02040503050406030204" pitchFamily="18" charset="0"/>
+                              </a:rPr>
+                              <m:t>𝑘</m:t>
+                            </m:r>
+                          </m:e>
+                        </m:d>
+                        <m:r>
+                          <a:rPr lang="en-GB" b="0" i="1" smtClean="0">
+                            <a:latin typeface="Cambria Math" panose="02040503050406030204" pitchFamily="18" charset="0"/>
+                          </a:rPr>
+                          <m:t>)</m:t>
+                        </m:r>
+                      </m:e>
+                    </m:d>
+                  </m:oMath>
+                </a14:m>
+                <a:endParaRPr lang="en-GB" dirty="0" smtClean="0"/>
+              </a:p>
+              <a:p>
+                <a:endParaRPr lang="en-GB" dirty="0"/>
+              </a:p>
+              <a:p>
+                <a:r>
+                  <a:rPr lang="en-GB" dirty="0" smtClean="0"/>
+                  <a:t>If we pose H=1 then we obtain a problem that address our project’s request (an OE model)</a:t>
+                </a:r>
+              </a:p>
+              <a:p>
+                <a:endParaRPr lang="en-GB" dirty="0"/>
+              </a:p>
+              <a:p>
+                <a:r>
+                  <a:rPr lang="en-GB" dirty="0" smtClean="0"/>
+                  <a:t>How good may be the </a:t>
+                </a:r>
+                <a:r>
+                  <a:rPr lang="en-GB" dirty="0" err="1" smtClean="0"/>
+                  <a:t>the</a:t>
+                </a:r>
+                <a:r>
+                  <a:rPr lang="en-GB" dirty="0" smtClean="0"/>
+                  <a:t> estimated G? </a:t>
+                </a:r>
+              </a:p>
+              <a:p>
+                <a:pPr marL="800100" lvl="1" indent="-342900">
+                  <a:buFont typeface="+mj-lt"/>
+                  <a:buAutoNum type="arabicPeriod"/>
+                </a:pPr>
+                <a:r>
+                  <a:rPr lang="en-GB" dirty="0" smtClean="0"/>
+                  <a:t>Consider that </a:t>
+                </a:r>
+                <a:r>
+                  <a:rPr lang="en-GB" dirty="0" err="1" smtClean="0"/>
+                  <a:t>y,u</a:t>
+                </a:r>
+                <a:r>
+                  <a:rPr lang="en-GB" dirty="0" smtClean="0"/>
+                  <a:t> are correlated, there is a feedback</a:t>
+                </a:r>
+              </a:p>
+              <a:p>
+                <a:pPr marL="800100" lvl="1" indent="-342900">
+                  <a:buFont typeface="+mj-lt"/>
+                  <a:buAutoNum type="arabicPeriod"/>
+                </a:pPr>
+                <a:r>
+                  <a:rPr lang="en-GB" dirty="0" smtClean="0"/>
+                  <a:t>We are also trying to estimate a noise (measurement noise, etc…) with the input u</a:t>
+                </a:r>
+              </a:p>
+              <a:p>
+                <a:endParaRPr lang="en-GB" dirty="0" smtClean="0"/>
+              </a:p>
+              <a:p>
+                <a:r>
+                  <a:rPr lang="en-GB" dirty="0" smtClean="0"/>
+                  <a:t>Though we obtain the best G </a:t>
+                </a:r>
+                <a:r>
+                  <a:rPr lang="en-GB" dirty="0" err="1"/>
+                  <a:t>s.t.</a:t>
+                </a:r>
+                <a:r>
+                  <a:rPr lang="en-GB" dirty="0"/>
+                  <a:t> </a:t>
+                </a:r>
+                <a14:m>
+                  <m:oMath xmlns:m="http://schemas.openxmlformats.org/officeDocument/2006/math">
+                    <m:r>
+                      <a:rPr lang="en-GB" i="1">
+                        <a:latin typeface="Cambria Math" panose="02040503050406030204" pitchFamily="18" charset="0"/>
+                      </a:rPr>
+                      <m:t>𝐺𝑢</m:t>
+                    </m:r>
+                    <m:d>
+                      <m:dPr>
+                        <m:ctrlPr>
+                          <a:rPr lang="en-GB" i="1">
+                            <a:latin typeface="Cambria Math" panose="02040503050406030204" pitchFamily="18" charset="0"/>
+                          </a:rPr>
+                        </m:ctrlPr>
+                      </m:dPr>
+                      <m:e>
+                        <m:r>
+                          <a:rPr lang="en-GB" i="1">
+                            <a:latin typeface="Cambria Math" panose="02040503050406030204" pitchFamily="18" charset="0"/>
+                          </a:rPr>
+                          <m:t>𝑡</m:t>
+                        </m:r>
+                        <m:r>
+                          <a:rPr lang="en-GB" i="1">
+                            <a:latin typeface="Cambria Math" panose="02040503050406030204" pitchFamily="18" charset="0"/>
+                          </a:rPr>
+                          <m:t>−</m:t>
+                        </m:r>
+                        <m:r>
+                          <a:rPr lang="en-GB" i="1">
+                            <a:latin typeface="Cambria Math" panose="02040503050406030204" pitchFamily="18" charset="0"/>
+                          </a:rPr>
+                          <m:t>𝑘</m:t>
+                        </m:r>
+                      </m:e>
+                    </m:d>
+                    <m:r>
+                      <a:rPr lang="en-GB" i="1">
+                        <a:latin typeface="Cambria Math" panose="02040503050406030204" pitchFamily="18" charset="0"/>
+                      </a:rPr>
+                      <m:t>∼</m:t>
+                    </m:r>
+                    <m:r>
+                      <a:rPr lang="en-GB" i="1">
+                        <a:latin typeface="Cambria Math" panose="02040503050406030204" pitchFamily="18" charset="0"/>
+                      </a:rPr>
+                      <m:t>𝑦</m:t>
+                    </m:r>
+                    <m:r>
+                      <a:rPr lang="en-GB" i="1">
+                        <a:latin typeface="Cambria Math" panose="02040503050406030204" pitchFamily="18" charset="0"/>
+                      </a:rPr>
+                      <m:t>(</m:t>
+                    </m:r>
+                    <m:r>
+                      <a:rPr lang="en-GB" i="1">
+                        <a:latin typeface="Cambria Math" panose="02040503050406030204" pitchFamily="18" charset="0"/>
+                      </a:rPr>
+                      <m:t>𝑡</m:t>
+                    </m:r>
+                    <m:r>
+                      <a:rPr lang="en-GB" i="1">
+                        <a:latin typeface="Cambria Math" panose="02040503050406030204" pitchFamily="18" charset="0"/>
+                      </a:rPr>
+                      <m:t>).</m:t>
+                    </m:r>
+                  </m:oMath>
+                </a14:m>
+                <a:endParaRPr lang="en-GB" dirty="0" smtClean="0"/>
+              </a:p>
+              <a:p>
+                <a:endParaRPr lang="en-GB" dirty="0"/>
+              </a:p>
+              <a:p>
+                <a:r>
+                  <a:rPr lang="en-GB" dirty="0" smtClean="0"/>
+                  <a:t>Now, how to choose the cost function?</a:t>
+                </a:r>
+                <a:endParaRPr lang="en-GB" dirty="0"/>
+              </a:p>
+              <a:p>
+                <a:pPr marL="800100" lvl="1" indent="-342900">
+                  <a:buFont typeface="+mj-lt"/>
+                  <a:buAutoNum type="arabicPeriod"/>
+                </a:pPr>
+                <a:endParaRPr lang="en-GB" dirty="0" smtClean="0"/>
+              </a:p>
+              <a:p>
+                <a:pPr marL="800100" lvl="1" indent="-342900">
+                  <a:buFont typeface="+mj-lt"/>
+                  <a:buAutoNum type="arabicPeriod"/>
+                </a:pPr>
+                <a:endParaRPr lang="en-GB" dirty="0" smtClean="0"/>
+              </a:p>
+              <a:p>
+                <a:pPr marL="342900" indent="-342900">
+                  <a:buFont typeface="+mj-lt"/>
+                  <a:buAutoNum type="arabicPeriod"/>
+                </a:pPr>
+                <a:endParaRPr lang="en-GB" dirty="0" smtClean="0"/>
+              </a:p>
+            </p:txBody>
+          </p:sp>
+        </mc:Choice>
+        <mc:Fallback>
+          <p:sp>
+            <p:nvSpPr>
+              <p:cNvPr id="5" name="TextBox 4"/>
+              <p:cNvSpPr txBox="1">
+                <a:spLocks noRot="1" noChangeAspect="1" noMove="1" noResize="1" noEditPoints="1" noAdjustHandles="1" noChangeArrowheads="1" noChangeShapeType="1" noTextEdit="1"/>
+              </p:cNvSpPr>
+              <p:nvPr/>
+            </p:nvSpPr>
+            <p:spPr>
+              <a:xfrm>
+                <a:off x="534099" y="1703934"/>
+                <a:ext cx="11425805" cy="4005968"/>
+              </a:xfrm>
+              <a:prstGeom prst="rect">
+                <a:avLst/>
+              </a:prstGeom>
+              <a:blipFill rotWithShape="0">
+                <a:blip r:embed="rId2"/>
+                <a:stretch>
+                  <a:fillRect l="-480" t="-457"/>
+                </a:stretch>
+              </a:blipFill>
+            </p:spPr>
+            <p:txBody>
+              <a:bodyPr/>
+              <a:lstStyle/>
+              <a:p>
+                <a:r>
+                  <a:rPr lang="en-GB">
+                    <a:noFill/>
+                  </a:rPr>
+                  <a:t> </a:t>
+                </a:r>
+              </a:p>
+            </p:txBody>
+          </p:sp>
+        </mc:Fallback>
+      </mc:AlternateContent>
+    </p:spTree>
+    <p:extLst>
+      <p:ext uri="{BB962C8B-B14F-4D97-AF65-F5344CB8AC3E}">
+        <p14:creationId xmlns:p14="http://schemas.microsoft.com/office/powerpoint/2010/main" val="4142777788"/>
+      </p:ext>
+    </p:extLst>
+  </p:cSld>
+  <p:clrMapOvr>
+    <a:masterClrMapping/>
+  </p:clrMapOvr>
+  <p:timing>
+    <p:tnLst>
+      <p:par>
+        <p:cTn id="1" dur="indefinite" restart="never" nodeType="tmRoot"/>
+      </p:par>
+    </p:tnLst>
+  </p:timing>
+</p:sld>
+</file>
+
+<file path=ppt/slides/slide21.xml><?xml version="1.0" encoding="utf-8"?>
+<p:sld xmlns:a="http://schemas.openxmlformats.org/drawingml/2006/main" xmlns:r="http://schemas.openxmlformats.org/officeDocument/2006/relationships" xmlns:p="http://schemas.openxmlformats.org/presentationml/2006/main">
+  <p:cSld>
+    <p:spTree>
+      <p:nvGrpSpPr>
+        <p:cNvPr id="1" name=""/>
+        <p:cNvGrpSpPr/>
+        <p:nvPr/>
+      </p:nvGrpSpPr>
+      <p:grpSpPr>
+        <a:xfrm>
+          <a:off x="0" y="0"/>
+          <a:ext cx="0" cy="0"/>
+          <a:chOff x="0" y="0"/>
+          <a:chExt cx="0" cy="0"/>
+        </a:xfrm>
+      </p:grpSpPr>
+      <p:sp>
+        <p:nvSpPr>
+          <p:cNvPr id="2" name="Slide Number Placeholder 1"/>
+          <p:cNvSpPr>
+            <a:spLocks noGrp="1"/>
+          </p:cNvSpPr>
+          <p:nvPr>
+            <p:ph type="sldNum" sz="quarter" idx="10"/>
+          </p:nvPr>
+        </p:nvSpPr>
+        <p:spPr/>
+        <p:txBody>
+          <a:bodyPr/>
+          <a:lstStyle/>
+          <a:p>
+            <a:fld id="{61155BBA-336D-4AED-BB34-E42D9706BCE7}" type="slidenum">
+              <a:rPr lang="it-IT" altLang="en-US" smtClean="0"/>
+              <a:pPr/>
+              <a:t>21</a:t>
             </a:fld>
             <a:endParaRPr lang="it-IT" altLang="en-US"/>
           </a:p>
@@ -13915,142 +15049,6 @@
 </p:sld>
 </file>
 
-<file path=ppt/slides/slide21.xml><?xml version="1.0" encoding="utf-8"?>
-<p:sld xmlns:a="http://schemas.openxmlformats.org/drawingml/2006/main" xmlns:r="http://schemas.openxmlformats.org/officeDocument/2006/relationships" xmlns:p="http://schemas.openxmlformats.org/presentationml/2006/main">
-  <p:cSld>
-    <p:spTree>
-      <p:nvGrpSpPr>
-        <p:cNvPr id="1" name=""/>
-        <p:cNvGrpSpPr/>
-        <p:nvPr/>
-      </p:nvGrpSpPr>
-      <p:grpSpPr>
-        <a:xfrm>
-          <a:off x="0" y="0"/>
-          <a:ext cx="0" cy="0"/>
-          <a:chOff x="0" y="0"/>
-          <a:chExt cx="0" cy="0"/>
-        </a:xfrm>
-      </p:grpSpPr>
-      <p:sp>
-        <p:nvSpPr>
-          <p:cNvPr id="2" name="Slide Number Placeholder 1"/>
-          <p:cNvSpPr>
-            <a:spLocks noGrp="1"/>
-          </p:cNvSpPr>
-          <p:nvPr>
-            <p:ph type="sldNum" sz="quarter" idx="10"/>
-          </p:nvPr>
-        </p:nvSpPr>
-        <p:spPr/>
-        <p:txBody>
-          <a:bodyPr/>
-          <a:lstStyle/>
-          <a:p>
-            <a:fld id="{61155BBA-336D-4AED-BB34-E42D9706BCE7}" type="slidenum">
-              <a:rPr lang="it-IT" altLang="en-US" smtClean="0"/>
-              <a:pPr/>
-              <a:t>21</a:t>
-            </a:fld>
-            <a:endParaRPr lang="it-IT" altLang="en-US"/>
-          </a:p>
-        </p:txBody>
-      </p:sp>
-      <p:sp>
-        <p:nvSpPr>
-          <p:cNvPr id="3" name="TextBox 2"/>
-          <p:cNvSpPr txBox="1"/>
-          <p:nvPr/>
-        </p:nvSpPr>
-        <p:spPr>
-          <a:xfrm>
-            <a:off x="4292140" y="1046490"/>
-            <a:ext cx="3715569" cy="523220"/>
-          </a:xfrm>
-          <a:prstGeom prst="rect">
-            <a:avLst/>
-          </a:prstGeom>
-          <a:noFill/>
-        </p:spPr>
-        <p:txBody>
-          <a:bodyPr wrap="none" rtlCol="0">
-            <a:spAutoFit/>
-          </a:bodyPr>
-          <a:lstStyle/>
-          <a:p>
-            <a:r>
-              <a:rPr lang="en-GB" sz="2800" b="1" i="1" dirty="0" smtClean="0">
-                <a:latin typeface="+mj-lt"/>
-              </a:rPr>
-              <a:t>MODEL VALIDATION</a:t>
-            </a:r>
-          </a:p>
-        </p:txBody>
-      </p:sp>
-      <p:sp>
-        <p:nvSpPr>
-          <p:cNvPr id="4" name="TextBox 3"/>
-          <p:cNvSpPr txBox="1"/>
-          <p:nvPr/>
-        </p:nvSpPr>
-        <p:spPr>
-          <a:xfrm>
-            <a:off x="7078960" y="173782"/>
-            <a:ext cx="2746393" cy="369332"/>
-          </a:xfrm>
-          <a:prstGeom prst="rect">
-            <a:avLst/>
-          </a:prstGeom>
-          <a:noFill/>
-        </p:spPr>
-        <p:txBody>
-          <a:bodyPr wrap="none" rtlCol="0">
-            <a:spAutoFit/>
-          </a:bodyPr>
-          <a:lstStyle/>
-          <a:p>
-            <a:r>
-              <a:rPr lang="en-GB" b="1" dirty="0" smtClean="0">
-                <a:solidFill>
-                  <a:srgbClr val="FF0000"/>
-                </a:solidFill>
-                <a:latin typeface="DejaVu Sans" panose="020B0603030804020204" pitchFamily="34" charset="0"/>
-                <a:ea typeface="DejaVu Sans" panose="020B0603030804020204" pitchFamily="34" charset="0"/>
-                <a:cs typeface="DejaVu Sans" panose="020B0603030804020204" pitchFamily="34" charset="0"/>
-              </a:rPr>
-              <a:t>MODEL VALIDATION</a:t>
-            </a:r>
-            <a:endParaRPr lang="en-GB" b="1" dirty="0">
-              <a:solidFill>
-                <a:srgbClr val="FF0000"/>
-              </a:solidFill>
-              <a:latin typeface="DejaVu Sans" panose="020B0603030804020204" pitchFamily="34" charset="0"/>
-              <a:ea typeface="DejaVu Sans" panose="020B0603030804020204" pitchFamily="34" charset="0"/>
-              <a:cs typeface="DejaVu Sans" panose="020B0603030804020204" pitchFamily="34" charset="0"/>
-            </a:endParaRPr>
-          </a:p>
-        </p:txBody>
-      </p:sp>
-    </p:spTree>
-    <p:extLst>
-      <p:ext uri="{BB962C8B-B14F-4D97-AF65-F5344CB8AC3E}">
-        <p14:creationId xmlns:p14="http://schemas.microsoft.com/office/powerpoint/2010/main" val="55177232"/>
-      </p:ext>
-    </p:extLst>
-  </p:cSld>
-  <p:clrMapOvr>
-    <a:masterClrMapping/>
-  </p:clrMapOvr>
-  <p:timing>
-    <p:tnLst>
-      <p:par>
-        <p:cTn id="1" dur="indefinite" restart="never" nodeType="tmRoot"/>
-      </p:par>
-    </p:tnLst>
-  </p:timing>
-</p:sld>
-</file>
-
 <file path=ppt/slides/slide22.xml><?xml version="1.0" encoding="utf-8"?>
 <p:sld xmlns:a="http://schemas.openxmlformats.org/drawingml/2006/main" xmlns:r="http://schemas.openxmlformats.org/officeDocument/2006/relationships" xmlns:p="http://schemas.openxmlformats.org/presentationml/2006/main">
   <p:cSld>
@@ -14100,8 +15098,8 @@
         </p:nvSpPr>
         <p:spPr>
           <a:xfrm>
-            <a:off x="4746912" y="1033790"/>
-            <a:ext cx="2698175" cy="523220"/>
+            <a:off x="4292140" y="1046490"/>
+            <a:ext cx="3715569" cy="523220"/>
           </a:xfrm>
           <a:prstGeom prst="rect">
             <a:avLst/>
@@ -14118,7 +15116,7 @@
               <a:rPr lang="en-GB" sz="2800" b="1" i="1" dirty="0" smtClean="0">
                 <a:latin typeface="+mj-lt"/>
               </a:rPr>
-              <a:t>CONCLUSION</a:t>
+              <a:t>MODEL VALIDATION</a:t>
             </a:r>
           </a:p>
         </p:txBody>
@@ -14131,8 +15129,8 @@
         </p:nvSpPr>
         <p:spPr>
           <a:xfrm>
-            <a:off x="6956299" y="173782"/>
-            <a:ext cx="3512308" cy="369332"/>
+            <a:off x="7078960" y="173782"/>
+            <a:ext cx="2746393" cy="369332"/>
           </a:xfrm>
           <a:prstGeom prst="rect">
             <a:avLst/>
@@ -14154,7 +15152,7 @@
                 <a:ea typeface="DejaVu Sans" panose="020B0603030804020204" pitchFamily="34" charset="0"/>
                 <a:cs typeface="DejaVu Sans" panose="020B0603030804020204" pitchFamily="34" charset="0"/>
               </a:rPr>
-              <a:t>CONCLUSION &amp; REMARKS</a:t>
+              <a:t>MODEL VALIDATION</a:t>
             </a:r>
             <a:endParaRPr lang="en-GB" b="1" dirty="0">
               <a:solidFill>
@@ -14167,10 +15165,155 @@
           </a:p>
         </p:txBody>
       </p:sp>
+      <mc:AlternateContent xmlns:mc="http://schemas.openxmlformats.org/markup-compatibility/2006">
+        <mc:Choice xmlns:a14="http://schemas.microsoft.com/office/drawing/2010/main" Requires="a14">
+          <p:sp>
+            <p:nvSpPr>
+              <p:cNvPr id="5" name="TextBox 4"/>
+              <p:cNvSpPr txBox="1"/>
+              <p:nvPr/>
+            </p:nvSpPr>
+            <p:spPr>
+              <a:xfrm>
+                <a:off x="0" y="4664985"/>
+                <a:ext cx="19574589" cy="1754326"/>
+              </a:xfrm>
+              <a:prstGeom prst="rect">
+                <a:avLst/>
+              </a:prstGeom>
+              <a:noFill/>
+            </p:spPr>
+            <p:txBody>
+              <a:bodyPr wrap="none" rtlCol="0">
+                <a:spAutoFit/>
+              </a:bodyPr>
+              <a:lstStyle/>
+              <a:p>
+                <a:r>
+                  <a:rPr lang="en-GB" dirty="0"/>
+                  <a:t>but we are training a model based on </a:t>
+                </a:r>
+                <a14:m>
+                  <m:oMath xmlns:m="http://schemas.openxmlformats.org/officeDocument/2006/math">
+                    <m:r>
+                      <a:rPr lang="en-GB" i="1">
+                        <a:latin typeface="Cambria Math" panose="02040503050406030204" pitchFamily="18" charset="0"/>
+                      </a:rPr>
+                      <m:t>(</m:t>
+                    </m:r>
+                    <m:r>
+                      <a:rPr lang="en-GB" i="1">
+                        <a:latin typeface="Cambria Math" panose="02040503050406030204" pitchFamily="18" charset="0"/>
+                      </a:rPr>
+                      <m:t>𝑦</m:t>
+                    </m:r>
+                    <m:r>
+                      <a:rPr lang="en-GB" i="1">
+                        <a:latin typeface="Cambria Math" panose="02040503050406030204" pitchFamily="18" charset="0"/>
+                      </a:rPr>
+                      <m:t>,</m:t>
+                    </m:r>
+                    <m:r>
+                      <a:rPr lang="en-GB" i="1">
+                        <a:latin typeface="Cambria Math" panose="02040503050406030204" pitchFamily="18" charset="0"/>
+                      </a:rPr>
+                      <m:t>𝑢</m:t>
+                    </m:r>
+                    <m:r>
+                      <a:rPr lang="en-GB" i="1">
+                        <a:latin typeface="Cambria Math" panose="02040503050406030204" pitchFamily="18" charset="0"/>
+                      </a:rPr>
+                      <m:t>)</m:t>
+                    </m:r>
+                  </m:oMath>
+                </a14:m>
+                <a:r>
+                  <a:rPr lang="en-GB" dirty="0"/>
+                  <a:t> data and then check the cost function on the same data -&gt; we get a biased result.</a:t>
+                </a:r>
+              </a:p>
+              <a:p>
+                <a:r>
+                  <a:rPr lang="en-GB" dirty="0"/>
+                  <a:t>To get unbiased results we need to test the cost function on a different data set.</a:t>
+                </a:r>
+              </a:p>
+              <a:p>
+                <a:endParaRPr lang="en-GB" dirty="0"/>
+              </a:p>
+              <a:p>
+                <a:r>
+                  <a:rPr lang="en-GB" dirty="0"/>
+                  <a:t>Unfortunately in this project the data is quite similar, though the second data set covariance function is a little different </a:t>
+                </a:r>
+                <a14:m>
+                  <m:oMath xmlns:m="http://schemas.openxmlformats.org/officeDocument/2006/math">
+                    <m:r>
+                      <a:rPr lang="en-GB" i="1">
+                        <a:latin typeface="Cambria Math" panose="02040503050406030204" pitchFamily="18" charset="0"/>
+                      </a:rPr>
+                      <m:t>⇒</m:t>
+                    </m:r>
+                  </m:oMath>
+                </a14:m>
+                <a:r>
+                  <a:rPr lang="en-GB" dirty="0"/>
+                  <a:t> We may test the cost function on a subset of this experiment. 	</a:t>
+                </a:r>
+                <a:endParaRPr lang="en-GB" dirty="0"/>
+              </a:p>
+              <a:p>
+                <a:endParaRPr lang="en-GB" dirty="0"/>
+              </a:p>
+              <a:p>
+                <a:endParaRPr lang="en-GB" dirty="0"/>
+              </a:p>
+            </p:txBody>
+          </p:sp>
+        </mc:Choice>
+        <mc:Fallback>
+          <p:sp>
+            <p:nvSpPr>
+              <p:cNvPr id="5" name="TextBox 4"/>
+              <p:cNvSpPr txBox="1">
+                <a:spLocks noRot="1" noChangeAspect="1" noMove="1" noResize="1" noEditPoints="1" noAdjustHandles="1" noChangeArrowheads="1" noChangeShapeType="1" noTextEdit="1"/>
+              </p:cNvSpPr>
+              <p:nvPr/>
+            </p:nvSpPr>
+            <p:spPr>
+              <a:xfrm>
+                <a:off x="0" y="4664985"/>
+                <a:ext cx="19574589" cy="1754326"/>
+              </a:xfrm>
+              <a:prstGeom prst="rect">
+                <a:avLst/>
+              </a:prstGeom>
+              <a:blipFill rotWithShape="0">
+                <a:blip r:embed="rId2"/>
+                <a:stretch>
+                  <a:fillRect l="-249" t="-1736"/>
+                </a:stretch>
+              </a:blipFill>
+            </p:spPr>
+            <p:txBody>
+              <a:bodyPr/>
+              <a:lstStyle/>
+              <a:p>
+                <a:r>
+                  <a:rPr lang="en-GB">
+                    <a:noFill/>
+                  </a:rPr>
+                  <a:t> </a:t>
+                </a:r>
+              </a:p>
+            </p:txBody>
+          </p:sp>
+        </mc:Fallback>
+      </mc:AlternateContent>
     </p:spTree>
     <p:extLst>
       <p:ext uri="{BB962C8B-B14F-4D97-AF65-F5344CB8AC3E}">
-        <p14:creationId xmlns:p14="http://schemas.microsoft.com/office/powerpoint/2010/main" val="2463455316"/>
+        <p14:creationId xmlns:p14="http://schemas.microsoft.com/office/powerpoint/2010/main" val="55177232"/>
       </p:ext>
     </p:extLst>
   </p:cSld>
@@ -14230,87 +15373,75 @@
       </p:sp>
       <p:sp>
         <p:nvSpPr>
-          <p:cNvPr id="4" name="Rectangle 3"/>
-          <p:cNvSpPr/>
+          <p:cNvPr id="3" name="TextBox 2"/>
+          <p:cNvSpPr txBox="1"/>
           <p:nvPr/>
         </p:nvSpPr>
         <p:spPr>
           <a:xfrm>
-            <a:off x="2444744" y="2588350"/>
-            <a:ext cx="7302512" cy="1754326"/>
+            <a:off x="4746912" y="1033790"/>
+            <a:ext cx="2698175" cy="523220"/>
           </a:xfrm>
           <a:prstGeom prst="rect">
             <a:avLst/>
           </a:prstGeom>
+          <a:noFill/>
         </p:spPr>
-        <p:style>
-          <a:lnRef idx="3">
-            <a:schemeClr val="lt1"/>
-          </a:lnRef>
-          <a:fillRef idx="1">
-            <a:schemeClr val="accent5"/>
-          </a:fillRef>
-          <a:effectRef idx="1">
-            <a:schemeClr val="accent5"/>
-          </a:effectRef>
-          <a:fontRef idx="minor">
-            <a:schemeClr val="lt1"/>
-          </a:fontRef>
-        </p:style>
         <p:txBody>
-          <a:bodyPr wrap="none" lIns="91440" tIns="45720" rIns="91440" bIns="45720">
+          <a:bodyPr wrap="none" rtlCol="0">
             <a:spAutoFit/>
           </a:bodyPr>
           <a:lstStyle/>
           <a:p>
-            <a:pPr algn="ctr"/>
-            <a:r>
-              <a:rPr lang="en-US" sz="5400" b="0" cap="none" spc="0" dirty="0" smtClean="0">
-                <a:ln w="0"/>
+            <a:r>
+              <a:rPr lang="en-GB" sz="2800" b="1" i="1" dirty="0" smtClean="0">
+                <a:latin typeface="+mj-lt"/>
+              </a:rPr>
+              <a:t>CONCLUSION</a:t>
+            </a:r>
+          </a:p>
+        </p:txBody>
+      </p:sp>
+      <p:sp>
+        <p:nvSpPr>
+          <p:cNvPr id="4" name="TextBox 3"/>
+          <p:cNvSpPr txBox="1"/>
+          <p:nvPr/>
+        </p:nvSpPr>
+        <p:spPr>
+          <a:xfrm>
+            <a:off x="6956299" y="173782"/>
+            <a:ext cx="3512308" cy="369332"/>
+          </a:xfrm>
+          <a:prstGeom prst="rect">
+            <a:avLst/>
+          </a:prstGeom>
+          <a:noFill/>
+        </p:spPr>
+        <p:txBody>
+          <a:bodyPr wrap="none" rtlCol="0">
+            <a:spAutoFit/>
+          </a:bodyPr>
+          <a:lstStyle/>
+          <a:p>
+            <a:r>
+              <a:rPr lang="en-GB" b="1" dirty="0" smtClean="0">
                 <a:solidFill>
-                  <a:schemeClr val="tx1"/>
+                  <a:srgbClr val="FF0000"/>
                 </a:solidFill>
-                <a:effectLst>
-                  <a:outerShdw blurRad="38100" dist="19050" dir="2700000" algn="tl" rotWithShape="0">
-                    <a:schemeClr val="dk1">
-                      <a:alpha val="40000"/>
-                    </a:schemeClr>
-                  </a:outerShdw>
-                </a:effectLst>
+                <a:latin typeface="DejaVu Sans" panose="020B0603030804020204" pitchFamily="34" charset="0"/>
+                <a:ea typeface="DejaVu Sans" panose="020B0603030804020204" pitchFamily="34" charset="0"/>
+                <a:cs typeface="DejaVu Sans" panose="020B0603030804020204" pitchFamily="34" charset="0"/>
               </a:rPr>
-              <a:t>WHAT WENT WRONG</a:t>
-            </a:r>
-          </a:p>
-          <a:p>
-            <a:pPr algn="ctr"/>
-            <a:r>
-              <a:rPr lang="en-US" sz="5400" dirty="0" smtClean="0">
-                <a:ln w="0"/>
-                <a:solidFill>
-                  <a:schemeClr val="tx1"/>
-                </a:solidFill>
-                <a:effectLst>
-                  <a:outerShdw blurRad="38100" dist="19050" dir="2700000" algn="tl" rotWithShape="0">
-                    <a:schemeClr val="dk1">
-                      <a:alpha val="40000"/>
-                    </a:schemeClr>
-                  </a:outerShdw>
-                </a:effectLst>
-              </a:rPr>
-              <a:t>AND WHY</a:t>
-            </a:r>
-            <a:endParaRPr lang="en-US" sz="5400" b="0" cap="none" spc="0" dirty="0">
-              <a:ln w="0"/>
+              <a:t>CONCLUSION &amp; REMARKS</a:t>
+            </a:r>
+            <a:endParaRPr lang="en-GB" b="1" dirty="0">
               <a:solidFill>
-                <a:schemeClr val="tx1"/>
+                <a:srgbClr val="FF0000"/>
               </a:solidFill>
-              <a:effectLst>
-                <a:outerShdw blurRad="38100" dist="19050" dir="2700000" algn="tl" rotWithShape="0">
-                  <a:schemeClr val="dk1">
-                    <a:alpha val="40000"/>
-                  </a:schemeClr>
-                </a:outerShdw>
-              </a:effectLst>
+              <a:latin typeface="DejaVu Sans" panose="020B0603030804020204" pitchFamily="34" charset="0"/>
+              <a:ea typeface="DejaVu Sans" panose="020B0603030804020204" pitchFamily="34" charset="0"/>
+              <a:cs typeface="DejaVu Sans" panose="020B0603030804020204" pitchFamily="34" charset="0"/>
             </a:endParaRPr>
           </a:p>
         </p:txBody>
@@ -14318,7 +15449,7 @@
     </p:spTree>
     <p:extLst>
       <p:ext uri="{BB962C8B-B14F-4D97-AF65-F5344CB8AC3E}">
-        <p14:creationId xmlns:p14="http://schemas.microsoft.com/office/powerpoint/2010/main" val="548125632"/>
+        <p14:creationId xmlns:p14="http://schemas.microsoft.com/office/powerpoint/2010/main" val="2463455316"/>
       </p:ext>
     </p:extLst>
   </p:cSld>
@@ -14371,6 +15502,154 @@
               <a:rPr lang="it-IT" altLang="en-US" smtClean="0"/>
               <a:pPr/>
               <a:t>24</a:t>
+            </a:fld>
+            <a:endParaRPr lang="it-IT" altLang="en-US"/>
+          </a:p>
+        </p:txBody>
+      </p:sp>
+      <p:sp>
+        <p:nvSpPr>
+          <p:cNvPr id="4" name="Rectangle 3"/>
+          <p:cNvSpPr/>
+          <p:nvPr/>
+        </p:nvSpPr>
+        <p:spPr>
+          <a:xfrm>
+            <a:off x="2444744" y="2588350"/>
+            <a:ext cx="7302512" cy="1754326"/>
+          </a:xfrm>
+          <a:prstGeom prst="rect">
+            <a:avLst/>
+          </a:prstGeom>
+        </p:spPr>
+        <p:style>
+          <a:lnRef idx="3">
+            <a:schemeClr val="lt1"/>
+          </a:lnRef>
+          <a:fillRef idx="1">
+            <a:schemeClr val="accent5"/>
+          </a:fillRef>
+          <a:effectRef idx="1">
+            <a:schemeClr val="accent5"/>
+          </a:effectRef>
+          <a:fontRef idx="minor">
+            <a:schemeClr val="lt1"/>
+          </a:fontRef>
+        </p:style>
+        <p:txBody>
+          <a:bodyPr wrap="none" lIns="91440" tIns="45720" rIns="91440" bIns="45720">
+            <a:spAutoFit/>
+          </a:bodyPr>
+          <a:lstStyle/>
+          <a:p>
+            <a:pPr algn="ctr"/>
+            <a:r>
+              <a:rPr lang="en-US" sz="5400" b="0" cap="none" spc="0" dirty="0" smtClean="0">
+                <a:ln w="0"/>
+                <a:solidFill>
+                  <a:schemeClr val="tx1"/>
+                </a:solidFill>
+                <a:effectLst>
+                  <a:outerShdw blurRad="38100" dist="19050" dir="2700000" algn="tl" rotWithShape="0">
+                    <a:schemeClr val="dk1">
+                      <a:alpha val="40000"/>
+                    </a:schemeClr>
+                  </a:outerShdw>
+                </a:effectLst>
+              </a:rPr>
+              <a:t>WHAT WENT WRONG</a:t>
+            </a:r>
+          </a:p>
+          <a:p>
+            <a:pPr algn="ctr"/>
+            <a:r>
+              <a:rPr lang="en-US" sz="5400" dirty="0" smtClean="0">
+                <a:ln w="0"/>
+                <a:solidFill>
+                  <a:schemeClr val="tx1"/>
+                </a:solidFill>
+                <a:effectLst>
+                  <a:outerShdw blurRad="38100" dist="19050" dir="2700000" algn="tl" rotWithShape="0">
+                    <a:schemeClr val="dk1">
+                      <a:alpha val="40000"/>
+                    </a:schemeClr>
+                  </a:outerShdw>
+                </a:effectLst>
+              </a:rPr>
+              <a:t>AND WHY</a:t>
+            </a:r>
+            <a:endParaRPr lang="en-US" sz="5400" b="0" cap="none" spc="0" dirty="0">
+              <a:ln w="0"/>
+              <a:solidFill>
+                <a:schemeClr val="tx1"/>
+              </a:solidFill>
+              <a:effectLst>
+                <a:outerShdw blurRad="38100" dist="19050" dir="2700000" algn="tl" rotWithShape="0">
+                  <a:schemeClr val="dk1">
+                    <a:alpha val="40000"/>
+                  </a:schemeClr>
+                </a:outerShdw>
+              </a:effectLst>
+            </a:endParaRPr>
+          </a:p>
+        </p:txBody>
+      </p:sp>
+    </p:spTree>
+    <p:extLst>
+      <p:ext uri="{BB962C8B-B14F-4D97-AF65-F5344CB8AC3E}">
+        <p14:creationId xmlns:p14="http://schemas.microsoft.com/office/powerpoint/2010/main" val="548125632"/>
+      </p:ext>
+    </p:extLst>
+  </p:cSld>
+  <p:clrMapOvr>
+    <a:masterClrMapping/>
+  </p:clrMapOvr>
+  <p:timing>
+    <p:tnLst>
+      <p:par>
+        <p:cTn id="1" dur="indefinite" restart="never" nodeType="tmRoot"/>
+      </p:par>
+    </p:tnLst>
+  </p:timing>
+</p:sld>
+</file>
+
+<file path=ppt/slides/slide25.xml><?xml version="1.0" encoding="utf-8"?>
+<p:sld xmlns:a="http://schemas.openxmlformats.org/drawingml/2006/main" xmlns:r="http://schemas.openxmlformats.org/officeDocument/2006/relationships" xmlns:p="http://schemas.openxmlformats.org/presentationml/2006/main">
+  <p:cSld>
+    <p:spTree>
+      <p:nvGrpSpPr>
+        <p:cNvPr id="1" name=""/>
+        <p:cNvGrpSpPr/>
+        <p:nvPr/>
+      </p:nvGrpSpPr>
+      <p:grpSpPr>
+        <a:xfrm>
+          <a:off x="0" y="0"/>
+          <a:ext cx="0" cy="0"/>
+          <a:chOff x="0" y="0"/>
+          <a:chExt cx="0" cy="0"/>
+        </a:xfrm>
+      </p:grpSpPr>
+      <p:sp>
+        <p:nvSpPr>
+          <p:cNvPr id="2" name="Slide Number Placeholder 1"/>
+          <p:cNvSpPr>
+            <a:spLocks noGrp="1"/>
+          </p:cNvSpPr>
+          <p:nvPr>
+            <p:ph type="sldNum" sz="quarter" idx="10"/>
+          </p:nvPr>
+        </p:nvSpPr>
+        <p:spPr/>
+        <p:txBody>
+          <a:bodyPr/>
+          <a:lstStyle/>
+          <a:p>
+            <a:fld id="{61155BBA-336D-4AED-BB34-E42D9706BCE7}" type="slidenum">
+              <a:rPr lang="it-IT" altLang="en-US" smtClean="0"/>
+              <a:pPr/>
+              <a:t>25</a:t>
             </a:fld>
             <a:endParaRPr lang="it-IT" altLang="en-US"/>
           </a:p>

</xml_diff>

<commit_message>
Further work on report (cost function)
</commit_message>
<xml_diff>
--- a/report/Report.pptx
+++ b/report/Report.pptx
@@ -13754,8 +13754,8 @@
             </p:nvSpPr>
             <p:spPr>
               <a:xfrm>
-                <a:off x="494950" y="1988191"/>
-                <a:ext cx="10863744" cy="2519344"/>
+                <a:off x="546790" y="1677798"/>
+                <a:ext cx="10863744" cy="4759829"/>
               </a:xfrm>
               <a:prstGeom prst="rect">
                 <a:avLst/>
@@ -14092,21 +14092,33 @@
                         </m:d>
                       </m:e>
                       <m:sub>
-                        <m:r>
-                          <a:rPr lang="en-GB" b="0" i="1" smtClean="0">
-                            <a:latin typeface="Cambria Math" panose="02040503050406030204" pitchFamily="18" charset="0"/>
-                          </a:rPr>
-                          <m:t>2</m:t>
-                        </m:r>
+                        <m:sSup>
+                          <m:sSupPr>
+                            <m:ctrlPr>
+                              <a:rPr lang="en-GB" b="0" i="1" smtClean="0">
+                                <a:latin typeface="Cambria Math" panose="02040503050406030204" pitchFamily="18" charset="0"/>
+                              </a:rPr>
+                            </m:ctrlPr>
+                          </m:sSupPr>
+                          <m:e>
+                            <m:r>
+                              <a:rPr lang="en-GB" b="0" i="1" smtClean="0">
+                                <a:latin typeface="Cambria Math" panose="02040503050406030204" pitchFamily="18" charset="0"/>
+                              </a:rPr>
+                              <m:t>𝐿</m:t>
+                            </m:r>
+                          </m:e>
+                          <m:sup>
+                            <m:r>
+                              <a:rPr lang="en-GB" b="0" i="1" smtClean="0">
+                                <a:latin typeface="Cambria Math" panose="02040503050406030204" pitchFamily="18" charset="0"/>
+                              </a:rPr>
+                              <m:t>2</m:t>
+                            </m:r>
+                          </m:sup>
+                        </m:sSup>
                       </m:sub>
-                      <m:sup>
-                        <m:r>
-                          <a:rPr lang="en-GB" b="0" i="1" smtClean="0">
-                            <a:latin typeface="Cambria Math" panose="02040503050406030204" pitchFamily="18" charset="0"/>
-                          </a:rPr>
-                          <m:t>2</m:t>
-                        </m:r>
-                      </m:sup>
+                      <m:sup/>
                     </m:sSubSup>
                     <m:r>
                       <a:rPr lang="en-GB" b="0" i="1" smtClean="0">
@@ -14215,21 +14227,33 @@
                         </m:d>
                       </m:e>
                       <m:sub>
-                        <m:r>
-                          <a:rPr lang="en-GB" i="1">
-                            <a:latin typeface="Cambria Math" panose="02040503050406030204" pitchFamily="18" charset="0"/>
-                          </a:rPr>
-                          <m:t>2</m:t>
-                        </m:r>
+                        <m:sSup>
+                          <m:sSupPr>
+                            <m:ctrlPr>
+                              <a:rPr lang="en-GB" b="0" i="1" smtClean="0">
+                                <a:latin typeface="Cambria Math" panose="02040503050406030204" pitchFamily="18" charset="0"/>
+                              </a:rPr>
+                            </m:ctrlPr>
+                          </m:sSupPr>
+                          <m:e>
+                            <m:r>
+                              <a:rPr lang="en-GB" b="0" i="1" smtClean="0">
+                                <a:latin typeface="Cambria Math" panose="02040503050406030204" pitchFamily="18" charset="0"/>
+                              </a:rPr>
+                              <m:t>𝐿</m:t>
+                            </m:r>
+                          </m:e>
+                          <m:sup>
+                            <m:r>
+                              <a:rPr lang="en-GB" b="0" i="1" smtClean="0">
+                                <a:latin typeface="Cambria Math" panose="02040503050406030204" pitchFamily="18" charset="0"/>
+                              </a:rPr>
+                              <m:t>2</m:t>
+                            </m:r>
+                          </m:sup>
+                        </m:sSup>
                       </m:sub>
-                      <m:sup>
-                        <m:r>
-                          <a:rPr lang="en-GB" i="1">
-                            <a:latin typeface="Cambria Math" panose="02040503050406030204" pitchFamily="18" charset="0"/>
-                          </a:rPr>
-                          <m:t>2</m:t>
-                        </m:r>
-                      </m:sup>
+                      <m:sup/>
                     </m:sSubSup>
                   </m:oMath>
                 </a14:m>
@@ -14373,7 +14397,7 @@
                 </a14:m>
                 <a:r>
                   <a:rPr lang="en-GB" dirty="0" smtClean="0"/>
-                  <a:t> </a:t>
+                  <a:t>  </a:t>
                 </a:r>
                 <a14:m>
                   <m:oMath xmlns:m="http://schemas.openxmlformats.org/officeDocument/2006/math">
@@ -14718,7 +14742,7 @@
                       <a:rPr lang="en-GB" b="0" i="1" smtClean="0">
                         <a:latin typeface="Cambria Math" panose="02040503050406030204" pitchFamily="18" charset="0"/>
                       </a:rPr>
-                      <m:t>𝑓𝑖𝑡</m:t>
+                      <m:t>𝑚𝑓𝑖𝑡</m:t>
                     </m:r>
                     <m:d>
                       <m:dPr>
@@ -14983,9 +15007,65 @@
                 </a14:m>
                 <a:r>
                   <a:rPr lang="en-GB" dirty="0" smtClean="0"/>
-                  <a:t> fit function</a:t>
+                  <a:t> matlab fit function</a:t>
                 </a:r>
+              </a:p>
+              <a:p>
+                <a:pPr marL="342900" indent="-342900">
+                  <a:buFont typeface="+mj-lt"/>
+                  <a:buAutoNum type="arabicPeriod"/>
+                </a:pPr>
                 <a:endParaRPr lang="en-GB" dirty="0"/>
+              </a:p>
+              <a:p>
+                <a:r>
+                  <a:rPr lang="en-GB" dirty="0" smtClean="0"/>
+                  <a:t>For sure the  3</a:t>
+                </a:r>
+                <a:r>
+                  <a:rPr lang="en-GB" baseline="30000" dirty="0" smtClean="0"/>
+                  <a:t>rd</a:t>
+                </a:r>
+                <a:r>
+                  <a:rPr lang="en-GB" dirty="0" smtClean="0"/>
+                  <a:t>  cost function is the most </a:t>
+                </a:r>
+                <a:r>
+                  <a:rPr lang="en-GB" dirty="0" err="1" smtClean="0"/>
+                  <a:t>unappropriate</a:t>
+                </a:r>
+                <a:r>
+                  <a:rPr lang="en-GB" dirty="0" smtClean="0"/>
+                  <a:t>, since it tries to minimise the maximum error, which may be given by a noise peak.</a:t>
+                </a:r>
+              </a:p>
+              <a:p>
+                <a:r>
+                  <a:rPr lang="en-GB" dirty="0" smtClean="0"/>
+                  <a:t>Minimising the 4</a:t>
+                </a:r>
+                <a:r>
+                  <a:rPr lang="en-GB" baseline="30000" dirty="0" smtClean="0"/>
+                  <a:t>th</a:t>
+                </a:r>
+                <a:r>
+                  <a:rPr lang="en-GB" dirty="0" smtClean="0"/>
+                  <a:t> or the 1</a:t>
+                </a:r>
+                <a:r>
+                  <a:rPr lang="en-GB" baseline="30000" dirty="0" smtClean="0"/>
+                  <a:t>st</a:t>
+                </a:r>
+                <a:r>
+                  <a:rPr lang="en-GB" dirty="0" smtClean="0"/>
+                  <a:t> is the same since we are using the Euclidean norm, which minimise the variance of the error. Again, we may have peaks given by the noise, though if we have enough points may have no influence.</a:t>
+                </a:r>
+              </a:p>
+              <a:p>
+                <a:r>
+                  <a:rPr lang="en-GB" dirty="0" smtClean="0"/>
+                  <a:t>Minimising the L^2 norm is equal to have a global convergence, peaks are not overrated since we are integrating.</a:t>
+                </a:r>
               </a:p>
             </p:txBody>
           </p:sp>
@@ -15001,8 +15081,8 @@
             </p:nvSpPr>
             <p:spPr>
               <a:xfrm>
-                <a:off x="494950" y="1988191"/>
-                <a:ext cx="10863744" cy="2519344"/>
+                <a:off x="546790" y="1677798"/>
+                <a:ext cx="10863744" cy="4759829"/>
               </a:xfrm>
               <a:prstGeom prst="rect">
                 <a:avLst/>
@@ -15010,7 +15090,7 @@
               <a:blipFill rotWithShape="0">
                 <a:blip r:embed="rId2"/>
                 <a:stretch>
-                  <a:fillRect l="-393"/>
+                  <a:fillRect l="-505" b="-1152"/>
                 </a:stretch>
               </a:blipFill>
             </p:spPr>

</xml_diff>

<commit_message>
Further work on report (cost function)+fourier plot
Function to plot the fft of a siganl + its fourier representation
</commit_message>
<xml_diff>
--- a/report/Report.pptx
+++ b/report/Report.pptx
@@ -28,10 +28,12 @@
     <p:sldId id="279" r:id="rId22"/>
     <p:sldId id="281" r:id="rId23"/>
     <p:sldId id="280" r:id="rId24"/>
-    <p:sldId id="264" r:id="rId25"/>
-    <p:sldId id="265" r:id="rId26"/>
-    <p:sldId id="277" r:id="rId27"/>
-    <p:sldId id="278" r:id="rId28"/>
+    <p:sldId id="283" r:id="rId25"/>
+    <p:sldId id="282" r:id="rId26"/>
+    <p:sldId id="264" r:id="rId27"/>
+    <p:sldId id="265" r:id="rId28"/>
+    <p:sldId id="277" r:id="rId29"/>
+    <p:sldId id="278" r:id="rId30"/>
   </p:sldIdLst>
   <p:sldSz cx="12192000" cy="6858000"/>
   <p:notesSz cx="6858000" cy="9144000"/>
@@ -13755,7 +13757,7 @@
             <p:spPr>
               <a:xfrm>
                 <a:off x="546790" y="1677798"/>
-                <a:ext cx="10863744" cy="4759829"/>
+                <a:ext cx="10863744" cy="4482830"/>
               </a:xfrm>
               <a:prstGeom prst="rect">
                 <a:avLst/>
@@ -15058,13 +15060,13 @@
                 </a:r>
                 <a:r>
                   <a:rPr lang="en-GB" dirty="0" smtClean="0"/>
-                  <a:t> is the same since we are using the Euclidean norm, which minimise the variance of the error. Again, we may have peaks given by the noise, though if we have enough points may have no influence.</a:t>
+                  <a:t> is the same since we are using the Euclidean norm, which minimise the variance of the error. Again, we may have peaks given by the noise, though if we have enough points may have no influence =&gt; global convergence.</a:t>
                 </a:r>
               </a:p>
               <a:p>
                 <a:r>
                   <a:rPr lang="en-GB" dirty="0" smtClean="0"/>
-                  <a:t>Minimising the L^2 norm is equal to have a global convergence, peaks are not overrated since we are integrating.</a:t>
+                  <a:t>The L^2 norm is simply the first cost function.</a:t>
                 </a:r>
               </a:p>
             </p:txBody>
@@ -15082,7 +15084,7 @@
             <p:spPr>
               <a:xfrm>
                 <a:off x="546790" y="1677798"/>
-                <a:ext cx="10863744" cy="4759829"/>
+                <a:ext cx="10863744" cy="4482830"/>
               </a:xfrm>
               <a:prstGeom prst="rect">
                 <a:avLst/>
@@ -15090,7 +15092,7 @@
               <a:blipFill rotWithShape="0">
                 <a:blip r:embed="rId2"/>
                 <a:stretch>
-                  <a:fillRect l="-505" b="-1152"/>
+                  <a:fillRect l="-505" b="-1223"/>
                 </a:stretch>
               </a:blipFill>
             </p:spPr>
@@ -15165,6 +15167,1546 @@
               <a:rPr lang="it-IT" altLang="en-US" smtClean="0"/>
               <a:pPr/>
               <a:t>22</a:t>
+            </a:fld>
+            <a:endParaRPr lang="it-IT" altLang="en-US"/>
+          </a:p>
+        </p:txBody>
+      </p:sp>
+      <p:sp>
+        <p:nvSpPr>
+          <p:cNvPr id="3" name="TextBox 2"/>
+          <p:cNvSpPr txBox="1"/>
+          <p:nvPr/>
+        </p:nvSpPr>
+        <p:spPr>
+          <a:xfrm>
+            <a:off x="2102986" y="1054879"/>
+            <a:ext cx="7751353" cy="523220"/>
+          </a:xfrm>
+          <a:prstGeom prst="rect">
+            <a:avLst/>
+          </a:prstGeom>
+          <a:noFill/>
+        </p:spPr>
+        <p:txBody>
+          <a:bodyPr wrap="none" rtlCol="0">
+            <a:spAutoFit/>
+          </a:bodyPr>
+          <a:lstStyle/>
+          <a:p>
+            <a:r>
+              <a:rPr lang="en-GB" sz="2800" b="1" i="1" dirty="0" smtClean="0">
+                <a:latin typeface="+mj-lt"/>
+              </a:rPr>
+              <a:t>MODEL </a:t>
+            </a:r>
+            <a:r>
+              <a:rPr lang="en-GB" sz="2800" b="1" i="1" dirty="0" smtClean="0">
+                <a:latin typeface="+mj-lt"/>
+              </a:rPr>
+              <a:t>IDENTIFICATION – LOSS FUNCTION</a:t>
+            </a:r>
+            <a:endParaRPr lang="en-GB" sz="2800" b="1" i="1" dirty="0" smtClean="0">
+              <a:latin typeface="+mj-lt"/>
+            </a:endParaRPr>
+          </a:p>
+        </p:txBody>
+      </p:sp>
+      <p:sp>
+        <p:nvSpPr>
+          <p:cNvPr id="4" name="TextBox 3"/>
+          <p:cNvSpPr txBox="1"/>
+          <p:nvPr/>
+        </p:nvSpPr>
+        <p:spPr>
+          <a:xfrm>
+            <a:off x="7078960" y="173782"/>
+            <a:ext cx="3266985" cy="369332"/>
+          </a:xfrm>
+          <a:prstGeom prst="rect">
+            <a:avLst/>
+          </a:prstGeom>
+          <a:noFill/>
+        </p:spPr>
+        <p:txBody>
+          <a:bodyPr wrap="none" rtlCol="0">
+            <a:spAutoFit/>
+          </a:bodyPr>
+          <a:lstStyle/>
+          <a:p>
+            <a:r>
+              <a:rPr lang="en-GB" b="1" dirty="0" smtClean="0">
+                <a:solidFill>
+                  <a:srgbClr val="FF0000"/>
+                </a:solidFill>
+                <a:latin typeface="DejaVu Sans" panose="020B0603030804020204" pitchFamily="34" charset="0"/>
+                <a:ea typeface="DejaVu Sans" panose="020B0603030804020204" pitchFamily="34" charset="0"/>
+                <a:cs typeface="DejaVu Sans" panose="020B0603030804020204" pitchFamily="34" charset="0"/>
+              </a:rPr>
+              <a:t>MODEL IDENTIFICATION</a:t>
+            </a:r>
+            <a:endParaRPr lang="en-GB" b="1" dirty="0">
+              <a:solidFill>
+                <a:srgbClr val="FF0000"/>
+              </a:solidFill>
+              <a:latin typeface="DejaVu Sans" panose="020B0603030804020204" pitchFamily="34" charset="0"/>
+              <a:ea typeface="DejaVu Sans" panose="020B0603030804020204" pitchFamily="34" charset="0"/>
+              <a:cs typeface="DejaVu Sans" panose="020B0603030804020204" pitchFamily="34" charset="0"/>
+            </a:endParaRPr>
+          </a:p>
+        </p:txBody>
+      </p:sp>
+      <mc:AlternateContent xmlns:mc="http://schemas.openxmlformats.org/markup-compatibility/2006">
+        <mc:Choice xmlns:a14="http://schemas.microsoft.com/office/drawing/2010/main" Requires="a14">
+          <p:sp>
+            <p:nvSpPr>
+              <p:cNvPr id="6" name="TextBox 5"/>
+              <p:cNvSpPr txBox="1"/>
+              <p:nvPr/>
+            </p:nvSpPr>
+            <p:spPr>
+              <a:xfrm>
+                <a:off x="546790" y="1677798"/>
+                <a:ext cx="10863744" cy="1831592"/>
+              </a:xfrm>
+              <a:prstGeom prst="rect">
+                <a:avLst/>
+              </a:prstGeom>
+              <a:noFill/>
+            </p:spPr>
+            <p:txBody>
+              <a:bodyPr wrap="square" rtlCol="0">
+                <a:spAutoFit/>
+              </a:bodyPr>
+              <a:lstStyle/>
+              <a:p>
+                <a14:m>
+                  <m:oMath xmlns:m="http://schemas.openxmlformats.org/officeDocument/2006/math">
+                    <m:sSub>
+                      <m:sSubPr>
+                        <m:ctrlPr>
+                          <a:rPr lang="en-GB" i="1" smtClean="0">
+                            <a:latin typeface="Cambria Math" panose="02040503050406030204" pitchFamily="18" charset="0"/>
+                          </a:rPr>
+                        </m:ctrlPr>
+                      </m:sSubPr>
+                      <m:e>
+                        <m:acc>
+                          <m:accPr>
+                            <m:chr m:val="̅"/>
+                            <m:ctrlPr>
+                              <a:rPr lang="en-GB" i="1" smtClean="0">
+                                <a:latin typeface="Cambria Math" panose="02040503050406030204" pitchFamily="18" charset="0"/>
+                              </a:rPr>
+                            </m:ctrlPr>
+                          </m:accPr>
+                          <m:e>
+                            <m:r>
+                              <a:rPr lang="en-GB" b="0" i="1" smtClean="0">
+                                <a:latin typeface="Cambria Math" panose="02040503050406030204" pitchFamily="18" charset="0"/>
+                              </a:rPr>
+                              <m:t>𝐽</m:t>
+                            </m:r>
+                          </m:e>
+                        </m:acc>
+                        <m:d>
+                          <m:dPr>
+                            <m:ctrlPr>
+                              <a:rPr lang="en-GB" b="0" i="1" smtClean="0">
+                                <a:latin typeface="Cambria Math" panose="02040503050406030204" pitchFamily="18" charset="0"/>
+                              </a:rPr>
+                            </m:ctrlPr>
+                          </m:dPr>
+                          <m:e>
+                            <m:r>
+                              <a:rPr lang="en-GB" b="0" i="1" smtClean="0">
+                                <a:latin typeface="Cambria Math" panose="02040503050406030204" pitchFamily="18" charset="0"/>
+                              </a:rPr>
+                              <m:t>𝜃</m:t>
+                            </m:r>
+                          </m:e>
+                        </m:d>
+                        <m:r>
+                          <a:rPr lang="en-GB" b="0" i="1" smtClean="0">
+                            <a:latin typeface="Cambria Math" panose="02040503050406030204" pitchFamily="18" charset="0"/>
+                          </a:rPr>
+                          <m:t>=</m:t>
+                        </m:r>
+                        <m:r>
+                          <a:rPr lang="en-GB" i="1">
+                            <a:latin typeface="Cambria Math" panose="02040503050406030204" pitchFamily="18" charset="0"/>
+                          </a:rPr>
+                          <m:t>𝑚𝑖𝑛</m:t>
+                        </m:r>
+                      </m:e>
+                      <m:sub>
+                        <m:r>
+                          <a:rPr lang="en-GB" i="1">
+                            <a:latin typeface="Cambria Math" panose="02040503050406030204" pitchFamily="18" charset="0"/>
+                          </a:rPr>
+                          <m:t>𝜃</m:t>
+                        </m:r>
+                      </m:sub>
+                    </m:sSub>
+                    <m:r>
+                      <a:rPr lang="en-GB" i="1">
+                        <a:latin typeface="Cambria Math" panose="02040503050406030204" pitchFamily="18" charset="0"/>
+                      </a:rPr>
+                      <m:t>𝑙</m:t>
+                    </m:r>
+                    <m:d>
+                      <m:dPr>
+                        <m:ctrlPr>
+                          <a:rPr lang="en-GB" i="1">
+                            <a:latin typeface="Cambria Math" panose="02040503050406030204" pitchFamily="18" charset="0"/>
+                          </a:rPr>
+                        </m:ctrlPr>
+                      </m:dPr>
+                      <m:e>
+                        <m:r>
+                          <a:rPr lang="en-GB" i="1">
+                            <a:latin typeface="Cambria Math" panose="02040503050406030204" pitchFamily="18" charset="0"/>
+                          </a:rPr>
+                          <m:t>𝑦</m:t>
+                        </m:r>
+                        <m:d>
+                          <m:dPr>
+                            <m:ctrlPr>
+                              <a:rPr lang="en-GB" i="1">
+                                <a:latin typeface="Cambria Math" panose="02040503050406030204" pitchFamily="18" charset="0"/>
+                              </a:rPr>
+                            </m:ctrlPr>
+                          </m:dPr>
+                          <m:e>
+                            <m:r>
+                              <a:rPr lang="en-GB" i="1">
+                                <a:latin typeface="Cambria Math" panose="02040503050406030204" pitchFamily="18" charset="0"/>
+                              </a:rPr>
+                              <m:t>𝑡</m:t>
+                            </m:r>
+                          </m:e>
+                        </m:d>
+                        <m:r>
+                          <a:rPr lang="en-GB" i="1">
+                            <a:latin typeface="Cambria Math" panose="02040503050406030204" pitchFamily="18" charset="0"/>
+                          </a:rPr>
+                          <m:t>−</m:t>
+                        </m:r>
+                        <m:r>
+                          <a:rPr lang="en-GB" i="1">
+                            <a:latin typeface="Cambria Math" panose="02040503050406030204" pitchFamily="18" charset="0"/>
+                          </a:rPr>
+                          <m:t>𝐺𝑢</m:t>
+                        </m:r>
+                        <m:d>
+                          <m:dPr>
+                            <m:ctrlPr>
+                              <a:rPr lang="en-GB" i="1">
+                                <a:latin typeface="Cambria Math" panose="02040503050406030204" pitchFamily="18" charset="0"/>
+                              </a:rPr>
+                            </m:ctrlPr>
+                          </m:dPr>
+                          <m:e>
+                            <m:r>
+                              <a:rPr lang="en-GB" i="1">
+                                <a:latin typeface="Cambria Math" panose="02040503050406030204" pitchFamily="18" charset="0"/>
+                              </a:rPr>
+                              <m:t>𝑡</m:t>
+                            </m:r>
+                            <m:r>
+                              <a:rPr lang="en-GB" i="1">
+                                <a:latin typeface="Cambria Math" panose="02040503050406030204" pitchFamily="18" charset="0"/>
+                              </a:rPr>
+                              <m:t>−</m:t>
+                            </m:r>
+                            <m:r>
+                              <a:rPr lang="en-GB" i="1">
+                                <a:latin typeface="Cambria Math" panose="02040503050406030204" pitchFamily="18" charset="0"/>
+                              </a:rPr>
+                              <m:t>𝑘</m:t>
+                            </m:r>
+                          </m:e>
+                        </m:d>
+                      </m:e>
+                    </m:d>
+                  </m:oMath>
+                </a14:m>
+                <a:r>
+                  <a:rPr lang="en-GB" dirty="0" smtClean="0"/>
+                  <a:t> =</a:t>
+                </a:r>
+                <a:r>
+                  <a:rPr lang="en-GB" dirty="0"/>
+                  <a:t> </a:t>
+                </a:r>
+                <a14:m>
+                  <m:oMath xmlns:m="http://schemas.openxmlformats.org/officeDocument/2006/math">
+                    <m:r>
+                      <a:rPr lang="en-GB" i="1">
+                        <a:latin typeface="Cambria Math" panose="02040503050406030204" pitchFamily="18" charset="0"/>
+                      </a:rPr>
+                      <m:t>𝐸</m:t>
+                    </m:r>
+                    <m:d>
+                      <m:dPr>
+                        <m:begChr m:val="["/>
+                        <m:endChr m:val="]"/>
+                        <m:ctrlPr>
+                          <a:rPr lang="en-GB" i="1">
+                            <a:latin typeface="Cambria Math" panose="02040503050406030204" pitchFamily="18" charset="0"/>
+                          </a:rPr>
+                        </m:ctrlPr>
+                      </m:dPr>
+                      <m:e>
+                        <m:sSup>
+                          <m:sSupPr>
+                            <m:ctrlPr>
+                              <a:rPr lang="en-GB" i="1">
+                                <a:latin typeface="Cambria Math" panose="02040503050406030204" pitchFamily="18" charset="0"/>
+                              </a:rPr>
+                            </m:ctrlPr>
+                          </m:sSupPr>
+                          <m:e>
+                            <m:d>
+                              <m:dPr>
+                                <m:ctrlPr>
+                                  <a:rPr lang="en-GB" i="1">
+                                    <a:latin typeface="Cambria Math" panose="02040503050406030204" pitchFamily="18" charset="0"/>
+                                  </a:rPr>
+                                </m:ctrlPr>
+                              </m:dPr>
+                              <m:e>
+                                <m:r>
+                                  <a:rPr lang="en-GB" i="1">
+                                    <a:latin typeface="Cambria Math" panose="02040503050406030204" pitchFamily="18" charset="0"/>
+                                  </a:rPr>
+                                  <m:t>𝑦</m:t>
+                                </m:r>
+                                <m:d>
+                                  <m:dPr>
+                                    <m:ctrlPr>
+                                      <a:rPr lang="en-GB" i="1">
+                                        <a:latin typeface="Cambria Math" panose="02040503050406030204" pitchFamily="18" charset="0"/>
+                                      </a:rPr>
+                                    </m:ctrlPr>
+                                  </m:dPr>
+                                  <m:e>
+                                    <m:r>
+                                      <a:rPr lang="en-GB" i="1">
+                                        <a:latin typeface="Cambria Math" panose="02040503050406030204" pitchFamily="18" charset="0"/>
+                                      </a:rPr>
+                                      <m:t>𝑡</m:t>
+                                    </m:r>
+                                  </m:e>
+                                </m:d>
+                                <m:r>
+                                  <a:rPr lang="en-GB" i="1">
+                                    <a:latin typeface="Cambria Math" panose="02040503050406030204" pitchFamily="18" charset="0"/>
+                                  </a:rPr>
+                                  <m:t>−</m:t>
+                                </m:r>
+                                <m:r>
+                                  <a:rPr lang="en-GB" b="0" i="1" smtClean="0">
+                                    <a:latin typeface="Cambria Math" panose="02040503050406030204" pitchFamily="18" charset="0"/>
+                                  </a:rPr>
+                                  <m:t>𝐺𝑢</m:t>
+                                </m:r>
+                                <m:d>
+                                  <m:dPr>
+                                    <m:ctrlPr>
+                                      <a:rPr lang="en-GB" b="0" i="1" smtClean="0">
+                                        <a:latin typeface="Cambria Math" panose="02040503050406030204" pitchFamily="18" charset="0"/>
+                                      </a:rPr>
+                                    </m:ctrlPr>
+                                  </m:dPr>
+                                  <m:e>
+                                    <m:r>
+                                      <a:rPr lang="en-GB" b="0" i="1" smtClean="0">
+                                        <a:latin typeface="Cambria Math" panose="02040503050406030204" pitchFamily="18" charset="0"/>
+                                      </a:rPr>
+                                      <m:t>𝑡</m:t>
+                                    </m:r>
+                                    <m:r>
+                                      <a:rPr lang="en-GB" b="0" i="1" smtClean="0">
+                                        <a:latin typeface="Cambria Math" panose="02040503050406030204" pitchFamily="18" charset="0"/>
+                                      </a:rPr>
+                                      <m:t>−</m:t>
+                                    </m:r>
+                                    <m:r>
+                                      <a:rPr lang="en-GB" b="0" i="1" smtClean="0">
+                                        <a:latin typeface="Cambria Math" panose="02040503050406030204" pitchFamily="18" charset="0"/>
+                                      </a:rPr>
+                                      <m:t>𝑘</m:t>
+                                    </m:r>
+                                  </m:e>
+                                </m:d>
+                              </m:e>
+                            </m:d>
+                          </m:e>
+                          <m:sup>
+                            <m:r>
+                              <a:rPr lang="en-GB" i="1">
+                                <a:latin typeface="Cambria Math" panose="02040503050406030204" pitchFamily="18" charset="0"/>
+                              </a:rPr>
+                              <m:t>2</m:t>
+                            </m:r>
+                          </m:sup>
+                        </m:sSup>
+                      </m:e>
+                    </m:d>
+                    <m:r>
+                      <a:rPr lang="en-GB" b="0" i="1" smtClean="0">
+                        <a:latin typeface="Cambria Math" panose="02040503050406030204" pitchFamily="18" charset="0"/>
+                      </a:rPr>
+                      <m:t>≈</m:t>
+                    </m:r>
+                    <m:f>
+                      <m:fPr>
+                        <m:ctrlPr>
+                          <a:rPr lang="en-GB" b="0" i="1" smtClean="0">
+                            <a:latin typeface="Cambria Math" panose="02040503050406030204" pitchFamily="18" charset="0"/>
+                          </a:rPr>
+                        </m:ctrlPr>
+                      </m:fPr>
+                      <m:num>
+                        <m:r>
+                          <a:rPr lang="en-GB" b="0" i="1" smtClean="0">
+                            <a:latin typeface="Cambria Math" panose="02040503050406030204" pitchFamily="18" charset="0"/>
+                          </a:rPr>
+                          <m:t>1</m:t>
+                        </m:r>
+                      </m:num>
+                      <m:den>
+                        <m:r>
+                          <a:rPr lang="en-GB" b="0" i="1" smtClean="0">
+                            <a:latin typeface="Cambria Math" panose="02040503050406030204" pitchFamily="18" charset="0"/>
+                          </a:rPr>
+                          <m:t>𝑁</m:t>
+                        </m:r>
+                      </m:den>
+                    </m:f>
+                    <m:nary>
+                      <m:naryPr>
+                        <m:chr m:val="∑"/>
+                        <m:ctrlPr>
+                          <a:rPr lang="en-GB" b="0" i="1" smtClean="0">
+                            <a:latin typeface="Cambria Math" panose="02040503050406030204" pitchFamily="18" charset="0"/>
+                          </a:rPr>
+                        </m:ctrlPr>
+                      </m:naryPr>
+                      <m:sub>
+                        <m:r>
+                          <m:rPr>
+                            <m:brk m:alnAt="23"/>
+                          </m:rPr>
+                          <a:rPr lang="en-GB" b="0" i="1" smtClean="0">
+                            <a:latin typeface="Cambria Math" panose="02040503050406030204" pitchFamily="18" charset="0"/>
+                          </a:rPr>
+                          <m:t>𝑛</m:t>
+                        </m:r>
+                        <m:r>
+                          <a:rPr lang="en-GB" b="0" i="1" smtClean="0">
+                            <a:latin typeface="Cambria Math" panose="02040503050406030204" pitchFamily="18" charset="0"/>
+                          </a:rPr>
+                          <m:t>=1</m:t>
+                        </m:r>
+                      </m:sub>
+                      <m:sup>
+                        <m:r>
+                          <a:rPr lang="en-GB" b="0" i="1" smtClean="0">
+                            <a:latin typeface="Cambria Math" panose="02040503050406030204" pitchFamily="18" charset="0"/>
+                          </a:rPr>
+                          <m:t>𝑁</m:t>
+                        </m:r>
+                      </m:sup>
+                      <m:e>
+                        <m:sSup>
+                          <m:sSupPr>
+                            <m:ctrlPr>
+                              <a:rPr lang="en-GB" b="0" i="1" smtClean="0">
+                                <a:latin typeface="Cambria Math" panose="02040503050406030204" pitchFamily="18" charset="0"/>
+                              </a:rPr>
+                            </m:ctrlPr>
+                          </m:sSupPr>
+                          <m:e>
+                            <m:d>
+                              <m:dPr>
+                                <m:ctrlPr>
+                                  <a:rPr lang="en-GB" b="0" i="1" smtClean="0">
+                                    <a:latin typeface="Cambria Math" panose="02040503050406030204" pitchFamily="18" charset="0"/>
+                                  </a:rPr>
+                                </m:ctrlPr>
+                              </m:dPr>
+                              <m:e>
+                                <m:r>
+                                  <a:rPr lang="en-GB" b="0" i="1" smtClean="0">
+                                    <a:latin typeface="Cambria Math" panose="02040503050406030204" pitchFamily="18" charset="0"/>
+                                  </a:rPr>
+                                  <m:t>𝑦</m:t>
+                                </m:r>
+                                <m:d>
+                                  <m:dPr>
+                                    <m:ctrlPr>
+                                      <a:rPr lang="en-GB" b="0" i="1" smtClean="0">
+                                        <a:latin typeface="Cambria Math" panose="02040503050406030204" pitchFamily="18" charset="0"/>
+                                      </a:rPr>
+                                    </m:ctrlPr>
+                                  </m:dPr>
+                                  <m:e>
+                                    <m:r>
+                                      <a:rPr lang="en-GB" b="0" i="1" smtClean="0">
+                                        <a:latin typeface="Cambria Math" panose="02040503050406030204" pitchFamily="18" charset="0"/>
+                                      </a:rPr>
+                                      <m:t>𝑡</m:t>
+                                    </m:r>
+                                  </m:e>
+                                </m:d>
+                                <m:r>
+                                  <a:rPr lang="en-GB" b="0" i="1" smtClean="0">
+                                    <a:latin typeface="Cambria Math" panose="02040503050406030204" pitchFamily="18" charset="0"/>
+                                  </a:rPr>
+                                  <m:t>−</m:t>
+                                </m:r>
+                                <m:r>
+                                  <a:rPr lang="en-GB" b="0" i="1" smtClean="0">
+                                    <a:latin typeface="Cambria Math" panose="02040503050406030204" pitchFamily="18" charset="0"/>
+                                  </a:rPr>
+                                  <m:t>𝐺</m:t>
+                                </m:r>
+                                <m:d>
+                                  <m:dPr>
+                                    <m:ctrlPr>
+                                      <a:rPr lang="en-GB" b="0" i="1" smtClean="0">
+                                        <a:latin typeface="Cambria Math" panose="02040503050406030204" pitchFamily="18" charset="0"/>
+                                      </a:rPr>
+                                    </m:ctrlPr>
+                                  </m:dPr>
+                                  <m:e>
+                                    <m:sSup>
+                                      <m:sSupPr>
+                                        <m:ctrlPr>
+                                          <a:rPr lang="en-GB" b="0" i="1" smtClean="0">
+                                            <a:latin typeface="Cambria Math" panose="02040503050406030204" pitchFamily="18" charset="0"/>
+                                          </a:rPr>
+                                        </m:ctrlPr>
+                                      </m:sSupPr>
+                                      <m:e>
+                                        <m:r>
+                                          <a:rPr lang="en-GB" b="0" i="1" smtClean="0">
+                                            <a:latin typeface="Cambria Math" panose="02040503050406030204" pitchFamily="18" charset="0"/>
+                                          </a:rPr>
+                                          <m:t>𝑧</m:t>
+                                        </m:r>
+                                      </m:e>
+                                      <m:sup>
+                                        <m:r>
+                                          <a:rPr lang="en-GB" b="0" i="1" smtClean="0">
+                                            <a:latin typeface="Cambria Math" panose="02040503050406030204" pitchFamily="18" charset="0"/>
+                                          </a:rPr>
+                                          <m:t>−1</m:t>
+                                        </m:r>
+                                      </m:sup>
+                                    </m:sSup>
+                                    <m:r>
+                                      <a:rPr lang="en-GB" b="0" i="1" smtClean="0">
+                                        <a:latin typeface="Cambria Math" panose="02040503050406030204" pitchFamily="18" charset="0"/>
+                                      </a:rPr>
+                                      <m:t>,</m:t>
+                                    </m:r>
+                                    <m:r>
+                                      <a:rPr lang="en-GB" b="0" i="1" smtClean="0">
+                                        <a:latin typeface="Cambria Math" panose="02040503050406030204" pitchFamily="18" charset="0"/>
+                                      </a:rPr>
+                                      <m:t>𝜃</m:t>
+                                    </m:r>
+                                  </m:e>
+                                </m:d>
+                                <m:r>
+                                  <a:rPr lang="en-GB" b="0" i="1" smtClean="0">
+                                    <a:latin typeface="Cambria Math" panose="02040503050406030204" pitchFamily="18" charset="0"/>
+                                  </a:rPr>
+                                  <m:t>𝑢</m:t>
+                                </m:r>
+                                <m:d>
+                                  <m:dPr>
+                                    <m:ctrlPr>
+                                      <a:rPr lang="en-GB" b="0" i="1" smtClean="0">
+                                        <a:latin typeface="Cambria Math" panose="02040503050406030204" pitchFamily="18" charset="0"/>
+                                      </a:rPr>
+                                    </m:ctrlPr>
+                                  </m:dPr>
+                                  <m:e>
+                                    <m:r>
+                                      <a:rPr lang="en-GB" b="0" i="1" smtClean="0">
+                                        <a:latin typeface="Cambria Math" panose="02040503050406030204" pitchFamily="18" charset="0"/>
+                                      </a:rPr>
+                                      <m:t>𝑡</m:t>
+                                    </m:r>
+                                    <m:r>
+                                      <a:rPr lang="en-GB" b="0" i="1" smtClean="0">
+                                        <a:latin typeface="Cambria Math" panose="02040503050406030204" pitchFamily="18" charset="0"/>
+                                      </a:rPr>
+                                      <m:t>−</m:t>
+                                    </m:r>
+                                    <m:r>
+                                      <a:rPr lang="en-GB" b="0" i="1" smtClean="0">
+                                        <a:latin typeface="Cambria Math" panose="02040503050406030204" pitchFamily="18" charset="0"/>
+                                      </a:rPr>
+                                      <m:t>𝑘</m:t>
+                                    </m:r>
+                                  </m:e>
+                                </m:d>
+                              </m:e>
+                            </m:d>
+                          </m:e>
+                          <m:sup>
+                            <m:r>
+                              <a:rPr lang="en-GB" b="0" i="1" smtClean="0">
+                                <a:latin typeface="Cambria Math" panose="02040503050406030204" pitchFamily="18" charset="0"/>
+                              </a:rPr>
+                              <m:t>2</m:t>
+                            </m:r>
+                          </m:sup>
+                        </m:sSup>
+                      </m:e>
+                    </m:nary>
+                    <m:r>
+                      <a:rPr lang="en-GB" b="0" i="1" smtClean="0">
+                        <a:latin typeface="Cambria Math" panose="02040503050406030204" pitchFamily="18" charset="0"/>
+                      </a:rPr>
+                      <m:t>=</m:t>
+                    </m:r>
+                    <m:r>
+                      <a:rPr lang="en-GB" b="0" i="1" smtClean="0">
+                        <a:latin typeface="Cambria Math" panose="02040503050406030204" pitchFamily="18" charset="0"/>
+                      </a:rPr>
+                      <m:t>𝐽</m:t>
+                    </m:r>
+                    <m:d>
+                      <m:dPr>
+                        <m:ctrlPr>
+                          <a:rPr lang="en-GB" b="0" i="1" smtClean="0">
+                            <a:latin typeface="Cambria Math" panose="02040503050406030204" pitchFamily="18" charset="0"/>
+                          </a:rPr>
+                        </m:ctrlPr>
+                      </m:dPr>
+                      <m:e>
+                        <m:r>
+                          <a:rPr lang="en-GB" b="0" i="1" smtClean="0">
+                            <a:latin typeface="Cambria Math" panose="02040503050406030204" pitchFamily="18" charset="0"/>
+                          </a:rPr>
+                          <m:t>𝜃</m:t>
+                        </m:r>
+                      </m:e>
+                    </m:d>
+                  </m:oMath>
+                </a14:m>
+                <a:endParaRPr lang="en-GB" dirty="0" smtClean="0"/>
+              </a:p>
+              <a:p>
+                <a:r>
+                  <a:rPr lang="en-GB" dirty="0"/>
+                  <a:t>(</a:t>
+                </a:r>
+                <a:r>
+                  <a:rPr lang="en-GB" dirty="0" smtClean="0"/>
+                  <a:t> and  for the asymptotic </a:t>
+                </a:r>
+                <a:r>
+                  <a:rPr lang="en-GB" dirty="0" err="1" smtClean="0"/>
+                  <a:t>pem</a:t>
+                </a:r>
+                <a:r>
+                  <a:rPr lang="en-GB" dirty="0" smtClean="0"/>
+                  <a:t> theory we have uniform convergence for </a:t>
+                </a:r>
+                <a14:m>
+                  <m:oMath xmlns:m="http://schemas.openxmlformats.org/officeDocument/2006/math">
+                    <m:r>
+                      <a:rPr lang="en-GB" b="0" i="1" smtClean="0">
+                        <a:latin typeface="Cambria Math" panose="02040503050406030204" pitchFamily="18" charset="0"/>
+                      </a:rPr>
+                      <m:t>𝑁</m:t>
+                    </m:r>
+                    <m:r>
+                      <a:rPr lang="en-GB" b="0" i="1" smtClean="0">
+                        <a:latin typeface="Cambria Math" panose="02040503050406030204" pitchFamily="18" charset="0"/>
+                      </a:rPr>
+                      <m:t>→∞</m:t>
+                    </m:r>
+                  </m:oMath>
+                </a14:m>
+                <a:r>
+                  <a:rPr lang="en-GB" dirty="0" smtClean="0"/>
+                  <a:t>) .</a:t>
+                </a:r>
+              </a:p>
+              <a:p>
+                <a:endParaRPr lang="en-GB" dirty="0"/>
+              </a:p>
+              <a:p>
+                <a:r>
+                  <a:rPr lang="en-GB" dirty="0" smtClean="0"/>
+                  <a:t>Call </a:t>
+                </a:r>
+                <a14:m>
+                  <m:oMath xmlns:m="http://schemas.openxmlformats.org/officeDocument/2006/math">
+                    <m:r>
+                      <a:rPr lang="en-GB" b="0" i="1" smtClean="0">
+                        <a:latin typeface="Cambria Math" panose="02040503050406030204" pitchFamily="18" charset="0"/>
+                      </a:rPr>
+                      <m:t>𝐺</m:t>
+                    </m:r>
+                    <m:d>
+                      <m:dPr>
+                        <m:ctrlPr>
+                          <a:rPr lang="en-GB" b="0" i="1" smtClean="0">
+                            <a:latin typeface="Cambria Math" panose="02040503050406030204" pitchFamily="18" charset="0"/>
+                          </a:rPr>
+                        </m:ctrlPr>
+                      </m:dPr>
+                      <m:e>
+                        <m:sSup>
+                          <m:sSupPr>
+                            <m:ctrlPr>
+                              <a:rPr lang="en-GB" b="0" i="1" smtClean="0">
+                                <a:latin typeface="Cambria Math" panose="02040503050406030204" pitchFamily="18" charset="0"/>
+                              </a:rPr>
+                            </m:ctrlPr>
+                          </m:sSupPr>
+                          <m:e>
+                            <m:r>
+                              <a:rPr lang="en-GB" b="0" i="1" smtClean="0">
+                                <a:latin typeface="Cambria Math" panose="02040503050406030204" pitchFamily="18" charset="0"/>
+                              </a:rPr>
+                              <m:t>𝑧</m:t>
+                            </m:r>
+                          </m:e>
+                          <m:sup>
+                            <m:r>
+                              <a:rPr lang="en-GB" b="0" i="1" smtClean="0">
+                                <a:latin typeface="Cambria Math" panose="02040503050406030204" pitchFamily="18" charset="0"/>
+                              </a:rPr>
+                              <m:t>−1</m:t>
+                            </m:r>
+                          </m:sup>
+                        </m:sSup>
+                        <m:r>
+                          <a:rPr lang="en-GB" b="0" i="1" smtClean="0">
+                            <a:latin typeface="Cambria Math" panose="02040503050406030204" pitchFamily="18" charset="0"/>
+                          </a:rPr>
+                          <m:t>,</m:t>
+                        </m:r>
+                        <m:r>
+                          <a:rPr lang="en-GB" b="0" i="1" smtClean="0">
+                            <a:latin typeface="Cambria Math" panose="02040503050406030204" pitchFamily="18" charset="0"/>
+                          </a:rPr>
+                          <m:t>𝜃</m:t>
+                        </m:r>
+                      </m:e>
+                    </m:d>
+                    <m:r>
+                      <a:rPr lang="en-GB" b="0" i="1" smtClean="0">
+                        <a:latin typeface="Cambria Math" panose="02040503050406030204" pitchFamily="18" charset="0"/>
+                      </a:rPr>
+                      <m:t>=</m:t>
+                    </m:r>
+                    <m:f>
+                      <m:fPr>
+                        <m:ctrlPr>
+                          <a:rPr lang="en-GB" b="0" i="1" smtClean="0">
+                            <a:latin typeface="Cambria Math" panose="02040503050406030204" pitchFamily="18" charset="0"/>
+                          </a:rPr>
+                        </m:ctrlPr>
+                      </m:fPr>
+                      <m:num>
+                        <m:sSubSup>
+                          <m:sSubSupPr>
+                            <m:ctrlPr>
+                              <a:rPr lang="en-GB" b="0" i="1" smtClean="0">
+                                <a:latin typeface="Cambria Math" panose="02040503050406030204" pitchFamily="18" charset="0"/>
+                              </a:rPr>
+                            </m:ctrlPr>
+                          </m:sSubSupPr>
+                          <m:e>
+                            <m:r>
+                              <a:rPr lang="en-GB" b="0" i="1" smtClean="0">
+                                <a:latin typeface="Cambria Math" panose="02040503050406030204" pitchFamily="18" charset="0"/>
+                              </a:rPr>
+                              <m:t>𝜃</m:t>
+                            </m:r>
+                          </m:e>
+                          <m:sub>
+                            <m:r>
+                              <a:rPr lang="en-GB" b="0" i="1" smtClean="0">
+                                <a:latin typeface="Cambria Math" panose="02040503050406030204" pitchFamily="18" charset="0"/>
+                              </a:rPr>
+                              <m:t>1</m:t>
+                            </m:r>
+                          </m:sub>
+                          <m:sup>
+                            <m:r>
+                              <a:rPr lang="en-GB" b="0" i="1" smtClean="0">
+                                <a:latin typeface="Cambria Math" panose="02040503050406030204" pitchFamily="18" charset="0"/>
+                              </a:rPr>
+                              <m:t>𝑇</m:t>
+                            </m:r>
+                          </m:sup>
+                        </m:sSubSup>
+                        <m:sSub>
+                          <m:sSubPr>
+                            <m:ctrlPr>
+                              <a:rPr lang="en-GB" b="0" i="1" smtClean="0">
+                                <a:latin typeface="Cambria Math" panose="02040503050406030204" pitchFamily="18" charset="0"/>
+                              </a:rPr>
+                            </m:ctrlPr>
+                          </m:sSubPr>
+                          <m:e>
+                            <m:r>
+                              <a:rPr lang="en-GB" b="0" i="1" smtClean="0">
+                                <a:latin typeface="Cambria Math" panose="02040503050406030204" pitchFamily="18" charset="0"/>
+                              </a:rPr>
+                              <m:t>𝑧</m:t>
+                            </m:r>
+                          </m:e>
+                          <m:sub>
+                            <m:r>
+                              <a:rPr lang="en-GB" b="0" i="1" smtClean="0">
+                                <a:latin typeface="Cambria Math" panose="02040503050406030204" pitchFamily="18" charset="0"/>
+                              </a:rPr>
+                              <m:t>1</m:t>
+                            </m:r>
+                          </m:sub>
+                        </m:sSub>
+                      </m:num>
+                      <m:den>
+                        <m:sSubSup>
+                          <m:sSubSupPr>
+                            <m:ctrlPr>
+                              <a:rPr lang="en-GB" b="0" i="1" smtClean="0">
+                                <a:latin typeface="Cambria Math" panose="02040503050406030204" pitchFamily="18" charset="0"/>
+                              </a:rPr>
+                            </m:ctrlPr>
+                          </m:sSubSupPr>
+                          <m:e>
+                            <m:r>
+                              <a:rPr lang="en-GB" b="0" i="1" smtClean="0">
+                                <a:latin typeface="Cambria Math" panose="02040503050406030204" pitchFamily="18" charset="0"/>
+                              </a:rPr>
+                              <m:t>𝜃</m:t>
+                            </m:r>
+                          </m:e>
+                          <m:sub>
+                            <m:r>
+                              <a:rPr lang="en-GB" b="0" i="1" smtClean="0">
+                                <a:latin typeface="Cambria Math" panose="02040503050406030204" pitchFamily="18" charset="0"/>
+                              </a:rPr>
+                              <m:t>2</m:t>
+                            </m:r>
+                          </m:sub>
+                          <m:sup>
+                            <m:r>
+                              <a:rPr lang="en-GB" b="0" i="1" smtClean="0">
+                                <a:latin typeface="Cambria Math" panose="02040503050406030204" pitchFamily="18" charset="0"/>
+                              </a:rPr>
+                              <m:t>𝑇</m:t>
+                            </m:r>
+                          </m:sup>
+                        </m:sSubSup>
+                        <m:sSub>
+                          <m:sSubPr>
+                            <m:ctrlPr>
+                              <a:rPr lang="en-GB" b="0" i="1" smtClean="0">
+                                <a:latin typeface="Cambria Math" panose="02040503050406030204" pitchFamily="18" charset="0"/>
+                              </a:rPr>
+                            </m:ctrlPr>
+                          </m:sSubPr>
+                          <m:e>
+                            <m:r>
+                              <a:rPr lang="en-GB" b="0" i="1" smtClean="0">
+                                <a:latin typeface="Cambria Math" panose="02040503050406030204" pitchFamily="18" charset="0"/>
+                              </a:rPr>
+                              <m:t>𝑧</m:t>
+                            </m:r>
+                          </m:e>
+                          <m:sub>
+                            <m:r>
+                              <a:rPr lang="en-GB" b="0" i="1" smtClean="0">
+                                <a:latin typeface="Cambria Math" panose="02040503050406030204" pitchFamily="18" charset="0"/>
+                              </a:rPr>
+                              <m:t>2</m:t>
+                            </m:r>
+                          </m:sub>
+                        </m:sSub>
+                      </m:den>
+                    </m:f>
+                    <m:r>
+                      <a:rPr lang="en-GB" b="0" i="1" smtClean="0">
+                        <a:latin typeface="Cambria Math" panose="02040503050406030204" pitchFamily="18" charset="0"/>
+                      </a:rPr>
+                      <m:t> , </m:t>
+                    </m:r>
+                    <m:r>
+                      <a:rPr lang="en-GB" b="0" i="1" smtClean="0">
+                        <a:latin typeface="Cambria Math" panose="02040503050406030204" pitchFamily="18" charset="0"/>
+                      </a:rPr>
+                      <m:t>𝜖</m:t>
+                    </m:r>
+                    <m:d>
+                      <m:dPr>
+                        <m:ctrlPr>
+                          <a:rPr lang="en-GB" b="0" i="1" smtClean="0">
+                            <a:latin typeface="Cambria Math" panose="02040503050406030204" pitchFamily="18" charset="0"/>
+                          </a:rPr>
+                        </m:ctrlPr>
+                      </m:dPr>
+                      <m:e>
+                        <m:r>
+                          <a:rPr lang="en-GB" b="0" i="1" smtClean="0">
+                            <a:latin typeface="Cambria Math" panose="02040503050406030204" pitchFamily="18" charset="0"/>
+                          </a:rPr>
+                          <m:t>𝑡</m:t>
+                        </m:r>
+                      </m:e>
+                    </m:d>
+                    <m:r>
+                      <a:rPr lang="en-GB" b="0" i="1" smtClean="0">
+                        <a:latin typeface="Cambria Math" panose="02040503050406030204" pitchFamily="18" charset="0"/>
+                      </a:rPr>
+                      <m:t>=</m:t>
+                    </m:r>
+                    <m:r>
+                      <a:rPr lang="en-GB" b="0" i="1" smtClean="0">
+                        <a:latin typeface="Cambria Math" panose="02040503050406030204" pitchFamily="18" charset="0"/>
+                      </a:rPr>
+                      <m:t>𝑦</m:t>
+                    </m:r>
+                    <m:d>
+                      <m:dPr>
+                        <m:ctrlPr>
+                          <a:rPr lang="en-GB" b="0" i="1" smtClean="0">
+                            <a:latin typeface="Cambria Math" panose="02040503050406030204" pitchFamily="18" charset="0"/>
+                          </a:rPr>
+                        </m:ctrlPr>
+                      </m:dPr>
+                      <m:e>
+                        <m:r>
+                          <a:rPr lang="en-GB" b="0" i="1" smtClean="0">
+                            <a:latin typeface="Cambria Math" panose="02040503050406030204" pitchFamily="18" charset="0"/>
+                          </a:rPr>
+                          <m:t>𝑡</m:t>
+                        </m:r>
+                      </m:e>
+                    </m:d>
+                    <m:r>
+                      <a:rPr lang="en-GB" b="0" i="1" smtClean="0">
+                        <a:latin typeface="Cambria Math" panose="02040503050406030204" pitchFamily="18" charset="0"/>
+                      </a:rPr>
+                      <m:t>−</m:t>
+                    </m:r>
+                    <m:f>
+                      <m:fPr>
+                        <m:ctrlPr>
+                          <a:rPr lang="en-GB" i="1">
+                            <a:latin typeface="Cambria Math" panose="02040503050406030204" pitchFamily="18" charset="0"/>
+                          </a:rPr>
+                        </m:ctrlPr>
+                      </m:fPr>
+                      <m:num>
+                        <m:sSubSup>
+                          <m:sSubSupPr>
+                            <m:ctrlPr>
+                              <a:rPr lang="en-GB" i="1">
+                                <a:latin typeface="Cambria Math" panose="02040503050406030204" pitchFamily="18" charset="0"/>
+                              </a:rPr>
+                            </m:ctrlPr>
+                          </m:sSubSupPr>
+                          <m:e>
+                            <m:r>
+                              <a:rPr lang="en-GB" i="1">
+                                <a:latin typeface="Cambria Math" panose="02040503050406030204" pitchFamily="18" charset="0"/>
+                              </a:rPr>
+                              <m:t>𝜃</m:t>
+                            </m:r>
+                          </m:e>
+                          <m:sub>
+                            <m:r>
+                              <a:rPr lang="en-GB" i="1">
+                                <a:latin typeface="Cambria Math" panose="02040503050406030204" pitchFamily="18" charset="0"/>
+                              </a:rPr>
+                              <m:t>1</m:t>
+                            </m:r>
+                          </m:sub>
+                          <m:sup>
+                            <m:r>
+                              <a:rPr lang="en-GB" i="1">
+                                <a:latin typeface="Cambria Math" panose="02040503050406030204" pitchFamily="18" charset="0"/>
+                              </a:rPr>
+                              <m:t>𝑇</m:t>
+                            </m:r>
+                          </m:sup>
+                        </m:sSubSup>
+                        <m:sSub>
+                          <m:sSubPr>
+                            <m:ctrlPr>
+                              <a:rPr lang="en-GB" i="1">
+                                <a:latin typeface="Cambria Math" panose="02040503050406030204" pitchFamily="18" charset="0"/>
+                              </a:rPr>
+                            </m:ctrlPr>
+                          </m:sSubPr>
+                          <m:e>
+                            <m:r>
+                              <a:rPr lang="en-GB" i="1">
+                                <a:latin typeface="Cambria Math" panose="02040503050406030204" pitchFamily="18" charset="0"/>
+                              </a:rPr>
+                              <m:t>𝑧</m:t>
+                            </m:r>
+                          </m:e>
+                          <m:sub>
+                            <m:r>
+                              <a:rPr lang="en-GB" i="1">
+                                <a:latin typeface="Cambria Math" panose="02040503050406030204" pitchFamily="18" charset="0"/>
+                              </a:rPr>
+                              <m:t>1</m:t>
+                            </m:r>
+                          </m:sub>
+                        </m:sSub>
+                      </m:num>
+                      <m:den>
+                        <m:sSubSup>
+                          <m:sSubSupPr>
+                            <m:ctrlPr>
+                              <a:rPr lang="en-GB" i="1">
+                                <a:latin typeface="Cambria Math" panose="02040503050406030204" pitchFamily="18" charset="0"/>
+                              </a:rPr>
+                            </m:ctrlPr>
+                          </m:sSubSupPr>
+                          <m:e>
+                            <m:r>
+                              <a:rPr lang="en-GB" i="1">
+                                <a:latin typeface="Cambria Math" panose="02040503050406030204" pitchFamily="18" charset="0"/>
+                              </a:rPr>
+                              <m:t>𝜃</m:t>
+                            </m:r>
+                          </m:e>
+                          <m:sub>
+                            <m:r>
+                              <a:rPr lang="en-GB" i="1">
+                                <a:latin typeface="Cambria Math" panose="02040503050406030204" pitchFamily="18" charset="0"/>
+                              </a:rPr>
+                              <m:t>2</m:t>
+                            </m:r>
+                          </m:sub>
+                          <m:sup>
+                            <m:r>
+                              <a:rPr lang="en-GB" i="1">
+                                <a:latin typeface="Cambria Math" panose="02040503050406030204" pitchFamily="18" charset="0"/>
+                              </a:rPr>
+                              <m:t>𝑇</m:t>
+                            </m:r>
+                          </m:sup>
+                        </m:sSubSup>
+                        <m:sSub>
+                          <m:sSubPr>
+                            <m:ctrlPr>
+                              <a:rPr lang="en-GB" i="1">
+                                <a:latin typeface="Cambria Math" panose="02040503050406030204" pitchFamily="18" charset="0"/>
+                              </a:rPr>
+                            </m:ctrlPr>
+                          </m:sSubPr>
+                          <m:e>
+                            <m:r>
+                              <a:rPr lang="en-GB" i="1">
+                                <a:latin typeface="Cambria Math" panose="02040503050406030204" pitchFamily="18" charset="0"/>
+                              </a:rPr>
+                              <m:t>𝑧</m:t>
+                            </m:r>
+                          </m:e>
+                          <m:sub>
+                            <m:r>
+                              <a:rPr lang="en-GB" i="1">
+                                <a:latin typeface="Cambria Math" panose="02040503050406030204" pitchFamily="18" charset="0"/>
+                              </a:rPr>
+                              <m:t>2</m:t>
+                            </m:r>
+                          </m:sub>
+                        </m:sSub>
+                      </m:den>
+                    </m:f>
+                    <m:r>
+                      <a:rPr lang="en-GB" b="0" i="1" smtClean="0">
+                        <a:latin typeface="Cambria Math" panose="02040503050406030204" pitchFamily="18" charset="0"/>
+                      </a:rPr>
+                      <m:t>𝑢</m:t>
+                    </m:r>
+                    <m:d>
+                      <m:dPr>
+                        <m:ctrlPr>
+                          <a:rPr lang="en-GB" b="0" i="1" smtClean="0">
+                            <a:latin typeface="Cambria Math" panose="02040503050406030204" pitchFamily="18" charset="0"/>
+                          </a:rPr>
+                        </m:ctrlPr>
+                      </m:dPr>
+                      <m:e>
+                        <m:r>
+                          <a:rPr lang="en-GB" b="0" i="1" smtClean="0">
+                            <a:latin typeface="Cambria Math" panose="02040503050406030204" pitchFamily="18" charset="0"/>
+                          </a:rPr>
+                          <m:t>𝑡</m:t>
+                        </m:r>
+                        <m:r>
+                          <a:rPr lang="en-GB" b="0" i="1" smtClean="0">
+                            <a:latin typeface="Cambria Math" panose="02040503050406030204" pitchFamily="18" charset="0"/>
+                          </a:rPr>
+                          <m:t>−</m:t>
+                        </m:r>
+                        <m:r>
+                          <a:rPr lang="en-GB" b="0" i="1" smtClean="0">
+                            <a:latin typeface="Cambria Math" panose="02040503050406030204" pitchFamily="18" charset="0"/>
+                          </a:rPr>
+                          <m:t>𝑘</m:t>
+                        </m:r>
+                      </m:e>
+                    </m:d>
+                    <m:r>
+                      <a:rPr lang="en-GB" b="0" i="1" smtClean="0">
+                        <a:latin typeface="Cambria Math" panose="02040503050406030204" pitchFamily="18" charset="0"/>
+                      </a:rPr>
+                      <m:t>⇒</m:t>
+                    </m:r>
+                    <m:sSubSup>
+                      <m:sSubSupPr>
+                        <m:ctrlPr>
+                          <a:rPr lang="en-GB" b="0" i="1" smtClean="0">
+                            <a:latin typeface="Cambria Math" panose="02040503050406030204" pitchFamily="18" charset="0"/>
+                          </a:rPr>
+                        </m:ctrlPr>
+                      </m:sSubSupPr>
+                      <m:e>
+                        <m:r>
+                          <a:rPr lang="en-GB" b="0" i="1" smtClean="0">
+                            <a:latin typeface="Cambria Math" panose="02040503050406030204" pitchFamily="18" charset="0"/>
+                          </a:rPr>
+                          <m:t>𝜃</m:t>
+                        </m:r>
+                      </m:e>
+                      <m:sub>
+                        <m:r>
+                          <a:rPr lang="en-GB" b="0" i="1" smtClean="0">
+                            <a:latin typeface="Cambria Math" panose="02040503050406030204" pitchFamily="18" charset="0"/>
+                          </a:rPr>
+                          <m:t>2</m:t>
+                        </m:r>
+                      </m:sub>
+                      <m:sup>
+                        <m:r>
+                          <a:rPr lang="en-GB" b="0" i="1" smtClean="0">
+                            <a:latin typeface="Cambria Math" panose="02040503050406030204" pitchFamily="18" charset="0"/>
+                          </a:rPr>
+                          <m:t>𝑇</m:t>
+                        </m:r>
+                      </m:sup>
+                    </m:sSubSup>
+                    <m:sSub>
+                      <m:sSubPr>
+                        <m:ctrlPr>
+                          <a:rPr lang="en-GB" b="0" i="1" smtClean="0">
+                            <a:latin typeface="Cambria Math" panose="02040503050406030204" pitchFamily="18" charset="0"/>
+                          </a:rPr>
+                        </m:ctrlPr>
+                      </m:sSubPr>
+                      <m:e>
+                        <m:r>
+                          <a:rPr lang="en-GB" b="0" i="1" smtClean="0">
+                            <a:latin typeface="Cambria Math" panose="02040503050406030204" pitchFamily="18" charset="0"/>
+                          </a:rPr>
+                          <m:t>𝑧</m:t>
+                        </m:r>
+                      </m:e>
+                      <m:sub>
+                        <m:r>
+                          <a:rPr lang="en-GB" b="0" i="1" smtClean="0">
+                            <a:latin typeface="Cambria Math" panose="02040503050406030204" pitchFamily="18" charset="0"/>
+                          </a:rPr>
+                          <m:t>2</m:t>
+                        </m:r>
+                      </m:sub>
+                    </m:sSub>
+                    <m:r>
+                      <a:rPr lang="en-GB" b="0" i="1" smtClean="0">
+                        <a:latin typeface="Cambria Math" panose="02040503050406030204" pitchFamily="18" charset="0"/>
+                      </a:rPr>
+                      <m:t>𝜖</m:t>
+                    </m:r>
+                    <m:d>
+                      <m:dPr>
+                        <m:ctrlPr>
+                          <a:rPr lang="en-GB" b="0" i="1" smtClean="0">
+                            <a:latin typeface="Cambria Math" panose="02040503050406030204" pitchFamily="18" charset="0"/>
+                          </a:rPr>
+                        </m:ctrlPr>
+                      </m:dPr>
+                      <m:e>
+                        <m:r>
+                          <a:rPr lang="en-GB" b="0" i="1" smtClean="0">
+                            <a:latin typeface="Cambria Math" panose="02040503050406030204" pitchFamily="18" charset="0"/>
+                          </a:rPr>
+                          <m:t>𝑡</m:t>
+                        </m:r>
+                      </m:e>
+                    </m:d>
+                    <m:r>
+                      <a:rPr lang="en-GB" b="0" i="1" smtClean="0">
+                        <a:latin typeface="Cambria Math" panose="02040503050406030204" pitchFamily="18" charset="0"/>
+                      </a:rPr>
+                      <m:t>=</m:t>
+                    </m:r>
+                    <m:sSubSup>
+                      <m:sSubSupPr>
+                        <m:ctrlPr>
+                          <a:rPr lang="en-GB" i="1">
+                            <a:latin typeface="Cambria Math" panose="02040503050406030204" pitchFamily="18" charset="0"/>
+                          </a:rPr>
+                        </m:ctrlPr>
+                      </m:sSubSupPr>
+                      <m:e>
+                        <m:r>
+                          <a:rPr lang="en-GB" i="1">
+                            <a:latin typeface="Cambria Math" panose="02040503050406030204" pitchFamily="18" charset="0"/>
+                          </a:rPr>
+                          <m:t>𝜃</m:t>
+                        </m:r>
+                      </m:e>
+                      <m:sub>
+                        <m:r>
+                          <a:rPr lang="en-GB" i="1">
+                            <a:latin typeface="Cambria Math" panose="02040503050406030204" pitchFamily="18" charset="0"/>
+                          </a:rPr>
+                          <m:t>2</m:t>
+                        </m:r>
+                      </m:sub>
+                      <m:sup>
+                        <m:r>
+                          <a:rPr lang="en-GB" i="1">
+                            <a:latin typeface="Cambria Math" panose="02040503050406030204" pitchFamily="18" charset="0"/>
+                          </a:rPr>
+                          <m:t>𝑇</m:t>
+                        </m:r>
+                      </m:sup>
+                    </m:sSubSup>
+                    <m:sSub>
+                      <m:sSubPr>
+                        <m:ctrlPr>
+                          <a:rPr lang="en-GB" i="1">
+                            <a:latin typeface="Cambria Math" panose="02040503050406030204" pitchFamily="18" charset="0"/>
+                          </a:rPr>
+                        </m:ctrlPr>
+                      </m:sSubPr>
+                      <m:e>
+                        <m:r>
+                          <a:rPr lang="en-GB" i="1">
+                            <a:latin typeface="Cambria Math" panose="02040503050406030204" pitchFamily="18" charset="0"/>
+                          </a:rPr>
+                          <m:t>𝑧</m:t>
+                        </m:r>
+                      </m:e>
+                      <m:sub>
+                        <m:r>
+                          <a:rPr lang="en-GB" i="1">
+                            <a:latin typeface="Cambria Math" panose="02040503050406030204" pitchFamily="18" charset="0"/>
+                          </a:rPr>
+                          <m:t>2</m:t>
+                        </m:r>
+                      </m:sub>
+                    </m:sSub>
+                    <m:r>
+                      <a:rPr lang="en-GB" i="1">
+                        <a:latin typeface="Cambria Math" panose="02040503050406030204" pitchFamily="18" charset="0"/>
+                      </a:rPr>
+                      <m:t>𝑦</m:t>
+                    </m:r>
+                    <m:d>
+                      <m:dPr>
+                        <m:ctrlPr>
+                          <a:rPr lang="en-GB" i="1">
+                            <a:latin typeface="Cambria Math" panose="02040503050406030204" pitchFamily="18" charset="0"/>
+                          </a:rPr>
+                        </m:ctrlPr>
+                      </m:dPr>
+                      <m:e>
+                        <m:r>
+                          <a:rPr lang="en-GB" i="1">
+                            <a:latin typeface="Cambria Math" panose="02040503050406030204" pitchFamily="18" charset="0"/>
+                          </a:rPr>
+                          <m:t>𝑡</m:t>
+                        </m:r>
+                      </m:e>
+                    </m:d>
+                    <m:r>
+                      <a:rPr lang="en-GB" i="1">
+                        <a:latin typeface="Cambria Math" panose="02040503050406030204" pitchFamily="18" charset="0"/>
+                      </a:rPr>
+                      <m:t>−</m:t>
+                    </m:r>
+                    <m:sSubSup>
+                      <m:sSubSupPr>
+                        <m:ctrlPr>
+                          <a:rPr lang="en-GB" i="1">
+                            <a:latin typeface="Cambria Math" panose="02040503050406030204" pitchFamily="18" charset="0"/>
+                          </a:rPr>
+                        </m:ctrlPr>
+                      </m:sSubSupPr>
+                      <m:e>
+                        <m:r>
+                          <a:rPr lang="en-GB" i="1">
+                            <a:latin typeface="Cambria Math" panose="02040503050406030204" pitchFamily="18" charset="0"/>
+                          </a:rPr>
+                          <m:t>𝜃</m:t>
+                        </m:r>
+                      </m:e>
+                      <m:sub>
+                        <m:r>
+                          <a:rPr lang="en-GB" i="1">
+                            <a:latin typeface="Cambria Math" panose="02040503050406030204" pitchFamily="18" charset="0"/>
+                          </a:rPr>
+                          <m:t>1</m:t>
+                        </m:r>
+                      </m:sub>
+                      <m:sup>
+                        <m:r>
+                          <a:rPr lang="en-GB" i="1">
+                            <a:latin typeface="Cambria Math" panose="02040503050406030204" pitchFamily="18" charset="0"/>
+                          </a:rPr>
+                          <m:t>𝑇</m:t>
+                        </m:r>
+                      </m:sup>
+                    </m:sSubSup>
+                    <m:sSub>
+                      <m:sSubPr>
+                        <m:ctrlPr>
+                          <a:rPr lang="en-GB" i="1">
+                            <a:latin typeface="Cambria Math" panose="02040503050406030204" pitchFamily="18" charset="0"/>
+                          </a:rPr>
+                        </m:ctrlPr>
+                      </m:sSubPr>
+                      <m:e>
+                        <m:r>
+                          <a:rPr lang="en-GB" i="1">
+                            <a:latin typeface="Cambria Math" panose="02040503050406030204" pitchFamily="18" charset="0"/>
+                          </a:rPr>
+                          <m:t>𝑧</m:t>
+                        </m:r>
+                      </m:e>
+                      <m:sub>
+                        <m:r>
+                          <a:rPr lang="en-GB" i="1">
+                            <a:latin typeface="Cambria Math" panose="02040503050406030204" pitchFamily="18" charset="0"/>
+                          </a:rPr>
+                          <m:t>1</m:t>
+                        </m:r>
+                      </m:sub>
+                    </m:sSub>
+                    <m:r>
+                      <a:rPr lang="en-GB" i="1">
+                        <a:latin typeface="Cambria Math" panose="02040503050406030204" pitchFamily="18" charset="0"/>
+                      </a:rPr>
+                      <m:t>𝑢</m:t>
+                    </m:r>
+                    <m:r>
+                      <a:rPr lang="en-GB" i="1">
+                        <a:latin typeface="Cambria Math" panose="02040503050406030204" pitchFamily="18" charset="0"/>
+                      </a:rPr>
+                      <m:t>(</m:t>
+                    </m:r>
+                    <m:r>
+                      <a:rPr lang="en-GB" i="1">
+                        <a:latin typeface="Cambria Math" panose="02040503050406030204" pitchFamily="18" charset="0"/>
+                      </a:rPr>
+                      <m:t>𝑡</m:t>
+                    </m:r>
+                    <m:r>
+                      <a:rPr lang="en-GB" i="1">
+                        <a:latin typeface="Cambria Math" panose="02040503050406030204" pitchFamily="18" charset="0"/>
+                      </a:rPr>
+                      <m:t>−</m:t>
+                    </m:r>
+                    <m:r>
+                      <a:rPr lang="en-GB" i="1">
+                        <a:latin typeface="Cambria Math" panose="02040503050406030204" pitchFamily="18" charset="0"/>
+                      </a:rPr>
+                      <m:t>𝑘</m:t>
+                    </m:r>
+                    <m:r>
+                      <a:rPr lang="en-GB" i="1">
+                        <a:latin typeface="Cambria Math" panose="02040503050406030204" pitchFamily="18" charset="0"/>
+                      </a:rPr>
+                      <m:t>)</m:t>
+                    </m:r>
+                  </m:oMath>
+                </a14:m>
+                <a:r>
+                  <a:rPr lang="en-GB" dirty="0" smtClean="0"/>
+                  <a:t>,</a:t>
+                </a:r>
+              </a:p>
+              <a:p>
+                <a:r>
+                  <a:rPr lang="en-GB" dirty="0" smtClean="0"/>
+                  <a:t> </a:t>
+                </a:r>
+              </a:p>
+            </p:txBody>
+          </p:sp>
+        </mc:Choice>
+        <mc:Fallback>
+          <p:sp>
+            <p:nvSpPr>
+              <p:cNvPr id="6" name="TextBox 5"/>
+              <p:cNvSpPr txBox="1">
+                <a:spLocks noRot="1" noChangeAspect="1" noMove="1" noResize="1" noEditPoints="1" noAdjustHandles="1" noChangeArrowheads="1" noChangeShapeType="1" noTextEdit="1"/>
+              </p:cNvSpPr>
+              <p:nvPr/>
+            </p:nvSpPr>
+            <p:spPr>
+              <a:xfrm>
+                <a:off x="546790" y="1677798"/>
+                <a:ext cx="10863744" cy="1831592"/>
+              </a:xfrm>
+              <a:prstGeom prst="rect">
+                <a:avLst/>
+              </a:prstGeom>
+              <a:blipFill rotWithShape="0">
+                <a:blip r:embed="rId2"/>
+                <a:stretch>
+                  <a:fillRect l="-505" t="-19934"/>
+                </a:stretch>
+              </a:blipFill>
+            </p:spPr>
+            <p:txBody>
+              <a:bodyPr/>
+              <a:lstStyle/>
+              <a:p>
+                <a:r>
+                  <a:rPr lang="en-GB">
+                    <a:noFill/>
+                  </a:rPr>
+                  <a:t> </a:t>
+                </a:r>
+              </a:p>
+            </p:txBody>
+          </p:sp>
+        </mc:Fallback>
+      </mc:AlternateContent>
+    </p:spTree>
+    <p:extLst>
+      <p:ext uri="{BB962C8B-B14F-4D97-AF65-F5344CB8AC3E}">
+        <p14:creationId xmlns:p14="http://schemas.microsoft.com/office/powerpoint/2010/main" val="3873851003"/>
+      </p:ext>
+    </p:extLst>
+  </p:cSld>
+  <p:clrMapOvr>
+    <a:masterClrMapping/>
+  </p:clrMapOvr>
+  <p:timing>
+    <p:tnLst>
+      <p:par>
+        <p:cTn id="1" dur="indefinite" restart="never" nodeType="tmRoot"/>
+      </p:par>
+    </p:tnLst>
+  </p:timing>
+</p:sld>
+</file>
+
+<file path=ppt/slides/slide23.xml><?xml version="1.0" encoding="utf-8"?>
+<p:sld xmlns:a="http://schemas.openxmlformats.org/drawingml/2006/main" xmlns:r="http://schemas.openxmlformats.org/officeDocument/2006/relationships" xmlns:p="http://schemas.openxmlformats.org/presentationml/2006/main">
+  <p:cSld>
+    <p:spTree>
+      <p:nvGrpSpPr>
+        <p:cNvPr id="1" name=""/>
+        <p:cNvGrpSpPr/>
+        <p:nvPr/>
+      </p:nvGrpSpPr>
+      <p:grpSpPr>
+        <a:xfrm>
+          <a:off x="0" y="0"/>
+          <a:ext cx="0" cy="0"/>
+          <a:chOff x="0" y="0"/>
+          <a:chExt cx="0" cy="0"/>
+        </a:xfrm>
+      </p:grpSpPr>
+      <p:sp>
+        <p:nvSpPr>
+          <p:cNvPr id="2" name="Slide Number Placeholder 1"/>
+          <p:cNvSpPr>
+            <a:spLocks noGrp="1"/>
+          </p:cNvSpPr>
+          <p:nvPr>
+            <p:ph type="sldNum" sz="quarter" idx="10"/>
+          </p:nvPr>
+        </p:nvSpPr>
+        <p:spPr/>
+        <p:txBody>
+          <a:bodyPr/>
+          <a:lstStyle/>
+          <a:p>
+            <a:fld id="{61155BBA-336D-4AED-BB34-E42D9706BCE7}" type="slidenum">
+              <a:rPr lang="it-IT" altLang="en-US" smtClean="0"/>
+              <a:pPr/>
+              <a:t>23</a:t>
+            </a:fld>
+            <a:endParaRPr lang="it-IT" altLang="en-US"/>
+          </a:p>
+        </p:txBody>
+      </p:sp>
+    </p:spTree>
+    <p:extLst>
+      <p:ext uri="{BB962C8B-B14F-4D97-AF65-F5344CB8AC3E}">
+        <p14:creationId xmlns:p14="http://schemas.microsoft.com/office/powerpoint/2010/main" val="850820712"/>
+      </p:ext>
+    </p:extLst>
+  </p:cSld>
+  <p:clrMapOvr>
+    <a:masterClrMapping/>
+  </p:clrMapOvr>
+</p:sld>
+</file>
+
+<file path=ppt/slides/slide24.xml><?xml version="1.0" encoding="utf-8"?>
+<p:sld xmlns:a="http://schemas.openxmlformats.org/drawingml/2006/main" xmlns:r="http://schemas.openxmlformats.org/officeDocument/2006/relationships" xmlns:p="http://schemas.openxmlformats.org/presentationml/2006/main">
+  <p:cSld>
+    <p:spTree>
+      <p:nvGrpSpPr>
+        <p:cNvPr id="1" name=""/>
+        <p:cNvGrpSpPr/>
+        <p:nvPr/>
+      </p:nvGrpSpPr>
+      <p:grpSpPr>
+        <a:xfrm>
+          <a:off x="0" y="0"/>
+          <a:ext cx="0" cy="0"/>
+          <a:chOff x="0" y="0"/>
+          <a:chExt cx="0" cy="0"/>
+        </a:xfrm>
+      </p:grpSpPr>
+      <p:sp>
+        <p:nvSpPr>
+          <p:cNvPr id="2" name="Slide Number Placeholder 1"/>
+          <p:cNvSpPr>
+            <a:spLocks noGrp="1"/>
+          </p:cNvSpPr>
+          <p:nvPr>
+            <p:ph type="sldNum" sz="quarter" idx="10"/>
+          </p:nvPr>
+        </p:nvSpPr>
+        <p:spPr/>
+        <p:txBody>
+          <a:bodyPr/>
+          <a:lstStyle/>
+          <a:p>
+            <a:fld id="{61155BBA-336D-4AED-BB34-E42D9706BCE7}" type="slidenum">
+              <a:rPr lang="it-IT" altLang="en-US" smtClean="0"/>
+              <a:pPr/>
+              <a:t>24</a:t>
             </a:fld>
             <a:endParaRPr lang="it-IT" altLang="en-US"/>
           </a:p>
@@ -15410,7 +16952,7 @@
 </p:sld>
 </file>
 
-<file path=ppt/slides/slide23.xml><?xml version="1.0" encoding="utf-8"?>
+<file path=ppt/slides/slide25.xml><?xml version="1.0" encoding="utf-8"?>
 <p:sld xmlns:a="http://schemas.openxmlformats.org/drawingml/2006/main" xmlns:r="http://schemas.openxmlformats.org/officeDocument/2006/relationships" xmlns:p="http://schemas.openxmlformats.org/presentationml/2006/main">
   <p:cSld>
     <p:spTree>
@@ -15445,7 +16987,7 @@
             <a:fld id="{61155BBA-336D-4AED-BB34-E42D9706BCE7}" type="slidenum">
               <a:rPr lang="it-IT" altLang="en-US" smtClean="0"/>
               <a:pPr/>
-              <a:t>23</a:t>
+              <a:t>25</a:t>
             </a:fld>
             <a:endParaRPr lang="it-IT" altLang="en-US"/>
           </a:p>
@@ -15546,7 +17088,7 @@
 </p:sld>
 </file>
 
-<file path=ppt/slides/slide24.xml><?xml version="1.0" encoding="utf-8"?>
+<file path=ppt/slides/slide26.xml><?xml version="1.0" encoding="utf-8"?>
 <p:sld xmlns:a="http://schemas.openxmlformats.org/drawingml/2006/main" xmlns:r="http://schemas.openxmlformats.org/officeDocument/2006/relationships" xmlns:p="http://schemas.openxmlformats.org/presentationml/2006/main">
   <p:cSld>
     <p:spTree>
@@ -15581,7 +17123,7 @@
             <a:fld id="{61155BBA-336D-4AED-BB34-E42D9706BCE7}" type="slidenum">
               <a:rPr lang="it-IT" altLang="en-US" smtClean="0"/>
               <a:pPr/>
-              <a:t>24</a:t>
+              <a:t>26</a:t>
             </a:fld>
             <a:endParaRPr lang="it-IT" altLang="en-US"/>
           </a:p>
@@ -15694,7 +17236,7 @@
 </p:sld>
 </file>
 
-<file path=ppt/slides/slide25.xml><?xml version="1.0" encoding="utf-8"?>
+<file path=ppt/slides/slide27.xml><?xml version="1.0" encoding="utf-8"?>
 <p:sld xmlns:a="http://schemas.openxmlformats.org/drawingml/2006/main" xmlns:r="http://schemas.openxmlformats.org/officeDocument/2006/relationships" xmlns:p="http://schemas.openxmlformats.org/presentationml/2006/main">
   <p:cSld>
     <p:spTree>
@@ -15729,7 +17271,7 @@
             <a:fld id="{61155BBA-336D-4AED-BB34-E42D9706BCE7}" type="slidenum">
               <a:rPr lang="it-IT" altLang="en-US" smtClean="0"/>
               <a:pPr/>
-              <a:t>25</a:t>
+              <a:t>27</a:t>
             </a:fld>
             <a:endParaRPr lang="it-IT" altLang="en-US"/>
           </a:p>

</xml_diff>

<commit_message>
Work on report, sysSpectrum function, updated CRA
Further work on the report
new functino to plot the spectrum of a system: sysSpectrum
Updated cranalysis with integration of the impulse to obtain step
response
</commit_message>
<xml_diff>
--- a/report/Report.pptx
+++ b/report/Report.pptx
@@ -283,7 +283,7 @@
           <a:p>
             <a:fld id="{843C4FC0-81D1-4453-9443-D3E156B7E80B}" type="datetimeFigureOut">
               <a:rPr lang="en-GB" smtClean="0"/>
-              <a:t>13/04/2015</a:t>
+              <a:t>14/04/2015</a:t>
             </a:fld>
             <a:endParaRPr lang="en-GB"/>
           </a:p>
@@ -453,7 +453,7 @@
           <a:p>
             <a:fld id="{843C4FC0-81D1-4453-9443-D3E156B7E80B}" type="datetimeFigureOut">
               <a:rPr lang="en-GB" smtClean="0"/>
-              <a:t>13/04/2015</a:t>
+              <a:t>14/04/2015</a:t>
             </a:fld>
             <a:endParaRPr lang="en-GB"/>
           </a:p>
@@ -633,7 +633,7 @@
           <a:p>
             <a:fld id="{843C4FC0-81D1-4453-9443-D3E156B7E80B}" type="datetimeFigureOut">
               <a:rPr lang="en-GB" smtClean="0"/>
-              <a:t>13/04/2015</a:t>
+              <a:t>14/04/2015</a:t>
             </a:fld>
             <a:endParaRPr lang="en-GB"/>
           </a:p>
@@ -1414,7 +1414,7 @@
           <a:p>
             <a:fld id="{843C4FC0-81D1-4453-9443-D3E156B7E80B}" type="datetimeFigureOut">
               <a:rPr lang="en-GB" smtClean="0"/>
-              <a:t>13/04/2015</a:t>
+              <a:t>14/04/2015</a:t>
             </a:fld>
             <a:endParaRPr lang="en-GB"/>
           </a:p>
@@ -1660,7 +1660,7 @@
           <a:p>
             <a:fld id="{843C4FC0-81D1-4453-9443-D3E156B7E80B}" type="datetimeFigureOut">
               <a:rPr lang="en-GB" smtClean="0"/>
-              <a:t>13/04/2015</a:t>
+              <a:t>14/04/2015</a:t>
             </a:fld>
             <a:endParaRPr lang="en-GB"/>
           </a:p>
@@ -1892,7 +1892,7 @@
           <a:p>
             <a:fld id="{843C4FC0-81D1-4453-9443-D3E156B7E80B}" type="datetimeFigureOut">
               <a:rPr lang="en-GB" smtClean="0"/>
-              <a:t>13/04/2015</a:t>
+              <a:t>14/04/2015</a:t>
             </a:fld>
             <a:endParaRPr lang="en-GB"/>
           </a:p>
@@ -2259,7 +2259,7 @@
           <a:p>
             <a:fld id="{843C4FC0-81D1-4453-9443-D3E156B7E80B}" type="datetimeFigureOut">
               <a:rPr lang="en-GB" smtClean="0"/>
-              <a:t>13/04/2015</a:t>
+              <a:t>14/04/2015</a:t>
             </a:fld>
             <a:endParaRPr lang="en-GB"/>
           </a:p>
@@ -2377,7 +2377,7 @@
           <a:p>
             <a:fld id="{843C4FC0-81D1-4453-9443-D3E156B7E80B}" type="datetimeFigureOut">
               <a:rPr lang="en-GB" smtClean="0"/>
-              <a:t>13/04/2015</a:t>
+              <a:t>14/04/2015</a:t>
             </a:fld>
             <a:endParaRPr lang="en-GB"/>
           </a:p>
@@ -2472,7 +2472,7 @@
           <a:p>
             <a:fld id="{843C4FC0-81D1-4453-9443-D3E156B7E80B}" type="datetimeFigureOut">
               <a:rPr lang="en-GB" smtClean="0"/>
-              <a:t>13/04/2015</a:t>
+              <a:t>14/04/2015</a:t>
             </a:fld>
             <a:endParaRPr lang="en-GB"/>
           </a:p>
@@ -2749,7 +2749,7 @@
           <a:p>
             <a:fld id="{843C4FC0-81D1-4453-9443-D3E156B7E80B}" type="datetimeFigureOut">
               <a:rPr lang="en-GB" smtClean="0"/>
-              <a:t>13/04/2015</a:t>
+              <a:t>14/04/2015</a:t>
             </a:fld>
             <a:endParaRPr lang="en-GB"/>
           </a:p>
@@ -3002,7 +3002,7 @@
           <a:p>
             <a:fld id="{843C4FC0-81D1-4453-9443-D3E156B7E80B}" type="datetimeFigureOut">
               <a:rPr lang="en-GB" smtClean="0"/>
-              <a:t>13/04/2015</a:t>
+              <a:t>14/04/2015</a:t>
             </a:fld>
             <a:endParaRPr lang="en-GB"/>
           </a:p>
@@ -3215,7 +3215,7 @@
           <a:p>
             <a:fld id="{843C4FC0-81D1-4453-9443-D3E156B7E80B}" type="datetimeFigureOut">
               <a:rPr lang="en-GB" smtClean="0"/>
-              <a:t>13/04/2015</a:t>
+              <a:t>14/04/2015</a:t>
             </a:fld>
             <a:endParaRPr lang="en-GB"/>
           </a:p>
@@ -5033,8 +5033,8 @@
         </p:nvSpPr>
         <p:spPr bwMode="auto">
           <a:xfrm>
-            <a:off x="7196836" y="5524143"/>
-            <a:ext cx="4752975" cy="1218795"/>
+            <a:off x="6618914" y="5524143"/>
+            <a:ext cx="5330897" cy="941796"/>
           </a:xfrm>
           <a:prstGeom prst="rect">
             <a:avLst/>
@@ -5064,7 +5064,7 @@
           </a:extLst>
         </p:spPr>
         <p:txBody>
-          <a:bodyPr lIns="0" tIns="0" rIns="0" bIns="0">
+          <a:bodyPr wrap="square" lIns="0" tIns="0" rIns="0" bIns="0">
             <a:spAutoFit/>
           </a:bodyPr>
           <a:lstStyle>
@@ -5197,9 +5197,8 @@
             </a:pPr>
             <a:r>
               <a:rPr lang="it-IT" altLang="en-US" sz="1800" b="1" dirty="0" smtClean="0"/>
-              <a:t>Polytechnic of Milan</a:t>
+              <a:t>Politecnico di milano</a:t>
             </a:r>
-            <a:endParaRPr lang="it-IT" altLang="en-US" sz="1800" b="1" dirty="0"/>
           </a:p>
         </p:txBody>
       </p:sp>
@@ -5421,7 +5420,7 @@
         </p:nvSpPr>
         <p:spPr>
           <a:xfrm>
-            <a:off x="2050142" y="6314883"/>
+            <a:off x="2050142" y="6096607"/>
             <a:ext cx="3928383" cy="369332"/>
           </a:xfrm>
           <a:prstGeom prst="rect">
@@ -7097,8 +7096,8 @@
           </a:p>
         </p:txBody>
       </p:sp>
-      <mc:AlternateContent xmlns:mc="http://schemas.openxmlformats.org/markup-compatibility/2006" xmlns:a14="http://schemas.microsoft.com/office/drawing/2010/main">
-        <mc:Choice Requires="a14">
+      <mc:AlternateContent xmlns:mc="http://schemas.openxmlformats.org/markup-compatibility/2006">
+        <mc:Choice xmlns:a14="http://schemas.microsoft.com/office/drawing/2010/main" Requires="a14">
           <p:sp>
             <p:nvSpPr>
               <p:cNvPr id="8" name="TextBox 7"/>
@@ -7108,7 +7107,7 @@
             <p:spPr>
               <a:xfrm>
                 <a:off x="679506" y="3915768"/>
-                <a:ext cx="10620465" cy="2602315"/>
+                <a:ext cx="10620465" cy="2325317"/>
               </a:xfrm>
               <a:prstGeom prst="rect">
                 <a:avLst/>
@@ -8029,9 +8028,6 @@
                     </m:oMath>
                   </m:oMathPara>
                 </a14:m>
-                <a:endParaRPr lang="en-GB" dirty="0" smtClean="0"/>
-              </a:p>
-              <a:p>
                 <a:endParaRPr lang="en-GB" dirty="0"/>
               </a:p>
               <a:p>
@@ -8146,7 +8142,7 @@
             </p:txBody>
           </p:sp>
         </mc:Choice>
-        <mc:Fallback xmlns="">
+        <mc:Fallback>
           <p:sp>
             <p:nvSpPr>
               <p:cNvPr id="8" name="TextBox 7"/>
@@ -8158,7 +8154,7 @@
             <p:spPr>
               <a:xfrm>
                 <a:off x="679506" y="3915768"/>
-                <a:ext cx="10620465" cy="2602315"/>
+                <a:ext cx="10620465" cy="2325317"/>
               </a:xfrm>
               <a:prstGeom prst="rect">
                 <a:avLst/>
@@ -8166,7 +8162,7 @@
               <a:blipFill rotWithShape="0">
                 <a:blip r:embed="rId2"/>
                 <a:stretch>
-                  <a:fillRect l="-1320" t="-7963" r="-1033"/>
+                  <a:fillRect l="-1320" t="-8901" r="-1033"/>
                 </a:stretch>
               </a:blipFill>
             </p:spPr>
@@ -15201,8 +15197,8 @@
           </a:p>
         </p:txBody>
       </p:sp>
-      <mc:AlternateContent xmlns:mc="http://schemas.openxmlformats.org/markup-compatibility/2006">
-        <mc:Choice xmlns:a14="http://schemas.microsoft.com/office/drawing/2010/main" Requires="a14">
+      <mc:AlternateContent xmlns:mc="http://schemas.openxmlformats.org/markup-compatibility/2006" xmlns:a14="http://schemas.microsoft.com/office/drawing/2010/main">
+        <mc:Choice Requires="a14">
           <p:sp>
             <p:nvSpPr>
               <p:cNvPr id="6" name="TextBox 5"/>
@@ -15551,13 +15547,7 @@
                           <a:rPr lang="en-GB" b="0" i="1" smtClean="0">
                             <a:latin typeface="Cambria Math" panose="02040503050406030204" pitchFamily="18" charset="0"/>
                           </a:rPr>
-                          <m:t>=</m:t>
-                        </m:r>
-                        <m:r>
-                          <a:rPr lang="en-GB" b="0" i="1" smtClean="0">
-                            <a:latin typeface="Cambria Math" panose="02040503050406030204" pitchFamily="18" charset="0"/>
-                          </a:rPr>
-                          <m:t>1</m:t>
+                          <m:t>=1</m:t>
                         </m:r>
                       </m:sub>
                       <m:sup/>
@@ -15796,7 +15786,7 @@
             </p:txBody>
           </p:sp>
         </mc:Choice>
-        <mc:Fallback>
+        <mc:Fallback xmlns="">
           <p:sp>
             <p:nvSpPr>
               <p:cNvPr id="6" name="TextBox 5"/>
@@ -15896,8 +15886,8 @@
           </a:p>
         </p:txBody>
       </p:sp>
-      <mc:AlternateContent xmlns:mc="http://schemas.openxmlformats.org/markup-compatibility/2006">
-        <mc:Choice xmlns:a14="http://schemas.microsoft.com/office/drawing/2010/main" Requires="a14">
+      <mc:AlternateContent xmlns:mc="http://schemas.openxmlformats.org/markup-compatibility/2006" xmlns:a14="http://schemas.microsoft.com/office/drawing/2010/main">
+        <mc:Choice Requires="a14">
           <p:sp>
             <p:nvSpPr>
               <p:cNvPr id="3" name="TextBox 2"/>
@@ -16879,18 +16869,15 @@
                 <a:endParaRPr lang="en-GB" dirty="0"/>
               </a:p>
               <a:p>
-                <a:pPr/>
                 <a:endParaRPr lang="en-GB" dirty="0" smtClean="0"/>
               </a:p>
               <a:p>
-                <a:pPr/>
                 <a:r>
                   <a:rPr lang="en-GB" dirty="0" smtClean="0"/>
                   <a:t>Notice that 1+GC = S^-1, inverse of the sensitivity T.F.</a:t>
                 </a:r>
               </a:p>
               <a:p>
-                <a:pPr/>
                 <a:endParaRPr lang="en-GB" dirty="0"/>
               </a:p>
               <a:p>
@@ -16947,13 +16934,7 @@
                                 <a:rPr lang="en-GB" b="0" i="1" smtClean="0">
                                   <a:latin typeface="Cambria Math" panose="02040503050406030204" pitchFamily="18" charset="0"/>
                                 </a:rPr>
-                                <m:t>𝐶</m:t>
-                              </m:r>
-                              <m:r>
-                                <a:rPr lang="en-GB" b="0" i="1" smtClean="0">
-                                  <a:latin typeface="Cambria Math" panose="02040503050406030204" pitchFamily="18" charset="0"/>
-                                </a:rPr>
-                                <m:t>𝑆</m:t>
+                                <m:t>𝐶𝑆</m:t>
                               </m:r>
                             </m:e>
                             <m:sup>
@@ -17157,7 +17138,6 @@
                 <a:endParaRPr lang="en-GB" dirty="0" smtClean="0"/>
               </a:p>
               <a:p>
-                <a:pPr/>
                 <a:endParaRPr lang="en-GB" dirty="0"/>
               </a:p>
               <a:p>
@@ -18464,7 +18444,6 @@
                 <a:endParaRPr lang="en-GB" dirty="0" smtClean="0"/>
               </a:p>
               <a:p>
-                <a:pPr/>
                 <a:endParaRPr lang="en-GB" dirty="0"/>
               </a:p>
               <a:p>
@@ -18539,7 +18518,7 @@
             </p:txBody>
           </p:sp>
         </mc:Choice>
-        <mc:Fallback>
+        <mc:Fallback xmlns="">
           <p:sp>
             <p:nvSpPr>
               <p:cNvPr id="3" name="TextBox 2"/>
@@ -18639,8 +18618,8 @@
           </a:p>
         </p:txBody>
       </p:sp>
-      <mc:AlternateContent xmlns:mc="http://schemas.openxmlformats.org/markup-compatibility/2006">
-        <mc:Choice xmlns:a14="http://schemas.microsoft.com/office/drawing/2010/main" Requires="a14">
+      <mc:AlternateContent xmlns:mc="http://schemas.openxmlformats.org/markup-compatibility/2006" xmlns:a14="http://schemas.microsoft.com/office/drawing/2010/main">
+        <mc:Choice Requires="a14">
           <p:sp>
             <p:nvSpPr>
               <p:cNvPr id="3" name="Rectangle 2"/>
@@ -19409,18 +19388,15 @@
                 <a:endParaRPr lang="en-GB" dirty="0" smtClean="0"/>
               </a:p>
               <a:p>
-                <a:pPr/>
                 <a:endParaRPr lang="en-GB" dirty="0"/>
               </a:p>
               <a:p>
-                <a:pPr/>
                 <a:r>
                   <a:rPr lang="en-GB" dirty="0" smtClean="0"/>
                   <a:t>With our objective to obtain a simulated output very similar to the measurement (H=1) we obtain:</a:t>
                 </a:r>
               </a:p>
               <a:p>
-                <a:pPr/>
                 <a:endParaRPr lang="en-GB" dirty="0"/>
               </a:p>
               <a:p>
@@ -20041,21 +20017,19 @@
                 <a:endParaRPr lang="en-GB" dirty="0" smtClean="0"/>
               </a:p>
               <a:p>
-                <a:pPr/>
                 <a:endParaRPr lang="en-GB" dirty="0"/>
               </a:p>
               <a:p>
-                <a:pPr/>
                 <a:r>
                   <a:rPr lang="en-GB" dirty="0" smtClean="0"/>
                   <a:t>In order to understand the effect of the minimisation problem we can write in the following manner:</a:t>
                 </a:r>
               </a:p>
               <a:p>
-                <a:pPr/>
                 <a:endParaRPr lang="en-GB" dirty="0"/>
               </a:p>
               <a:p>
+                <a:pPr/>
                 <a14:m>
                   <m:oMathPara xmlns:m="http://schemas.openxmlformats.org/officeDocument/2006/math">
                     <m:oMathParaPr>
@@ -20945,6 +20919,7 @@
                 <a:endParaRPr lang="en-GB" dirty="0" smtClean="0"/>
               </a:p>
               <a:p>
+                <a:pPr/>
                 <a14:m>
                   <m:oMathPara xmlns:m="http://schemas.openxmlformats.org/officeDocument/2006/math">
                     <m:oMathParaPr>
@@ -21288,13 +21263,12 @@
                 <a:endParaRPr lang="en-GB" dirty="0"/>
               </a:p>
               <a:p>
-                <a:pPr/>
                 <a:endParaRPr lang="en-GB" dirty="0"/>
               </a:p>
             </p:txBody>
           </p:sp>
         </mc:Choice>
-        <mc:Fallback>
+        <mc:Fallback xmlns="">
           <p:sp>
             <p:nvSpPr>
               <p:cNvPr id="3" name="Rectangle 2"/>

</xml_diff>

<commit_message>
Update Report - Validation Chapter
</commit_message>
<xml_diff>
--- a/report/Report.pptx
+++ b/report/Report.pptx
@@ -31,10 +31,18 @@
     <p:sldId id="283" r:id="rId25"/>
     <p:sldId id="282" r:id="rId26"/>
     <p:sldId id="284" r:id="rId27"/>
-    <p:sldId id="264" r:id="rId28"/>
-    <p:sldId id="265" r:id="rId29"/>
-    <p:sldId id="277" r:id="rId30"/>
-    <p:sldId id="278" r:id="rId31"/>
+    <p:sldId id="287" r:id="rId28"/>
+    <p:sldId id="264" r:id="rId29"/>
+    <p:sldId id="289" r:id="rId30"/>
+    <p:sldId id="290" r:id="rId31"/>
+    <p:sldId id="291" r:id="rId32"/>
+    <p:sldId id="285" r:id="rId33"/>
+    <p:sldId id="286" r:id="rId34"/>
+    <p:sldId id="292" r:id="rId35"/>
+    <p:sldId id="288" r:id="rId36"/>
+    <p:sldId id="265" r:id="rId37"/>
+    <p:sldId id="277" r:id="rId38"/>
+    <p:sldId id="278" r:id="rId39"/>
   </p:sldIdLst>
   <p:sldSz cx="12192000" cy="6858000"/>
   <p:notesSz cx="6858000" cy="9144000"/>
@@ -7096,8 +7104,8 @@
           </a:p>
         </p:txBody>
       </p:sp>
-      <mc:AlternateContent xmlns:mc="http://schemas.openxmlformats.org/markup-compatibility/2006">
-        <mc:Choice xmlns:a14="http://schemas.microsoft.com/office/drawing/2010/main" Requires="a14">
+      <mc:AlternateContent xmlns:mc="http://schemas.openxmlformats.org/markup-compatibility/2006" xmlns:a14="http://schemas.microsoft.com/office/drawing/2010/main">
+        <mc:Choice Requires="a14">
           <p:sp>
             <p:nvSpPr>
               <p:cNvPr id="8" name="TextBox 7"/>
@@ -8142,7 +8150,7 @@
             </p:txBody>
           </p:sp>
         </mc:Choice>
-        <mc:Fallback>
+        <mc:Fallback xmlns="">
           <p:sp>
             <p:nvSpPr>
               <p:cNvPr id="8" name="TextBox 7"/>
@@ -13696,8 +13704,8 @@
           </a:p>
         </p:txBody>
       </p:sp>
-      <mc:AlternateContent xmlns:mc="http://schemas.openxmlformats.org/markup-compatibility/2006" xmlns:a14="http://schemas.microsoft.com/office/drawing/2010/main">
-        <mc:Choice Requires="a14">
+      <mc:AlternateContent xmlns:mc="http://schemas.openxmlformats.org/markup-compatibility/2006">
+        <mc:Choice xmlns:a14="http://schemas.microsoft.com/office/drawing/2010/main" Requires="a14">
           <p:sp>
             <p:nvSpPr>
               <p:cNvPr id="6" name="TextBox 5"/>
@@ -14983,8 +14991,12 @@
                   <a:t>  cost function is the most </a:t>
                 </a:r>
                 <a:r>
-                  <a:rPr lang="en-GB" dirty="0" err="1" smtClean="0"/>
-                  <a:t>unappropriate</a:t>
+                  <a:rPr lang="en-GB" dirty="0"/>
+                  <a:t>i</a:t>
+                </a:r>
+                <a:r>
+                  <a:rPr lang="en-GB" dirty="0" smtClean="0"/>
+                  <a:t>nappropriate</a:t>
                 </a:r>
                 <a:r>
                   <a:rPr lang="en-GB" dirty="0" smtClean="0"/>
@@ -15022,7 +15034,7 @@
             </p:txBody>
           </p:sp>
         </mc:Choice>
-        <mc:Fallback xmlns="">
+        <mc:Fallback>
           <p:sp>
             <p:nvSpPr>
               <p:cNvPr id="6" name="TextBox 5"/>
@@ -15051,7 +15063,7 @@
               <a:lstStyle/>
               <a:p>
                 <a:r>
-                  <a:rPr lang="en-GB">
+                  <a:rPr lang="it-IT">
                     <a:noFill/>
                   </a:rPr>
                   <a:t> </a:t>
@@ -21370,14 +21382,136 @@
       </p:sp>
       <p:sp>
         <p:nvSpPr>
+          <p:cNvPr id="3" name="Rectangle 2"/>
+          <p:cNvSpPr/>
+          <p:nvPr/>
+        </p:nvSpPr>
+        <p:spPr>
+          <a:xfrm>
+            <a:off x="2682409" y="2588350"/>
+            <a:ext cx="6827190" cy="923330"/>
+          </a:xfrm>
+          <a:prstGeom prst="rect">
+            <a:avLst/>
+          </a:prstGeom>
+        </p:spPr>
+        <p:style>
+          <a:lnRef idx="3">
+            <a:schemeClr val="lt1"/>
+          </a:lnRef>
+          <a:fillRef idx="1">
+            <a:schemeClr val="accent5"/>
+          </a:fillRef>
+          <a:effectRef idx="1">
+            <a:schemeClr val="accent5"/>
+          </a:effectRef>
+          <a:fontRef idx="minor">
+            <a:schemeClr val="lt1"/>
+          </a:fontRef>
+        </p:style>
+        <p:txBody>
+          <a:bodyPr wrap="none" lIns="91440" tIns="45720" rIns="91440" bIns="45720">
+            <a:spAutoFit/>
+          </a:bodyPr>
+          <a:lstStyle/>
+          <a:p>
+            <a:pPr algn="ctr"/>
+            <a:r>
+              <a:rPr lang="en-US" sz="5400" b="0" cap="none" spc="0" dirty="0" smtClean="0">
+                <a:ln w="0"/>
+                <a:solidFill>
+                  <a:schemeClr val="tx1"/>
+                </a:solidFill>
+                <a:effectLst>
+                  <a:outerShdw blurRad="38100" dist="19050" dir="2700000" algn="tl" rotWithShape="0">
+                    <a:schemeClr val="dk1">
+                      <a:alpha val="40000"/>
+                    </a:schemeClr>
+                  </a:outerShdw>
+                </a:effectLst>
+              </a:rPr>
+              <a:t>MODEL VALIDATION</a:t>
+            </a:r>
+            <a:endParaRPr lang="en-US" sz="5400" b="0" cap="none" spc="0" dirty="0">
+              <a:ln w="0"/>
+              <a:solidFill>
+                <a:schemeClr val="tx1"/>
+              </a:solidFill>
+              <a:effectLst>
+                <a:outerShdw blurRad="38100" dist="19050" dir="2700000" algn="tl" rotWithShape="0">
+                  <a:schemeClr val="dk1">
+                    <a:alpha val="40000"/>
+                  </a:schemeClr>
+                </a:outerShdw>
+              </a:effectLst>
+            </a:endParaRPr>
+          </a:p>
+        </p:txBody>
+      </p:sp>
+    </p:spTree>
+    <p:extLst>
+      <p:ext uri="{BB962C8B-B14F-4D97-AF65-F5344CB8AC3E}">
+        <p14:creationId xmlns:p14="http://schemas.microsoft.com/office/powerpoint/2010/main" val="315044901"/>
+      </p:ext>
+    </p:extLst>
+  </p:cSld>
+  <p:clrMapOvr>
+    <a:masterClrMapping/>
+  </p:clrMapOvr>
+</p:sld>
+</file>
+
+<file path=ppt/slides/slide26.xml><?xml version="1.0" encoding="utf-8"?>
+<p:sld xmlns:a="http://schemas.openxmlformats.org/drawingml/2006/main" xmlns:r="http://schemas.openxmlformats.org/officeDocument/2006/relationships" xmlns:p="http://schemas.openxmlformats.org/presentationml/2006/main">
+  <p:cSld>
+    <p:spTree>
+      <p:nvGrpSpPr>
+        <p:cNvPr id="1" name=""/>
+        <p:cNvGrpSpPr/>
+        <p:nvPr/>
+      </p:nvGrpSpPr>
+      <p:grpSpPr>
+        <a:xfrm>
+          <a:off x="0" y="0"/>
+          <a:ext cx="0" cy="0"/>
+          <a:chOff x="0" y="0"/>
+          <a:chExt cx="0" cy="0"/>
+        </a:xfrm>
+      </p:grpSpPr>
+      <p:sp>
+        <p:nvSpPr>
+          <p:cNvPr id="2" name="Slide Number Placeholder 1"/>
+          <p:cNvSpPr>
+            <a:spLocks noGrp="1"/>
+          </p:cNvSpPr>
+          <p:nvPr>
+            <p:ph type="sldNum" sz="quarter" idx="10"/>
+          </p:nvPr>
+        </p:nvSpPr>
+        <p:spPr/>
+        <p:txBody>
+          <a:bodyPr/>
+          <a:lstStyle/>
+          <a:p>
+            <a:fld id="{61155BBA-336D-4AED-BB34-E42D9706BCE7}" type="slidenum">
+              <a:rPr lang="it-IT" altLang="en-US" smtClean="0"/>
+              <a:pPr/>
+              <a:t>26</a:t>
+            </a:fld>
+            <a:endParaRPr lang="it-IT" altLang="en-US"/>
+          </a:p>
+        </p:txBody>
+      </p:sp>
+      <p:sp>
+        <p:nvSpPr>
           <p:cNvPr id="3" name="TextBox 2"/>
           <p:cNvSpPr txBox="1"/>
           <p:nvPr/>
         </p:nvSpPr>
         <p:spPr>
           <a:xfrm>
-            <a:off x="4292140" y="1046490"/>
-            <a:ext cx="3715569" cy="523220"/>
+            <a:off x="231820" y="1046490"/>
+            <a:ext cx="11797048" cy="523220"/>
           </a:xfrm>
           <a:prstGeom prst="rect">
             <a:avLst/>
@@ -21385,11 +21519,12 @@
           <a:noFill/>
         </p:spPr>
         <p:txBody>
-          <a:bodyPr wrap="none" rtlCol="0">
+          <a:bodyPr wrap="square" rtlCol="0">
             <a:spAutoFit/>
           </a:bodyPr>
           <a:lstStyle/>
           <a:p>
+            <a:pPr algn="ctr"/>
             <a:r>
               <a:rPr lang="en-GB" sz="2800" b="1" i="1" dirty="0" smtClean="0">
                 <a:latin typeface="+mj-lt"/>
@@ -21443,8 +21578,8 @@
           </a:p>
         </p:txBody>
       </p:sp>
-      <mc:AlternateContent xmlns:mc="http://schemas.openxmlformats.org/markup-compatibility/2006" xmlns:a14="http://schemas.microsoft.com/office/drawing/2010/main">
-        <mc:Choice Requires="a14">
+      <mc:AlternateContent xmlns:mc="http://schemas.openxmlformats.org/markup-compatibility/2006">
+        <mc:Choice xmlns:a14="http://schemas.microsoft.com/office/drawing/2010/main" Requires="a14">
           <p:sp>
             <p:nvSpPr>
               <p:cNvPr id="5" name="TextBox 4"/>
@@ -21453,8 +21588,8 @@
             </p:nvSpPr>
             <p:spPr>
               <a:xfrm>
-                <a:off x="0" y="4664985"/>
-                <a:ext cx="19574589" cy="1754326"/>
+                <a:off x="231820" y="1569710"/>
+                <a:ext cx="11719775" cy="4387548"/>
               </a:xfrm>
               <a:prstGeom prst="rect">
                 <a:avLst/>
@@ -21462,14 +21597,14 @@
               <a:noFill/>
             </p:spPr>
             <p:txBody>
-              <a:bodyPr wrap="none" rtlCol="0">
+              <a:bodyPr wrap="square" rtlCol="0">
                 <a:spAutoFit/>
               </a:bodyPr>
               <a:lstStyle/>
               <a:p>
                 <a:r>
-                  <a:rPr lang="en-GB" dirty="0"/>
-                  <a:t>but we are training a model based on </a:t>
+                  <a:rPr lang="en-GB" dirty="0" smtClean="0"/>
+                  <a:t>In order to validate a model, it is necessary to compare it with another set of data </a:t>
                 </a:r>
                 <a14:m>
                   <m:oMath xmlns:m="http://schemas.openxmlformats.org/officeDocument/2006/math">
@@ -21506,14 +21641,33 @@
                   </m:oMath>
                 </a14:m>
                 <a:r>
+                  <a:rPr lang="en-GB" dirty="0" smtClean="0"/>
+                  <a:t>,</a:t>
+                </a:r>
+                <a:r>
                   <a:rPr lang="en-GB" dirty="0"/>
-                  <a:t> data and then check the cost function on the same data -&gt; we get a biased result.</a:t>
+                  <a:t> </a:t>
                 </a:r>
+                <a:r>
+                  <a:rPr lang="en-GB" dirty="0" smtClean="0"/>
+                  <a:t>since using again </a:t>
+                </a:r>
+                <a:br>
+                  <a:rPr lang="en-GB" dirty="0" smtClean="0"/>
+                </a:br>
+                <a:r>
+                  <a:rPr lang="en-GB" dirty="0" smtClean="0"/>
+                  <a:t>the training set would lead to non affordable (biased) results.</a:t>
+                </a:r>
+                <a:endParaRPr lang="en-GB" dirty="0" smtClean="0"/>
+              </a:p>
+              <a:p>
+                <a:endParaRPr lang="en-GB" dirty="0"/>
               </a:p>
               <a:p>
                 <a:r>
-                  <a:rPr lang="en-GB" dirty="0"/>
-                  <a:t>To get unbiased results we need to test the cost function on a different data set.</a:t>
+                  <a:rPr lang="en-GB" dirty="0" smtClean="0"/>
+                  <a:t>Unfortunately, as it is easy to see, all three sets are quite similar; because of this we cannot rely validation process only and further analysis are needed, even though it is a first step which allows us to have a impression.</a:t>
                 </a:r>
               </a:p>
               <a:p>
@@ -21521,8 +21675,8 @@
               </a:p>
               <a:p>
                 <a:r>
-                  <a:rPr lang="en-GB" dirty="0"/>
-                  <a:t>Unfortunately in this project the data is quite similar, though the second data set covariance function is a little different </a:t>
+                  <a:rPr lang="en-GB" dirty="0" smtClean="0"/>
+                  <a:t>As discussed in previous slides, there are many cost function we can make use of but in this project we have chosen the minimization of the simulation error </a:t>
                 </a:r>
                 <a14:m>
                   <m:oMath xmlns:m="http://schemas.openxmlformats.org/officeDocument/2006/math">
@@ -21530,25 +21684,192 @@
                       <a:rPr lang="en-GB" i="1">
                         <a:latin typeface="Cambria Math" panose="02040503050406030204" pitchFamily="18" charset="0"/>
                       </a:rPr>
-                      <m:t>⇒</m:t>
+                      <m:t>𝐸</m:t>
+                    </m:r>
+                    <m:d>
+                      <m:dPr>
+                        <m:begChr m:val="["/>
+                        <m:endChr m:val="]"/>
+                        <m:ctrlPr>
+                          <a:rPr lang="en-GB" i="1">
+                            <a:latin typeface="Cambria Math" panose="02040503050406030204" pitchFamily="18" charset="0"/>
+                          </a:rPr>
+                        </m:ctrlPr>
+                      </m:dPr>
+                      <m:e>
+                        <m:sSup>
+                          <m:sSupPr>
+                            <m:ctrlPr>
+                              <a:rPr lang="en-GB" i="1">
+                                <a:latin typeface="Cambria Math" panose="02040503050406030204" pitchFamily="18" charset="0"/>
+                              </a:rPr>
+                            </m:ctrlPr>
+                          </m:sSupPr>
+                          <m:e>
+                            <m:d>
+                              <m:dPr>
+                                <m:ctrlPr>
+                                  <a:rPr lang="en-GB" i="1">
+                                    <a:latin typeface="Cambria Math" panose="02040503050406030204" pitchFamily="18" charset="0"/>
+                                  </a:rPr>
+                                </m:ctrlPr>
+                              </m:dPr>
+                              <m:e>
+                                <m:r>
+                                  <a:rPr lang="en-GB" i="1">
+                                    <a:latin typeface="Cambria Math" panose="02040503050406030204" pitchFamily="18" charset="0"/>
+                                  </a:rPr>
+                                  <m:t>𝑦</m:t>
+                                </m:r>
+                                <m:d>
+                                  <m:dPr>
+                                    <m:ctrlPr>
+                                      <a:rPr lang="en-GB" i="1">
+                                        <a:latin typeface="Cambria Math" panose="02040503050406030204" pitchFamily="18" charset="0"/>
+                                      </a:rPr>
+                                    </m:ctrlPr>
+                                  </m:dPr>
+                                  <m:e>
+                                    <m:r>
+                                      <a:rPr lang="en-GB" i="1">
+                                        <a:latin typeface="Cambria Math" panose="02040503050406030204" pitchFamily="18" charset="0"/>
+                                      </a:rPr>
+                                      <m:t>𝑡</m:t>
+                                    </m:r>
+                                  </m:e>
+                                </m:d>
+                                <m:r>
+                                  <a:rPr lang="en-GB" i="1">
+                                    <a:latin typeface="Cambria Math" panose="02040503050406030204" pitchFamily="18" charset="0"/>
+                                  </a:rPr>
+                                  <m:t>−</m:t>
+                                </m:r>
+                                <m:acc>
+                                  <m:accPr>
+                                    <m:chr m:val="̂"/>
+                                    <m:ctrlPr>
+                                      <a:rPr lang="en-GB" i="1">
+                                        <a:latin typeface="Cambria Math" panose="02040503050406030204" pitchFamily="18" charset="0"/>
+                                      </a:rPr>
+                                    </m:ctrlPr>
+                                  </m:accPr>
+                                  <m:e>
+                                    <m:r>
+                                      <a:rPr lang="en-GB" i="1">
+                                        <a:latin typeface="Cambria Math" panose="02040503050406030204" pitchFamily="18" charset="0"/>
+                                      </a:rPr>
+                                      <m:t>𝑦</m:t>
+                                    </m:r>
+                                  </m:e>
+                                </m:acc>
+                                <m:d>
+                                  <m:dPr>
+                                    <m:ctrlPr>
+                                      <a:rPr lang="en-GB" i="1">
+                                        <a:latin typeface="Cambria Math" panose="02040503050406030204" pitchFamily="18" charset="0"/>
+                                      </a:rPr>
+                                    </m:ctrlPr>
+                                  </m:dPr>
+                                  <m:e>
+                                    <m:r>
+                                      <a:rPr lang="en-GB" i="1">
+                                        <a:latin typeface="Cambria Math" panose="02040503050406030204" pitchFamily="18" charset="0"/>
+                                      </a:rPr>
+                                      <m:t>𝑡</m:t>
+                                    </m:r>
+                                  </m:e>
+                                </m:d>
+                              </m:e>
+                            </m:d>
+                          </m:e>
+                          <m:sup>
+                            <m:r>
+                              <a:rPr lang="en-GB" i="1">
+                                <a:latin typeface="Cambria Math" panose="02040503050406030204" pitchFamily="18" charset="0"/>
+                              </a:rPr>
+                              <m:t>2</m:t>
+                            </m:r>
+                          </m:sup>
+                        </m:sSup>
+                      </m:e>
+                    </m:d>
+                    <m:r>
+                      <a:rPr lang="it-IT" b="0" i="0" smtClean="0">
+                        <a:latin typeface="Cambria Math" panose="02040503050406030204" pitchFamily="18" charset="0"/>
+                      </a:rPr>
+                      <m:t>.</m:t>
                     </m:r>
                   </m:oMath>
                 </a14:m>
+                <a:endParaRPr lang="en-GB" dirty="0" smtClean="0"/>
+              </a:p>
+              <a:p>
                 <a:r>
                   <a:rPr lang="en-GB" dirty="0"/>
-                  <a:t> We may test the cost function on a subset of this experiment. 	</a:t>
+                  <a:t>	</a:t>
                 </a:r>
               </a:p>
               <a:p>
-                <a:endParaRPr lang="en-GB" dirty="0"/>
+                <a:r>
+                  <a:rPr lang="en-GB" dirty="0" smtClean="0"/>
+                  <a:t>The validation will be performed in this way:</a:t>
+                </a:r>
               </a:p>
               <a:p>
+                <a:pPr marL="800100" lvl="1" indent="-342900">
+                  <a:buFont typeface="+mj-lt"/>
+                  <a:buAutoNum type="arabicPeriod"/>
+                </a:pPr>
+                <a:r>
+                  <a:rPr lang="en-GB" i="1" dirty="0" smtClean="0"/>
+                  <a:t>Choose a model class</a:t>
+                </a:r>
+              </a:p>
+              <a:p>
+                <a:pPr marL="800100" lvl="1" indent="-342900">
+                  <a:buFont typeface="+mj-lt"/>
+                  <a:buAutoNum type="arabicPeriod"/>
+                </a:pPr>
+                <a:r>
+                  <a:rPr lang="en-GB" i="1" dirty="0" smtClean="0"/>
+                  <a:t>Identify a model from one dataset using different order of complexity and keeping best fit</a:t>
+                </a:r>
+              </a:p>
+              <a:p>
+                <a:pPr marL="800100" lvl="1" indent="-342900">
+                  <a:buFont typeface="+mj-lt"/>
+                  <a:buAutoNum type="arabicPeriod"/>
+                </a:pPr>
+                <a:r>
+                  <a:rPr lang="en-GB" i="1" dirty="0" smtClean="0"/>
+                  <a:t>Validate data on the other two dataset and write down results</a:t>
+                </a:r>
+              </a:p>
+              <a:p>
+                <a:pPr marL="800100" lvl="1" indent="-342900">
+                  <a:buFont typeface="+mj-lt"/>
+                  <a:buAutoNum type="arabicPeriod"/>
+                </a:pPr>
+                <a:r>
+                  <a:rPr lang="en-GB" i="1" dirty="0" smtClean="0"/>
+                  <a:t>Repeat point 2. and 3. picking another dataset for training and the others for validation</a:t>
+                </a:r>
+              </a:p>
+              <a:p>
+                <a:pPr marL="800100" lvl="1" indent="-342900">
+                  <a:buFont typeface="+mj-lt"/>
+                  <a:buAutoNum type="arabicPeriod"/>
+                </a:pPr>
+                <a:r>
+                  <a:rPr lang="en-GB" i="1" dirty="0" smtClean="0"/>
+                  <a:t>Repeat from point 1. with another model class</a:t>
+                </a:r>
                 <a:endParaRPr lang="en-GB" dirty="0"/>
               </a:p>
             </p:txBody>
           </p:sp>
         </mc:Choice>
-        <mc:Fallback xmlns="">
+        <mc:Fallback>
           <p:sp>
             <p:nvSpPr>
               <p:cNvPr id="5" name="TextBox 4"/>
@@ -21559,8 +21880,8 @@
             </p:nvSpPr>
             <p:spPr>
               <a:xfrm>
-                <a:off x="0" y="4664985"/>
-                <a:ext cx="19574589" cy="1754326"/>
+                <a:off x="231820" y="1569710"/>
+                <a:ext cx="11719775" cy="4387548"/>
               </a:xfrm>
               <a:prstGeom prst="rect">
                 <a:avLst/>
@@ -21568,7 +21889,7 @@
               <a:blipFill rotWithShape="0">
                 <a:blip r:embed="rId2"/>
                 <a:stretch>
-                  <a:fillRect l="-249" t="-1736"/>
+                  <a:fillRect l="-416" t="-694" b="-1250"/>
                 </a:stretch>
               </a:blipFill>
             </p:spPr>
@@ -21577,7 +21898,7 @@
               <a:lstStyle/>
               <a:p>
                 <a:r>
-                  <a:rPr lang="en-GB">
+                  <a:rPr lang="it-IT">
                     <a:noFill/>
                   </a:rPr>
                   <a:t> </a:t>
@@ -21591,142 +21912,6 @@
     <p:extLst>
       <p:ext uri="{BB962C8B-B14F-4D97-AF65-F5344CB8AC3E}">
         <p14:creationId xmlns:p14="http://schemas.microsoft.com/office/powerpoint/2010/main" val="55177232"/>
-      </p:ext>
-    </p:extLst>
-  </p:cSld>
-  <p:clrMapOvr>
-    <a:masterClrMapping/>
-  </p:clrMapOvr>
-  <p:timing>
-    <p:tnLst>
-      <p:par>
-        <p:cTn id="1" dur="indefinite" restart="never" nodeType="tmRoot"/>
-      </p:par>
-    </p:tnLst>
-  </p:timing>
-</p:sld>
-</file>
-
-<file path=ppt/slides/slide26.xml><?xml version="1.0" encoding="utf-8"?>
-<p:sld xmlns:a="http://schemas.openxmlformats.org/drawingml/2006/main" xmlns:r="http://schemas.openxmlformats.org/officeDocument/2006/relationships" xmlns:p="http://schemas.openxmlformats.org/presentationml/2006/main">
-  <p:cSld>
-    <p:spTree>
-      <p:nvGrpSpPr>
-        <p:cNvPr id="1" name=""/>
-        <p:cNvGrpSpPr/>
-        <p:nvPr/>
-      </p:nvGrpSpPr>
-      <p:grpSpPr>
-        <a:xfrm>
-          <a:off x="0" y="0"/>
-          <a:ext cx="0" cy="0"/>
-          <a:chOff x="0" y="0"/>
-          <a:chExt cx="0" cy="0"/>
-        </a:xfrm>
-      </p:grpSpPr>
-      <p:sp>
-        <p:nvSpPr>
-          <p:cNvPr id="2" name="Slide Number Placeholder 1"/>
-          <p:cNvSpPr>
-            <a:spLocks noGrp="1"/>
-          </p:cNvSpPr>
-          <p:nvPr>
-            <p:ph type="sldNum" sz="quarter" idx="10"/>
-          </p:nvPr>
-        </p:nvSpPr>
-        <p:spPr/>
-        <p:txBody>
-          <a:bodyPr/>
-          <a:lstStyle/>
-          <a:p>
-            <a:fld id="{61155BBA-336D-4AED-BB34-E42D9706BCE7}" type="slidenum">
-              <a:rPr lang="it-IT" altLang="en-US" smtClean="0"/>
-              <a:pPr/>
-              <a:t>26</a:t>
-            </a:fld>
-            <a:endParaRPr lang="it-IT" altLang="en-US"/>
-          </a:p>
-        </p:txBody>
-      </p:sp>
-      <p:sp>
-        <p:nvSpPr>
-          <p:cNvPr id="3" name="TextBox 2"/>
-          <p:cNvSpPr txBox="1"/>
-          <p:nvPr/>
-        </p:nvSpPr>
-        <p:spPr>
-          <a:xfrm>
-            <a:off x="4746912" y="1033790"/>
-            <a:ext cx="2698175" cy="523220"/>
-          </a:xfrm>
-          <a:prstGeom prst="rect">
-            <a:avLst/>
-          </a:prstGeom>
-          <a:noFill/>
-        </p:spPr>
-        <p:txBody>
-          <a:bodyPr wrap="none" rtlCol="0">
-            <a:spAutoFit/>
-          </a:bodyPr>
-          <a:lstStyle/>
-          <a:p>
-            <a:r>
-              <a:rPr lang="en-GB" sz="2800" b="1" i="1" dirty="0" smtClean="0">
-                <a:latin typeface="+mj-lt"/>
-              </a:rPr>
-              <a:t>CONCLUSION</a:t>
-            </a:r>
-          </a:p>
-        </p:txBody>
-      </p:sp>
-      <p:sp>
-        <p:nvSpPr>
-          <p:cNvPr id="4" name="TextBox 3"/>
-          <p:cNvSpPr txBox="1"/>
-          <p:nvPr/>
-        </p:nvSpPr>
-        <p:spPr>
-          <a:xfrm>
-            <a:off x="6956299" y="173782"/>
-            <a:ext cx="3512308" cy="369332"/>
-          </a:xfrm>
-          <a:prstGeom prst="rect">
-            <a:avLst/>
-          </a:prstGeom>
-          <a:noFill/>
-        </p:spPr>
-        <p:txBody>
-          <a:bodyPr wrap="none" rtlCol="0">
-            <a:spAutoFit/>
-          </a:bodyPr>
-          <a:lstStyle/>
-          <a:p>
-            <a:r>
-              <a:rPr lang="en-GB" b="1" dirty="0" smtClean="0">
-                <a:solidFill>
-                  <a:srgbClr val="FF0000"/>
-                </a:solidFill>
-                <a:latin typeface="DejaVu Sans" panose="020B0603030804020204" pitchFamily="34" charset="0"/>
-                <a:ea typeface="DejaVu Sans" panose="020B0603030804020204" pitchFamily="34" charset="0"/>
-                <a:cs typeface="DejaVu Sans" panose="020B0603030804020204" pitchFamily="34" charset="0"/>
-              </a:rPr>
-              <a:t>CONCLUSION &amp; REMARKS</a:t>
-            </a:r>
-            <a:endParaRPr lang="en-GB" b="1" dirty="0">
-              <a:solidFill>
-                <a:srgbClr val="FF0000"/>
-              </a:solidFill>
-              <a:latin typeface="DejaVu Sans" panose="020B0603030804020204" pitchFamily="34" charset="0"/>
-              <a:ea typeface="DejaVu Sans" panose="020B0603030804020204" pitchFamily="34" charset="0"/>
-              <a:cs typeface="DejaVu Sans" panose="020B0603030804020204" pitchFamily="34" charset="0"/>
-            </a:endParaRPr>
-          </a:p>
-        </p:txBody>
-      </p:sp>
-    </p:spTree>
-    <p:extLst>
-      <p:ext uri="{BB962C8B-B14F-4D97-AF65-F5344CB8AC3E}">
-        <p14:creationId xmlns:p14="http://schemas.microsoft.com/office/powerpoint/2010/main" val="2463455316"/>
       </p:ext>
     </p:extLst>
   </p:cSld>
@@ -21786,95 +21971,271 @@
       </p:sp>
       <p:sp>
         <p:nvSpPr>
-          <p:cNvPr id="4" name="Rectangle 3"/>
-          <p:cNvSpPr/>
+          <p:cNvPr id="3" name="TextBox 2"/>
+          <p:cNvSpPr txBox="1"/>
           <p:nvPr/>
         </p:nvSpPr>
         <p:spPr>
           <a:xfrm>
-            <a:off x="2444744" y="2588350"/>
-            <a:ext cx="7302512" cy="1754326"/>
+            <a:off x="231820" y="1046490"/>
+            <a:ext cx="11797048" cy="523220"/>
           </a:xfrm>
           <a:prstGeom prst="rect">
             <a:avLst/>
           </a:prstGeom>
+          <a:noFill/>
         </p:spPr>
-        <p:style>
-          <a:lnRef idx="3">
-            <a:schemeClr val="lt1"/>
-          </a:lnRef>
-          <a:fillRef idx="1">
-            <a:schemeClr val="accent5"/>
-          </a:fillRef>
-          <a:effectRef idx="1">
-            <a:schemeClr val="accent5"/>
-          </a:effectRef>
-          <a:fontRef idx="minor">
-            <a:schemeClr val="lt1"/>
-          </a:fontRef>
-        </p:style>
         <p:txBody>
-          <a:bodyPr wrap="none" lIns="91440" tIns="45720" rIns="91440" bIns="45720">
+          <a:bodyPr wrap="square" rtlCol="0">
             <a:spAutoFit/>
           </a:bodyPr>
           <a:lstStyle/>
           <a:p>
             <a:pPr algn="ctr"/>
             <a:r>
-              <a:rPr lang="en-US" sz="5400" b="0" cap="none" spc="0" dirty="0" smtClean="0">
-                <a:ln w="0"/>
+              <a:rPr lang="en-GB" sz="2800" b="1" i="1" dirty="0" smtClean="0">
+                <a:latin typeface="+mj-lt"/>
+              </a:rPr>
+              <a:t>MODEL </a:t>
+            </a:r>
+            <a:r>
+              <a:rPr lang="en-GB" sz="2800" b="1" i="1" dirty="0" smtClean="0">
+                <a:latin typeface="+mj-lt"/>
+              </a:rPr>
+              <a:t>VALIDATION - ARX</a:t>
+            </a:r>
+            <a:endParaRPr lang="en-GB" sz="2800" b="1" i="1" dirty="0" smtClean="0">
+              <a:latin typeface="+mj-lt"/>
+            </a:endParaRPr>
+          </a:p>
+        </p:txBody>
+      </p:sp>
+      <p:sp>
+        <p:nvSpPr>
+          <p:cNvPr id="4" name="TextBox 3"/>
+          <p:cNvSpPr txBox="1"/>
+          <p:nvPr/>
+        </p:nvSpPr>
+        <p:spPr>
+          <a:xfrm>
+            <a:off x="7078960" y="173782"/>
+            <a:ext cx="2746393" cy="369332"/>
+          </a:xfrm>
+          <a:prstGeom prst="rect">
+            <a:avLst/>
+          </a:prstGeom>
+          <a:noFill/>
+        </p:spPr>
+        <p:txBody>
+          <a:bodyPr wrap="none" rtlCol="0">
+            <a:spAutoFit/>
+          </a:bodyPr>
+          <a:lstStyle/>
+          <a:p>
+            <a:r>
+              <a:rPr lang="en-GB" b="1" dirty="0" smtClean="0">
                 <a:solidFill>
-                  <a:schemeClr val="tx1"/>
+                  <a:srgbClr val="FF0000"/>
                 </a:solidFill>
-                <a:effectLst>
-                  <a:outerShdw blurRad="38100" dist="19050" dir="2700000" algn="tl" rotWithShape="0">
-                    <a:schemeClr val="dk1">
-                      <a:alpha val="40000"/>
-                    </a:schemeClr>
-                  </a:outerShdw>
-                </a:effectLst>
+                <a:latin typeface="DejaVu Sans" panose="020B0603030804020204" pitchFamily="34" charset="0"/>
+                <a:ea typeface="DejaVu Sans" panose="020B0603030804020204" pitchFamily="34" charset="0"/>
+                <a:cs typeface="DejaVu Sans" panose="020B0603030804020204" pitchFamily="34" charset="0"/>
               </a:rPr>
-              <a:t>WHAT WENT WRONG</a:t>
-            </a:r>
-          </a:p>
-          <a:p>
-            <a:pPr algn="ctr"/>
-            <a:r>
-              <a:rPr lang="en-US" sz="5400" dirty="0" smtClean="0">
-                <a:ln w="0"/>
-                <a:solidFill>
-                  <a:schemeClr val="tx1"/>
-                </a:solidFill>
-                <a:effectLst>
-                  <a:outerShdw blurRad="38100" dist="19050" dir="2700000" algn="tl" rotWithShape="0">
-                    <a:schemeClr val="dk1">
-                      <a:alpha val="40000"/>
-                    </a:schemeClr>
-                  </a:outerShdw>
-                </a:effectLst>
-              </a:rPr>
-              <a:t>AND WHY</a:t>
-            </a:r>
-            <a:endParaRPr lang="en-US" sz="5400" b="0" cap="none" spc="0" dirty="0">
-              <a:ln w="0"/>
+              <a:t>MODEL VALIDATION</a:t>
+            </a:r>
+            <a:endParaRPr lang="en-GB" b="1" dirty="0">
               <a:solidFill>
-                <a:schemeClr val="tx1"/>
+                <a:srgbClr val="FF0000"/>
               </a:solidFill>
-              <a:effectLst>
-                <a:outerShdw blurRad="38100" dist="19050" dir="2700000" algn="tl" rotWithShape="0">
-                  <a:schemeClr val="dk1">
-                    <a:alpha val="40000"/>
-                  </a:schemeClr>
-                </a:outerShdw>
-              </a:effectLst>
+              <a:latin typeface="DejaVu Sans" panose="020B0603030804020204" pitchFamily="34" charset="0"/>
+              <a:ea typeface="DejaVu Sans" panose="020B0603030804020204" pitchFamily="34" charset="0"/>
+              <a:cs typeface="DejaVu Sans" panose="020B0603030804020204" pitchFamily="34" charset="0"/>
             </a:endParaRPr>
+          </a:p>
+        </p:txBody>
+      </p:sp>
+      <p:sp>
+        <p:nvSpPr>
+          <p:cNvPr id="5" name="TextBox 4"/>
+          <p:cNvSpPr txBox="1"/>
+          <p:nvPr/>
+        </p:nvSpPr>
+        <p:spPr>
+          <a:xfrm>
+            <a:off x="231820" y="1569710"/>
+            <a:ext cx="11719775" cy="4524315"/>
+          </a:xfrm>
+          <a:prstGeom prst="rect">
+            <a:avLst/>
+          </a:prstGeom>
+          <a:noFill/>
+        </p:spPr>
+        <p:txBody>
+          <a:bodyPr wrap="square" rtlCol="0">
+            <a:spAutoFit/>
+          </a:bodyPr>
+          <a:lstStyle/>
+          <a:p>
+            <a:endParaRPr lang="en-GB" dirty="0" smtClean="0"/>
+          </a:p>
+          <a:p>
+            <a:r>
+              <a:rPr lang="it-IT" dirty="0"/>
+              <a:t>*Training on 1 exp</a:t>
+            </a:r>
+          </a:p>
+          <a:p>
+            <a:r>
+              <a:rPr lang="pl-PL" dirty="0"/>
+              <a:t>A(z): 1     -1.9551     0.64593     0.70572    -0.41605    0.025549</a:t>
+            </a:r>
+          </a:p>
+          <a:p>
+            <a:r>
+              <a:rPr lang="pl-PL" dirty="0"/>
+              <a:t>B(z): 0           0     0.27464    -</a:t>
+            </a:r>
+            <a:r>
+              <a:rPr lang="pl-PL" dirty="0" smtClean="0"/>
+              <a:t>0.26442</a:t>
+            </a:r>
+            <a:endParaRPr lang="it-IT" dirty="0" smtClean="0"/>
+          </a:p>
+          <a:p>
+            <a:r>
+              <a:rPr lang="it-IT" dirty="0" smtClean="0"/>
+              <a:t>Validation </a:t>
+            </a:r>
+            <a:r>
+              <a:rPr lang="it-IT" dirty="0"/>
+              <a:t>on 1 exp: </a:t>
+            </a:r>
+            <a:r>
+              <a:rPr lang="it-IT" dirty="0" smtClean="0"/>
+              <a:t>68.191	Validation </a:t>
+            </a:r>
+            <a:r>
+              <a:rPr lang="it-IT" dirty="0"/>
+              <a:t>on 2 exp: </a:t>
+            </a:r>
+            <a:r>
+              <a:rPr lang="it-IT" dirty="0" smtClean="0"/>
+              <a:t>63.8589 	Validation </a:t>
+            </a:r>
+            <a:r>
+              <a:rPr lang="it-IT" dirty="0"/>
+              <a:t>on 3 exp: 86.9643</a:t>
+            </a:r>
+          </a:p>
+          <a:p>
+            <a:r>
+              <a:rPr lang="it" dirty="0"/>
+              <a:t> </a:t>
+            </a:r>
+          </a:p>
+          <a:p>
+            <a:r>
+              <a:rPr lang="it-IT" dirty="0"/>
+              <a:t>*Training on 2 exp</a:t>
+            </a:r>
+          </a:p>
+          <a:p>
+            <a:r>
+              <a:rPr lang="pl-PL" dirty="0"/>
+              <a:t>A(z): 1     -1.8858     0.50166     0.76105    -0.37101</a:t>
+            </a:r>
+          </a:p>
+          <a:p>
+            <a:r>
+              <a:rPr lang="pl-PL" dirty="0"/>
+              <a:t>B(z): 0           0     0.28013    -0.26904</a:t>
+            </a:r>
+          </a:p>
+          <a:p>
+            <a:r>
+              <a:rPr lang="it-IT" dirty="0" smtClean="0"/>
+              <a:t>Validation </a:t>
+            </a:r>
+            <a:r>
+              <a:rPr lang="it-IT" dirty="0"/>
+              <a:t>on 1 exp: </a:t>
+            </a:r>
+            <a:r>
+              <a:rPr lang="it-IT" dirty="0" smtClean="0"/>
+              <a:t>68.4208 	Validation </a:t>
+            </a:r>
+            <a:r>
+              <a:rPr lang="it-IT" dirty="0"/>
+              <a:t>on 2 exp: </a:t>
+            </a:r>
+            <a:r>
+              <a:rPr lang="it-IT" dirty="0" smtClean="0"/>
+              <a:t>63.2204 	Validation </a:t>
+            </a:r>
+            <a:r>
+              <a:rPr lang="it-IT" dirty="0"/>
+              <a:t>on 3 exp: 88.7234</a:t>
+            </a:r>
+          </a:p>
+          <a:p>
+            <a:r>
+              <a:rPr lang="it" dirty="0"/>
+              <a:t> </a:t>
+            </a:r>
+          </a:p>
+          <a:p>
+            <a:r>
+              <a:rPr lang="it-IT" dirty="0"/>
+              <a:t>*Training on 3 exp</a:t>
+            </a:r>
+          </a:p>
+          <a:p>
+            <a:r>
+              <a:rPr lang="pl-PL" dirty="0"/>
+              <a:t>A(z): 1     -1.8037      0.2948     0.93228    -0.41768</a:t>
+            </a:r>
+          </a:p>
+          <a:p>
+            <a:r>
+              <a:rPr lang="pl-PL" dirty="0"/>
+              <a:t>B(z): 0           0     0.17739   -0.033072     -0.1383</a:t>
+            </a:r>
+          </a:p>
+          <a:p>
+            <a:r>
+              <a:rPr lang="it-IT" dirty="0" smtClean="0"/>
+              <a:t>Validation </a:t>
+            </a:r>
+            <a:r>
+              <a:rPr lang="it-IT" dirty="0"/>
+              <a:t>on 1 exp: </a:t>
+            </a:r>
+            <a:r>
+              <a:rPr lang="it-IT" dirty="0" smtClean="0"/>
+              <a:t>67.6965 	Validation </a:t>
+            </a:r>
+            <a:r>
+              <a:rPr lang="it-IT" dirty="0"/>
+              <a:t>on 2 exp: </a:t>
+            </a:r>
+            <a:r>
+              <a:rPr lang="it-IT" dirty="0" smtClean="0"/>
+              <a:t>62.7143 	Validation </a:t>
+            </a:r>
+            <a:r>
+              <a:rPr lang="it-IT" dirty="0"/>
+              <a:t>on 3 exp: 85.5182</a:t>
+            </a:r>
+          </a:p>
+          <a:p>
+            <a:endParaRPr lang="en-GB" dirty="0"/>
           </a:p>
         </p:txBody>
       </p:sp>
     </p:spTree>
     <p:extLst>
       <p:ext uri="{BB962C8B-B14F-4D97-AF65-F5344CB8AC3E}">
-        <p14:creationId xmlns:p14="http://schemas.microsoft.com/office/powerpoint/2010/main" val="548125632"/>
+        <p14:creationId xmlns:p14="http://schemas.microsoft.com/office/powerpoint/2010/main" val="4065924737"/>
       </p:ext>
     </p:extLst>
   </p:cSld>
@@ -21934,14 +22295,55 @@
       </p:sp>
       <p:sp>
         <p:nvSpPr>
+          <p:cNvPr id="3" name="TextBox 2"/>
+          <p:cNvSpPr txBox="1"/>
+          <p:nvPr/>
+        </p:nvSpPr>
+        <p:spPr>
+          <a:xfrm>
+            <a:off x="231820" y="1046490"/>
+            <a:ext cx="11797048" cy="523220"/>
+          </a:xfrm>
+          <a:prstGeom prst="rect">
+            <a:avLst/>
+          </a:prstGeom>
+          <a:noFill/>
+        </p:spPr>
+        <p:txBody>
+          <a:bodyPr wrap="square" rtlCol="0">
+            <a:spAutoFit/>
+          </a:bodyPr>
+          <a:lstStyle/>
+          <a:p>
+            <a:pPr algn="ctr"/>
+            <a:r>
+              <a:rPr lang="en-GB" sz="2800" b="1" i="1" dirty="0" smtClean="0">
+                <a:latin typeface="+mj-lt"/>
+              </a:rPr>
+              <a:t>MODEL </a:t>
+            </a:r>
+            <a:r>
+              <a:rPr lang="en-GB" sz="2800" b="1" i="1" dirty="0" smtClean="0">
+                <a:latin typeface="+mj-lt"/>
+              </a:rPr>
+              <a:t>VALIDATION - OE</a:t>
+            </a:r>
+            <a:endParaRPr lang="en-GB" sz="2800" b="1" i="1" dirty="0" smtClean="0">
+              <a:latin typeface="+mj-lt"/>
+            </a:endParaRPr>
+          </a:p>
+        </p:txBody>
+      </p:sp>
+      <p:sp>
+        <p:nvSpPr>
           <p:cNvPr id="4" name="TextBox 3"/>
           <p:cNvSpPr txBox="1"/>
           <p:nvPr/>
         </p:nvSpPr>
         <p:spPr>
           <a:xfrm>
-            <a:off x="6956299" y="173782"/>
-            <a:ext cx="3973973" cy="369332"/>
+            <a:off x="7078960" y="173782"/>
+            <a:ext cx="2746393" cy="369332"/>
           </a:xfrm>
           <a:prstGeom prst="rect">
             <a:avLst/>
@@ -21954,7 +22356,6 @@
           </a:bodyPr>
           <a:lstStyle/>
           <a:p>
-            <a:pPr lvl="1"/>
             <a:r>
               <a:rPr lang="en-GB" b="1" dirty="0" smtClean="0">
                 <a:solidFill>
@@ -21964,7 +22365,7 @@
                 <a:ea typeface="DejaVu Sans" panose="020B0603030804020204" pitchFamily="34" charset="0"/>
                 <a:cs typeface="DejaVu Sans" panose="020B0603030804020204" pitchFamily="34" charset="0"/>
               </a:rPr>
-              <a:t>CONCLUSION &amp; REMARKS</a:t>
+              <a:t>MODEL VALIDATION</a:t>
             </a:r>
             <a:endParaRPr lang="en-GB" b="1" dirty="0">
               <a:solidFill>
@@ -21985,8 +22386,297 @@
         </p:nvSpPr>
         <p:spPr>
           <a:xfrm>
-            <a:off x="1375794" y="2181138"/>
-            <a:ext cx="7904728" cy="1200329"/>
+            <a:off x="231820" y="1569710"/>
+            <a:ext cx="11719775" cy="4247317"/>
+          </a:xfrm>
+          <a:prstGeom prst="rect">
+            <a:avLst/>
+          </a:prstGeom>
+          <a:noFill/>
+        </p:spPr>
+        <p:txBody>
+          <a:bodyPr wrap="square" rtlCol="0">
+            <a:spAutoFit/>
+          </a:bodyPr>
+          <a:lstStyle/>
+          <a:p>
+            <a:endParaRPr lang="en-GB" dirty="0" smtClean="0"/>
+          </a:p>
+          <a:p>
+            <a:r>
+              <a:rPr lang="it-IT" dirty="0"/>
+              <a:t>*Training on 1 </a:t>
+            </a:r>
+            <a:r>
+              <a:rPr lang="it-IT" dirty="0" smtClean="0"/>
+              <a:t>exp</a:t>
+            </a:r>
+            <a:endParaRPr lang="it" dirty="0"/>
+          </a:p>
+          <a:p>
+            <a:r>
+              <a:rPr lang="pl-PL" dirty="0"/>
+              <a:t>A(z): 1     -2.0798      1.5923     -1.0809     0.85391     -0.2781</a:t>
+            </a:r>
+          </a:p>
+          <a:p>
+            <a:r>
+              <a:rPr lang="pl-PL" dirty="0"/>
+              <a:t>B(z): 0           0    -0.17999     0.65694    -0.47025</a:t>
+            </a:r>
+          </a:p>
+          <a:p>
+            <a:r>
+              <a:rPr lang="it-IT" dirty="0" smtClean="0"/>
+              <a:t>Validation </a:t>
+            </a:r>
+            <a:r>
+              <a:rPr lang="it-IT" dirty="0"/>
+              <a:t>on 1 exp: </a:t>
+            </a:r>
+            <a:r>
+              <a:rPr lang="it-IT" dirty="0" smtClean="0"/>
+              <a:t>54.6866	Validation </a:t>
+            </a:r>
+            <a:r>
+              <a:rPr lang="it-IT" dirty="0"/>
+              <a:t>on 2 exp: </a:t>
+            </a:r>
+            <a:r>
+              <a:rPr lang="it-IT" dirty="0" smtClean="0"/>
+              <a:t>49.5952	Validation </a:t>
+            </a:r>
+            <a:r>
+              <a:rPr lang="it-IT" dirty="0"/>
+              <a:t>on 3 exp: 74.6829</a:t>
+            </a:r>
+          </a:p>
+          <a:p>
+            <a:r>
+              <a:rPr lang="it" dirty="0"/>
+              <a:t> </a:t>
+            </a:r>
+          </a:p>
+          <a:p>
+            <a:r>
+              <a:rPr lang="it-IT" dirty="0"/>
+              <a:t>*Training on 2 </a:t>
+            </a:r>
+            <a:r>
+              <a:rPr lang="it-IT" dirty="0" smtClean="0"/>
+              <a:t>exp</a:t>
+            </a:r>
+            <a:endParaRPr lang="it" dirty="0"/>
+          </a:p>
+          <a:p>
+            <a:r>
+              <a:rPr lang="pl-PL" dirty="0"/>
+              <a:t>A(z): 1      -2.046      1.4758    -0.99924     0.89773    -0.32148</a:t>
+            </a:r>
+          </a:p>
+          <a:p>
+            <a:r>
+              <a:rPr lang="pl-PL" dirty="0"/>
+              <a:t>B(z): 0           0    -0.19542     0.68029    -</a:t>
+            </a:r>
+            <a:r>
+              <a:rPr lang="pl-PL" dirty="0" smtClean="0"/>
+              <a:t>0.47878</a:t>
+            </a:r>
+            <a:endParaRPr lang="it-IT" dirty="0"/>
+          </a:p>
+          <a:p>
+            <a:r>
+              <a:rPr lang="it-IT" dirty="0"/>
+              <a:t>Validation on 1 exp: </a:t>
+            </a:r>
+            <a:r>
+              <a:rPr lang="it-IT" dirty="0" smtClean="0"/>
+              <a:t>54.9233	Validation </a:t>
+            </a:r>
+            <a:r>
+              <a:rPr lang="it-IT" dirty="0"/>
+              <a:t>on 2 exp: </a:t>
+            </a:r>
+            <a:r>
+              <a:rPr lang="it-IT" dirty="0" smtClean="0"/>
+              <a:t>49.3283	Validation </a:t>
+            </a:r>
+            <a:r>
+              <a:rPr lang="it-IT" dirty="0"/>
+              <a:t>on 3 exp: 75.5403</a:t>
+            </a:r>
+          </a:p>
+          <a:p>
+            <a:r>
+              <a:rPr lang="it" dirty="0"/>
+              <a:t> </a:t>
+            </a:r>
+          </a:p>
+          <a:p>
+            <a:r>
+              <a:rPr lang="it-IT" dirty="0"/>
+              <a:t>*Training on 3 </a:t>
+            </a:r>
+            <a:r>
+              <a:rPr lang="it-IT" dirty="0" smtClean="0"/>
+              <a:t>exp</a:t>
+            </a:r>
+            <a:endParaRPr lang="it" dirty="0"/>
+          </a:p>
+          <a:p>
+            <a:r>
+              <a:rPr lang="pl-PL" dirty="0"/>
+              <a:t>A(z): 1     -3.7358      5.1579     -3.0089     0.49021    0.096966</a:t>
+            </a:r>
+          </a:p>
+          <a:p>
+            <a:r>
+              <a:rPr lang="pl-PL" dirty="0"/>
+              <a:t>B(z): 0           0   -0.077889     0.61883     -1.3542      1.1687    -0.35517</a:t>
+            </a:r>
+          </a:p>
+          <a:p>
+            <a:r>
+              <a:rPr lang="it-IT" dirty="0" smtClean="0"/>
+              <a:t>Validation </a:t>
+            </a:r>
+            <a:r>
+              <a:rPr lang="it-IT" dirty="0"/>
+              <a:t>on 1 exp: </a:t>
+            </a:r>
+            <a:r>
+              <a:rPr lang="it-IT" dirty="0" smtClean="0"/>
+              <a:t>58.1653	Validation </a:t>
+            </a:r>
+            <a:r>
+              <a:rPr lang="it-IT" dirty="0"/>
+              <a:t>on 2 exp: </a:t>
+            </a:r>
+            <a:r>
+              <a:rPr lang="it-IT" dirty="0" smtClean="0"/>
+              <a:t>49.5579	Validation </a:t>
+            </a:r>
+            <a:r>
+              <a:rPr lang="it-IT" dirty="0"/>
+              <a:t>on 3 exp: 62.7157</a:t>
+            </a:r>
+            <a:endParaRPr lang="en-GB" dirty="0"/>
+          </a:p>
+        </p:txBody>
+      </p:sp>
+    </p:spTree>
+    <p:extLst>
+      <p:ext uri="{BB962C8B-B14F-4D97-AF65-F5344CB8AC3E}">
+        <p14:creationId xmlns:p14="http://schemas.microsoft.com/office/powerpoint/2010/main" val="1262541392"/>
+      </p:ext>
+    </p:extLst>
+  </p:cSld>
+  <p:clrMapOvr>
+    <a:masterClrMapping/>
+  </p:clrMapOvr>
+  <p:timing>
+    <p:tnLst>
+      <p:par>
+        <p:cTn id="1" dur="indefinite" restart="never" nodeType="tmRoot"/>
+      </p:par>
+    </p:tnLst>
+  </p:timing>
+</p:sld>
+</file>
+
+<file path=ppt/slides/slide29.xml><?xml version="1.0" encoding="utf-8"?>
+<p:sld xmlns:a="http://schemas.openxmlformats.org/drawingml/2006/main" xmlns:r="http://schemas.openxmlformats.org/officeDocument/2006/relationships" xmlns:p="http://schemas.openxmlformats.org/presentationml/2006/main">
+  <p:cSld>
+    <p:spTree>
+      <p:nvGrpSpPr>
+        <p:cNvPr id="1" name=""/>
+        <p:cNvGrpSpPr/>
+        <p:nvPr/>
+      </p:nvGrpSpPr>
+      <p:grpSpPr>
+        <a:xfrm>
+          <a:off x="0" y="0"/>
+          <a:ext cx="0" cy="0"/>
+          <a:chOff x="0" y="0"/>
+          <a:chExt cx="0" cy="0"/>
+        </a:xfrm>
+      </p:grpSpPr>
+      <p:sp>
+        <p:nvSpPr>
+          <p:cNvPr id="2" name="Slide Number Placeholder 1"/>
+          <p:cNvSpPr>
+            <a:spLocks noGrp="1"/>
+          </p:cNvSpPr>
+          <p:nvPr>
+            <p:ph type="sldNum" sz="quarter" idx="10"/>
+          </p:nvPr>
+        </p:nvSpPr>
+        <p:spPr/>
+        <p:txBody>
+          <a:bodyPr/>
+          <a:lstStyle/>
+          <a:p>
+            <a:fld id="{61155BBA-336D-4AED-BB34-E42D9706BCE7}" type="slidenum">
+              <a:rPr lang="it-IT" altLang="en-US" smtClean="0"/>
+              <a:pPr/>
+              <a:t>29</a:t>
+            </a:fld>
+            <a:endParaRPr lang="it-IT" altLang="en-US"/>
+          </a:p>
+        </p:txBody>
+      </p:sp>
+      <p:sp>
+        <p:nvSpPr>
+          <p:cNvPr id="3" name="TextBox 2"/>
+          <p:cNvSpPr txBox="1"/>
+          <p:nvPr/>
+        </p:nvSpPr>
+        <p:spPr>
+          <a:xfrm>
+            <a:off x="231820" y="1046490"/>
+            <a:ext cx="11797048" cy="523220"/>
+          </a:xfrm>
+          <a:prstGeom prst="rect">
+            <a:avLst/>
+          </a:prstGeom>
+          <a:noFill/>
+        </p:spPr>
+        <p:txBody>
+          <a:bodyPr wrap="square" rtlCol="0">
+            <a:spAutoFit/>
+          </a:bodyPr>
+          <a:lstStyle/>
+          <a:p>
+            <a:pPr algn="ctr"/>
+            <a:r>
+              <a:rPr lang="en-GB" sz="2800" b="1" i="1" dirty="0" smtClean="0">
+                <a:latin typeface="+mj-lt"/>
+              </a:rPr>
+              <a:t>MODEL </a:t>
+            </a:r>
+            <a:r>
+              <a:rPr lang="en-GB" sz="2800" b="1" i="1" dirty="0" smtClean="0">
+                <a:latin typeface="+mj-lt"/>
+              </a:rPr>
+              <a:t>VALIDATION</a:t>
+            </a:r>
+            <a:endParaRPr lang="en-GB" sz="2800" b="1" i="1" dirty="0" smtClean="0">
+              <a:latin typeface="+mj-lt"/>
+            </a:endParaRPr>
+          </a:p>
+        </p:txBody>
+      </p:sp>
+      <p:sp>
+        <p:nvSpPr>
+          <p:cNvPr id="4" name="TextBox 3"/>
+          <p:cNvSpPr txBox="1"/>
+          <p:nvPr/>
+        </p:nvSpPr>
+        <p:spPr>
+          <a:xfrm>
+            <a:off x="7078960" y="173782"/>
+            <a:ext cx="2746393" cy="369332"/>
           </a:xfrm>
           <a:prstGeom prst="rect">
             <a:avLst/>
@@ -22000,117 +22690,134 @@
           <a:lstStyle/>
           <a:p>
             <a:r>
+              <a:rPr lang="en-GB" b="1" dirty="0" smtClean="0">
+                <a:solidFill>
+                  <a:srgbClr val="FF0000"/>
+                </a:solidFill>
+                <a:latin typeface="DejaVu Sans" panose="020B0603030804020204" pitchFamily="34" charset="0"/>
+                <a:ea typeface="DejaVu Sans" panose="020B0603030804020204" pitchFamily="34" charset="0"/>
+                <a:cs typeface="DejaVu Sans" panose="020B0603030804020204" pitchFamily="34" charset="0"/>
+              </a:rPr>
+              <a:t>MODEL VALIDATION</a:t>
+            </a:r>
+            <a:endParaRPr lang="en-GB" b="1" dirty="0">
+              <a:solidFill>
+                <a:srgbClr val="FF0000"/>
+              </a:solidFill>
+              <a:latin typeface="DejaVu Sans" panose="020B0603030804020204" pitchFamily="34" charset="0"/>
+              <a:ea typeface="DejaVu Sans" panose="020B0603030804020204" pitchFamily="34" charset="0"/>
+              <a:cs typeface="DejaVu Sans" panose="020B0603030804020204" pitchFamily="34" charset="0"/>
+            </a:endParaRPr>
+          </a:p>
+        </p:txBody>
+      </p:sp>
+      <p:sp>
+        <p:nvSpPr>
+          <p:cNvPr id="5" name="TextBox 4"/>
+          <p:cNvSpPr txBox="1"/>
+          <p:nvPr/>
+        </p:nvSpPr>
+        <p:spPr>
+          <a:xfrm>
+            <a:off x="231820" y="1569710"/>
+            <a:ext cx="11719775" cy="1754326"/>
+          </a:xfrm>
+          <a:prstGeom prst="rect">
+            <a:avLst/>
+          </a:prstGeom>
+          <a:noFill/>
+        </p:spPr>
+        <p:txBody>
+          <a:bodyPr wrap="square" rtlCol="0">
+            <a:spAutoFit/>
+          </a:bodyPr>
+          <a:lstStyle/>
+          <a:p>
+            <a:r>
+              <a:rPr lang="en-GB" b="1" dirty="0" smtClean="0"/>
+              <a:t>OE</a:t>
+            </a:r>
+            <a:r>
               <a:rPr lang="en-GB" dirty="0" smtClean="0"/>
-              <a:t>Qui </a:t>
+              <a:t> performs better than </a:t>
+            </a:r>
+            <a:r>
+              <a:rPr lang="en-GB" b="1" dirty="0" smtClean="0"/>
+              <a:t>ARX</a:t>
+            </a:r>
+            <a:r>
+              <a:rPr lang="en-GB" dirty="0" smtClean="0"/>
+              <a:t> models as expected from the previous theoretical discussion.</a:t>
+            </a:r>
+          </a:p>
+          <a:p>
+            <a:endParaRPr lang="en-GB" b="1" dirty="0"/>
+          </a:p>
+          <a:p>
+            <a:r>
+              <a:rPr lang="en-GB" b="1" dirty="0" smtClean="0"/>
+              <a:t>ARMAX </a:t>
+            </a:r>
+            <a:r>
+              <a:rPr lang="en-GB" dirty="0" smtClean="0"/>
+              <a:t>and </a:t>
+            </a:r>
+            <a:r>
+              <a:rPr lang="en-GB" b="1" dirty="0" smtClean="0"/>
+              <a:t>BJ</a:t>
+            </a:r>
+            <a:r>
+              <a:rPr lang="en-GB" dirty="0" smtClean="0"/>
+              <a:t> give exactly the same results as </a:t>
+            </a:r>
+            <a:r>
+              <a:rPr lang="en-GB" b="1" dirty="0" smtClean="0"/>
+              <a:t>OE</a:t>
+            </a:r>
+            <a:r>
+              <a:rPr lang="en-GB" dirty="0" smtClean="0"/>
+              <a:t> models (explain </a:t>
             </a:r>
             <a:r>
               <a:rPr lang="en-GB" dirty="0" err="1" smtClean="0"/>
-              <a:t>possiamo</a:t>
+              <a:t>wtf</a:t>
             </a:r>
             <a:r>
               <a:rPr lang="en-GB" dirty="0" smtClean="0"/>
-              <a:t> </a:t>
+              <a:t> happens)</a:t>
+            </a:r>
+          </a:p>
+          <a:p>
+            <a:endParaRPr lang="en-GB" b="1" dirty="0"/>
+          </a:p>
+          <a:p>
+            <a:r>
+              <a:rPr lang="en-GB" dirty="0" smtClean="0"/>
+              <a:t>A deeper analysis can be done with a </a:t>
             </a:r>
             <a:r>
               <a:rPr lang="en-GB" dirty="0" err="1" smtClean="0"/>
-              <a:t>mettere</a:t>
+              <a:t>Matlab</a:t>
             </a:r>
             <a:r>
               <a:rPr lang="en-GB" dirty="0" smtClean="0"/>
-              <a:t> </a:t>
+              <a:t> script we wrote “</a:t>
             </a:r>
             <a:r>
               <a:rPr lang="en-GB" dirty="0" err="1" smtClean="0"/>
-              <a:t>tipo</a:t>
+              <a:t>compareModels</a:t>
             </a:r>
             <a:r>
               <a:rPr lang="en-GB" dirty="0" smtClean="0"/>
-              <a:t> le </a:t>
-            </a:r>
-            <a:r>
-              <a:rPr lang="en-GB" dirty="0" err="1" smtClean="0"/>
-              <a:t>ideee</a:t>
-            </a:r>
-            <a:r>
-              <a:rPr lang="en-GB" dirty="0" smtClean="0"/>
-              <a:t> </a:t>
-            </a:r>
-            <a:r>
-              <a:rPr lang="en-GB" dirty="0" err="1" smtClean="0"/>
-              <a:t>andate</a:t>
-            </a:r>
-            <a:r>
-              <a:rPr lang="en-GB" dirty="0" smtClean="0"/>
-              <a:t> male o da </a:t>
-            </a:r>
-            <a:r>
-              <a:rPr lang="en-GB" dirty="0" err="1" smtClean="0"/>
-              <a:t>provare</a:t>
-            </a:r>
-            <a:endParaRPr lang="en-GB" dirty="0" smtClean="0"/>
-          </a:p>
-          <a:p>
-            <a:r>
-              <a:rPr lang="en-GB" dirty="0" smtClean="0"/>
-              <a:t>-</a:t>
-            </a:r>
-            <a:r>
-              <a:rPr lang="en-GB" dirty="0" err="1" smtClean="0"/>
-              <a:t>interpolazione</a:t>
-            </a:r>
-            <a:r>
-              <a:rPr lang="en-GB" dirty="0" smtClean="0"/>
-              <a:t> </a:t>
-            </a:r>
-            <a:r>
-              <a:rPr lang="en-GB" dirty="0" err="1" smtClean="0"/>
-              <a:t>dati</a:t>
-            </a:r>
-            <a:r>
-              <a:rPr lang="en-GB" dirty="0" smtClean="0"/>
-              <a:t> + training </a:t>
-            </a:r>
-            <a:r>
-              <a:rPr lang="en-GB" dirty="0" err="1" smtClean="0"/>
-              <a:t>su</a:t>
-            </a:r>
-            <a:r>
-              <a:rPr lang="en-GB" dirty="0" smtClean="0"/>
-              <a:t> </a:t>
-            </a:r>
-            <a:r>
-              <a:rPr lang="en-GB" dirty="0" err="1" smtClean="0"/>
-              <a:t>essi</a:t>
-            </a:r>
-            <a:endParaRPr lang="en-GB" dirty="0" smtClean="0"/>
-          </a:p>
-          <a:p>
-            <a:r>
-              <a:rPr lang="en-GB" dirty="0" smtClean="0"/>
-              <a:t>-experiment have the same kind of shape-&gt; do an </a:t>
-            </a:r>
-            <a:r>
-              <a:rPr lang="en-GB" dirty="0" err="1" smtClean="0"/>
-              <a:t>avg</a:t>
-            </a:r>
-            <a:r>
-              <a:rPr lang="en-GB" dirty="0" smtClean="0"/>
-              <a:t> of the data and train</a:t>
-            </a:r>
-          </a:p>
-          <a:p>
-            <a:r>
-              <a:rPr lang="en-GB" dirty="0" smtClean="0"/>
-              <a:t>-use 2 experiments at time to do training and then validation on the other set</a:t>
-            </a:r>
-            <a:endParaRPr lang="en-GB" dirty="0"/>
+              <a:t>” which shows graphically this and that.</a:t>
+            </a:r>
           </a:p>
         </p:txBody>
       </p:sp>
     </p:spTree>
     <p:extLst>
       <p:ext uri="{BB962C8B-B14F-4D97-AF65-F5344CB8AC3E}">
-        <p14:creationId xmlns:p14="http://schemas.microsoft.com/office/powerpoint/2010/main" val="3455597643"/>
+        <p14:creationId xmlns:p14="http://schemas.microsoft.com/office/powerpoint/2010/main" val="1775920175"/>
       </p:ext>
     </p:extLst>
   </p:cSld>
@@ -22895,6 +23602,1236 @@
 </p:sld>
 </file>
 
+<file path=ppt/slides/slide30.xml><?xml version="1.0" encoding="utf-8"?>
+<p:sld xmlns:a="http://schemas.openxmlformats.org/drawingml/2006/main" xmlns:r="http://schemas.openxmlformats.org/officeDocument/2006/relationships" xmlns:p="http://schemas.openxmlformats.org/presentationml/2006/main">
+  <p:cSld>
+    <p:spTree>
+      <p:nvGrpSpPr>
+        <p:cNvPr id="1" name=""/>
+        <p:cNvGrpSpPr/>
+        <p:nvPr/>
+      </p:nvGrpSpPr>
+      <p:grpSpPr>
+        <a:xfrm>
+          <a:off x="0" y="0"/>
+          <a:ext cx="0" cy="0"/>
+          <a:chOff x="0" y="0"/>
+          <a:chExt cx="0" cy="0"/>
+        </a:xfrm>
+      </p:grpSpPr>
+      <p:sp>
+        <p:nvSpPr>
+          <p:cNvPr id="2" name="Slide Number Placeholder 1"/>
+          <p:cNvSpPr>
+            <a:spLocks noGrp="1"/>
+          </p:cNvSpPr>
+          <p:nvPr>
+            <p:ph type="sldNum" sz="quarter" idx="10"/>
+          </p:nvPr>
+        </p:nvSpPr>
+        <p:spPr/>
+        <p:txBody>
+          <a:bodyPr/>
+          <a:lstStyle/>
+          <a:p>
+            <a:fld id="{61155BBA-336D-4AED-BB34-E42D9706BCE7}" type="slidenum">
+              <a:rPr lang="it-IT" altLang="en-US" smtClean="0"/>
+              <a:pPr/>
+              <a:t>30</a:t>
+            </a:fld>
+            <a:endParaRPr lang="it-IT" altLang="en-US"/>
+          </a:p>
+        </p:txBody>
+      </p:sp>
+      <p:sp>
+        <p:nvSpPr>
+          <p:cNvPr id="4" name="TextBox 3"/>
+          <p:cNvSpPr txBox="1"/>
+          <p:nvPr/>
+        </p:nvSpPr>
+        <p:spPr>
+          <a:xfrm>
+            <a:off x="55812" y="1133341"/>
+            <a:ext cx="11642501" cy="5093702"/>
+          </a:xfrm>
+          <a:prstGeom prst="rect">
+            <a:avLst/>
+          </a:prstGeom>
+          <a:noFill/>
+        </p:spPr>
+        <p:txBody>
+          <a:bodyPr wrap="square" rtlCol="0">
+            <a:spAutoFit/>
+          </a:bodyPr>
+          <a:lstStyle/>
+          <a:p>
+            <a:pPr algn="ctr"/>
+            <a:r>
+              <a:rPr lang="it-IT" sz="2800" b="1" i="1" dirty="0">
+                <a:latin typeface="+mj-lt"/>
+              </a:rPr>
+              <a:t>MODEL VALIDATION </a:t>
+            </a:r>
+            <a:r>
+              <a:rPr lang="it-IT" sz="2800" b="1" i="1" dirty="0" smtClean="0">
+                <a:latin typeface="+mj-lt"/>
+              </a:rPr>
+              <a:t>– DYNAMICS</a:t>
+            </a:r>
+            <a:endParaRPr lang="it-IT" sz="2800" b="1" i="1" dirty="0">
+              <a:latin typeface="+mj-lt"/>
+            </a:endParaRPr>
+          </a:p>
+          <a:p>
+            <a:endParaRPr lang="it-IT" b="1" i="1" dirty="0" smtClean="0"/>
+          </a:p>
+          <a:p>
+            <a:r>
+              <a:rPr lang="it-IT" dirty="0" smtClean="0"/>
+              <a:t>Another way to discriminate among different models is to look at their dynamic behaviour.</a:t>
+            </a:r>
+          </a:p>
+          <a:p>
+            <a:endParaRPr lang="it-IT" dirty="0"/>
+          </a:p>
+          <a:p>
+            <a:pPr>
+              <a:lnSpc>
+                <a:spcPct val="150000"/>
+              </a:lnSpc>
+            </a:pPr>
+            <a:r>
+              <a:rPr lang="it-IT" dirty="0" smtClean="0"/>
+              <a:t>Here we will analyze:</a:t>
+            </a:r>
+          </a:p>
+          <a:p>
+            <a:pPr marL="742950" lvl="1" indent="-285750">
+              <a:lnSpc>
+                <a:spcPct val="150000"/>
+              </a:lnSpc>
+              <a:buFont typeface="Arial" panose="020B0604020202020204" pitchFamily="34" charset="0"/>
+              <a:buChar char="•"/>
+            </a:pPr>
+            <a:r>
+              <a:rPr lang="it-IT" dirty="0" smtClean="0"/>
+              <a:t>Poles and Zero</a:t>
+            </a:r>
+          </a:p>
+          <a:p>
+            <a:pPr marL="742950" lvl="1" indent="-285750">
+              <a:lnSpc>
+                <a:spcPct val="150000"/>
+              </a:lnSpc>
+              <a:buFont typeface="Arial" panose="020B0604020202020204" pitchFamily="34" charset="0"/>
+              <a:buChar char="•"/>
+            </a:pPr>
+            <a:r>
+              <a:rPr lang="it-IT" dirty="0" smtClean="0"/>
+              <a:t>Step response</a:t>
+            </a:r>
+          </a:p>
+          <a:p>
+            <a:pPr>
+              <a:lnSpc>
+                <a:spcPct val="150000"/>
+              </a:lnSpc>
+            </a:pPr>
+            <a:r>
+              <a:rPr lang="it-IT" dirty="0"/>
+              <a:t>t</a:t>
+            </a:r>
+            <a:r>
+              <a:rPr lang="it-IT" dirty="0" smtClean="0"/>
+              <a:t>rying to understand which dynamic best suit the actual system. </a:t>
+            </a:r>
+          </a:p>
+          <a:p>
+            <a:pPr>
+              <a:lnSpc>
+                <a:spcPct val="150000"/>
+              </a:lnSpc>
+            </a:pPr>
+            <a:endParaRPr lang="it-IT" dirty="0" smtClean="0"/>
+          </a:p>
+          <a:p>
+            <a:pPr>
+              <a:lnSpc>
+                <a:spcPct val="150000"/>
+              </a:lnSpc>
+            </a:pPr>
+            <a:r>
+              <a:rPr lang="it-IT" dirty="0" smtClean="0"/>
+              <a:t>We will also attempt to synthesize new models by shaping the pole-zero plot.</a:t>
+            </a:r>
+          </a:p>
+          <a:p>
+            <a:pPr>
+              <a:lnSpc>
+                <a:spcPct val="150000"/>
+              </a:lnSpc>
+            </a:pPr>
+            <a:endParaRPr lang="it-IT" b="1" i="1" dirty="0" smtClean="0"/>
+          </a:p>
+          <a:p>
+            <a:pPr>
+              <a:lnSpc>
+                <a:spcPct val="150000"/>
+              </a:lnSpc>
+            </a:pPr>
+            <a:r>
+              <a:rPr lang="it-IT" dirty="0" smtClean="0"/>
+              <a:t>Each model class is trained using the three dataset, leading to three different models for model class.</a:t>
+            </a:r>
+            <a:endParaRPr lang="it-IT" dirty="0"/>
+          </a:p>
+          <a:p>
+            <a:pPr>
+              <a:lnSpc>
+                <a:spcPct val="150000"/>
+              </a:lnSpc>
+            </a:pPr>
+            <a:r>
+              <a:rPr lang="it-IT" dirty="0" smtClean="0"/>
+              <a:t>Model classes tested: ARX, OE.</a:t>
+            </a:r>
+            <a:endParaRPr lang="it-IT" dirty="0"/>
+          </a:p>
+        </p:txBody>
+      </p:sp>
+    </p:spTree>
+    <p:extLst>
+      <p:ext uri="{BB962C8B-B14F-4D97-AF65-F5344CB8AC3E}">
+        <p14:creationId xmlns:p14="http://schemas.microsoft.com/office/powerpoint/2010/main" val="2084359161"/>
+      </p:ext>
+    </p:extLst>
+  </p:cSld>
+  <p:clrMapOvr>
+    <a:masterClrMapping/>
+  </p:clrMapOvr>
+</p:sld>
+</file>
+
+<file path=ppt/slides/slide31.xml><?xml version="1.0" encoding="utf-8"?>
+<p:sld xmlns:a="http://schemas.openxmlformats.org/drawingml/2006/main" xmlns:r="http://schemas.openxmlformats.org/officeDocument/2006/relationships" xmlns:p="http://schemas.openxmlformats.org/presentationml/2006/main">
+  <p:cSld>
+    <p:spTree>
+      <p:nvGrpSpPr>
+        <p:cNvPr id="1" name=""/>
+        <p:cNvGrpSpPr/>
+        <p:nvPr/>
+      </p:nvGrpSpPr>
+      <p:grpSpPr>
+        <a:xfrm>
+          <a:off x="0" y="0"/>
+          <a:ext cx="0" cy="0"/>
+          <a:chOff x="0" y="0"/>
+          <a:chExt cx="0" cy="0"/>
+        </a:xfrm>
+      </p:grpSpPr>
+      <p:sp>
+        <p:nvSpPr>
+          <p:cNvPr id="2" name="Slide Number Placeholder 1"/>
+          <p:cNvSpPr>
+            <a:spLocks noGrp="1"/>
+          </p:cNvSpPr>
+          <p:nvPr>
+            <p:ph type="sldNum" sz="quarter" idx="10"/>
+          </p:nvPr>
+        </p:nvSpPr>
+        <p:spPr/>
+        <p:txBody>
+          <a:bodyPr/>
+          <a:lstStyle/>
+          <a:p>
+            <a:fld id="{61155BBA-336D-4AED-BB34-E42D9706BCE7}" type="slidenum">
+              <a:rPr lang="it-IT" altLang="en-US" smtClean="0"/>
+              <a:pPr/>
+              <a:t>31</a:t>
+            </a:fld>
+            <a:endParaRPr lang="it-IT" altLang="en-US"/>
+          </a:p>
+        </p:txBody>
+      </p:sp>
+      <p:sp>
+        <p:nvSpPr>
+          <p:cNvPr id="4" name="TextBox 3"/>
+          <p:cNvSpPr txBox="1"/>
+          <p:nvPr/>
+        </p:nvSpPr>
+        <p:spPr>
+          <a:xfrm>
+            <a:off x="55812" y="1133341"/>
+            <a:ext cx="11642501" cy="923330"/>
+          </a:xfrm>
+          <a:prstGeom prst="rect">
+            <a:avLst/>
+          </a:prstGeom>
+          <a:noFill/>
+        </p:spPr>
+        <p:txBody>
+          <a:bodyPr wrap="square" rtlCol="0">
+            <a:spAutoFit/>
+          </a:bodyPr>
+          <a:lstStyle/>
+          <a:p>
+            <a:pPr algn="ctr"/>
+            <a:r>
+              <a:rPr lang="it-IT" sz="2800" b="1" i="1" dirty="0">
+                <a:latin typeface="+mj-lt"/>
+              </a:rPr>
+              <a:t>MODEL VALIDATION </a:t>
+            </a:r>
+            <a:r>
+              <a:rPr lang="it-IT" sz="2800" b="1" i="1" dirty="0" smtClean="0">
+                <a:latin typeface="+mj-lt"/>
+              </a:rPr>
+              <a:t>– DYNAMICS</a:t>
+            </a:r>
+          </a:p>
+          <a:p>
+            <a:pPr algn="ctr"/>
+            <a:endParaRPr lang="it-IT" sz="800" b="1" i="1" dirty="0">
+              <a:latin typeface="+mj-lt"/>
+            </a:endParaRPr>
+          </a:p>
+          <a:p>
+            <a:r>
+              <a:rPr lang="it-IT" b="1" i="1" dirty="0" smtClean="0"/>
+              <a:t>ARX MODELS</a:t>
+            </a:r>
+          </a:p>
+        </p:txBody>
+      </p:sp>
+      <p:pic>
+        <p:nvPicPr>
+          <p:cNvPr id="10" name="Picture 9"/>
+          <p:cNvPicPr>
+            <a:picLocks noChangeAspect="1"/>
+          </p:cNvPicPr>
+          <p:nvPr/>
+        </p:nvPicPr>
+        <p:blipFill>
+          <a:blip r:embed="rId2">
+            <a:extLst>
+              <a:ext uri="{28A0092B-C50C-407E-A947-70E740481C1C}">
+                <a14:useLocalDpi xmlns:a14="http://schemas.microsoft.com/office/drawing/2010/main" val="0"/>
+              </a:ext>
+            </a:extLst>
+          </a:blip>
+          <a:stretch>
+            <a:fillRect/>
+          </a:stretch>
+        </p:blipFill>
+        <p:spPr>
+          <a:xfrm>
+            <a:off x="47229" y="2204017"/>
+            <a:ext cx="4091184" cy="4000000"/>
+          </a:xfrm>
+          <a:prstGeom prst="rect">
+            <a:avLst/>
+          </a:prstGeom>
+        </p:spPr>
+      </p:pic>
+      <p:pic>
+        <p:nvPicPr>
+          <p:cNvPr id="11" name="Picture 10"/>
+          <p:cNvPicPr>
+            <a:picLocks noChangeAspect="1"/>
+          </p:cNvPicPr>
+          <p:nvPr/>
+        </p:nvPicPr>
+        <p:blipFill>
+          <a:blip r:embed="rId3">
+            <a:extLst>
+              <a:ext uri="{28A0092B-C50C-407E-A947-70E740481C1C}">
+                <a14:useLocalDpi xmlns:a14="http://schemas.microsoft.com/office/drawing/2010/main" val="0"/>
+              </a:ext>
+            </a:extLst>
+          </a:blip>
+          <a:stretch>
+            <a:fillRect/>
+          </a:stretch>
+        </p:blipFill>
+        <p:spPr>
+          <a:xfrm>
+            <a:off x="3770999" y="2204017"/>
+            <a:ext cx="4194959" cy="4000000"/>
+          </a:xfrm>
+          <a:prstGeom prst="rect">
+            <a:avLst/>
+          </a:prstGeom>
+        </p:spPr>
+      </p:pic>
+      <p:pic>
+        <p:nvPicPr>
+          <p:cNvPr id="12" name="Picture 11"/>
+          <p:cNvPicPr>
+            <a:picLocks noChangeAspect="1"/>
+          </p:cNvPicPr>
+          <p:nvPr/>
+        </p:nvPicPr>
+        <p:blipFill>
+          <a:blip r:embed="rId4">
+            <a:extLst>
+              <a:ext uri="{28A0092B-C50C-407E-A947-70E740481C1C}">
+                <a14:useLocalDpi xmlns:a14="http://schemas.microsoft.com/office/drawing/2010/main" val="0"/>
+              </a:ext>
+            </a:extLst>
+          </a:blip>
+          <a:stretch>
+            <a:fillRect/>
+          </a:stretch>
+        </p:blipFill>
+        <p:spPr>
+          <a:xfrm>
+            <a:off x="7739471" y="2204017"/>
+            <a:ext cx="4452529" cy="4000000"/>
+          </a:xfrm>
+          <a:prstGeom prst="rect">
+            <a:avLst/>
+          </a:prstGeom>
+        </p:spPr>
+      </p:pic>
+    </p:spTree>
+    <p:extLst>
+      <p:ext uri="{BB962C8B-B14F-4D97-AF65-F5344CB8AC3E}">
+        <p14:creationId xmlns:p14="http://schemas.microsoft.com/office/powerpoint/2010/main" val="2030788860"/>
+      </p:ext>
+    </p:extLst>
+  </p:cSld>
+  <p:clrMapOvr>
+    <a:masterClrMapping/>
+  </p:clrMapOvr>
+</p:sld>
+</file>
+
+<file path=ppt/slides/slide32.xml><?xml version="1.0" encoding="utf-8"?>
+<p:sld xmlns:a="http://schemas.openxmlformats.org/drawingml/2006/main" xmlns:r="http://schemas.openxmlformats.org/officeDocument/2006/relationships" xmlns:p="http://schemas.openxmlformats.org/presentationml/2006/main">
+  <p:cSld>
+    <p:spTree>
+      <p:nvGrpSpPr>
+        <p:cNvPr id="1" name=""/>
+        <p:cNvGrpSpPr/>
+        <p:nvPr/>
+      </p:nvGrpSpPr>
+      <p:grpSpPr>
+        <a:xfrm>
+          <a:off x="0" y="0"/>
+          <a:ext cx="0" cy="0"/>
+          <a:chOff x="0" y="0"/>
+          <a:chExt cx="0" cy="0"/>
+        </a:xfrm>
+      </p:grpSpPr>
+      <p:sp>
+        <p:nvSpPr>
+          <p:cNvPr id="2" name="Slide Number Placeholder 1"/>
+          <p:cNvSpPr>
+            <a:spLocks noGrp="1"/>
+          </p:cNvSpPr>
+          <p:nvPr>
+            <p:ph type="sldNum" sz="quarter" idx="10"/>
+          </p:nvPr>
+        </p:nvSpPr>
+        <p:spPr/>
+        <p:txBody>
+          <a:bodyPr/>
+          <a:lstStyle/>
+          <a:p>
+            <a:fld id="{61155BBA-336D-4AED-BB34-E42D9706BCE7}" type="slidenum">
+              <a:rPr lang="it-IT" altLang="en-US" smtClean="0"/>
+              <a:pPr/>
+              <a:t>32</a:t>
+            </a:fld>
+            <a:endParaRPr lang="it-IT" altLang="en-US"/>
+          </a:p>
+        </p:txBody>
+      </p:sp>
+      <p:sp>
+        <p:nvSpPr>
+          <p:cNvPr id="4" name="TextBox 3"/>
+          <p:cNvSpPr txBox="1"/>
+          <p:nvPr/>
+        </p:nvSpPr>
+        <p:spPr>
+          <a:xfrm>
+            <a:off x="55812" y="1133341"/>
+            <a:ext cx="11642501" cy="1200329"/>
+          </a:xfrm>
+          <a:prstGeom prst="rect">
+            <a:avLst/>
+          </a:prstGeom>
+          <a:noFill/>
+        </p:spPr>
+        <p:txBody>
+          <a:bodyPr wrap="square" rtlCol="0">
+            <a:spAutoFit/>
+          </a:bodyPr>
+          <a:lstStyle/>
+          <a:p>
+            <a:pPr algn="ctr"/>
+            <a:r>
+              <a:rPr lang="it-IT" sz="2800" b="1" i="1" dirty="0">
+                <a:latin typeface="+mj-lt"/>
+              </a:rPr>
+              <a:t>MODEL VALIDATION </a:t>
+            </a:r>
+            <a:r>
+              <a:rPr lang="it-IT" sz="2800" b="1" i="1" dirty="0" smtClean="0">
+                <a:latin typeface="+mj-lt"/>
+              </a:rPr>
+              <a:t>– DYNAMICS</a:t>
+            </a:r>
+          </a:p>
+          <a:p>
+            <a:pPr algn="ctr"/>
+            <a:endParaRPr lang="it-IT" sz="800" b="1" i="1" dirty="0">
+              <a:latin typeface="+mj-lt"/>
+            </a:endParaRPr>
+          </a:p>
+          <a:p>
+            <a:r>
+              <a:rPr lang="it-IT" b="1" i="1" dirty="0" smtClean="0"/>
+              <a:t>ARX</a:t>
+            </a:r>
+            <a:r>
+              <a:rPr lang="it-IT" i="1" dirty="0" smtClean="0"/>
+              <a:t> models looks very similar in all three identifications</a:t>
+            </a:r>
+            <a:endParaRPr lang="it-IT" b="1" i="1" dirty="0"/>
+          </a:p>
+          <a:p>
+            <a:endParaRPr lang="it-IT" b="1" i="1" dirty="0" smtClean="0"/>
+          </a:p>
+        </p:txBody>
+      </p:sp>
+    </p:spTree>
+    <p:extLst>
+      <p:ext uri="{BB962C8B-B14F-4D97-AF65-F5344CB8AC3E}">
+        <p14:creationId xmlns:p14="http://schemas.microsoft.com/office/powerpoint/2010/main" val="2868980295"/>
+      </p:ext>
+    </p:extLst>
+  </p:cSld>
+  <p:clrMapOvr>
+    <a:masterClrMapping/>
+  </p:clrMapOvr>
+</p:sld>
+</file>
+
+<file path=ppt/slides/slide33.xml><?xml version="1.0" encoding="utf-8"?>
+<p:sld xmlns:a="http://schemas.openxmlformats.org/drawingml/2006/main" xmlns:r="http://schemas.openxmlformats.org/officeDocument/2006/relationships" xmlns:p="http://schemas.openxmlformats.org/presentationml/2006/main">
+  <p:cSld>
+    <p:spTree>
+      <p:nvGrpSpPr>
+        <p:cNvPr id="1" name=""/>
+        <p:cNvGrpSpPr/>
+        <p:nvPr/>
+      </p:nvGrpSpPr>
+      <p:grpSpPr>
+        <a:xfrm>
+          <a:off x="0" y="0"/>
+          <a:ext cx="0" cy="0"/>
+          <a:chOff x="0" y="0"/>
+          <a:chExt cx="0" cy="0"/>
+        </a:xfrm>
+      </p:grpSpPr>
+      <p:sp>
+        <p:nvSpPr>
+          <p:cNvPr id="2" name="Slide Number Placeholder 1"/>
+          <p:cNvSpPr>
+            <a:spLocks noGrp="1"/>
+          </p:cNvSpPr>
+          <p:nvPr>
+            <p:ph type="sldNum" sz="quarter" idx="10"/>
+          </p:nvPr>
+        </p:nvSpPr>
+        <p:spPr/>
+        <p:txBody>
+          <a:bodyPr/>
+          <a:lstStyle/>
+          <a:p>
+            <a:fld id="{61155BBA-336D-4AED-BB34-E42D9706BCE7}" type="slidenum">
+              <a:rPr lang="it-IT" altLang="en-US" smtClean="0"/>
+              <a:pPr/>
+              <a:t>33</a:t>
+            </a:fld>
+            <a:endParaRPr lang="it-IT" altLang="en-US"/>
+          </a:p>
+        </p:txBody>
+      </p:sp>
+      <p:sp>
+        <p:nvSpPr>
+          <p:cNvPr id="4" name="TextBox 3"/>
+          <p:cNvSpPr txBox="1"/>
+          <p:nvPr/>
+        </p:nvSpPr>
+        <p:spPr>
+          <a:xfrm>
+            <a:off x="55812" y="1133341"/>
+            <a:ext cx="11642501" cy="923330"/>
+          </a:xfrm>
+          <a:prstGeom prst="rect">
+            <a:avLst/>
+          </a:prstGeom>
+          <a:noFill/>
+        </p:spPr>
+        <p:txBody>
+          <a:bodyPr wrap="square" rtlCol="0">
+            <a:spAutoFit/>
+          </a:bodyPr>
+          <a:lstStyle/>
+          <a:p>
+            <a:pPr algn="ctr"/>
+            <a:r>
+              <a:rPr lang="it-IT" sz="2800" b="1" i="1" dirty="0">
+                <a:latin typeface="+mj-lt"/>
+              </a:rPr>
+              <a:t>MODEL VALIDATION </a:t>
+            </a:r>
+            <a:r>
+              <a:rPr lang="it-IT" sz="2800" b="1" i="1" dirty="0" smtClean="0">
+                <a:latin typeface="+mj-lt"/>
+              </a:rPr>
+              <a:t>– DYNAMICS</a:t>
+            </a:r>
+          </a:p>
+          <a:p>
+            <a:pPr algn="ctr"/>
+            <a:endParaRPr lang="it-IT" sz="800" b="1" i="1" dirty="0">
+              <a:latin typeface="+mj-lt"/>
+            </a:endParaRPr>
+          </a:p>
+          <a:p>
+            <a:r>
+              <a:rPr lang="it-IT" b="1" i="1" dirty="0" smtClean="0"/>
+              <a:t>OE MODELS</a:t>
+            </a:r>
+          </a:p>
+        </p:txBody>
+      </p:sp>
+      <p:pic>
+        <p:nvPicPr>
+          <p:cNvPr id="10" name="Picture 9"/>
+          <p:cNvPicPr>
+            <a:picLocks noChangeAspect="1"/>
+          </p:cNvPicPr>
+          <p:nvPr/>
+        </p:nvPicPr>
+        <p:blipFill>
+          <a:blip r:embed="rId2">
+            <a:extLst>
+              <a:ext uri="{28A0092B-C50C-407E-A947-70E740481C1C}">
+                <a14:useLocalDpi xmlns:a14="http://schemas.microsoft.com/office/drawing/2010/main" val="0"/>
+              </a:ext>
+            </a:extLst>
+          </a:blip>
+          <a:stretch>
+            <a:fillRect/>
+          </a:stretch>
+        </p:blipFill>
+        <p:spPr>
+          <a:xfrm>
+            <a:off x="55813" y="2669823"/>
+            <a:ext cx="4091184" cy="3068388"/>
+          </a:xfrm>
+          <a:prstGeom prst="rect">
+            <a:avLst/>
+          </a:prstGeom>
+        </p:spPr>
+      </p:pic>
+      <p:pic>
+        <p:nvPicPr>
+          <p:cNvPr id="11" name="Picture 10"/>
+          <p:cNvPicPr>
+            <a:picLocks noChangeAspect="1"/>
+          </p:cNvPicPr>
+          <p:nvPr/>
+        </p:nvPicPr>
+        <p:blipFill>
+          <a:blip r:embed="rId3">
+            <a:extLst>
+              <a:ext uri="{28A0092B-C50C-407E-A947-70E740481C1C}">
+                <a14:useLocalDpi xmlns:a14="http://schemas.microsoft.com/office/drawing/2010/main" val="0"/>
+              </a:ext>
+            </a:extLst>
+          </a:blip>
+          <a:stretch>
+            <a:fillRect/>
+          </a:stretch>
+        </p:blipFill>
+        <p:spPr>
+          <a:xfrm>
+            <a:off x="3845755" y="2630907"/>
+            <a:ext cx="4194959" cy="3146219"/>
+          </a:xfrm>
+          <a:prstGeom prst="rect">
+            <a:avLst/>
+          </a:prstGeom>
+        </p:spPr>
+      </p:pic>
+      <p:pic>
+        <p:nvPicPr>
+          <p:cNvPr id="12" name="Picture 11"/>
+          <p:cNvPicPr>
+            <a:picLocks noChangeAspect="1"/>
+          </p:cNvPicPr>
+          <p:nvPr/>
+        </p:nvPicPr>
+        <p:blipFill>
+          <a:blip r:embed="rId4">
+            <a:extLst>
+              <a:ext uri="{28A0092B-C50C-407E-A947-70E740481C1C}">
+                <a14:useLocalDpi xmlns:a14="http://schemas.microsoft.com/office/drawing/2010/main" val="0"/>
+              </a:ext>
+            </a:extLst>
+          </a:blip>
+          <a:stretch>
+            <a:fillRect/>
+          </a:stretch>
+        </p:blipFill>
+        <p:spPr>
+          <a:xfrm>
+            <a:off x="7739471" y="2534319"/>
+            <a:ext cx="4452529" cy="3339396"/>
+          </a:xfrm>
+          <a:prstGeom prst="rect">
+            <a:avLst/>
+          </a:prstGeom>
+        </p:spPr>
+      </p:pic>
+    </p:spTree>
+    <p:extLst>
+      <p:ext uri="{BB962C8B-B14F-4D97-AF65-F5344CB8AC3E}">
+        <p14:creationId xmlns:p14="http://schemas.microsoft.com/office/powerpoint/2010/main" val="2986631930"/>
+      </p:ext>
+    </p:extLst>
+  </p:cSld>
+  <p:clrMapOvr>
+    <a:masterClrMapping/>
+  </p:clrMapOvr>
+</p:sld>
+</file>
+
+<file path=ppt/slides/slide34.xml><?xml version="1.0" encoding="utf-8"?>
+<p:sld xmlns:a="http://schemas.openxmlformats.org/drawingml/2006/main" xmlns:r="http://schemas.openxmlformats.org/officeDocument/2006/relationships" xmlns:p="http://schemas.openxmlformats.org/presentationml/2006/main">
+  <p:cSld>
+    <p:spTree>
+      <p:nvGrpSpPr>
+        <p:cNvPr id="1" name=""/>
+        <p:cNvGrpSpPr/>
+        <p:nvPr/>
+      </p:nvGrpSpPr>
+      <p:grpSpPr>
+        <a:xfrm>
+          <a:off x="0" y="0"/>
+          <a:ext cx="0" cy="0"/>
+          <a:chOff x="0" y="0"/>
+          <a:chExt cx="0" cy="0"/>
+        </a:xfrm>
+      </p:grpSpPr>
+      <p:sp>
+        <p:nvSpPr>
+          <p:cNvPr id="2" name="Slide Number Placeholder 1"/>
+          <p:cNvSpPr>
+            <a:spLocks noGrp="1"/>
+          </p:cNvSpPr>
+          <p:nvPr>
+            <p:ph type="sldNum" sz="quarter" idx="10"/>
+          </p:nvPr>
+        </p:nvSpPr>
+        <p:spPr/>
+        <p:txBody>
+          <a:bodyPr/>
+          <a:lstStyle/>
+          <a:p>
+            <a:fld id="{61155BBA-336D-4AED-BB34-E42D9706BCE7}" type="slidenum">
+              <a:rPr lang="it-IT" altLang="en-US" smtClean="0"/>
+              <a:pPr/>
+              <a:t>34</a:t>
+            </a:fld>
+            <a:endParaRPr lang="it-IT" altLang="en-US"/>
+          </a:p>
+        </p:txBody>
+      </p:sp>
+      <p:sp>
+        <p:nvSpPr>
+          <p:cNvPr id="3" name="TextBox 2"/>
+          <p:cNvSpPr txBox="1"/>
+          <p:nvPr/>
+        </p:nvSpPr>
+        <p:spPr>
+          <a:xfrm>
+            <a:off x="4746912" y="1033790"/>
+            <a:ext cx="2698175" cy="523220"/>
+          </a:xfrm>
+          <a:prstGeom prst="rect">
+            <a:avLst/>
+          </a:prstGeom>
+          <a:noFill/>
+        </p:spPr>
+        <p:txBody>
+          <a:bodyPr wrap="none" rtlCol="0">
+            <a:spAutoFit/>
+          </a:bodyPr>
+          <a:lstStyle/>
+          <a:p>
+            <a:r>
+              <a:rPr lang="en-GB" sz="2800" b="1" i="1" dirty="0" smtClean="0">
+                <a:latin typeface="+mj-lt"/>
+              </a:rPr>
+              <a:t>CONCLUSION</a:t>
+            </a:r>
+          </a:p>
+        </p:txBody>
+      </p:sp>
+      <p:sp>
+        <p:nvSpPr>
+          <p:cNvPr id="4" name="TextBox 3"/>
+          <p:cNvSpPr txBox="1"/>
+          <p:nvPr/>
+        </p:nvSpPr>
+        <p:spPr>
+          <a:xfrm>
+            <a:off x="6956299" y="173782"/>
+            <a:ext cx="3512308" cy="369332"/>
+          </a:xfrm>
+          <a:prstGeom prst="rect">
+            <a:avLst/>
+          </a:prstGeom>
+          <a:noFill/>
+        </p:spPr>
+        <p:txBody>
+          <a:bodyPr wrap="none" rtlCol="0">
+            <a:spAutoFit/>
+          </a:bodyPr>
+          <a:lstStyle/>
+          <a:p>
+            <a:r>
+              <a:rPr lang="en-GB" b="1" dirty="0" smtClean="0">
+                <a:solidFill>
+                  <a:srgbClr val="FF0000"/>
+                </a:solidFill>
+                <a:latin typeface="DejaVu Sans" panose="020B0603030804020204" pitchFamily="34" charset="0"/>
+                <a:ea typeface="DejaVu Sans" panose="020B0603030804020204" pitchFamily="34" charset="0"/>
+                <a:cs typeface="DejaVu Sans" panose="020B0603030804020204" pitchFamily="34" charset="0"/>
+              </a:rPr>
+              <a:t>CONCLUSION &amp; REMARKS</a:t>
+            </a:r>
+            <a:endParaRPr lang="en-GB" b="1" dirty="0">
+              <a:solidFill>
+                <a:srgbClr val="FF0000"/>
+              </a:solidFill>
+              <a:latin typeface="DejaVu Sans" panose="020B0603030804020204" pitchFamily="34" charset="0"/>
+              <a:ea typeface="DejaVu Sans" panose="020B0603030804020204" pitchFamily="34" charset="0"/>
+              <a:cs typeface="DejaVu Sans" panose="020B0603030804020204" pitchFamily="34" charset="0"/>
+            </a:endParaRPr>
+          </a:p>
+        </p:txBody>
+      </p:sp>
+    </p:spTree>
+    <p:extLst>
+      <p:ext uri="{BB962C8B-B14F-4D97-AF65-F5344CB8AC3E}">
+        <p14:creationId xmlns:p14="http://schemas.microsoft.com/office/powerpoint/2010/main" val="2463455316"/>
+      </p:ext>
+    </p:extLst>
+  </p:cSld>
+  <p:clrMapOvr>
+    <a:masterClrMapping/>
+  </p:clrMapOvr>
+  <p:timing>
+    <p:tnLst>
+      <p:par>
+        <p:cTn id="1" dur="indefinite" restart="never" nodeType="tmRoot"/>
+      </p:par>
+    </p:tnLst>
+  </p:timing>
+</p:sld>
+</file>
+
+<file path=ppt/slides/slide35.xml><?xml version="1.0" encoding="utf-8"?>
+<p:sld xmlns:a="http://schemas.openxmlformats.org/drawingml/2006/main" xmlns:r="http://schemas.openxmlformats.org/officeDocument/2006/relationships" xmlns:p="http://schemas.openxmlformats.org/presentationml/2006/main">
+  <p:cSld>
+    <p:spTree>
+      <p:nvGrpSpPr>
+        <p:cNvPr id="1" name=""/>
+        <p:cNvGrpSpPr/>
+        <p:nvPr/>
+      </p:nvGrpSpPr>
+      <p:grpSpPr>
+        <a:xfrm>
+          <a:off x="0" y="0"/>
+          <a:ext cx="0" cy="0"/>
+          <a:chOff x="0" y="0"/>
+          <a:chExt cx="0" cy="0"/>
+        </a:xfrm>
+      </p:grpSpPr>
+      <p:sp>
+        <p:nvSpPr>
+          <p:cNvPr id="2" name="Slide Number Placeholder 1"/>
+          <p:cNvSpPr>
+            <a:spLocks noGrp="1"/>
+          </p:cNvSpPr>
+          <p:nvPr>
+            <p:ph type="sldNum" sz="quarter" idx="10"/>
+          </p:nvPr>
+        </p:nvSpPr>
+        <p:spPr/>
+        <p:txBody>
+          <a:bodyPr/>
+          <a:lstStyle/>
+          <a:p>
+            <a:fld id="{61155BBA-336D-4AED-BB34-E42D9706BCE7}" type="slidenum">
+              <a:rPr lang="it-IT" altLang="en-US" smtClean="0"/>
+              <a:pPr/>
+              <a:t>35</a:t>
+            </a:fld>
+            <a:endParaRPr lang="it-IT" altLang="en-US"/>
+          </a:p>
+        </p:txBody>
+      </p:sp>
+      <p:sp>
+        <p:nvSpPr>
+          <p:cNvPr id="4" name="Rectangle 3"/>
+          <p:cNvSpPr/>
+          <p:nvPr/>
+        </p:nvSpPr>
+        <p:spPr>
+          <a:xfrm>
+            <a:off x="2444744" y="2588350"/>
+            <a:ext cx="7302512" cy="1754326"/>
+          </a:xfrm>
+          <a:prstGeom prst="rect">
+            <a:avLst/>
+          </a:prstGeom>
+        </p:spPr>
+        <p:style>
+          <a:lnRef idx="3">
+            <a:schemeClr val="lt1"/>
+          </a:lnRef>
+          <a:fillRef idx="1">
+            <a:schemeClr val="accent5"/>
+          </a:fillRef>
+          <a:effectRef idx="1">
+            <a:schemeClr val="accent5"/>
+          </a:effectRef>
+          <a:fontRef idx="minor">
+            <a:schemeClr val="lt1"/>
+          </a:fontRef>
+        </p:style>
+        <p:txBody>
+          <a:bodyPr wrap="none" lIns="91440" tIns="45720" rIns="91440" bIns="45720">
+            <a:spAutoFit/>
+          </a:bodyPr>
+          <a:lstStyle/>
+          <a:p>
+            <a:pPr algn="ctr"/>
+            <a:r>
+              <a:rPr lang="en-US" sz="5400" b="0" cap="none" spc="0" dirty="0" smtClean="0">
+                <a:ln w="0"/>
+                <a:solidFill>
+                  <a:schemeClr val="tx1"/>
+                </a:solidFill>
+                <a:effectLst>
+                  <a:outerShdw blurRad="38100" dist="19050" dir="2700000" algn="tl" rotWithShape="0">
+                    <a:schemeClr val="dk1">
+                      <a:alpha val="40000"/>
+                    </a:schemeClr>
+                  </a:outerShdw>
+                </a:effectLst>
+              </a:rPr>
+              <a:t>WHAT WENT WRONG</a:t>
+            </a:r>
+          </a:p>
+          <a:p>
+            <a:pPr algn="ctr"/>
+            <a:r>
+              <a:rPr lang="en-US" sz="5400" dirty="0" smtClean="0">
+                <a:ln w="0"/>
+                <a:solidFill>
+                  <a:schemeClr val="tx1"/>
+                </a:solidFill>
+                <a:effectLst>
+                  <a:outerShdw blurRad="38100" dist="19050" dir="2700000" algn="tl" rotWithShape="0">
+                    <a:schemeClr val="dk1">
+                      <a:alpha val="40000"/>
+                    </a:schemeClr>
+                  </a:outerShdw>
+                </a:effectLst>
+              </a:rPr>
+              <a:t>AND WHY</a:t>
+            </a:r>
+            <a:endParaRPr lang="en-US" sz="5400" b="0" cap="none" spc="0" dirty="0">
+              <a:ln w="0"/>
+              <a:solidFill>
+                <a:schemeClr val="tx1"/>
+              </a:solidFill>
+              <a:effectLst>
+                <a:outerShdw blurRad="38100" dist="19050" dir="2700000" algn="tl" rotWithShape="0">
+                  <a:schemeClr val="dk1">
+                    <a:alpha val="40000"/>
+                  </a:schemeClr>
+                </a:outerShdw>
+              </a:effectLst>
+            </a:endParaRPr>
+          </a:p>
+        </p:txBody>
+      </p:sp>
+    </p:spTree>
+    <p:extLst>
+      <p:ext uri="{BB962C8B-B14F-4D97-AF65-F5344CB8AC3E}">
+        <p14:creationId xmlns:p14="http://schemas.microsoft.com/office/powerpoint/2010/main" val="548125632"/>
+      </p:ext>
+    </p:extLst>
+  </p:cSld>
+  <p:clrMapOvr>
+    <a:masterClrMapping/>
+  </p:clrMapOvr>
+  <p:timing>
+    <p:tnLst>
+      <p:par>
+        <p:cTn id="1" dur="indefinite" restart="never" nodeType="tmRoot"/>
+      </p:par>
+    </p:tnLst>
+  </p:timing>
+</p:sld>
+</file>
+
+<file path=ppt/slides/slide36.xml><?xml version="1.0" encoding="utf-8"?>
+<p:sld xmlns:a="http://schemas.openxmlformats.org/drawingml/2006/main" xmlns:r="http://schemas.openxmlformats.org/officeDocument/2006/relationships" xmlns:p="http://schemas.openxmlformats.org/presentationml/2006/main">
+  <p:cSld>
+    <p:spTree>
+      <p:nvGrpSpPr>
+        <p:cNvPr id="1" name=""/>
+        <p:cNvGrpSpPr/>
+        <p:nvPr/>
+      </p:nvGrpSpPr>
+      <p:grpSpPr>
+        <a:xfrm>
+          <a:off x="0" y="0"/>
+          <a:ext cx="0" cy="0"/>
+          <a:chOff x="0" y="0"/>
+          <a:chExt cx="0" cy="0"/>
+        </a:xfrm>
+      </p:grpSpPr>
+      <p:sp>
+        <p:nvSpPr>
+          <p:cNvPr id="2" name="Slide Number Placeholder 1"/>
+          <p:cNvSpPr>
+            <a:spLocks noGrp="1"/>
+          </p:cNvSpPr>
+          <p:nvPr>
+            <p:ph type="sldNum" sz="quarter" idx="10"/>
+          </p:nvPr>
+        </p:nvSpPr>
+        <p:spPr/>
+        <p:txBody>
+          <a:bodyPr/>
+          <a:lstStyle/>
+          <a:p>
+            <a:fld id="{61155BBA-336D-4AED-BB34-E42D9706BCE7}" type="slidenum">
+              <a:rPr lang="it-IT" altLang="en-US" smtClean="0"/>
+              <a:pPr/>
+              <a:t>36</a:t>
+            </a:fld>
+            <a:endParaRPr lang="it-IT" altLang="en-US"/>
+          </a:p>
+        </p:txBody>
+      </p:sp>
+      <p:sp>
+        <p:nvSpPr>
+          <p:cNvPr id="4" name="TextBox 3"/>
+          <p:cNvSpPr txBox="1"/>
+          <p:nvPr/>
+        </p:nvSpPr>
+        <p:spPr>
+          <a:xfrm>
+            <a:off x="6956299" y="173782"/>
+            <a:ext cx="3973973" cy="369332"/>
+          </a:xfrm>
+          <a:prstGeom prst="rect">
+            <a:avLst/>
+          </a:prstGeom>
+          <a:noFill/>
+        </p:spPr>
+        <p:txBody>
+          <a:bodyPr wrap="none" rtlCol="0">
+            <a:spAutoFit/>
+          </a:bodyPr>
+          <a:lstStyle/>
+          <a:p>
+            <a:pPr lvl="1"/>
+            <a:r>
+              <a:rPr lang="en-GB" b="1" dirty="0" smtClean="0">
+                <a:solidFill>
+                  <a:srgbClr val="FF0000"/>
+                </a:solidFill>
+                <a:latin typeface="DejaVu Sans" panose="020B0603030804020204" pitchFamily="34" charset="0"/>
+                <a:ea typeface="DejaVu Sans" panose="020B0603030804020204" pitchFamily="34" charset="0"/>
+                <a:cs typeface="DejaVu Sans" panose="020B0603030804020204" pitchFamily="34" charset="0"/>
+              </a:rPr>
+              <a:t>CONCLUSION &amp; REMARKS</a:t>
+            </a:r>
+            <a:endParaRPr lang="en-GB" b="1" dirty="0">
+              <a:solidFill>
+                <a:srgbClr val="FF0000"/>
+              </a:solidFill>
+              <a:latin typeface="DejaVu Sans" panose="020B0603030804020204" pitchFamily="34" charset="0"/>
+              <a:ea typeface="DejaVu Sans" panose="020B0603030804020204" pitchFamily="34" charset="0"/>
+              <a:cs typeface="DejaVu Sans" panose="020B0603030804020204" pitchFamily="34" charset="0"/>
+            </a:endParaRPr>
+          </a:p>
+        </p:txBody>
+      </p:sp>
+      <p:sp>
+        <p:nvSpPr>
+          <p:cNvPr id="5" name="TextBox 4"/>
+          <p:cNvSpPr txBox="1"/>
+          <p:nvPr/>
+        </p:nvSpPr>
+        <p:spPr>
+          <a:xfrm>
+            <a:off x="1375794" y="2181138"/>
+            <a:ext cx="7904728" cy="1200329"/>
+          </a:xfrm>
+          <a:prstGeom prst="rect">
+            <a:avLst/>
+          </a:prstGeom>
+          <a:noFill/>
+        </p:spPr>
+        <p:txBody>
+          <a:bodyPr wrap="none" rtlCol="0">
+            <a:spAutoFit/>
+          </a:bodyPr>
+          <a:lstStyle/>
+          <a:p>
+            <a:r>
+              <a:rPr lang="en-GB" dirty="0" smtClean="0"/>
+              <a:t>Qui </a:t>
+            </a:r>
+            <a:r>
+              <a:rPr lang="en-GB" dirty="0" err="1" smtClean="0"/>
+              <a:t>possiamo</a:t>
+            </a:r>
+            <a:r>
+              <a:rPr lang="en-GB" dirty="0" smtClean="0"/>
+              <a:t> </a:t>
+            </a:r>
+            <a:r>
+              <a:rPr lang="en-GB" dirty="0" err="1" smtClean="0"/>
+              <a:t>mettere</a:t>
+            </a:r>
+            <a:r>
+              <a:rPr lang="en-GB" dirty="0" smtClean="0"/>
+              <a:t> </a:t>
+            </a:r>
+            <a:r>
+              <a:rPr lang="en-GB" dirty="0" err="1" smtClean="0"/>
+              <a:t>tipo</a:t>
+            </a:r>
+            <a:r>
+              <a:rPr lang="en-GB" dirty="0" smtClean="0"/>
+              <a:t> le </a:t>
+            </a:r>
+            <a:r>
+              <a:rPr lang="en-GB" dirty="0" err="1" smtClean="0"/>
+              <a:t>ideee</a:t>
+            </a:r>
+            <a:r>
+              <a:rPr lang="en-GB" dirty="0" smtClean="0"/>
+              <a:t> </a:t>
+            </a:r>
+            <a:r>
+              <a:rPr lang="en-GB" dirty="0" err="1" smtClean="0"/>
+              <a:t>andate</a:t>
+            </a:r>
+            <a:r>
+              <a:rPr lang="en-GB" dirty="0" smtClean="0"/>
+              <a:t> male o da </a:t>
+            </a:r>
+            <a:r>
+              <a:rPr lang="en-GB" dirty="0" err="1" smtClean="0"/>
+              <a:t>provare</a:t>
+            </a:r>
+            <a:endParaRPr lang="en-GB" dirty="0" smtClean="0"/>
+          </a:p>
+          <a:p>
+            <a:r>
+              <a:rPr lang="en-GB" dirty="0" smtClean="0"/>
+              <a:t>-</a:t>
+            </a:r>
+            <a:r>
+              <a:rPr lang="en-GB" dirty="0" err="1" smtClean="0"/>
+              <a:t>interpolazione</a:t>
+            </a:r>
+            <a:r>
+              <a:rPr lang="en-GB" dirty="0" smtClean="0"/>
+              <a:t> </a:t>
+            </a:r>
+            <a:r>
+              <a:rPr lang="en-GB" dirty="0" err="1" smtClean="0"/>
+              <a:t>dati</a:t>
+            </a:r>
+            <a:r>
+              <a:rPr lang="en-GB" dirty="0" smtClean="0"/>
+              <a:t> + training </a:t>
+            </a:r>
+            <a:r>
+              <a:rPr lang="en-GB" dirty="0" err="1" smtClean="0"/>
+              <a:t>su</a:t>
+            </a:r>
+            <a:r>
+              <a:rPr lang="en-GB" dirty="0" smtClean="0"/>
+              <a:t> </a:t>
+            </a:r>
+            <a:r>
+              <a:rPr lang="en-GB" dirty="0" err="1" smtClean="0"/>
+              <a:t>essi</a:t>
+            </a:r>
+            <a:endParaRPr lang="en-GB" dirty="0" smtClean="0"/>
+          </a:p>
+          <a:p>
+            <a:r>
+              <a:rPr lang="en-GB" dirty="0" smtClean="0"/>
+              <a:t>-experiment have the same kind of shape-&gt; do an </a:t>
+            </a:r>
+            <a:r>
+              <a:rPr lang="en-GB" dirty="0" err="1" smtClean="0"/>
+              <a:t>avg</a:t>
+            </a:r>
+            <a:r>
+              <a:rPr lang="en-GB" dirty="0" smtClean="0"/>
+              <a:t> of the data and train</a:t>
+            </a:r>
+          </a:p>
+          <a:p>
+            <a:r>
+              <a:rPr lang="en-GB" dirty="0" smtClean="0"/>
+              <a:t>-use 2 experiments at time to do training and then validation on the other set</a:t>
+            </a:r>
+            <a:endParaRPr lang="en-GB" dirty="0"/>
+          </a:p>
+        </p:txBody>
+      </p:sp>
+    </p:spTree>
+    <p:extLst>
+      <p:ext uri="{BB962C8B-B14F-4D97-AF65-F5344CB8AC3E}">
+        <p14:creationId xmlns:p14="http://schemas.microsoft.com/office/powerpoint/2010/main" val="3455597643"/>
+      </p:ext>
+    </p:extLst>
+  </p:cSld>
+  <p:clrMapOvr>
+    <a:masterClrMapping/>
+  </p:clrMapOvr>
+  <p:timing>
+    <p:tnLst>
+      <p:par>
+        <p:cTn id="1" dur="indefinite" restart="never" nodeType="tmRoot"/>
+      </p:par>
+    </p:tnLst>
+  </p:timing>
+</p:sld>
+</file>
+
 <file path=ppt/slides/slide4.xml><?xml version="1.0" encoding="utf-8"?>
 <p:sld xmlns:a="http://schemas.openxmlformats.org/drawingml/2006/main" xmlns:r="http://schemas.openxmlformats.org/officeDocument/2006/relationships" xmlns:p="http://schemas.openxmlformats.org/presentationml/2006/main">
   <p:cSld>
@@ -23099,8 +25036,8 @@
           </a:p>
         </p:txBody>
       </p:sp>
-      <mc:AlternateContent xmlns:mc="http://schemas.openxmlformats.org/markup-compatibility/2006" xmlns:a14="http://schemas.microsoft.com/office/drawing/2010/main">
-        <mc:Choice Requires="a14">
+      <mc:AlternateContent xmlns:mc="http://schemas.openxmlformats.org/markup-compatibility/2006">
+        <mc:Choice xmlns:a14="http://schemas.microsoft.com/office/drawing/2010/main" Requires="a14">
           <p:sp>
             <p:nvSpPr>
               <p:cNvPr id="4" name="TextBox 3"/>
@@ -23898,12 +25835,12 @@
                   <a:t> is the </a:t>
                 </a:r>
                 <a:r>
-                  <a:rPr lang="en-GB" dirty="0" err="1"/>
-                  <a:t>i</a:t>
+                  <a:rPr lang="en-GB" dirty="0" err="1" smtClean="0"/>
+                  <a:t>i-th</a:t>
                 </a:r>
                 <a:r>
-                  <a:rPr lang="en-GB" dirty="0"/>
-                  <a:t>-eth </a:t>
+                  <a:rPr lang="en-GB" dirty="0" smtClean="0"/>
+                  <a:t> </a:t>
                 </a:r>
                 <a:r>
                   <a:rPr lang="en-GB" dirty="0" smtClean="0"/>
@@ -24170,7 +26107,7 @@
             </p:txBody>
           </p:sp>
         </mc:Choice>
-        <mc:Fallback xmlns="">
+        <mc:Fallback>
           <p:sp>
             <p:nvSpPr>
               <p:cNvPr id="4" name="TextBox 3"/>
@@ -24199,7 +26136,7 @@
               <a:lstStyle/>
               <a:p>
                 <a:r>
-                  <a:rPr lang="en-GB">
+                  <a:rPr lang="it-IT">
                     <a:noFill/>
                   </a:rPr>
                   <a:t> </a:t>

</xml_diff>

<commit_message>
Model Identification - Best Trade-off
I have evaluated the variance of less complex models and I found the
best compromise in the oe23id(which is saved in data directory). oe23 is
what I got from oe33 cancelling the zero outside the circle: they are
very similar but the latter is not white.
</commit_message>
<xml_diff>
--- a/report/Report.pptx
+++ b/report/Report.pptx
@@ -42,9 +42,10 @@
     <p:sldId id="288" r:id="rId36"/>
     <p:sldId id="292" r:id="rId37"/>
     <p:sldId id="293" r:id="rId38"/>
-    <p:sldId id="265" r:id="rId39"/>
-    <p:sldId id="277" r:id="rId40"/>
-    <p:sldId id="278" r:id="rId41"/>
+    <p:sldId id="297" r:id="rId39"/>
+    <p:sldId id="265" r:id="rId40"/>
+    <p:sldId id="277" r:id="rId41"/>
+    <p:sldId id="278" r:id="rId42"/>
   </p:sldIdLst>
   <p:sldSz cx="12192000" cy="6858000"/>
   <p:notesSz cx="6858000" cy="9144000"/>
@@ -15207,8 +15208,8 @@
           </a:p>
         </p:txBody>
       </p:sp>
-      <mc:AlternateContent xmlns:mc="http://schemas.openxmlformats.org/markup-compatibility/2006">
-        <mc:Choice xmlns:a14="http://schemas.microsoft.com/office/drawing/2010/main" Requires="a14">
+      <mc:AlternateContent xmlns:mc="http://schemas.openxmlformats.org/markup-compatibility/2006" xmlns:a14="http://schemas.microsoft.com/office/drawing/2010/main">
+        <mc:Choice Requires="a14">
           <p:sp>
             <p:nvSpPr>
               <p:cNvPr id="6" name="TextBox 5"/>
@@ -15796,7 +15797,7 @@
             </p:txBody>
           </p:sp>
         </mc:Choice>
-        <mc:Fallback>
+        <mc:Fallback xmlns="">
           <p:sp>
             <p:nvSpPr>
               <p:cNvPr id="6" name="TextBox 5"/>
@@ -15896,8 +15897,8 @@
           </a:p>
         </p:txBody>
       </p:sp>
-      <mc:AlternateContent xmlns:mc="http://schemas.openxmlformats.org/markup-compatibility/2006">
-        <mc:Choice xmlns:a14="http://schemas.microsoft.com/office/drawing/2010/main" Requires="a14">
+      <mc:AlternateContent xmlns:mc="http://schemas.openxmlformats.org/markup-compatibility/2006" xmlns:a14="http://schemas.microsoft.com/office/drawing/2010/main">
+        <mc:Choice Requires="a14">
           <p:sp>
             <p:nvSpPr>
               <p:cNvPr id="3" name="TextBox 2"/>
@@ -15945,33 +15946,13 @@
                 </a:r>
                 <a:r>
                   <a:rPr lang="en-GB" dirty="0" smtClean="0"/>
-                  <a:t> noise transfer function will </a:t>
-                </a:r>
-                <a:r>
-                  <a:rPr lang="en-GB" dirty="0" smtClean="0"/>
-                  <a:t>give </a:t>
-                </a:r>
-                <a:r>
-                  <a:rPr lang="en-GB" dirty="0" smtClean="0"/>
-                  <a:t>better </a:t>
-                </a:r>
-                <a:r>
-                  <a:rPr lang="en-GB" dirty="0" smtClean="0"/>
-                  <a:t>results in </a:t>
+                  <a:t> noise transfer function will give better results in </a:t>
                 </a:r>
               </a:p>
               <a:p>
                 <a:r>
                   <a:rPr lang="en-GB" dirty="0" smtClean="0"/>
-                  <a:t>closed loop experiments when compared to OE models (where </a:t>
-                </a:r>
-                <a:r>
-                  <a:rPr lang="en-GB" dirty="0" smtClean="0"/>
-                  <a:t>best </a:t>
-                </a:r>
-                <a:r>
-                  <a:rPr lang="en-GB" dirty="0" smtClean="0"/>
-                  <a:t>means </a:t>
+                  <a:t>closed loop experiments when compared to OE models (where best means </a:t>
                 </a:r>
                 <a14:m>
                   <m:oMath xmlns:m="http://schemas.openxmlformats.org/officeDocument/2006/math">
@@ -16016,34 +15997,13 @@
                 </a14:m>
                 <a:r>
                   <a:rPr lang="en-GB" dirty="0" smtClean="0"/>
-                  <a:t>), whilst </a:t>
+                  <a:t>), whilst OE models are the </a:t>
                 </a:r>
-                <a:r>
-                  <a:rPr lang="en-GB" dirty="0" smtClean="0"/>
-                  <a:t>OE </a:t>
-                </a:r>
-                <a:r>
-                  <a:rPr lang="en-GB" dirty="0" smtClean="0"/>
-                  <a:t>models </a:t>
-                </a:r>
-                <a:r>
-                  <a:rPr lang="en-GB" dirty="0" smtClean="0"/>
-                  <a:t>are the </a:t>
-                </a:r>
-                <a:endParaRPr lang="en-GB" dirty="0" smtClean="0"/>
               </a:p>
               <a:p>
                 <a:r>
                   <a:rPr lang="en-GB" dirty="0" smtClean="0"/>
-                  <a:t>best </a:t>
-                </a:r>
-                <a:r>
-                  <a:rPr lang="en-GB" dirty="0" smtClean="0"/>
-                  <a:t>ones </a:t>
-                </a:r>
-                <a:r>
-                  <a:rPr lang="en-GB" dirty="0" smtClean="0"/>
-                  <a:t>in OL experiments. </a:t>
+                  <a:t>best ones in OL experiments. </a:t>
                 </a:r>
                 <a:r>
                   <a:rPr lang="en-GB" dirty="0"/>
@@ -16059,7 +16019,6 @@
                   <a:rPr lang="en-GB" dirty="0" smtClean="0"/>
                   <a:t>to OE models.</a:t>
                 </a:r>
-                <a:endParaRPr lang="en-GB" dirty="0" smtClean="0"/>
               </a:p>
               <a:p>
                 <a:endParaRPr lang="en-GB" dirty="0"/>
@@ -16105,7 +16064,7 @@
             </p:txBody>
           </p:sp>
         </mc:Choice>
-        <mc:Fallback>
+        <mc:Fallback xmlns="">
           <p:sp>
             <p:nvSpPr>
               <p:cNvPr id="3" name="TextBox 2"/>
@@ -16205,8 +16164,8 @@
           </a:p>
         </p:txBody>
       </p:sp>
-      <mc:AlternateContent xmlns:mc="http://schemas.openxmlformats.org/markup-compatibility/2006">
-        <mc:Choice xmlns:a14="http://schemas.microsoft.com/office/drawing/2010/main" Requires="a14">
+      <mc:AlternateContent xmlns:mc="http://schemas.openxmlformats.org/markup-compatibility/2006" xmlns:a14="http://schemas.microsoft.com/office/drawing/2010/main">
+        <mc:Choice Requires="a14">
           <p:sp>
             <p:nvSpPr>
               <p:cNvPr id="3" name="Rectangle 2"/>
@@ -17924,11 +17883,9 @@
                 <a:endParaRPr lang="en-GB" dirty="0" smtClean="0"/>
               </a:p>
               <a:p>
-                <a:pPr/>
                 <a:endParaRPr lang="en-GB" dirty="0"/>
               </a:p>
               <a:p>
-                <a:pPr/>
                 <a:r>
                   <a:rPr lang="en-GB" dirty="0" smtClean="0"/>
                   <a:t>If H=1 the minimisation of </a:t>
@@ -18216,7 +18173,7 @@
             </p:txBody>
           </p:sp>
         </mc:Choice>
-        <mc:Fallback>
+        <mc:Fallback xmlns="">
           <p:sp>
             <p:nvSpPr>
               <p:cNvPr id="3" name="Rectangle 2"/>
@@ -18309,8 +18266,8 @@
           </a:p>
         </p:txBody>
       </p:sp>
-      <mc:AlternateContent xmlns:mc="http://schemas.openxmlformats.org/markup-compatibility/2006">
-        <mc:Choice xmlns:a14="http://schemas.microsoft.com/office/drawing/2010/main" Requires="a14">
+      <mc:AlternateContent xmlns:mc="http://schemas.openxmlformats.org/markup-compatibility/2006" xmlns:a14="http://schemas.microsoft.com/office/drawing/2010/main">
+        <mc:Choice Requires="a14">
           <p:sp>
             <p:nvSpPr>
               <p:cNvPr id="5" name="TextBox 4"/>
@@ -18345,6 +18302,7 @@
                 </a:r>
               </a:p>
               <a:p>
+                <a:pPr/>
                 <a14:m>
                   <m:oMathPara xmlns:m="http://schemas.openxmlformats.org/officeDocument/2006/math">
                     <m:oMathParaPr>
@@ -18699,7 +18657,7 @@
             </p:txBody>
           </p:sp>
         </mc:Choice>
-        <mc:Fallback>
+        <mc:Fallback xmlns="">
           <p:sp>
             <p:nvSpPr>
               <p:cNvPr id="5" name="TextBox 4"/>
@@ -21831,8 +21789,8 @@
           </a:p>
         </p:txBody>
       </p:sp>
-      <mc:AlternateContent xmlns:mc="http://schemas.openxmlformats.org/markup-compatibility/2006" xmlns:a14="http://schemas.microsoft.com/office/drawing/2010/main">
-        <mc:Choice Requires="a14">
+      <mc:AlternateContent xmlns:mc="http://schemas.openxmlformats.org/markup-compatibility/2006">
+        <mc:Choice xmlns:a14="http://schemas.microsoft.com/office/drawing/2010/main" Requires="a14">
           <p:sp>
             <p:nvSpPr>
               <p:cNvPr id="4" name="TextBox 3"/>
@@ -21842,7 +21800,7 @@
             <p:spPr>
               <a:xfrm>
                 <a:off x="55812" y="1133341"/>
-                <a:ext cx="11642501" cy="4124206"/>
+                <a:ext cx="11642501" cy="5232202"/>
               </a:xfrm>
               <a:prstGeom prst="rect">
                 <a:avLst/>
@@ -21973,13 +21931,35 @@
                 </a:r>
                 <a:r>
                   <a:rPr lang="it-IT" dirty="0" smtClean="0"/>
-                  <a:t> models are equal since we can cancel a zero in the origin and the pole close to it.</a:t>
+                  <a:t> models are equal since we can cancel a zero in the origin and the pole close to it</a:t>
                 </a:r>
+                <a:r>
+                  <a:rPr lang="it-IT" dirty="0" smtClean="0"/>
+                  <a:t>.</a:t>
+                </a:r>
+              </a:p>
+              <a:p>
+                <a:endParaRPr lang="it-IT" dirty="0"/>
+              </a:p>
+              <a:p>
+                <a:r>
+                  <a:rPr lang="it-IT" dirty="0" smtClean="0"/>
+                  <a:t>The first two </a:t>
+                </a:r>
+                <a:r>
+                  <a:rPr lang="it-IT" b="1" dirty="0" smtClean="0"/>
+                  <a:t>OE </a:t>
+                </a:r>
+                <a:r>
+                  <a:rPr lang="it-IT" dirty="0" smtClean="0"/>
+                  <a:t>models are very similar and they both have a zero outside the unit circle, which makes us think that an overparametrization might have occurred; in order to verify this option we can cancel that zero and see wheter or not the dynamics is somehow affected.</a:t>
+                </a:r>
+                <a:endParaRPr lang="it-IT" dirty="0" smtClean="0"/>
               </a:p>
             </p:txBody>
           </p:sp>
         </mc:Choice>
-        <mc:Fallback xmlns="">
+        <mc:Fallback>
           <p:sp>
             <p:nvSpPr>
               <p:cNvPr id="4" name="TextBox 3"/>
@@ -21991,7 +21971,7 @@
             <p:spPr>
               <a:xfrm>
                 <a:off x="55812" y="1133341"/>
-                <a:ext cx="11642501" cy="4124206"/>
+                <a:ext cx="11642501" cy="5232202"/>
               </a:xfrm>
               <a:prstGeom prst="rect">
                 <a:avLst/>
@@ -21999,7 +21979,7 @@
               <a:blipFill rotWithShape="0">
                 <a:blip r:embed="rId2"/>
                 <a:stretch>
-                  <a:fillRect l="-419" t="-1627" r="-524" b="-1479"/>
+                  <a:fillRect l="-419" t="-1282" r="-524" b="-932"/>
                 </a:stretch>
               </a:blipFill>
             </p:spPr>
@@ -22074,14 +22054,14 @@
       </p:sp>
       <p:sp>
         <p:nvSpPr>
-          <p:cNvPr id="3" name="TextBox 2"/>
+          <p:cNvPr id="4" name="TextBox 3"/>
           <p:cNvSpPr txBox="1"/>
           <p:nvPr/>
         </p:nvSpPr>
         <p:spPr>
           <a:xfrm>
-            <a:off x="4746912" y="1033790"/>
-            <a:ext cx="2698175" cy="523220"/>
+            <a:off x="55812" y="1133341"/>
+            <a:ext cx="11642501" cy="523220"/>
           </a:xfrm>
           <a:prstGeom prst="rect">
             <a:avLst/>
@@ -22089,30 +22069,102 @@
           <a:noFill/>
         </p:spPr>
         <p:txBody>
-          <a:bodyPr wrap="none" rtlCol="0">
+          <a:bodyPr wrap="square" rtlCol="0">
             <a:spAutoFit/>
           </a:bodyPr>
           <a:lstStyle/>
           <a:p>
-            <a:r>
-              <a:rPr lang="en-GB" sz="2800" b="1" i="1" dirty="0" smtClean="0">
+            <a:pPr algn="ctr"/>
+            <a:r>
+              <a:rPr lang="it-IT" sz="2800" b="1" i="1" dirty="0" smtClean="0">
                 <a:latin typeface="+mj-lt"/>
               </a:rPr>
-              <a:t>CONCLUSION</a:t>
-            </a:r>
+              <a:t>MODEL VALIDATION – </a:t>
+            </a:r>
+            <a:r>
+              <a:rPr lang="it-IT" sz="2800" b="1" i="1" dirty="0" smtClean="0">
+                <a:latin typeface="+mj-lt"/>
+              </a:rPr>
+              <a:t>DYNAMICS</a:t>
+            </a:r>
+            <a:r>
+              <a:rPr lang="it-IT" dirty="0" smtClean="0"/>
+              <a:t>.</a:t>
+            </a:r>
+            <a:endParaRPr lang="it-IT" dirty="0" smtClean="0"/>
           </a:p>
         </p:txBody>
       </p:sp>
+      <p:pic>
+        <p:nvPicPr>
+          <p:cNvPr id="3" name="Picture 2"/>
+          <p:cNvPicPr>
+            <a:picLocks noChangeAspect="1"/>
+          </p:cNvPicPr>
+          <p:nvPr/>
+        </p:nvPicPr>
+        <p:blipFill>
+          <a:blip r:embed="rId2">
+            <a:extLst>
+              <a:ext uri="{28A0092B-C50C-407E-A947-70E740481C1C}">
+                <a14:useLocalDpi xmlns:a14="http://schemas.microsoft.com/office/drawing/2010/main" val="0"/>
+              </a:ext>
+            </a:extLst>
+          </a:blip>
+          <a:stretch>
+            <a:fillRect/>
+          </a:stretch>
+        </p:blipFill>
+        <p:spPr>
+          <a:xfrm>
+            <a:off x="377784" y="1666221"/>
+            <a:ext cx="5333333" cy="4000000"/>
+          </a:xfrm>
+          <a:prstGeom prst="rect">
+            <a:avLst/>
+          </a:prstGeom>
+        </p:spPr>
+      </p:pic>
+      <p:pic>
+        <p:nvPicPr>
+          <p:cNvPr id="5" name="Picture 4"/>
+          <p:cNvPicPr>
+            <a:picLocks noChangeAspect="1"/>
+          </p:cNvPicPr>
+          <p:nvPr/>
+        </p:nvPicPr>
+        <p:blipFill>
+          <a:blip r:embed="rId3">
+            <a:extLst>
+              <a:ext uri="{28A0092B-C50C-407E-A947-70E740481C1C}">
+                <a14:useLocalDpi xmlns:a14="http://schemas.microsoft.com/office/drawing/2010/main" val="0"/>
+              </a:ext>
+            </a:extLst>
+          </a:blip>
+          <a:stretch>
+            <a:fillRect/>
+          </a:stretch>
+        </p:blipFill>
+        <p:spPr>
+          <a:xfrm>
+            <a:off x="5711117" y="1656561"/>
+            <a:ext cx="5333333" cy="4000000"/>
+          </a:xfrm>
+          <a:prstGeom prst="rect">
+            <a:avLst/>
+          </a:prstGeom>
+        </p:spPr>
+      </p:pic>
       <p:sp>
         <p:nvSpPr>
-          <p:cNvPr id="4" name="TextBox 3"/>
+          <p:cNvPr id="6" name="TextBox 5"/>
           <p:cNvSpPr txBox="1"/>
           <p:nvPr/>
         </p:nvSpPr>
         <p:spPr>
           <a:xfrm>
-            <a:off x="6956299" y="173782"/>
-            <a:ext cx="3512308" cy="369332"/>
+            <a:off x="283335" y="5795493"/>
+            <a:ext cx="11414978" cy="646331"/>
           </a:xfrm>
           <a:prstGeom prst="rect">
             <a:avLst/>
@@ -22120,50 +22172,29 @@
           <a:noFill/>
         </p:spPr>
         <p:txBody>
-          <a:bodyPr wrap="none" rtlCol="0">
+          <a:bodyPr wrap="square" rtlCol="0">
             <a:spAutoFit/>
           </a:bodyPr>
           <a:lstStyle/>
           <a:p>
             <a:r>
-              <a:rPr lang="en-GB" b="1" dirty="0" smtClean="0">
-                <a:solidFill>
-                  <a:srgbClr val="FF0000"/>
-                </a:solidFill>
-                <a:latin typeface="DejaVu Sans" panose="020B0603030804020204" pitchFamily="34" charset="0"/>
-                <a:ea typeface="DejaVu Sans" panose="020B0603030804020204" pitchFamily="34" charset="0"/>
-                <a:cs typeface="DejaVu Sans" panose="020B0603030804020204" pitchFamily="34" charset="0"/>
-              </a:rPr>
-              <a:t>CONCLUSION &amp; REMARKS</a:t>
-            </a:r>
-            <a:endParaRPr lang="en-GB" b="1" dirty="0">
-              <a:solidFill>
-                <a:srgbClr val="FF0000"/>
-              </a:solidFill>
-              <a:latin typeface="DejaVu Sans" panose="020B0603030804020204" pitchFamily="34" charset="0"/>
-              <a:ea typeface="DejaVu Sans" panose="020B0603030804020204" pitchFamily="34" charset="0"/>
-              <a:cs typeface="DejaVu Sans" panose="020B0603030804020204" pitchFamily="34" charset="0"/>
-            </a:endParaRPr>
+              <a:rPr lang="it-IT" dirty="0" smtClean="0"/>
+              <a:t>Step response leads to the same results and even the «compareModels» analysis tells us there is little difference in terms of absolute error.</a:t>
+            </a:r>
+            <a:endParaRPr lang="it-IT" dirty="0"/>
           </a:p>
         </p:txBody>
       </p:sp>
     </p:spTree>
     <p:extLst>
       <p:ext uri="{BB962C8B-B14F-4D97-AF65-F5344CB8AC3E}">
-        <p14:creationId xmlns:p14="http://schemas.microsoft.com/office/powerpoint/2010/main" val="2463455316"/>
+        <p14:creationId xmlns:p14="http://schemas.microsoft.com/office/powerpoint/2010/main" val="1585881180"/>
       </p:ext>
     </p:extLst>
   </p:cSld>
   <p:clrMapOvr>
     <a:masterClrMapping/>
   </p:clrMapOvr>
-  <p:timing>
-    <p:tnLst>
-      <p:par>
-        <p:cTn id="1" dur="indefinite" restart="never" nodeType="tmRoot"/>
-      </p:par>
-    </p:tnLst>
-  </p:timing>
 </p:sld>
 </file>
 
@@ -22210,68 +22241,75 @@
       </p:sp>
       <p:sp>
         <p:nvSpPr>
-          <p:cNvPr id="4" name="Rectangle 3"/>
-          <p:cNvSpPr/>
+          <p:cNvPr id="3" name="TextBox 2"/>
+          <p:cNvSpPr txBox="1"/>
           <p:nvPr/>
         </p:nvSpPr>
         <p:spPr>
           <a:xfrm>
-            <a:off x="3656871" y="2588350"/>
-            <a:ext cx="4878259" cy="923330"/>
+            <a:off x="4746912" y="1033790"/>
+            <a:ext cx="2698175" cy="523220"/>
           </a:xfrm>
           <a:prstGeom prst="rect">
             <a:avLst/>
           </a:prstGeom>
+          <a:noFill/>
         </p:spPr>
-        <p:style>
-          <a:lnRef idx="3">
-            <a:schemeClr val="lt1"/>
-          </a:lnRef>
-          <a:fillRef idx="1">
-            <a:schemeClr val="accent5"/>
-          </a:fillRef>
-          <a:effectRef idx="1">
-            <a:schemeClr val="accent5"/>
-          </a:effectRef>
-          <a:fontRef idx="minor">
-            <a:schemeClr val="lt1"/>
-          </a:fontRef>
-        </p:style>
         <p:txBody>
-          <a:bodyPr wrap="none" lIns="91440" tIns="45720" rIns="91440" bIns="45720">
+          <a:bodyPr wrap="none" rtlCol="0">
             <a:spAutoFit/>
           </a:bodyPr>
           <a:lstStyle/>
           <a:p>
-            <a:pPr algn="ctr"/>
-            <a:r>
-              <a:rPr lang="en-US" sz="5400" dirty="0" smtClean="0">
-                <a:ln w="0"/>
+            <a:r>
+              <a:rPr lang="en-GB" sz="2800" b="1" i="1" dirty="0" smtClean="0">
+                <a:latin typeface="+mj-lt"/>
+              </a:rPr>
+              <a:t>CONCLUSION</a:t>
+            </a:r>
+          </a:p>
+        </p:txBody>
+      </p:sp>
+      <p:sp>
+        <p:nvSpPr>
+          <p:cNvPr id="4" name="TextBox 3"/>
+          <p:cNvSpPr txBox="1"/>
+          <p:nvPr/>
+        </p:nvSpPr>
+        <p:spPr>
+          <a:xfrm>
+            <a:off x="6956299" y="173782"/>
+            <a:ext cx="3512308" cy="369332"/>
+          </a:xfrm>
+          <a:prstGeom prst="rect">
+            <a:avLst/>
+          </a:prstGeom>
+          <a:noFill/>
+        </p:spPr>
+        <p:txBody>
+          <a:bodyPr wrap="none" rtlCol="0">
+            <a:spAutoFit/>
+          </a:bodyPr>
+          <a:lstStyle/>
+          <a:p>
+            <a:r>
+              <a:rPr lang="en-GB" b="1" dirty="0" smtClean="0">
                 <a:solidFill>
-                  <a:schemeClr val="tx1"/>
+                  <a:srgbClr val="FF0000"/>
                 </a:solidFill>
-                <a:effectLst>
-                  <a:outerShdw blurRad="38100" dist="19050" dir="2700000" algn="tl" rotWithShape="0">
-                    <a:schemeClr val="dk1">
-                      <a:alpha val="40000"/>
-                    </a:schemeClr>
-                  </a:outerShdw>
-                </a:effectLst>
+                <a:latin typeface="DejaVu Sans" panose="020B0603030804020204" pitchFamily="34" charset="0"/>
+                <a:ea typeface="DejaVu Sans" panose="020B0603030804020204" pitchFamily="34" charset="0"/>
+                <a:cs typeface="DejaVu Sans" panose="020B0603030804020204" pitchFamily="34" charset="0"/>
               </a:rPr>
-              <a:t>OTHER IDEAS</a:t>
-            </a:r>
-            <a:endParaRPr lang="en-US" sz="5400" b="0" cap="none" spc="0" dirty="0">
-              <a:ln w="0"/>
+              <a:t>CONCLUSION &amp; REMARKS</a:t>
+            </a:r>
+            <a:endParaRPr lang="en-GB" b="1" dirty="0">
               <a:solidFill>
-                <a:schemeClr val="tx1"/>
+                <a:srgbClr val="FF0000"/>
               </a:solidFill>
-              <a:effectLst>
-                <a:outerShdw blurRad="38100" dist="19050" dir="2700000" algn="tl" rotWithShape="0">
-                  <a:schemeClr val="dk1">
-                    <a:alpha val="40000"/>
-                  </a:schemeClr>
-                </a:outerShdw>
-              </a:effectLst>
+              <a:latin typeface="DejaVu Sans" panose="020B0603030804020204" pitchFamily="34" charset="0"/>
+              <a:ea typeface="DejaVu Sans" panose="020B0603030804020204" pitchFamily="34" charset="0"/>
+              <a:cs typeface="DejaVu Sans" panose="020B0603030804020204" pitchFamily="34" charset="0"/>
             </a:endParaRPr>
           </a:p>
         </p:txBody>
@@ -22279,7 +22317,7 @@
     </p:spTree>
     <p:extLst>
       <p:ext uri="{BB962C8B-B14F-4D97-AF65-F5344CB8AC3E}">
-        <p14:creationId xmlns:p14="http://schemas.microsoft.com/office/powerpoint/2010/main" val="548125632"/>
+        <p14:creationId xmlns:p14="http://schemas.microsoft.com/office/powerpoint/2010/main" val="2463455316"/>
       </p:ext>
     </p:extLst>
   </p:cSld>
@@ -22332,6 +22370,135 @@
               <a:rPr lang="it-IT" altLang="en-US" smtClean="0"/>
               <a:pPr/>
               <a:t>38</a:t>
+            </a:fld>
+            <a:endParaRPr lang="it-IT" altLang="en-US"/>
+          </a:p>
+        </p:txBody>
+      </p:sp>
+      <p:sp>
+        <p:nvSpPr>
+          <p:cNvPr id="4" name="Rectangle 3"/>
+          <p:cNvSpPr/>
+          <p:nvPr/>
+        </p:nvSpPr>
+        <p:spPr>
+          <a:xfrm>
+            <a:off x="3656871" y="2588350"/>
+            <a:ext cx="4878259" cy="923330"/>
+          </a:xfrm>
+          <a:prstGeom prst="rect">
+            <a:avLst/>
+          </a:prstGeom>
+        </p:spPr>
+        <p:style>
+          <a:lnRef idx="3">
+            <a:schemeClr val="lt1"/>
+          </a:lnRef>
+          <a:fillRef idx="1">
+            <a:schemeClr val="accent5"/>
+          </a:fillRef>
+          <a:effectRef idx="1">
+            <a:schemeClr val="accent5"/>
+          </a:effectRef>
+          <a:fontRef idx="minor">
+            <a:schemeClr val="lt1"/>
+          </a:fontRef>
+        </p:style>
+        <p:txBody>
+          <a:bodyPr wrap="none" lIns="91440" tIns="45720" rIns="91440" bIns="45720">
+            <a:spAutoFit/>
+          </a:bodyPr>
+          <a:lstStyle/>
+          <a:p>
+            <a:pPr algn="ctr"/>
+            <a:r>
+              <a:rPr lang="en-US" sz="5400" dirty="0" smtClean="0">
+                <a:ln w="0"/>
+                <a:solidFill>
+                  <a:schemeClr val="tx1"/>
+                </a:solidFill>
+                <a:effectLst>
+                  <a:outerShdw blurRad="38100" dist="19050" dir="2700000" algn="tl" rotWithShape="0">
+                    <a:schemeClr val="dk1">
+                      <a:alpha val="40000"/>
+                    </a:schemeClr>
+                  </a:outerShdw>
+                </a:effectLst>
+              </a:rPr>
+              <a:t>OTHER IDEAS</a:t>
+            </a:r>
+            <a:endParaRPr lang="en-US" sz="5400" b="0" cap="none" spc="0" dirty="0">
+              <a:ln w="0"/>
+              <a:solidFill>
+                <a:schemeClr val="tx1"/>
+              </a:solidFill>
+              <a:effectLst>
+                <a:outerShdw blurRad="38100" dist="19050" dir="2700000" algn="tl" rotWithShape="0">
+                  <a:schemeClr val="dk1">
+                    <a:alpha val="40000"/>
+                  </a:schemeClr>
+                </a:outerShdw>
+              </a:effectLst>
+            </a:endParaRPr>
+          </a:p>
+        </p:txBody>
+      </p:sp>
+    </p:spTree>
+    <p:extLst>
+      <p:ext uri="{BB962C8B-B14F-4D97-AF65-F5344CB8AC3E}">
+        <p14:creationId xmlns:p14="http://schemas.microsoft.com/office/powerpoint/2010/main" val="548125632"/>
+      </p:ext>
+    </p:extLst>
+  </p:cSld>
+  <p:clrMapOvr>
+    <a:masterClrMapping/>
+  </p:clrMapOvr>
+  <p:timing>
+    <p:tnLst>
+      <p:par>
+        <p:cTn id="1" dur="indefinite" restart="never" nodeType="tmRoot"/>
+      </p:par>
+    </p:tnLst>
+  </p:timing>
+</p:sld>
+</file>
+
+<file path=ppt/slides/slide39.xml><?xml version="1.0" encoding="utf-8"?>
+<p:sld xmlns:a="http://schemas.openxmlformats.org/drawingml/2006/main" xmlns:r="http://schemas.openxmlformats.org/officeDocument/2006/relationships" xmlns:p="http://schemas.openxmlformats.org/presentationml/2006/main">
+  <p:cSld>
+    <p:spTree>
+      <p:nvGrpSpPr>
+        <p:cNvPr id="1" name=""/>
+        <p:cNvGrpSpPr/>
+        <p:nvPr/>
+      </p:nvGrpSpPr>
+      <p:grpSpPr>
+        <a:xfrm>
+          <a:off x="0" y="0"/>
+          <a:ext cx="0" cy="0"/>
+          <a:chOff x="0" y="0"/>
+          <a:chExt cx="0" cy="0"/>
+        </a:xfrm>
+      </p:grpSpPr>
+      <p:sp>
+        <p:nvSpPr>
+          <p:cNvPr id="2" name="Slide Number Placeholder 1"/>
+          <p:cNvSpPr>
+            <a:spLocks noGrp="1"/>
+          </p:cNvSpPr>
+          <p:nvPr>
+            <p:ph type="sldNum" sz="quarter" idx="10"/>
+          </p:nvPr>
+        </p:nvSpPr>
+        <p:spPr/>
+        <p:txBody>
+          <a:bodyPr/>
+          <a:lstStyle/>
+          <a:p>
+            <a:fld id="{61155BBA-336D-4AED-BB34-E42D9706BCE7}" type="slidenum">
+              <a:rPr lang="it-IT" altLang="en-US" smtClean="0"/>
+              <a:pPr/>
+              <a:t>39</a:t>
             </a:fld>
             <a:endParaRPr lang="it-IT" altLang="en-US"/>
           </a:p>

</xml_diff>

<commit_message>
Work on report( validation)
</commit_message>
<xml_diff>
--- a/report/Report.pptx
+++ b/report/Report.pptx
@@ -298,7 +298,7 @@
           <a:p>
             <a:fld id="{843C4FC0-81D1-4453-9443-D3E156B7E80B}" type="datetimeFigureOut">
               <a:rPr lang="en-GB" smtClean="0"/>
-              <a:t>19/04/2015</a:t>
+              <a:t>20/04/2015</a:t>
             </a:fld>
             <a:endParaRPr lang="en-GB"/>
           </a:p>
@@ -468,7 +468,7 @@
           <a:p>
             <a:fld id="{843C4FC0-81D1-4453-9443-D3E156B7E80B}" type="datetimeFigureOut">
               <a:rPr lang="en-GB" smtClean="0"/>
-              <a:t>19/04/2015</a:t>
+              <a:t>20/04/2015</a:t>
             </a:fld>
             <a:endParaRPr lang="en-GB"/>
           </a:p>
@@ -648,7 +648,7 @@
           <a:p>
             <a:fld id="{843C4FC0-81D1-4453-9443-D3E156B7E80B}" type="datetimeFigureOut">
               <a:rPr lang="en-GB" smtClean="0"/>
-              <a:t>19/04/2015</a:t>
+              <a:t>20/04/2015</a:t>
             </a:fld>
             <a:endParaRPr lang="en-GB"/>
           </a:p>
@@ -1429,7 +1429,7 @@
           <a:p>
             <a:fld id="{843C4FC0-81D1-4453-9443-D3E156B7E80B}" type="datetimeFigureOut">
               <a:rPr lang="en-GB" smtClean="0"/>
-              <a:t>19/04/2015</a:t>
+              <a:t>20/04/2015</a:t>
             </a:fld>
             <a:endParaRPr lang="en-GB"/>
           </a:p>
@@ -1675,7 +1675,7 @@
           <a:p>
             <a:fld id="{843C4FC0-81D1-4453-9443-D3E156B7E80B}" type="datetimeFigureOut">
               <a:rPr lang="en-GB" smtClean="0"/>
-              <a:t>19/04/2015</a:t>
+              <a:t>20/04/2015</a:t>
             </a:fld>
             <a:endParaRPr lang="en-GB"/>
           </a:p>
@@ -1907,7 +1907,7 @@
           <a:p>
             <a:fld id="{843C4FC0-81D1-4453-9443-D3E156B7E80B}" type="datetimeFigureOut">
               <a:rPr lang="en-GB" smtClean="0"/>
-              <a:t>19/04/2015</a:t>
+              <a:t>20/04/2015</a:t>
             </a:fld>
             <a:endParaRPr lang="en-GB"/>
           </a:p>
@@ -2274,7 +2274,7 @@
           <a:p>
             <a:fld id="{843C4FC0-81D1-4453-9443-D3E156B7E80B}" type="datetimeFigureOut">
               <a:rPr lang="en-GB" smtClean="0"/>
-              <a:t>19/04/2015</a:t>
+              <a:t>20/04/2015</a:t>
             </a:fld>
             <a:endParaRPr lang="en-GB"/>
           </a:p>
@@ -2392,7 +2392,7 @@
           <a:p>
             <a:fld id="{843C4FC0-81D1-4453-9443-D3E156B7E80B}" type="datetimeFigureOut">
               <a:rPr lang="en-GB" smtClean="0"/>
-              <a:t>19/04/2015</a:t>
+              <a:t>20/04/2015</a:t>
             </a:fld>
             <a:endParaRPr lang="en-GB"/>
           </a:p>
@@ -2487,7 +2487,7 @@
           <a:p>
             <a:fld id="{843C4FC0-81D1-4453-9443-D3E156B7E80B}" type="datetimeFigureOut">
               <a:rPr lang="en-GB" smtClean="0"/>
-              <a:t>19/04/2015</a:t>
+              <a:t>20/04/2015</a:t>
             </a:fld>
             <a:endParaRPr lang="en-GB"/>
           </a:p>
@@ -2764,7 +2764,7 @@
           <a:p>
             <a:fld id="{843C4FC0-81D1-4453-9443-D3E156B7E80B}" type="datetimeFigureOut">
               <a:rPr lang="en-GB" smtClean="0"/>
-              <a:t>19/04/2015</a:t>
+              <a:t>20/04/2015</a:t>
             </a:fld>
             <a:endParaRPr lang="en-GB"/>
           </a:p>
@@ -3017,7 +3017,7 @@
           <a:p>
             <a:fld id="{843C4FC0-81D1-4453-9443-D3E156B7E80B}" type="datetimeFigureOut">
               <a:rPr lang="en-GB" smtClean="0"/>
-              <a:t>19/04/2015</a:t>
+              <a:t>20/04/2015</a:t>
             </a:fld>
             <a:endParaRPr lang="en-GB"/>
           </a:p>
@@ -3230,7 +3230,7 @@
           <a:p>
             <a:fld id="{843C4FC0-81D1-4453-9443-D3E156B7E80B}" type="datetimeFigureOut">
               <a:rPr lang="en-GB" smtClean="0"/>
-              <a:t>19/04/2015</a:t>
+              <a:t>20/04/2015</a:t>
             </a:fld>
             <a:endParaRPr lang="en-GB"/>
           </a:p>
@@ -18270,8 +18270,8 @@
           </a:p>
         </p:txBody>
       </p:sp>
-      <mc:AlternateContent xmlns:mc="http://schemas.openxmlformats.org/markup-compatibility/2006" xmlns:a14="http://schemas.microsoft.com/office/drawing/2010/main">
-        <mc:Choice Requires="a14">
+      <mc:AlternateContent xmlns:mc="http://schemas.openxmlformats.org/markup-compatibility/2006">
+        <mc:Choice xmlns:a14="http://schemas.microsoft.com/office/drawing/2010/main" Requires="a14">
           <p:sp>
             <p:nvSpPr>
               <p:cNvPr id="5" name="TextBox 4"/>
@@ -18281,7 +18281,7 @@
             <p:spPr>
               <a:xfrm>
                 <a:off x="478172" y="1736521"/>
-                <a:ext cx="11444159" cy="3426387"/>
+                <a:ext cx="11446467" cy="3426387"/>
               </a:xfrm>
               <a:prstGeom prst="rect">
                 <a:avLst/>
@@ -18639,8 +18639,15 @@
                 </a14:m>
                 <a:r>
                   <a:rPr lang="en-GB" dirty="0" smtClean="0"/>
-                  <a:t>.</a:t>
+                  <a:t>. But,</a:t>
                 </a:r>
+              </a:p>
+              <a:p>
+                <a:r>
+                  <a:rPr lang="en-GB" dirty="0" smtClean="0"/>
+                  <a:t>Notice that the spectrum of u is quite flat, therefore it’s not a problem.</a:t>
+                </a:r>
+                <a:endParaRPr lang="en-GB" dirty="0" smtClean="0"/>
               </a:p>
               <a:p>
                 <a:endParaRPr lang="en-GB" dirty="0"/>
@@ -18648,20 +18655,14 @@
               <a:p>
                 <a:r>
                   <a:rPr lang="en-GB" dirty="0" smtClean="0"/>
-                  <a:t>In this way all models converge to the OE ones. To improve OE results we need  to obtain a filter </a:t>
-                </a:r>
-              </a:p>
-              <a:p>
-                <a:r>
-                  <a:rPr lang="en-GB" dirty="0" smtClean="0"/>
-                  <a:t>Representation of u (easier if r(t) and C(z) were provided) in order to apply the correct filter L.</a:t>
+                  <a:t>In this way all models converge to the OE ones. </a:t>
                 </a:r>
                 <a:endParaRPr lang="en-GB" dirty="0"/>
               </a:p>
             </p:txBody>
           </p:sp>
         </mc:Choice>
-        <mc:Fallback xmlns="">
+        <mc:Fallback>
           <p:sp>
             <p:nvSpPr>
               <p:cNvPr id="5" name="TextBox 4"/>
@@ -18673,7 +18674,7 @@
             <p:spPr>
               <a:xfrm>
                 <a:off x="478172" y="1736521"/>
-                <a:ext cx="11444159" cy="3426387"/>
+                <a:ext cx="11446467" cy="3426387"/>
               </a:xfrm>
               <a:prstGeom prst="rect">
                 <a:avLst/>
@@ -20825,190 +20826,360 @@
           </a:p>
         </p:txBody>
       </p:sp>
-      <p:sp>
-        <p:nvSpPr>
-          <p:cNvPr id="5" name="TextBox 4"/>
-          <p:cNvSpPr txBox="1"/>
-          <p:nvPr/>
-        </p:nvSpPr>
-        <p:spPr>
-          <a:xfrm>
-            <a:off x="231820" y="1569710"/>
-            <a:ext cx="11719775" cy="4247317"/>
-          </a:xfrm>
-          <a:prstGeom prst="rect">
-            <a:avLst/>
-          </a:prstGeom>
-          <a:noFill/>
-        </p:spPr>
-        <p:txBody>
-          <a:bodyPr wrap="square" rtlCol="0">
-            <a:spAutoFit/>
-          </a:bodyPr>
-          <a:lstStyle/>
-          <a:p>
-            <a:r>
-              <a:rPr lang="en-GB" b="1" dirty="0" smtClean="0"/>
-              <a:t>OE</a:t>
-            </a:r>
-            <a:r>
-              <a:rPr lang="en-GB" dirty="0" smtClean="0"/>
-              <a:t> performs better than </a:t>
-            </a:r>
-            <a:r>
-              <a:rPr lang="en-GB" b="1" dirty="0" smtClean="0"/>
-              <a:t>ARX</a:t>
-            </a:r>
-            <a:r>
-              <a:rPr lang="en-GB" dirty="0" smtClean="0"/>
-              <a:t> models as expected from the previous theoretical discussion.</a:t>
-            </a:r>
-          </a:p>
-          <a:p>
-            <a:endParaRPr lang="en-GB" b="1" dirty="0"/>
-          </a:p>
-          <a:p>
-            <a:r>
-              <a:rPr lang="en-GB" b="1" dirty="0" smtClean="0"/>
-              <a:t>ARMAX </a:t>
-            </a:r>
-            <a:r>
-              <a:rPr lang="en-GB" dirty="0" smtClean="0"/>
-              <a:t>and </a:t>
-            </a:r>
-            <a:r>
-              <a:rPr lang="en-GB" b="1" dirty="0" smtClean="0"/>
-              <a:t>BJ</a:t>
-            </a:r>
-            <a:r>
-              <a:rPr lang="en-GB" dirty="0" smtClean="0"/>
-              <a:t> give exactly the same results as </a:t>
-            </a:r>
-            <a:r>
-              <a:rPr lang="en-GB" b="1" dirty="0" smtClean="0"/>
-              <a:t>OE</a:t>
-            </a:r>
-            <a:r>
-              <a:rPr lang="en-GB" dirty="0" smtClean="0"/>
-              <a:t> models using simulation focus.</a:t>
-            </a:r>
-          </a:p>
-          <a:p>
-            <a:endParaRPr lang="en-GB" b="1" dirty="0"/>
-          </a:p>
-          <a:p>
-            <a:r>
-              <a:rPr lang="en-GB" dirty="0" smtClean="0"/>
-              <a:t>A deeper analysis can be done with a </a:t>
-            </a:r>
-            <a:r>
-              <a:rPr lang="en-GB" dirty="0" err="1" smtClean="0"/>
-              <a:t>Matlab</a:t>
-            </a:r>
-            <a:r>
-              <a:rPr lang="en-GB" dirty="0" smtClean="0"/>
-              <a:t> script we wrote (</a:t>
-            </a:r>
-            <a:r>
-              <a:rPr lang="en-GB" dirty="0" err="1" smtClean="0"/>
-              <a:t>compareModels</a:t>
-            </a:r>
-            <a:r>
-              <a:rPr lang="en-GB" dirty="0" smtClean="0"/>
-              <a:t>) which shows graphically the properties of the two models, as:</a:t>
-            </a:r>
-          </a:p>
-          <a:p>
-            <a:pPr marL="285750" indent="-285750">
-              <a:buFont typeface="Arial" panose="020B0604020202020204" pitchFamily="34" charset="0"/>
-              <a:buChar char="•"/>
-            </a:pPr>
-            <a:r>
-              <a:rPr lang="en-GB" dirty="0" smtClean="0"/>
-              <a:t>Simulated output compared to actual data</a:t>
-            </a:r>
-          </a:p>
-          <a:p>
-            <a:pPr marL="285750" indent="-285750">
-              <a:buFont typeface="Arial" panose="020B0604020202020204" pitchFamily="34" charset="0"/>
-              <a:buChar char="•"/>
-            </a:pPr>
-            <a:r>
-              <a:rPr lang="en-GB" dirty="0" smtClean="0"/>
-              <a:t>Spectra analysis</a:t>
-            </a:r>
-          </a:p>
-          <a:p>
-            <a:pPr marL="285750" indent="-285750">
-              <a:buFont typeface="Arial" panose="020B0604020202020204" pitchFamily="34" charset="0"/>
-              <a:buChar char="•"/>
-            </a:pPr>
-            <a:r>
-              <a:rPr lang="en-GB" dirty="0" smtClean="0"/>
-              <a:t>Absolute error: mean, variance and max</a:t>
-            </a:r>
-          </a:p>
-          <a:p>
-            <a:pPr marL="285750" indent="-285750">
-              <a:buFont typeface="Arial" panose="020B0604020202020204" pitchFamily="34" charset="0"/>
-              <a:buChar char="•"/>
-            </a:pPr>
-            <a:r>
-              <a:rPr lang="en-GB" dirty="0" smtClean="0"/>
-              <a:t>Covariance of simulation error</a:t>
-            </a:r>
-          </a:p>
-          <a:p>
-            <a:pPr marL="285750" indent="-285750">
-              <a:buFont typeface="Arial" panose="020B0604020202020204" pitchFamily="34" charset="0"/>
-              <a:buChar char="•"/>
-            </a:pPr>
-            <a:r>
-              <a:rPr lang="en-GB" dirty="0" smtClean="0"/>
-              <a:t>Anderson Test</a:t>
-            </a:r>
-          </a:p>
-          <a:p>
-            <a:pPr marL="285750" indent="-285750">
-              <a:buFont typeface="Arial" panose="020B0604020202020204" pitchFamily="34" charset="0"/>
-              <a:buChar char="•"/>
-            </a:pPr>
-            <a:endParaRPr lang="en-GB" dirty="0"/>
-          </a:p>
-          <a:p>
-            <a:r>
-              <a:rPr lang="en-GB" dirty="0" smtClean="0"/>
-              <a:t>Both models pass Anderson Whiteness Test but </a:t>
-            </a:r>
-            <a:r>
-              <a:rPr lang="en-GB" b="1" dirty="0" smtClean="0"/>
-              <a:t>OE</a:t>
-            </a:r>
-            <a:r>
-              <a:rPr lang="en-GB" dirty="0" smtClean="0"/>
-              <a:t> has a better fitting and less error variance.</a:t>
-            </a:r>
-          </a:p>
-          <a:p>
-            <a:endParaRPr lang="en-GB" dirty="0"/>
-          </a:p>
-          <a:p>
-            <a:r>
-              <a:rPr lang="en-GB" dirty="0" smtClean="0"/>
-              <a:t>See attached </a:t>
-            </a:r>
-            <a:r>
-              <a:rPr lang="en-GB" dirty="0" err="1" smtClean="0"/>
-              <a:t>Matlab</a:t>
-            </a:r>
-            <a:r>
-              <a:rPr lang="en-GB" dirty="0" smtClean="0"/>
-              <a:t> scripts for more detailed info.</a:t>
-            </a:r>
-            <a:endParaRPr lang="en-GB" dirty="0"/>
-          </a:p>
-        </p:txBody>
-      </p:sp>
+      <mc:AlternateContent xmlns:mc="http://schemas.openxmlformats.org/markup-compatibility/2006">
+        <mc:Choice xmlns:a14="http://schemas.microsoft.com/office/drawing/2010/main" Requires="a14">
+          <p:sp>
+            <p:nvSpPr>
+              <p:cNvPr id="5" name="TextBox 4"/>
+              <p:cNvSpPr txBox="1"/>
+              <p:nvPr/>
+            </p:nvSpPr>
+            <p:spPr>
+              <a:xfrm>
+                <a:off x="231820" y="1569710"/>
+                <a:ext cx="11719775" cy="5909310"/>
+              </a:xfrm>
+              <a:prstGeom prst="rect">
+                <a:avLst/>
+              </a:prstGeom>
+              <a:noFill/>
+            </p:spPr>
+            <p:txBody>
+              <a:bodyPr wrap="square" rtlCol="0">
+                <a:spAutoFit/>
+              </a:bodyPr>
+              <a:lstStyle/>
+              <a:p>
+                <a:r>
+                  <a:rPr lang="en-GB" b="1" dirty="0" smtClean="0"/>
+                  <a:t>OE</a:t>
+                </a:r>
+                <a:r>
+                  <a:rPr lang="en-GB" dirty="0" smtClean="0"/>
+                  <a:t> performs better than </a:t>
+                </a:r>
+                <a:r>
+                  <a:rPr lang="en-GB" b="1" dirty="0" smtClean="0"/>
+                  <a:t>ARX</a:t>
+                </a:r>
+                <a:r>
+                  <a:rPr lang="en-GB" dirty="0" smtClean="0"/>
+                  <a:t> models as expected from the previous theoretical discussion.</a:t>
+                </a:r>
+              </a:p>
+              <a:p>
+                <a:endParaRPr lang="en-GB" b="1" dirty="0"/>
+              </a:p>
+              <a:p>
+                <a:r>
+                  <a:rPr lang="en-GB" b="1" dirty="0" smtClean="0"/>
+                  <a:t>ARMAX </a:t>
+                </a:r>
+                <a:r>
+                  <a:rPr lang="en-GB" dirty="0" smtClean="0"/>
+                  <a:t>and </a:t>
+                </a:r>
+                <a:r>
+                  <a:rPr lang="en-GB" b="1" dirty="0" smtClean="0"/>
+                  <a:t>BJ</a:t>
+                </a:r>
+                <a:r>
+                  <a:rPr lang="en-GB" dirty="0" smtClean="0"/>
+                  <a:t> give exactly the same results as </a:t>
+                </a:r>
+                <a:r>
+                  <a:rPr lang="en-GB" b="1" dirty="0" smtClean="0"/>
+                  <a:t>OE</a:t>
+                </a:r>
+                <a:r>
+                  <a:rPr lang="en-GB" dirty="0" smtClean="0"/>
+                  <a:t> models using simulation focus</a:t>
+                </a:r>
+                <a:r>
+                  <a:rPr lang="en-GB" dirty="0" smtClean="0"/>
+                  <a:t>. This is due to the fact that </a:t>
+                </a:r>
+              </a:p>
+              <a:p>
+                <a:r>
+                  <a:rPr lang="en-GB" dirty="0" err="1" smtClean="0"/>
+                  <a:t>Matlab</a:t>
+                </a:r>
+                <a:r>
+                  <a:rPr lang="en-GB" dirty="0" smtClean="0"/>
+                  <a:t> uses a 2 step identification, where in the first steps assume the T.F. from e to y to be 1, to identify </a:t>
+                </a:r>
+                <a14:m>
+                  <m:oMath xmlns:m="http://schemas.openxmlformats.org/officeDocument/2006/math">
+                    <m:r>
+                      <a:rPr lang="en-GB" b="0" i="1" smtClean="0">
+                        <a:latin typeface="Cambria Math" panose="02040503050406030204" pitchFamily="18" charset="0"/>
+                      </a:rPr>
+                      <m:t>𝐺</m:t>
+                    </m:r>
+                  </m:oMath>
+                </a14:m>
+                <a:r>
+                  <a:rPr lang="en-GB" dirty="0" smtClean="0"/>
+                  <a:t>. Then</a:t>
+                </a:r>
+              </a:p>
+              <a:p>
+                <a:r>
+                  <a:rPr lang="en-GB" dirty="0" smtClean="0"/>
+                  <a:t>The T.F. from e to y is identified. Therefore we obtain the OE model for </a:t>
+                </a:r>
+                <a14:m>
+                  <m:oMath xmlns:m="http://schemas.openxmlformats.org/officeDocument/2006/math">
+                    <m:r>
+                      <a:rPr lang="en-GB" i="1">
+                        <a:latin typeface="Cambria Math" panose="02040503050406030204" pitchFamily="18" charset="0"/>
+                      </a:rPr>
+                      <m:t>𝐺</m:t>
+                    </m:r>
+                  </m:oMath>
+                </a14:m>
+                <a:r>
+                  <a:rPr lang="en-GB" dirty="0" smtClean="0"/>
+                  <a:t>. </a:t>
+                </a:r>
+              </a:p>
+              <a:p>
+                <a:endParaRPr lang="en-GB" dirty="0"/>
+              </a:p>
+              <a:p>
+                <a:r>
+                  <a:rPr lang="en-GB" b="1" dirty="0"/>
+                  <a:t>ARMAX </a:t>
+                </a:r>
+                <a:r>
+                  <a:rPr lang="en-GB" dirty="0"/>
+                  <a:t>and </a:t>
+                </a:r>
+                <a:r>
+                  <a:rPr lang="en-GB" b="1" dirty="0"/>
+                  <a:t>BJ</a:t>
+                </a:r>
+                <a:r>
+                  <a:rPr lang="en-GB" dirty="0"/>
+                  <a:t> give </a:t>
+                </a:r>
+                <a:r>
+                  <a:rPr lang="en-GB" dirty="0" smtClean="0"/>
+                  <a:t>different results using prediction focus, but even with high complexity models they don’t get </a:t>
+                </a:r>
+              </a:p>
+              <a:p>
+                <a:r>
+                  <a:rPr lang="en-GB" dirty="0" smtClean="0"/>
+                  <a:t>As close as to the OE model. This might be a clue of being an open loop experiment since for closed loop data</a:t>
+                </a:r>
+              </a:p>
+              <a:p>
+                <a:r>
+                  <a:rPr lang="en-GB" dirty="0" smtClean="0"/>
+                  <a:t>Detailed </a:t>
+                </a:r>
+                <a14:m>
+                  <m:oMath xmlns:m="http://schemas.openxmlformats.org/officeDocument/2006/math">
+                    <m:r>
+                      <a:rPr lang="en-GB" b="0" i="1" smtClean="0">
+                        <a:latin typeface="Cambria Math" panose="02040503050406030204" pitchFamily="18" charset="0"/>
+                      </a:rPr>
+                      <m:t>𝑒</m:t>
+                    </m:r>
+                    <m:r>
+                      <a:rPr lang="en-GB" b="0" i="1" smtClean="0">
+                        <a:latin typeface="Cambria Math" panose="02040503050406030204" pitchFamily="18" charset="0"/>
+                      </a:rPr>
+                      <m:t> </m:t>
+                    </m:r>
+                    <m:r>
+                      <a:rPr lang="en-GB" b="0" i="1" smtClean="0">
+                        <a:latin typeface="Cambria Math" panose="02040503050406030204" pitchFamily="18" charset="0"/>
+                      </a:rPr>
+                      <m:t>𝑡𝑜</m:t>
+                    </m:r>
+                    <m:r>
+                      <a:rPr lang="en-GB" b="0" i="1" smtClean="0">
+                        <a:latin typeface="Cambria Math" panose="02040503050406030204" pitchFamily="18" charset="0"/>
+                      </a:rPr>
+                      <m:t> </m:t>
+                    </m:r>
+                    <m:r>
+                      <a:rPr lang="en-GB" b="0" i="1" smtClean="0">
+                        <a:latin typeface="Cambria Math" panose="02040503050406030204" pitchFamily="18" charset="0"/>
+                      </a:rPr>
+                      <m:t>𝑦</m:t>
+                    </m:r>
+                  </m:oMath>
+                </a14:m>
+                <a:r>
+                  <a:rPr lang="en-GB" dirty="0" smtClean="0"/>
+                  <a:t> T.F.s will give a better result (because of the compromise).</a:t>
+                </a:r>
+                <a:endParaRPr lang="en-GB" dirty="0"/>
+              </a:p>
+              <a:p>
+                <a:endParaRPr lang="en-GB" dirty="0"/>
+              </a:p>
+              <a:p>
+                <a:r>
+                  <a:rPr lang="en-GB" dirty="0" smtClean="0"/>
+                  <a:t>A </a:t>
+                </a:r>
+                <a:r>
+                  <a:rPr lang="en-GB" dirty="0" smtClean="0"/>
+                  <a:t>deeper analysis can be done with a </a:t>
+                </a:r>
+                <a:r>
+                  <a:rPr lang="en-GB" dirty="0" err="1" smtClean="0"/>
+                  <a:t>Matlab</a:t>
+                </a:r>
+                <a:r>
+                  <a:rPr lang="en-GB" dirty="0" smtClean="0"/>
+                  <a:t> script we wrote (</a:t>
+                </a:r>
+                <a:r>
+                  <a:rPr lang="en-GB" dirty="0" err="1" smtClean="0"/>
+                  <a:t>compareModels</a:t>
+                </a:r>
+                <a:r>
+                  <a:rPr lang="en-GB" dirty="0" smtClean="0"/>
+                  <a:t>) which shows graphically the properties of the two models, as:</a:t>
+                </a:r>
+              </a:p>
+              <a:p>
+                <a:pPr marL="285750" indent="-285750">
+                  <a:buFont typeface="Arial" panose="020B0604020202020204" pitchFamily="34" charset="0"/>
+                  <a:buChar char="•"/>
+                </a:pPr>
+                <a:r>
+                  <a:rPr lang="en-GB" dirty="0" smtClean="0"/>
+                  <a:t>Simulated output compared to actual data</a:t>
+                </a:r>
+              </a:p>
+              <a:p>
+                <a:pPr marL="285750" indent="-285750">
+                  <a:buFont typeface="Arial" panose="020B0604020202020204" pitchFamily="34" charset="0"/>
+                  <a:buChar char="•"/>
+                </a:pPr>
+                <a:r>
+                  <a:rPr lang="en-GB" dirty="0" smtClean="0"/>
+                  <a:t>Spectra analysis</a:t>
+                </a:r>
+              </a:p>
+              <a:p>
+                <a:pPr marL="285750" indent="-285750">
+                  <a:buFont typeface="Arial" panose="020B0604020202020204" pitchFamily="34" charset="0"/>
+                  <a:buChar char="•"/>
+                </a:pPr>
+                <a:r>
+                  <a:rPr lang="en-GB" dirty="0" smtClean="0"/>
+                  <a:t>Absolute error: mean, variance and max</a:t>
+                </a:r>
+              </a:p>
+              <a:p>
+                <a:pPr marL="285750" indent="-285750">
+                  <a:buFont typeface="Arial" panose="020B0604020202020204" pitchFamily="34" charset="0"/>
+                  <a:buChar char="•"/>
+                </a:pPr>
+                <a:r>
+                  <a:rPr lang="en-GB" dirty="0" smtClean="0"/>
+                  <a:t>Covariance of simulation error</a:t>
+                </a:r>
+              </a:p>
+              <a:p>
+                <a:pPr marL="285750" indent="-285750">
+                  <a:buFont typeface="Arial" panose="020B0604020202020204" pitchFamily="34" charset="0"/>
+                  <a:buChar char="•"/>
+                </a:pPr>
+                <a:r>
+                  <a:rPr lang="en-GB" dirty="0" smtClean="0"/>
+                  <a:t>Anderson Test</a:t>
+                </a:r>
+              </a:p>
+              <a:p>
+                <a:pPr marL="285750" indent="-285750">
+                  <a:buFont typeface="Arial" panose="020B0604020202020204" pitchFamily="34" charset="0"/>
+                  <a:buChar char="•"/>
+                </a:pPr>
+                <a:endParaRPr lang="en-GB" dirty="0"/>
+              </a:p>
+              <a:p>
+                <a:r>
+                  <a:rPr lang="en-GB" dirty="0" smtClean="0"/>
+                  <a:t>Both models pass Anderson Whiteness Test but </a:t>
+                </a:r>
+                <a:r>
+                  <a:rPr lang="en-GB" b="1" dirty="0" smtClean="0"/>
+                  <a:t>OE</a:t>
+                </a:r>
+                <a:r>
+                  <a:rPr lang="en-GB" dirty="0" smtClean="0"/>
+                  <a:t> has a better fitting and less error variance.</a:t>
+                </a:r>
+              </a:p>
+              <a:p>
+                <a:endParaRPr lang="en-GB" dirty="0"/>
+              </a:p>
+              <a:p>
+                <a:r>
+                  <a:rPr lang="en-GB" dirty="0" smtClean="0"/>
+                  <a:t>See attached </a:t>
+                </a:r>
+                <a:r>
+                  <a:rPr lang="en-GB" dirty="0" err="1" smtClean="0"/>
+                  <a:t>Matlab</a:t>
+                </a:r>
+                <a:r>
+                  <a:rPr lang="en-GB" dirty="0" smtClean="0"/>
+                  <a:t> scripts for more detailed info.</a:t>
+                </a:r>
+                <a:endParaRPr lang="en-GB" dirty="0"/>
+              </a:p>
+            </p:txBody>
+          </p:sp>
+        </mc:Choice>
+        <mc:Fallback>
+          <p:sp>
+            <p:nvSpPr>
+              <p:cNvPr id="5" name="TextBox 4"/>
+              <p:cNvSpPr txBox="1">
+                <a:spLocks noRot="1" noChangeAspect="1" noMove="1" noResize="1" noEditPoints="1" noAdjustHandles="1" noChangeArrowheads="1" noChangeShapeType="1" noTextEdit="1"/>
+              </p:cNvSpPr>
+              <p:nvPr/>
+            </p:nvSpPr>
+            <p:spPr>
+              <a:xfrm>
+                <a:off x="231820" y="1569710"/>
+                <a:ext cx="11719775" cy="5909310"/>
+              </a:xfrm>
+              <a:prstGeom prst="rect">
+                <a:avLst/>
+              </a:prstGeom>
+              <a:blipFill rotWithShape="0">
+                <a:blip r:embed="rId2"/>
+                <a:stretch>
+                  <a:fillRect l="-416" t="-515" b="-619"/>
+                </a:stretch>
+              </a:blipFill>
+            </p:spPr>
+            <p:txBody>
+              <a:bodyPr/>
+              <a:lstStyle/>
+              <a:p>
+                <a:r>
+                  <a:rPr lang="en-GB">
+                    <a:noFill/>
+                  </a:rPr>
+                  <a:t> </a:t>
+                </a:r>
+              </a:p>
+            </p:txBody>
+          </p:sp>
+        </mc:Fallback>
+      </mc:AlternateContent>
     </p:spTree>
     <p:extLst>
       <p:ext uri="{BB962C8B-B14F-4D97-AF65-F5344CB8AC3E}">
@@ -22078,13 +22249,7 @@
               <a:rPr lang="it-IT" sz="2800" b="1" i="1" dirty="0" smtClean="0">
                 <a:latin typeface="+mj-lt"/>
               </a:rPr>
-              <a:t>MODEL VALIDATION – </a:t>
-            </a:r>
-            <a:r>
-              <a:rPr lang="it-IT" sz="2800" b="1" i="1" dirty="0" smtClean="0">
-                <a:latin typeface="+mj-lt"/>
-              </a:rPr>
-              <a:t>DYNAMICS</a:t>
+              <a:t>MODEL VALIDATION – DYNAMICS</a:t>
             </a:r>
             <a:endParaRPr lang="it-IT" dirty="0" smtClean="0"/>
           </a:p>
@@ -22261,13 +22426,7 @@
               <a:rPr lang="it-IT" sz="2800" b="1" i="1" dirty="0" smtClean="0">
                 <a:latin typeface="+mj-lt"/>
               </a:rPr>
-              <a:t>MODEL VALIDATION – </a:t>
-            </a:r>
-            <a:r>
-              <a:rPr lang="it-IT" sz="2800" b="1" i="1" dirty="0" smtClean="0">
-                <a:latin typeface="+mj-lt"/>
-              </a:rPr>
-              <a:t>DYNAMICS</a:t>
+              <a:t>MODEL VALIDATION – DYNAMICS</a:t>
             </a:r>
           </a:p>
           <a:p>
@@ -22501,13 +22660,7 @@
               <a:rPr lang="it-IT" sz="2800" b="1" i="1" dirty="0" smtClean="0">
                 <a:latin typeface="+mj-lt"/>
               </a:rPr>
-              <a:t>MODEL VALIDATION – </a:t>
-            </a:r>
-            <a:r>
-              <a:rPr lang="it-IT" sz="2800" b="1" i="1" dirty="0" smtClean="0">
-                <a:latin typeface="+mj-lt"/>
-              </a:rPr>
-              <a:t>DYNAMICS</a:t>
+              <a:t>MODEL VALIDATION – DYNAMICS</a:t>
             </a:r>
             <a:endParaRPr lang="it-IT" dirty="0" smtClean="0"/>
           </a:p>
@@ -23573,7 +23726,7 @@
         <p:spPr>
           <a:xfrm>
             <a:off x="922789" y="1795244"/>
-            <a:ext cx="10161180" cy="1200329"/>
+            <a:ext cx="10161180" cy="1477328"/>
           </a:xfrm>
           <a:prstGeom prst="rect">
             <a:avLst/>
@@ -23648,7 +23801,25 @@
             </a:pPr>
             <a:r>
               <a:rPr lang="en-GB" dirty="0" smtClean="0"/>
-              <a:t>Better experimental data wont be bad</a:t>
+              <a:t>Better experimental data wont be </a:t>
+            </a:r>
+            <a:r>
+              <a:rPr lang="en-GB" dirty="0" smtClean="0"/>
+              <a:t>bad</a:t>
+            </a:r>
+          </a:p>
+          <a:p>
+            <a:pPr marL="342900" indent="-342900">
+              <a:buFont typeface="+mj-lt"/>
+              <a:buAutoNum type="arabicPeriod"/>
+            </a:pPr>
+            <a:r>
+              <a:rPr lang="en-GB" dirty="0" err="1" smtClean="0"/>
+              <a:t>Istrunemtnal</a:t>
+            </a:r>
+            <a:r>
+              <a:rPr lang="en-GB" smtClean="0"/>
+              <a:t> variable method</a:t>
             </a:r>
             <a:endParaRPr lang="en-GB" dirty="0"/>
           </a:p>

</xml_diff>

<commit_message>
Update Report - Final Version
This is a good candidate to be presented on tuesday.
</commit_message>
<xml_diff>
--- a/report/Report.pptx
+++ b/report/Report.pptx
@@ -298,7 +298,7 @@
           <a:p>
             <a:fld id="{843C4FC0-81D1-4453-9443-D3E156B7E80B}" type="datetimeFigureOut">
               <a:rPr lang="en-GB" smtClean="0"/>
-              <a:t>20/04/2015</a:t>
+              <a:t>25/04/2015</a:t>
             </a:fld>
             <a:endParaRPr lang="en-GB"/>
           </a:p>
@@ -468,7 +468,7 @@
           <a:p>
             <a:fld id="{843C4FC0-81D1-4453-9443-D3E156B7E80B}" type="datetimeFigureOut">
               <a:rPr lang="en-GB" smtClean="0"/>
-              <a:t>20/04/2015</a:t>
+              <a:t>25/04/2015</a:t>
             </a:fld>
             <a:endParaRPr lang="en-GB"/>
           </a:p>
@@ -648,7 +648,7 @@
           <a:p>
             <a:fld id="{843C4FC0-81D1-4453-9443-D3E156B7E80B}" type="datetimeFigureOut">
               <a:rPr lang="en-GB" smtClean="0"/>
-              <a:t>20/04/2015</a:t>
+              <a:t>25/04/2015</a:t>
             </a:fld>
             <a:endParaRPr lang="en-GB"/>
           </a:p>
@@ -1429,7 +1429,7 @@
           <a:p>
             <a:fld id="{843C4FC0-81D1-4453-9443-D3E156B7E80B}" type="datetimeFigureOut">
               <a:rPr lang="en-GB" smtClean="0"/>
-              <a:t>20/04/2015</a:t>
+              <a:t>25/04/2015</a:t>
             </a:fld>
             <a:endParaRPr lang="en-GB"/>
           </a:p>
@@ -1675,7 +1675,7 @@
           <a:p>
             <a:fld id="{843C4FC0-81D1-4453-9443-D3E156B7E80B}" type="datetimeFigureOut">
               <a:rPr lang="en-GB" smtClean="0"/>
-              <a:t>20/04/2015</a:t>
+              <a:t>25/04/2015</a:t>
             </a:fld>
             <a:endParaRPr lang="en-GB"/>
           </a:p>
@@ -1907,7 +1907,7 @@
           <a:p>
             <a:fld id="{843C4FC0-81D1-4453-9443-D3E156B7E80B}" type="datetimeFigureOut">
               <a:rPr lang="en-GB" smtClean="0"/>
-              <a:t>20/04/2015</a:t>
+              <a:t>25/04/2015</a:t>
             </a:fld>
             <a:endParaRPr lang="en-GB"/>
           </a:p>
@@ -2274,7 +2274,7 @@
           <a:p>
             <a:fld id="{843C4FC0-81D1-4453-9443-D3E156B7E80B}" type="datetimeFigureOut">
               <a:rPr lang="en-GB" smtClean="0"/>
-              <a:t>20/04/2015</a:t>
+              <a:t>25/04/2015</a:t>
             </a:fld>
             <a:endParaRPr lang="en-GB"/>
           </a:p>
@@ -2392,7 +2392,7 @@
           <a:p>
             <a:fld id="{843C4FC0-81D1-4453-9443-D3E156B7E80B}" type="datetimeFigureOut">
               <a:rPr lang="en-GB" smtClean="0"/>
-              <a:t>20/04/2015</a:t>
+              <a:t>25/04/2015</a:t>
             </a:fld>
             <a:endParaRPr lang="en-GB"/>
           </a:p>
@@ -2487,7 +2487,7 @@
           <a:p>
             <a:fld id="{843C4FC0-81D1-4453-9443-D3E156B7E80B}" type="datetimeFigureOut">
               <a:rPr lang="en-GB" smtClean="0"/>
-              <a:t>20/04/2015</a:t>
+              <a:t>25/04/2015</a:t>
             </a:fld>
             <a:endParaRPr lang="en-GB"/>
           </a:p>
@@ -2764,7 +2764,7 @@
           <a:p>
             <a:fld id="{843C4FC0-81D1-4453-9443-D3E156B7E80B}" type="datetimeFigureOut">
               <a:rPr lang="en-GB" smtClean="0"/>
-              <a:t>20/04/2015</a:t>
+              <a:t>25/04/2015</a:t>
             </a:fld>
             <a:endParaRPr lang="en-GB"/>
           </a:p>
@@ -3017,7 +3017,7 @@
           <a:p>
             <a:fld id="{843C4FC0-81D1-4453-9443-D3E156B7E80B}" type="datetimeFigureOut">
               <a:rPr lang="en-GB" smtClean="0"/>
-              <a:t>20/04/2015</a:t>
+              <a:t>25/04/2015</a:t>
             </a:fld>
             <a:endParaRPr lang="en-GB"/>
           </a:p>
@@ -3230,7 +3230,7 @@
           <a:p>
             <a:fld id="{843C4FC0-81D1-4453-9443-D3E156B7E80B}" type="datetimeFigureOut">
               <a:rPr lang="en-GB" smtClean="0"/>
-              <a:t>20/04/2015</a:t>
+              <a:t>25/04/2015</a:t>
             </a:fld>
             <a:endParaRPr lang="en-GB"/>
           </a:p>
@@ -18270,8 +18270,8 @@
           </a:p>
         </p:txBody>
       </p:sp>
-      <mc:AlternateContent xmlns:mc="http://schemas.openxmlformats.org/markup-compatibility/2006">
-        <mc:Choice xmlns:a14="http://schemas.microsoft.com/office/drawing/2010/main" Requires="a14">
+      <mc:AlternateContent xmlns:mc="http://schemas.openxmlformats.org/markup-compatibility/2006" xmlns:a14="http://schemas.microsoft.com/office/drawing/2010/main">
+        <mc:Choice Requires="a14">
           <p:sp>
             <p:nvSpPr>
               <p:cNvPr id="5" name="TextBox 4"/>
@@ -18647,7 +18647,6 @@
                   <a:rPr lang="en-GB" dirty="0" smtClean="0"/>
                   <a:t>Notice that the spectrum of u is quite flat, therefore it’s not a problem.</a:t>
                 </a:r>
-                <a:endParaRPr lang="en-GB" dirty="0" smtClean="0"/>
               </a:p>
               <a:p>
                 <a:endParaRPr lang="en-GB" dirty="0"/>
@@ -18662,7 +18661,7 @@
             </p:txBody>
           </p:sp>
         </mc:Choice>
-        <mc:Fallback>
+        <mc:Fallback xmlns="">
           <p:sp>
             <p:nvSpPr>
               <p:cNvPr id="5" name="TextBox 4"/>
@@ -20826,8 +20825,8 @@
           </a:p>
         </p:txBody>
       </p:sp>
-      <mc:AlternateContent xmlns:mc="http://schemas.openxmlformats.org/markup-compatibility/2006">
-        <mc:Choice xmlns:a14="http://schemas.microsoft.com/office/drawing/2010/main" Requires="a14">
+      <mc:AlternateContent xmlns:mc="http://schemas.openxmlformats.org/markup-compatibility/2006" xmlns:a14="http://schemas.microsoft.com/office/drawing/2010/main">
+        <mc:Choice Requires="a14">
           <p:sp>
             <p:nvSpPr>
               <p:cNvPr id="5" name="TextBox 4"/>
@@ -20893,11 +20892,7 @@
                 </a:r>
                 <a:r>
                   <a:rPr lang="en-GB" dirty="0" smtClean="0"/>
-                  <a:t> models using simulation focus</a:t>
-                </a:r>
-                <a:r>
-                  <a:rPr lang="en-GB" dirty="0" smtClean="0"/>
-                  <a:t>. This is due to the fact that </a:t>
+                  <a:t> models using simulation focus. This is due to the fact that </a:t>
                 </a:r>
               </a:p>
               <a:p>
@@ -21026,11 +21021,7 @@
               <a:p>
                 <a:r>
                   <a:rPr lang="en-GB" dirty="0" smtClean="0"/>
-                  <a:t>A </a:t>
-                </a:r>
-                <a:r>
-                  <a:rPr lang="en-GB" dirty="0" smtClean="0"/>
-                  <a:t>deeper analysis can be done with a </a:t>
+                  <a:t>A deeper analysis can be done with a </a:t>
                 </a:r>
                 <a:r>
                   <a:rPr lang="en-GB" dirty="0" err="1" smtClean="0"/>
@@ -21141,7 +21132,7 @@
             </p:txBody>
           </p:sp>
         </mc:Choice>
-        <mc:Fallback>
+        <mc:Fallback xmlns="">
           <p:sp>
             <p:nvSpPr>
               <p:cNvPr id="5" name="TextBox 4"/>
@@ -23725,8 +23716,8 @@
         </p:nvSpPr>
         <p:spPr>
           <a:xfrm>
-            <a:off x="922789" y="1795244"/>
-            <a:ext cx="10161180" cy="1477328"/>
+            <a:off x="250068" y="1125543"/>
+            <a:ext cx="11418510" cy="5093702"/>
           </a:xfrm>
           <a:prstGeom prst="rect">
             <a:avLst/>
@@ -23739,88 +23730,197 @@
           </a:bodyPr>
           <a:lstStyle/>
           <a:p>
+            <a:pPr algn="ctr"/>
+            <a:r>
+              <a:rPr lang="en-GB" sz="2800" b="1" i="1" dirty="0">
+                <a:latin typeface="+mj-lt"/>
+              </a:rPr>
+              <a:t>OTHER </a:t>
+            </a:r>
+            <a:r>
+              <a:rPr lang="en-GB" sz="2800" b="1" i="1" dirty="0" smtClean="0">
+                <a:latin typeface="+mj-lt"/>
+              </a:rPr>
+              <a:t>IDEAS</a:t>
+            </a:r>
+            <a:endParaRPr lang="en-GB" sz="2800" b="1" i="1" dirty="0">
+              <a:latin typeface="+mj-lt"/>
+            </a:endParaRPr>
+          </a:p>
+          <a:p>
             <a:pPr marL="342900" indent="-342900">
+              <a:lnSpc>
+                <a:spcPct val="150000"/>
+              </a:lnSpc>
               <a:buFont typeface="+mj-lt"/>
               <a:buAutoNum type="arabicPeriod"/>
             </a:pPr>
-            <a:r>
-              <a:rPr lang="en-GB" dirty="0" smtClean="0"/>
-              <a:t>Non linear identification: tried to use </a:t>
-            </a:r>
-            <a:r>
-              <a:rPr lang="en-GB" dirty="0" err="1" smtClean="0"/>
-              <a:t>matlab</a:t>
-            </a:r>
-            <a:r>
-              <a:rPr lang="en-GB" dirty="0" smtClean="0"/>
-              <a:t> toolbox, </a:t>
-            </a:r>
-            <a:r>
-              <a:rPr lang="en-GB" dirty="0" err="1" smtClean="0"/>
-              <a:t>kinda</a:t>
-            </a:r>
-            <a:r>
-              <a:rPr lang="en-GB" dirty="0" smtClean="0"/>
-              <a:t> bad results</a:t>
-            </a:r>
+            <a:endParaRPr lang="en-GB" dirty="0" smtClean="0"/>
           </a:p>
           <a:p>
             <a:pPr marL="342900" indent="-342900">
+              <a:lnSpc>
+                <a:spcPct val="150000"/>
+              </a:lnSpc>
               <a:buFont typeface="+mj-lt"/>
               <a:buAutoNum type="arabicPeriod"/>
             </a:pPr>
             <a:r>
               <a:rPr lang="en-GB" dirty="0" smtClean="0"/>
-              <a:t>Try to merge the first 2 datasets (they are similar) and do training on this, then validation on 3</a:t>
-            </a:r>
-            <a:r>
-              <a:rPr lang="en-GB" baseline="30000" dirty="0" smtClean="0"/>
-              <a:t>rd</a:t>
-            </a:r>
-            <a:endParaRPr lang="en-GB" dirty="0" smtClean="0"/>
+              <a:t>Non </a:t>
+            </a:r>
+            <a:r>
+              <a:rPr lang="en-GB" dirty="0" smtClean="0"/>
+              <a:t>linear identification: tried to use </a:t>
+            </a:r>
+            <a:r>
+              <a:rPr lang="en-GB" dirty="0" err="1" smtClean="0"/>
+              <a:t>matlab</a:t>
+            </a:r>
+            <a:r>
+              <a:rPr lang="en-GB" dirty="0" smtClean="0"/>
+              <a:t> </a:t>
+            </a:r>
+            <a:r>
+              <a:rPr lang="en-GB" dirty="0" smtClean="0"/>
+              <a:t>toolbox: Bad </a:t>
+            </a:r>
+            <a:r>
+              <a:rPr lang="en-GB" dirty="0" smtClean="0"/>
+              <a:t>results</a:t>
+            </a:r>
           </a:p>
           <a:p>
             <a:pPr marL="342900" indent="-342900">
+              <a:lnSpc>
+                <a:spcPct val="150000"/>
+              </a:lnSpc>
               <a:buFont typeface="+mj-lt"/>
               <a:buAutoNum type="arabicPeriod"/>
             </a:pPr>
             <a:r>
               <a:rPr lang="en-GB" dirty="0" smtClean="0"/>
-              <a:t>Interpolation of data, sampling at higher frequency-&gt; new </a:t>
-            </a:r>
-            <a:r>
-              <a:rPr lang="en-GB" dirty="0" err="1" smtClean="0"/>
-              <a:t>traning</a:t>
+              <a:t>Interpolation </a:t>
+            </a:r>
+            <a:r>
+              <a:rPr lang="en-GB" dirty="0" smtClean="0"/>
+              <a:t>of data, sampling at higher </a:t>
+            </a:r>
+            <a:r>
+              <a:rPr lang="en-GB" dirty="0" smtClean="0"/>
+              <a:t>frequency, in order to obtain more training data: Bad results</a:t>
             </a:r>
             <a:endParaRPr lang="en-GB" dirty="0" smtClean="0"/>
           </a:p>
           <a:p>
             <a:pPr marL="342900" indent="-342900">
+              <a:lnSpc>
+                <a:spcPct val="150000"/>
+              </a:lnSpc>
               <a:buFont typeface="+mj-lt"/>
               <a:buAutoNum type="arabicPeriod"/>
             </a:pPr>
             <a:r>
               <a:rPr lang="en-GB" dirty="0" smtClean="0"/>
-              <a:t>Better experimental data wont be </a:t>
+              <a:t>Best result in terms of minimum variance found setting the input delay to 1: 5</a:t>
+            </a:r>
+            <a:r>
+              <a:rPr lang="en-GB" baseline="30000" dirty="0" smtClean="0"/>
+              <a:t>th</a:t>
             </a:r>
             <a:r>
               <a:rPr lang="en-GB" dirty="0" smtClean="0"/>
-              <a:t>bad</a:t>
-            </a:r>
+              <a:t> order system with poles and</a:t>
+            </a:r>
+            <a:br>
+              <a:rPr lang="en-GB" dirty="0" smtClean="0"/>
+            </a:br>
+            <a:r>
+              <a:rPr lang="en-GB" dirty="0" smtClean="0"/>
+              <a:t>zeros condensed in a small area, suggesting a bad identification.</a:t>
+            </a:r>
+            <a:endParaRPr lang="en-GB" dirty="0" smtClean="0"/>
+          </a:p>
+          <a:p>
+            <a:pPr>
+              <a:lnSpc>
+                <a:spcPct val="150000"/>
+              </a:lnSpc>
+            </a:pPr>
+            <a:endParaRPr lang="en-GB" dirty="0" smtClean="0"/>
+          </a:p>
+          <a:p>
+            <a:pPr>
+              <a:lnSpc>
+                <a:spcPct val="150000"/>
+              </a:lnSpc>
+            </a:pPr>
+            <a:r>
+              <a:rPr lang="en-GB" dirty="0" smtClean="0"/>
+              <a:t>Something more to try:</a:t>
+            </a:r>
+            <a:endParaRPr lang="en-GB" dirty="0" smtClean="0"/>
           </a:p>
           <a:p>
             <a:pPr marL="342900" indent="-342900">
+              <a:lnSpc>
+                <a:spcPct val="150000"/>
+              </a:lnSpc>
               <a:buFont typeface="+mj-lt"/>
               <a:buAutoNum type="arabicPeriod"/>
             </a:pPr>
             <a:r>
-              <a:rPr lang="en-GB" dirty="0" err="1" smtClean="0"/>
-              <a:t>Istrunemtnal</a:t>
+              <a:rPr lang="en-GB" dirty="0" smtClean="0"/>
+              <a:t>Instrumental </a:t>
+            </a:r>
+            <a:r>
+              <a:rPr lang="en-GB" dirty="0" smtClean="0"/>
+              <a:t>variable </a:t>
+            </a:r>
+            <a:r>
+              <a:rPr lang="en-GB" dirty="0" smtClean="0"/>
+              <a:t>method</a:t>
+            </a:r>
+          </a:p>
+          <a:p>
+            <a:pPr marL="342900" indent="-342900">
+              <a:lnSpc>
+                <a:spcPct val="150000"/>
+              </a:lnSpc>
+              <a:buFont typeface="+mj-lt"/>
+              <a:buAutoNum type="arabicPeriod"/>
+            </a:pPr>
+            <a:r>
+              <a:rPr lang="en-GB" dirty="0" smtClean="0"/>
+              <a:t>New experiments including impulse and step response</a:t>
+            </a:r>
+          </a:p>
+          <a:p>
+            <a:pPr marL="342900" indent="-342900">
+              <a:lnSpc>
+                <a:spcPct val="150000"/>
+              </a:lnSpc>
+              <a:buFont typeface="+mj-lt"/>
+              <a:buAutoNum type="arabicPeriod"/>
+            </a:pPr>
+            <a:r>
+              <a:rPr lang="en-GB" dirty="0" smtClean="0"/>
+              <a:t>Compare results with </a:t>
             </a:r>
             <a:r>
               <a:rPr lang="en-GB" smtClean="0"/>
-              <a:t> variable method</a:t>
-            </a:r>
+              <a:t>a physical model</a:t>
+            </a:r>
+            <a:endParaRPr lang="en-GB" dirty="0" smtClean="0"/>
+          </a:p>
+          <a:p>
+            <a:pPr marL="342900" indent="-342900">
+              <a:lnSpc>
+                <a:spcPct val="150000"/>
+              </a:lnSpc>
+              <a:buFont typeface="+mj-lt"/>
+              <a:buAutoNum type="arabicPeriod"/>
+            </a:pPr>
             <a:endParaRPr lang="en-GB" dirty="0"/>
           </a:p>
         </p:txBody>
@@ -25529,15 +25629,15 @@
           <a:p>
             <a:r>
               <a:rPr lang="en-GB" dirty="0" smtClean="0"/>
-              <a:t>Experiments are quite similar, though the third one has some differences. For identification </a:t>
-            </a:r>
-            <a:r>
-              <a:rPr lang="en-GB" dirty="0" err="1" smtClean="0"/>
-              <a:t>puroposes</a:t>
+              <a:t>Experiments are quite similar, though the third one has some differences. For </a:t>
+            </a:r>
+            <a:r>
+              <a:rPr lang="en-GB" smtClean="0"/>
+              <a:t>identification purposes </a:t>
             </a:r>
             <a:r>
               <a:rPr lang="en-GB" dirty="0" smtClean="0"/>
-              <a:t> we’ll see</a:t>
+              <a:t>we’ll see</a:t>
             </a:r>
           </a:p>
           <a:p>
@@ -25752,8 +25852,8 @@
           <a:chExt cx="0" cy="0"/>
         </a:xfrm>
       </p:grpSpPr>
-      <mc:AlternateContent xmlns:mc="http://schemas.openxmlformats.org/markup-compatibility/2006" xmlns:a14="http://schemas.microsoft.com/office/drawing/2010/main">
-        <mc:Choice Requires="a14">
+      <mc:AlternateContent xmlns:mc="http://schemas.openxmlformats.org/markup-compatibility/2006">
+        <mc:Choice xmlns:a14="http://schemas.microsoft.com/office/drawing/2010/main" Requires="a14">
           <p:sp>
             <p:nvSpPr>
               <p:cNvPr id="2" name="Content Placeholder 1"/>
@@ -25847,7 +25947,11 @@
                 </a:r>
                 <a:r>
                   <a:rPr lang="en-GB" dirty="0" smtClean="0"/>
-                  <a:t> ) the estimate of a parametric model</a:t>
+                  <a:t>) </a:t>
+                </a:r>
+                <a:r>
+                  <a:rPr lang="en-GB" dirty="0" smtClean="0"/>
+                  <a:t>the estimate of a parametric model</a:t>
                 </a:r>
               </a:p>
               <a:p>
@@ -25891,7 +25995,7 @@
             </p:txBody>
           </p:sp>
         </mc:Choice>
-        <mc:Fallback xmlns="">
+        <mc:Fallback>
           <p:sp>
             <p:nvSpPr>
               <p:cNvPr id="2" name="Content Placeholder 1"/>
@@ -25915,7 +26019,7 @@
               <a:lstStyle/>
               <a:p>
                 <a:r>
-                  <a:rPr lang="en-GB">
+                  <a:rPr lang="it-IT">
                     <a:noFill/>
                   </a:rPr>
                   <a:t> </a:t>

</xml_diff>